<commit_message>
slide funcionalidades do CADIMA e exclusão da tabela que compara as funcionalidades dos softwares.
</commit_message>
<xml_diff>
--- a/apresentacao-revisao-sistematica.pptx
+++ b/apresentacao-revisao-sistematica.pptx
@@ -15,32 +15,25 @@
     <p:sldId id="271" r:id="rId6"/>
     <p:sldId id="274" r:id="rId7"/>
     <p:sldId id="272" r:id="rId8"/>
-    <p:sldId id="275" r:id="rId9"/>
-    <p:sldId id="267" r:id="rId10"/>
-    <p:sldId id="273" r:id="rId11"/>
+    <p:sldId id="267" r:id="rId9"/>
+    <p:sldId id="273" r:id="rId10"/>
+    <p:sldId id="276" r:id="rId11"/>
     <p:sldId id="270" r:id="rId12"/>
   </p:sldIdLst>
   <p:sldSz cx="9144000" cy="5143500" type="screen16x9"/>
   <p:notesSz cx="6858000" cy="9144000"/>
   <p:embeddedFontLst>
     <p:embeddedFont>
-      <p:font typeface="Calibri" panose="020F0502020204030204" pitchFamily="34" charset="0"/>
+      <p:font typeface="Maven Pro" panose="020B0604020202020204" charset="0"/>
       <p:regular r:id="rId14"/>
       <p:bold r:id="rId15"/>
-      <p:italic r:id="rId16"/>
-      <p:boldItalic r:id="rId17"/>
-    </p:embeddedFont>
-    <p:embeddedFont>
-      <p:font typeface="Maven Pro" panose="020B0604020202020204" charset="0"/>
-      <p:regular r:id="rId18"/>
-      <p:bold r:id="rId19"/>
     </p:embeddedFont>
     <p:embeddedFont>
       <p:font typeface="Nunito" panose="00000500000000000000" pitchFamily="2" charset="0"/>
-      <p:regular r:id="rId20"/>
-      <p:bold r:id="rId21"/>
-      <p:italic r:id="rId22"/>
-      <p:boldItalic r:id="rId23"/>
+      <p:regular r:id="rId16"/>
+      <p:bold r:id="rId17"/>
+      <p:italic r:id="rId18"/>
+      <p:boldItalic r:id="rId19"/>
     </p:embeddedFont>
   </p:embeddedFontLst>
   <p:defaultTextStyle>
@@ -8639,100 +8632,6 @@
 </file>
 
 <file path=ppt/notesSlides/notesSlide6.xml><?xml version="1.0" encoding="utf-8"?>
-<p:notes xmlns:a="http://schemas.openxmlformats.org/drawingml/2006/main" xmlns:r="http://schemas.openxmlformats.org/officeDocument/2006/relationships" xmlns:p="http://schemas.openxmlformats.org/presentationml/2006/main">
-  <p:cSld>
-    <p:spTree>
-      <p:nvGrpSpPr>
-        <p:cNvPr id="1" name=""/>
-        <p:cNvGrpSpPr/>
-        <p:nvPr/>
-      </p:nvGrpSpPr>
-      <p:grpSpPr>
-        <a:xfrm>
-          <a:off x="0" y="0"/>
-          <a:ext cx="0" cy="0"/>
-          <a:chOff x="0" y="0"/>
-          <a:chExt cx="0" cy="0"/>
-        </a:xfrm>
-      </p:grpSpPr>
-      <p:sp>
-        <p:nvSpPr>
-          <p:cNvPr id="2" name="Espaço Reservado para Imagem de Slide 1"/>
-          <p:cNvSpPr>
-            <a:spLocks noGrp="1" noRot="1" noChangeAspect="1"/>
-          </p:cNvSpPr>
-          <p:nvPr>
-            <p:ph type="sldImg"/>
-          </p:nvPr>
-        </p:nvSpPr>
-        <p:spPr>
-          <a:xfrm>
-            <a:off x="381000" y="685800"/>
-            <a:ext cx="6096000" cy="3429000"/>
-          </a:xfrm>
-        </p:spPr>
-      </p:sp>
-      <p:sp>
-        <p:nvSpPr>
-          <p:cNvPr id="3" name="Espaço Reservado para Anotações 2"/>
-          <p:cNvSpPr>
-            <a:spLocks noGrp="1"/>
-          </p:cNvSpPr>
-          <p:nvPr>
-            <p:ph type="body" idx="1"/>
-          </p:nvPr>
-        </p:nvSpPr>
-        <p:spPr/>
-        <p:txBody>
-          <a:bodyPr/>
-          <a:lstStyle/>
-          <a:p>
-            <a:pPr marL="158750" marR="0" lvl="0" indent="0" algn="l" defTabSz="914400" rtl="0" eaLnBrk="1" fontAlgn="auto" latinLnBrk="0" hangingPunct="1">
-              <a:lnSpc>
-                <a:spcPct val="100000"/>
-              </a:lnSpc>
-              <a:spcBef>
-                <a:spcPts val="0"/>
-              </a:spcBef>
-              <a:spcAft>
-                <a:spcPts val="0"/>
-              </a:spcAft>
-              <a:buClr>
-                <a:srgbClr val="000000"/>
-              </a:buClr>
-              <a:buSzPts val="1100"/>
-              <a:buFont typeface="Arial"/>
-              <a:buNone/>
-              <a:tabLst/>
-              <a:defRPr/>
-            </a:pPr>
-            <a:r>
-              <a:rPr lang="pt-BR" dirty="0"/>
-              <a:t>Comparação da funcionalidade dos pacotes de software de gerenciamento de revisão sistemática atualmente disponíveis</a:t>
-            </a:r>
-          </a:p>
-          <a:p>
-            <a:pPr marL="158750" indent="0">
-              <a:buNone/>
-            </a:pPr>
-            <a:endParaRPr lang="pt-BR" dirty="0"/>
-          </a:p>
-        </p:txBody>
-      </p:sp>
-    </p:spTree>
-    <p:extLst>
-      <p:ext uri="{BB962C8B-B14F-4D97-AF65-F5344CB8AC3E}">
-        <p14:creationId xmlns:p14="http://schemas.microsoft.com/office/powerpoint/2010/main" val="2111372944"/>
-      </p:ext>
-    </p:extLst>
-  </p:cSld>
-  <p:clrMapOvr>
-    <a:masterClrMapping/>
-  </p:clrMapOvr>
-</p:notes>
-</file>
-
-<file path=ppt/notesSlides/notesSlide7.xml><?xml version="1.0" encoding="utf-8"?>
 <p:notes xmlns:a="http://schemas.openxmlformats.org/drawingml/2006/main" xmlns:r="http://schemas.openxmlformats.org/officeDocument/2006/relationships" xmlns:p="http://schemas.openxmlformats.org/presentationml/2006/main" showMasterSp="0" showMasterPhAnim="0">
   <p:cSld>
     <p:spTree>
@@ -8879,7 +8778,7 @@
 </p:notes>
 </file>
 
-<file path=ppt/notesSlides/notesSlide8.xml><?xml version="1.0" encoding="utf-8"?>
+<file path=ppt/notesSlides/notesSlide7.xml><?xml version="1.0" encoding="utf-8"?>
 <p:notes xmlns:a="http://schemas.openxmlformats.org/drawingml/2006/main" xmlns:r="http://schemas.openxmlformats.org/officeDocument/2006/relationships" xmlns:p="http://schemas.openxmlformats.org/presentationml/2006/main" showMasterSp="0" showMasterPhAnim="0">
   <p:cSld>
     <p:spTree>
@@ -23010,7 +22909,7 @@
           <p:cNvPr id="2" name="Título 1">
             <a:extLst>
               <a:ext uri="{FF2B5EF4-FFF2-40B4-BE49-F238E27FC236}">
-                <a16:creationId xmlns:a16="http://schemas.microsoft.com/office/drawing/2014/main" id="{F6C4B51F-0372-4C26-85B8-F6054AE0B5EF}"/>
+                <a16:creationId xmlns:a16="http://schemas.microsoft.com/office/drawing/2014/main" id="{6BA4C740-8BC1-4E1F-BD3C-E1C3AD1DA824}"/>
               </a:ext>
             </a:extLst>
           </p:cNvPr>
@@ -23021,49 +22920,47 @@
             <p:ph type="title"/>
           </p:nvPr>
         </p:nvSpPr>
-        <p:spPr>
-          <a:xfrm>
-            <a:off x="1303800" y="598575"/>
-            <a:ext cx="7030500" cy="999300"/>
-          </a:xfrm>
-        </p:spPr>
+        <p:spPr/>
         <p:txBody>
           <a:bodyPr/>
           <a:lstStyle/>
           <a:p>
             <a:r>
               <a:rPr lang="pt-BR" dirty="0"/>
-              <a:t>CADIMA</a:t>
+              <a:t>Funcionalidades CADIMA</a:t>
             </a:r>
           </a:p>
         </p:txBody>
       </p:sp>
-      <p:graphicFrame>
-        <p:nvGraphicFramePr>
-          <p:cNvPr id="6" name="Diagrama 5">
+      <p:sp>
+        <p:nvSpPr>
+          <p:cNvPr id="3" name="Espaço Reservado para Texto 2">
             <a:extLst>
               <a:ext uri="{FF2B5EF4-FFF2-40B4-BE49-F238E27FC236}">
-                <a16:creationId xmlns:a16="http://schemas.microsoft.com/office/drawing/2014/main" id="{8FCD1805-A8C1-46C2-81C2-0C4ABBFCECD9}"/>
+                <a16:creationId xmlns:a16="http://schemas.microsoft.com/office/drawing/2014/main" id="{2785D4E1-9B1B-491C-8E9D-4AC33BDF0499}"/>
               </a:ext>
             </a:extLst>
           </p:cNvPr>
-          <p:cNvGraphicFramePr/>
-          <p:nvPr/>
-        </p:nvGraphicFramePr>
-        <p:xfrm>
-          <a:off x="1303338" y="1990725"/>
-          <a:ext cx="7031037" cy="2541588"/>
-        </p:xfrm>
-        <a:graphic>
-          <a:graphicData uri="http://schemas.openxmlformats.org/drawingml/2006/diagram">
-            <dgm:relIds xmlns:dgm="http://schemas.openxmlformats.org/drawingml/2006/diagram" xmlns:r="http://schemas.openxmlformats.org/officeDocument/2006/relationships" r:dm="rId2" r:lo="rId3" r:qs="rId4" r:cs="rId5"/>
-          </a:graphicData>
-        </a:graphic>
-      </p:graphicFrame>
+          <p:cNvSpPr>
+            <a:spLocks noGrp="1"/>
+          </p:cNvSpPr>
+          <p:nvPr>
+            <p:ph type="body" idx="1"/>
+          </p:nvPr>
+        </p:nvSpPr>
+        <p:spPr/>
+        <p:txBody>
+          <a:bodyPr/>
+          <a:lstStyle/>
+          <a:p>
+            <a:endParaRPr lang="pt-BR"/>
+          </a:p>
+        </p:txBody>
+      </p:sp>
     </p:spTree>
     <p:extLst>
       <p:ext uri="{BB962C8B-B14F-4D97-AF65-F5344CB8AC3E}">
-        <p14:creationId xmlns:p14="http://schemas.microsoft.com/office/powerpoint/2010/main" val="3846482829"/>
+        <p14:creationId xmlns:p14="http://schemas.microsoft.com/office/powerpoint/2010/main" val="2857494968"/>
       </p:ext>
     </p:extLst>
   </p:cSld>
@@ -24956,2429 +24853,6 @@
   <p:cSld>
     <p:spTree>
       <p:nvGrpSpPr>
-        <p:cNvPr id="1" name=""/>
-        <p:cNvGrpSpPr/>
-        <p:nvPr/>
-      </p:nvGrpSpPr>
-      <p:grpSpPr>
-        <a:xfrm>
-          <a:off x="0" y="0"/>
-          <a:ext cx="0" cy="0"/>
-          <a:chOff x="0" y="0"/>
-          <a:chExt cx="0" cy="0"/>
-        </a:xfrm>
-      </p:grpSpPr>
-      <p:sp>
-        <p:nvSpPr>
-          <p:cNvPr id="2" name="Título 1">
-            <a:extLst>
-              <a:ext uri="{FF2B5EF4-FFF2-40B4-BE49-F238E27FC236}">
-                <a16:creationId xmlns:a16="http://schemas.microsoft.com/office/drawing/2014/main" id="{D3A1AA29-EDCA-42A4-86D0-BA06C1FE376A}"/>
-              </a:ext>
-            </a:extLst>
-          </p:cNvPr>
-          <p:cNvSpPr>
-            <a:spLocks noGrp="1"/>
-          </p:cNvSpPr>
-          <p:nvPr>
-            <p:ph type="title"/>
-          </p:nvPr>
-        </p:nvSpPr>
-        <p:spPr/>
-        <p:txBody>
-          <a:bodyPr/>
-          <a:lstStyle/>
-          <a:p>
-            <a:r>
-              <a:rPr lang="pt-BR" dirty="0"/>
-              <a:t>Alguns softwares disponíveis </a:t>
-            </a:r>
-          </a:p>
-        </p:txBody>
-      </p:sp>
-      <p:sp>
-        <p:nvSpPr>
-          <p:cNvPr id="3" name="Espaço Reservado para Texto 2">
-            <a:extLst>
-              <a:ext uri="{FF2B5EF4-FFF2-40B4-BE49-F238E27FC236}">
-                <a16:creationId xmlns:a16="http://schemas.microsoft.com/office/drawing/2014/main" id="{DF43DBF4-ADD7-4D0C-8E61-985CE0C91445}"/>
-              </a:ext>
-            </a:extLst>
-          </p:cNvPr>
-          <p:cNvSpPr>
-            <a:spLocks noGrp="1"/>
-          </p:cNvSpPr>
-          <p:nvPr>
-            <p:ph type="body" idx="1"/>
-          </p:nvPr>
-        </p:nvSpPr>
-        <p:spPr/>
-        <p:txBody>
-          <a:bodyPr/>
-          <a:lstStyle/>
-          <a:p>
-            <a:endParaRPr lang="pt-BR"/>
-          </a:p>
-        </p:txBody>
-      </p:sp>
-      <p:graphicFrame>
-        <p:nvGraphicFramePr>
-          <p:cNvPr id="4" name="Tabela 3">
-            <a:extLst>
-              <a:ext uri="{FF2B5EF4-FFF2-40B4-BE49-F238E27FC236}">
-                <a16:creationId xmlns:a16="http://schemas.microsoft.com/office/drawing/2014/main" id="{61D7FEC8-7753-45ED-9C33-FCE3AC4F824E}"/>
-              </a:ext>
-            </a:extLst>
-          </p:cNvPr>
-          <p:cNvGraphicFramePr>
-            <a:graphicFrameLocks noGrp="1"/>
-          </p:cNvGraphicFramePr>
-          <p:nvPr/>
-        </p:nvGraphicFramePr>
-        <p:xfrm>
-          <a:off x="311150" y="1008856"/>
-          <a:ext cx="8521699" cy="4233167"/>
-        </p:xfrm>
-        <a:graphic>
-          <a:graphicData uri="http://schemas.openxmlformats.org/drawingml/2006/table">
-            <a:tbl>
-              <a:tblPr firstRow="1" firstCol="1" bandRow="1">
-                <a:tableStyleId>{5C22544A-7EE6-4342-B048-85BDC9FD1C3A}</a:tableStyleId>
-              </a:tblPr>
-              <a:tblGrid>
-                <a:gridCol w="753276">
-                  <a:extLst>
-                    <a:ext uri="{9D8B030D-6E8A-4147-A177-3AD203B41FA5}">
-                      <a16:colId xmlns:a16="http://schemas.microsoft.com/office/drawing/2014/main" val="3288685528"/>
-                    </a:ext>
-                  </a:extLst>
-                </a:gridCol>
-                <a:gridCol w="871413">
-                  <a:extLst>
-                    <a:ext uri="{9D8B030D-6E8A-4147-A177-3AD203B41FA5}">
-                      <a16:colId xmlns:a16="http://schemas.microsoft.com/office/drawing/2014/main" val="519527359"/>
-                    </a:ext>
-                  </a:extLst>
-                </a:gridCol>
-                <a:gridCol w="1083329">
-                  <a:extLst>
-                    <a:ext uri="{9D8B030D-6E8A-4147-A177-3AD203B41FA5}">
-                      <a16:colId xmlns:a16="http://schemas.microsoft.com/office/drawing/2014/main" val="3958378779"/>
-                    </a:ext>
-                  </a:extLst>
-                </a:gridCol>
-                <a:gridCol w="793467">
-                  <a:extLst>
-                    <a:ext uri="{9D8B030D-6E8A-4147-A177-3AD203B41FA5}">
-                      <a16:colId xmlns:a16="http://schemas.microsoft.com/office/drawing/2014/main" val="1766806889"/>
-                    </a:ext>
-                  </a:extLst>
-                </a:gridCol>
-                <a:gridCol w="880547">
-                  <a:extLst>
-                    <a:ext uri="{9D8B030D-6E8A-4147-A177-3AD203B41FA5}">
-                      <a16:colId xmlns:a16="http://schemas.microsoft.com/office/drawing/2014/main" val="2964880731"/>
-                    </a:ext>
-                  </a:extLst>
-                </a:gridCol>
-                <a:gridCol w="732571">
-                  <a:extLst>
-                    <a:ext uri="{9D8B030D-6E8A-4147-A177-3AD203B41FA5}">
-                      <a16:colId xmlns:a16="http://schemas.microsoft.com/office/drawing/2014/main" val="3907787973"/>
-                    </a:ext>
-                  </a:extLst>
-                </a:gridCol>
-                <a:gridCol w="812344">
-                  <a:extLst>
-                    <a:ext uri="{9D8B030D-6E8A-4147-A177-3AD203B41FA5}">
-                      <a16:colId xmlns:a16="http://schemas.microsoft.com/office/drawing/2014/main" val="3075618855"/>
-                    </a:ext>
-                  </a:extLst>
-                </a:gridCol>
-                <a:gridCol w="789204">
-                  <a:extLst>
-                    <a:ext uri="{9D8B030D-6E8A-4147-A177-3AD203B41FA5}">
-                      <a16:colId xmlns:a16="http://schemas.microsoft.com/office/drawing/2014/main" val="3637989100"/>
-                    </a:ext>
-                  </a:extLst>
-                </a:gridCol>
-                <a:gridCol w="848882">
-                  <a:extLst>
-                    <a:ext uri="{9D8B030D-6E8A-4147-A177-3AD203B41FA5}">
-                      <a16:colId xmlns:a16="http://schemas.microsoft.com/office/drawing/2014/main" val="3499833860"/>
-                    </a:ext>
-                  </a:extLst>
-                </a:gridCol>
-                <a:gridCol w="956666">
-                  <a:extLst>
-                    <a:ext uri="{9D8B030D-6E8A-4147-A177-3AD203B41FA5}">
-                      <a16:colId xmlns:a16="http://schemas.microsoft.com/office/drawing/2014/main" val="3732983824"/>
-                    </a:ext>
-                  </a:extLst>
-                </a:gridCol>
-              </a:tblGrid>
-              <a:tr h="336447">
-                <a:tc>
-                  <a:txBody>
-                    <a:bodyPr/>
-                    <a:lstStyle/>
-                    <a:p>
-                      <a:pPr>
-                        <a:lnSpc>
-                          <a:spcPct val="107000"/>
-                        </a:lnSpc>
-                        <a:spcAft>
-                          <a:spcPts val="800"/>
-                        </a:spcAft>
-                      </a:pPr>
-                      <a:r>
-                        <a:rPr lang="pt-BR" sz="1100">
-                          <a:effectLst/>
-                        </a:rPr>
-                        <a:t>Nome do Software</a:t>
-                      </a:r>
-                      <a:endParaRPr lang="pt-BR" sz="1100">
-                        <a:effectLst/>
-                        <a:latin typeface="Calibri" panose="020F0502020204030204" pitchFamily="34" charset="0"/>
-                        <a:ea typeface="Calibri" panose="020F0502020204030204" pitchFamily="34" charset="0"/>
-                        <a:cs typeface="Times New Roman" panose="02020603050405020304" pitchFamily="18" charset="0"/>
-                      </a:endParaRPr>
-                    </a:p>
-                  </a:txBody>
-                  <a:tcPr marL="65767" marR="65767" marT="0" marB="0"/>
-                </a:tc>
-                <a:tc>
-                  <a:txBody>
-                    <a:bodyPr/>
-                    <a:lstStyle/>
-                    <a:p>
-                      <a:pPr>
-                        <a:lnSpc>
-                          <a:spcPct val="107000"/>
-                        </a:lnSpc>
-                        <a:spcAft>
-                          <a:spcPts val="800"/>
-                        </a:spcAft>
-                      </a:pPr>
-                      <a:r>
-                        <a:rPr lang="pt-BR" sz="1100">
-                          <a:effectLst/>
-                        </a:rPr>
-                        <a:t>Configurando a revisão</a:t>
-                      </a:r>
-                      <a:endParaRPr lang="pt-BR" sz="1100">
-                        <a:effectLst/>
-                        <a:latin typeface="Calibri" panose="020F0502020204030204" pitchFamily="34" charset="0"/>
-                        <a:ea typeface="Calibri" panose="020F0502020204030204" pitchFamily="34" charset="0"/>
-                        <a:cs typeface="Times New Roman" panose="02020603050405020304" pitchFamily="18" charset="0"/>
-                      </a:endParaRPr>
-                    </a:p>
-                  </a:txBody>
-                  <a:tcPr marL="65767" marR="65767" marT="0" marB="0"/>
-                </a:tc>
-                <a:tc>
-                  <a:txBody>
-                    <a:bodyPr/>
-                    <a:lstStyle/>
-                    <a:p>
-                      <a:pPr>
-                        <a:lnSpc>
-                          <a:spcPct val="107000"/>
-                        </a:lnSpc>
-                        <a:spcAft>
-                          <a:spcPts val="800"/>
-                        </a:spcAft>
-                      </a:pPr>
-                      <a:r>
-                        <a:rPr lang="pt-BR" sz="1100">
-                          <a:effectLst/>
-                        </a:rPr>
-                        <a:t>Escopo / estudo piloto</a:t>
-                      </a:r>
-                      <a:endParaRPr lang="pt-BR" sz="1100">
-                        <a:effectLst/>
-                        <a:latin typeface="Calibri" panose="020F0502020204030204" pitchFamily="34" charset="0"/>
-                        <a:ea typeface="Calibri" panose="020F0502020204030204" pitchFamily="34" charset="0"/>
-                        <a:cs typeface="Times New Roman" panose="02020603050405020304" pitchFamily="18" charset="0"/>
-                      </a:endParaRPr>
-                    </a:p>
-                  </a:txBody>
-                  <a:tcPr marL="65767" marR="65767" marT="0" marB="0"/>
-                </a:tc>
-                <a:tc>
-                  <a:txBody>
-                    <a:bodyPr/>
-                    <a:lstStyle/>
-                    <a:p>
-                      <a:pPr>
-                        <a:lnSpc>
-                          <a:spcPct val="107000"/>
-                        </a:lnSpc>
-                        <a:spcAft>
-                          <a:spcPts val="800"/>
-                        </a:spcAft>
-                      </a:pPr>
-                      <a:r>
-                        <a:rPr lang="pt-BR" sz="1100">
-                          <a:effectLst/>
-                        </a:rPr>
-                        <a:t>Pesquisa de literatura</a:t>
-                      </a:r>
-                      <a:endParaRPr lang="pt-BR" sz="1100">
-                        <a:effectLst/>
-                        <a:latin typeface="Calibri" panose="020F0502020204030204" pitchFamily="34" charset="0"/>
-                        <a:ea typeface="Calibri" panose="020F0502020204030204" pitchFamily="34" charset="0"/>
-                        <a:cs typeface="Times New Roman" panose="02020603050405020304" pitchFamily="18" charset="0"/>
-                      </a:endParaRPr>
-                    </a:p>
-                  </a:txBody>
-                  <a:tcPr marL="65767" marR="65767" marT="0" marB="0"/>
-                </a:tc>
-                <a:tc>
-                  <a:txBody>
-                    <a:bodyPr/>
-                    <a:lstStyle/>
-                    <a:p>
-                      <a:pPr>
-                        <a:lnSpc>
-                          <a:spcPct val="107000"/>
-                        </a:lnSpc>
-                        <a:spcAft>
-                          <a:spcPts val="800"/>
-                        </a:spcAft>
-                      </a:pPr>
-                      <a:r>
-                        <a:rPr lang="pt-BR" sz="1100">
-                          <a:effectLst/>
-                        </a:rPr>
-                        <a:t>Verificação de duplicado</a:t>
-                      </a:r>
-                      <a:endParaRPr lang="pt-BR" sz="1100">
-                        <a:effectLst/>
-                        <a:latin typeface="Calibri" panose="020F0502020204030204" pitchFamily="34" charset="0"/>
-                        <a:ea typeface="Calibri" panose="020F0502020204030204" pitchFamily="34" charset="0"/>
-                        <a:cs typeface="Times New Roman" panose="02020603050405020304" pitchFamily="18" charset="0"/>
-                      </a:endParaRPr>
-                    </a:p>
-                  </a:txBody>
-                  <a:tcPr marL="65767" marR="65767" marT="0" marB="0"/>
-                </a:tc>
-                <a:tc>
-                  <a:txBody>
-                    <a:bodyPr/>
-                    <a:lstStyle/>
-                    <a:p>
-                      <a:pPr>
-                        <a:lnSpc>
-                          <a:spcPct val="107000"/>
-                        </a:lnSpc>
-                        <a:spcAft>
-                          <a:spcPts val="800"/>
-                        </a:spcAft>
-                      </a:pPr>
-                      <a:r>
-                        <a:rPr lang="pt-BR" sz="1100">
-                          <a:effectLst/>
-                        </a:rPr>
-                        <a:t>Triagem de artigos</a:t>
-                      </a:r>
-                      <a:endParaRPr lang="pt-BR" sz="1100">
-                        <a:effectLst/>
-                        <a:latin typeface="Calibri" panose="020F0502020204030204" pitchFamily="34" charset="0"/>
-                        <a:ea typeface="Calibri" panose="020F0502020204030204" pitchFamily="34" charset="0"/>
-                        <a:cs typeface="Times New Roman" panose="02020603050405020304" pitchFamily="18" charset="0"/>
-                      </a:endParaRPr>
-                    </a:p>
-                  </a:txBody>
-                  <a:tcPr marL="65767" marR="65767" marT="0" marB="0"/>
-                </a:tc>
-                <a:tc>
-                  <a:txBody>
-                    <a:bodyPr/>
-                    <a:lstStyle/>
-                    <a:p>
-                      <a:pPr>
-                        <a:lnSpc>
-                          <a:spcPct val="107000"/>
-                        </a:lnSpc>
-                        <a:spcAft>
-                          <a:spcPts val="800"/>
-                        </a:spcAft>
-                      </a:pPr>
-                      <a:r>
-                        <a:rPr lang="pt-BR" sz="1100">
-                          <a:effectLst/>
-                        </a:rPr>
-                        <a:t>Codificação de dados</a:t>
-                      </a:r>
-                      <a:endParaRPr lang="pt-BR" sz="1100">
-                        <a:effectLst/>
-                        <a:latin typeface="Calibri" panose="020F0502020204030204" pitchFamily="34" charset="0"/>
-                        <a:ea typeface="Calibri" panose="020F0502020204030204" pitchFamily="34" charset="0"/>
-                        <a:cs typeface="Times New Roman" panose="02020603050405020304" pitchFamily="18" charset="0"/>
-                      </a:endParaRPr>
-                    </a:p>
-                  </a:txBody>
-                  <a:tcPr marL="65767" marR="65767" marT="0" marB="0"/>
-                </a:tc>
-                <a:tc>
-                  <a:txBody>
-                    <a:bodyPr/>
-                    <a:lstStyle/>
-                    <a:p>
-                      <a:pPr>
-                        <a:lnSpc>
-                          <a:spcPct val="107000"/>
-                        </a:lnSpc>
-                        <a:spcAft>
-                          <a:spcPts val="800"/>
-                        </a:spcAft>
-                      </a:pPr>
-                      <a:r>
-                        <a:rPr lang="pt-BR" sz="1100">
-                          <a:effectLst/>
-                        </a:rPr>
-                        <a:t>Avaliação crítica</a:t>
-                      </a:r>
-                      <a:endParaRPr lang="pt-BR" sz="1100">
-                        <a:effectLst/>
-                        <a:latin typeface="Calibri" panose="020F0502020204030204" pitchFamily="34" charset="0"/>
-                        <a:ea typeface="Calibri" panose="020F0502020204030204" pitchFamily="34" charset="0"/>
-                        <a:cs typeface="Times New Roman" panose="02020603050405020304" pitchFamily="18" charset="0"/>
-                      </a:endParaRPr>
-                    </a:p>
-                  </a:txBody>
-                  <a:tcPr marL="65767" marR="65767" marT="0" marB="0"/>
-                </a:tc>
-                <a:tc>
-                  <a:txBody>
-                    <a:bodyPr/>
-                    <a:lstStyle/>
-                    <a:p>
-                      <a:pPr>
-                        <a:lnSpc>
-                          <a:spcPct val="107000"/>
-                        </a:lnSpc>
-                        <a:spcAft>
-                          <a:spcPts val="800"/>
-                        </a:spcAft>
-                      </a:pPr>
-                      <a:r>
-                        <a:rPr lang="pt-BR" sz="1100">
-                          <a:effectLst/>
-                        </a:rPr>
-                        <a:t>Sínteses</a:t>
-                      </a:r>
-                      <a:endParaRPr lang="pt-BR" sz="1100">
-                        <a:effectLst/>
-                        <a:latin typeface="Calibri" panose="020F0502020204030204" pitchFamily="34" charset="0"/>
-                        <a:ea typeface="Calibri" panose="020F0502020204030204" pitchFamily="34" charset="0"/>
-                        <a:cs typeface="Times New Roman" panose="02020603050405020304" pitchFamily="18" charset="0"/>
-                      </a:endParaRPr>
-                    </a:p>
-                  </a:txBody>
-                  <a:tcPr marL="65767" marR="65767" marT="0" marB="0"/>
-                </a:tc>
-                <a:tc>
-                  <a:txBody>
-                    <a:bodyPr/>
-                    <a:lstStyle/>
-                    <a:p>
-                      <a:pPr>
-                        <a:lnSpc>
-                          <a:spcPct val="107000"/>
-                        </a:lnSpc>
-                        <a:spcAft>
-                          <a:spcPts val="800"/>
-                        </a:spcAft>
-                      </a:pPr>
-                      <a:r>
-                        <a:rPr lang="pt-BR" sz="1100">
-                          <a:effectLst/>
-                        </a:rPr>
-                        <a:t>Documentação</a:t>
-                      </a:r>
-                      <a:endParaRPr lang="pt-BR" sz="1100">
-                        <a:effectLst/>
-                        <a:latin typeface="Calibri" panose="020F0502020204030204" pitchFamily="34" charset="0"/>
-                        <a:ea typeface="Calibri" panose="020F0502020204030204" pitchFamily="34" charset="0"/>
-                        <a:cs typeface="Times New Roman" panose="02020603050405020304" pitchFamily="18" charset="0"/>
-                      </a:endParaRPr>
-                    </a:p>
-                  </a:txBody>
-                  <a:tcPr marL="65767" marR="65767" marT="0" marB="0"/>
-                </a:tc>
-                <a:extLst>
-                  <a:ext uri="{0D108BD9-81ED-4DB2-BD59-A6C34878D82A}">
-                    <a16:rowId xmlns:a16="http://schemas.microsoft.com/office/drawing/2014/main" val="135642397"/>
-                  </a:ext>
-                </a:extLst>
-              </a:tr>
-              <a:tr h="1368624">
-                <a:tc>
-                  <a:txBody>
-                    <a:bodyPr/>
-                    <a:lstStyle/>
-                    <a:p>
-                      <a:pPr>
-                        <a:lnSpc>
-                          <a:spcPct val="107000"/>
-                        </a:lnSpc>
-                        <a:spcAft>
-                          <a:spcPts val="800"/>
-                        </a:spcAft>
-                      </a:pPr>
-                      <a:r>
-                        <a:rPr lang="pt-BR" sz="1100">
-                          <a:effectLst/>
-                        </a:rPr>
-                        <a:t> </a:t>
-                      </a:r>
-                      <a:endParaRPr lang="pt-BR" sz="1100">
-                        <a:effectLst/>
-                        <a:latin typeface="Calibri" panose="020F0502020204030204" pitchFamily="34" charset="0"/>
-                        <a:ea typeface="Calibri" panose="020F0502020204030204" pitchFamily="34" charset="0"/>
-                        <a:cs typeface="Times New Roman" panose="02020603050405020304" pitchFamily="18" charset="0"/>
-                      </a:endParaRPr>
-                    </a:p>
-                  </a:txBody>
-                  <a:tcPr marL="65767" marR="65767" marT="0" marB="0"/>
-                </a:tc>
-                <a:tc>
-                  <a:txBody>
-                    <a:bodyPr/>
-                    <a:lstStyle/>
-                    <a:p>
-                      <a:pPr>
-                        <a:lnSpc>
-                          <a:spcPct val="107000"/>
-                        </a:lnSpc>
-                        <a:spcAft>
-                          <a:spcPts val="800"/>
-                        </a:spcAft>
-                      </a:pPr>
-                      <a:r>
-                        <a:rPr lang="pt-BR" sz="1100">
-                          <a:effectLst/>
-                        </a:rPr>
-                        <a:t>Facilitação de perguntas sobre a fórmula e / ou engajamento das partes interessadas</a:t>
-                      </a:r>
-                      <a:endParaRPr lang="pt-BR" sz="1100">
-                        <a:effectLst/>
-                        <a:latin typeface="Calibri" panose="020F0502020204030204" pitchFamily="34" charset="0"/>
-                        <a:ea typeface="Calibri" panose="020F0502020204030204" pitchFamily="34" charset="0"/>
-                        <a:cs typeface="Times New Roman" panose="02020603050405020304" pitchFamily="18" charset="0"/>
-                      </a:endParaRPr>
-                    </a:p>
-                  </a:txBody>
-                  <a:tcPr marL="65767" marR="65767" marT="0" marB="0"/>
-                </a:tc>
-                <a:tc>
-                  <a:txBody>
-                    <a:bodyPr/>
-                    <a:lstStyle/>
-                    <a:p>
-                      <a:pPr>
-                        <a:lnSpc>
-                          <a:spcPct val="107000"/>
-                        </a:lnSpc>
-                        <a:spcAft>
-                          <a:spcPts val="800"/>
-                        </a:spcAft>
-                      </a:pPr>
-                      <a:r>
-                        <a:rPr lang="pt-BR" sz="1100">
-                          <a:effectLst/>
-                        </a:rPr>
-                        <a:t>Desenvolvimento de protocolo, elementos PICO * especificados</a:t>
-                      </a:r>
-                      <a:endParaRPr lang="pt-BR" sz="1100">
-                        <a:effectLst/>
-                        <a:latin typeface="Calibri" panose="020F0502020204030204" pitchFamily="34" charset="0"/>
-                        <a:ea typeface="Calibri" panose="020F0502020204030204" pitchFamily="34" charset="0"/>
-                        <a:cs typeface="Times New Roman" panose="02020603050405020304" pitchFamily="18" charset="0"/>
-                      </a:endParaRPr>
-                    </a:p>
-                  </a:txBody>
-                  <a:tcPr marL="65767" marR="65767" marT="0" marB="0"/>
-                </a:tc>
-                <a:tc>
-                  <a:txBody>
-                    <a:bodyPr/>
-                    <a:lstStyle/>
-                    <a:p>
-                      <a:pPr>
-                        <a:lnSpc>
-                          <a:spcPct val="107000"/>
-                        </a:lnSpc>
-                        <a:spcAft>
-                          <a:spcPts val="800"/>
-                        </a:spcAft>
-                      </a:pPr>
-                      <a:r>
-                        <a:rPr lang="pt-BR" sz="1100">
-                          <a:effectLst/>
-                        </a:rPr>
-                        <a:t>Software integrado com bancos de dados de publicação</a:t>
-                      </a:r>
-                      <a:endParaRPr lang="pt-BR" sz="1100">
-                        <a:effectLst/>
-                        <a:latin typeface="Calibri" panose="020F0502020204030204" pitchFamily="34" charset="0"/>
-                        <a:ea typeface="Calibri" panose="020F0502020204030204" pitchFamily="34" charset="0"/>
-                        <a:cs typeface="Times New Roman" panose="02020603050405020304" pitchFamily="18" charset="0"/>
-                      </a:endParaRPr>
-                    </a:p>
-                  </a:txBody>
-                  <a:tcPr marL="65767" marR="65767" marT="0" marB="0"/>
-                </a:tc>
-                <a:tc>
-                  <a:txBody>
-                    <a:bodyPr/>
-                    <a:lstStyle/>
-                    <a:p>
-                      <a:pPr>
-                        <a:lnSpc>
-                          <a:spcPct val="107000"/>
-                        </a:lnSpc>
-                        <a:spcAft>
-                          <a:spcPts val="800"/>
-                        </a:spcAft>
-                      </a:pPr>
-                      <a:r>
-                        <a:rPr lang="pt-BR" sz="1100">
-                          <a:effectLst/>
-                        </a:rPr>
-                        <a:t>Marcação automatizada de duplicados</a:t>
-                      </a:r>
-                      <a:endParaRPr lang="pt-BR" sz="1100">
-                        <a:effectLst/>
-                        <a:latin typeface="Calibri" panose="020F0502020204030204" pitchFamily="34" charset="0"/>
-                        <a:ea typeface="Calibri" panose="020F0502020204030204" pitchFamily="34" charset="0"/>
-                        <a:cs typeface="Times New Roman" panose="02020603050405020304" pitchFamily="18" charset="0"/>
-                      </a:endParaRPr>
-                    </a:p>
-                  </a:txBody>
-                  <a:tcPr marL="65767" marR="65767" marT="0" marB="0"/>
-                </a:tc>
-                <a:tc>
-                  <a:txBody>
-                    <a:bodyPr/>
-                    <a:lstStyle/>
-                    <a:p>
-                      <a:pPr>
-                        <a:lnSpc>
-                          <a:spcPct val="107000"/>
-                        </a:lnSpc>
-                        <a:spcAft>
-                          <a:spcPts val="800"/>
-                        </a:spcAft>
-                      </a:pPr>
-                      <a:r>
-                        <a:rPr lang="pt-BR" sz="1100">
-                          <a:effectLst/>
-                        </a:rPr>
-                        <a:t>Para seleção de estudo</a:t>
-                      </a:r>
-                      <a:endParaRPr lang="pt-BR" sz="1100">
-                        <a:effectLst/>
-                        <a:latin typeface="Calibri" panose="020F0502020204030204" pitchFamily="34" charset="0"/>
-                        <a:ea typeface="Calibri" panose="020F0502020204030204" pitchFamily="34" charset="0"/>
-                        <a:cs typeface="Times New Roman" panose="02020603050405020304" pitchFamily="18" charset="0"/>
-                      </a:endParaRPr>
-                    </a:p>
-                  </a:txBody>
-                  <a:tcPr marL="65767" marR="65767" marT="0" marB="0"/>
-                </a:tc>
-                <a:tc>
-                  <a:txBody>
-                    <a:bodyPr/>
-                    <a:lstStyle/>
-                    <a:p>
-                      <a:pPr>
-                        <a:lnSpc>
-                          <a:spcPct val="107000"/>
-                        </a:lnSpc>
-                        <a:spcAft>
-                          <a:spcPts val="800"/>
-                        </a:spcAft>
-                      </a:pPr>
-                      <a:r>
-                        <a:rPr lang="pt-BR" sz="1100">
-                          <a:effectLst/>
-                        </a:rPr>
-                        <a:t>Marcação e extração para dar suporte à meta-análise</a:t>
-                      </a:r>
-                      <a:endParaRPr lang="pt-BR" sz="1100">
-                        <a:effectLst/>
-                        <a:latin typeface="Calibri" panose="020F0502020204030204" pitchFamily="34" charset="0"/>
-                        <a:ea typeface="Calibri" panose="020F0502020204030204" pitchFamily="34" charset="0"/>
-                        <a:cs typeface="Times New Roman" panose="02020603050405020304" pitchFamily="18" charset="0"/>
-                      </a:endParaRPr>
-                    </a:p>
-                  </a:txBody>
-                  <a:tcPr marL="65767" marR="65767" marT="0" marB="0"/>
-                </a:tc>
-                <a:tc>
-                  <a:txBody>
-                    <a:bodyPr/>
-                    <a:lstStyle/>
-                    <a:p>
-                      <a:pPr>
-                        <a:lnSpc>
-                          <a:spcPct val="107000"/>
-                        </a:lnSpc>
-                        <a:spcAft>
-                          <a:spcPts val="800"/>
-                        </a:spcAft>
-                      </a:pPr>
-                      <a:r>
-                        <a:rPr lang="pt-BR" sz="1100">
-                          <a:effectLst/>
-                        </a:rPr>
-                        <a:t>Avaliações de risco de viés</a:t>
-                      </a:r>
-                      <a:endParaRPr lang="pt-BR" sz="1100">
-                        <a:effectLst/>
-                        <a:latin typeface="Calibri" panose="020F0502020204030204" pitchFamily="34" charset="0"/>
-                        <a:ea typeface="Calibri" panose="020F0502020204030204" pitchFamily="34" charset="0"/>
-                        <a:cs typeface="Times New Roman" panose="02020603050405020304" pitchFamily="18" charset="0"/>
-                      </a:endParaRPr>
-                    </a:p>
-                  </a:txBody>
-                  <a:tcPr marL="65767" marR="65767" marT="0" marB="0"/>
-                </a:tc>
-                <a:tc>
-                  <a:txBody>
-                    <a:bodyPr/>
-                    <a:lstStyle/>
-                    <a:p>
-                      <a:pPr>
-                        <a:lnSpc>
-                          <a:spcPct val="107000"/>
-                        </a:lnSpc>
-                        <a:spcAft>
-                          <a:spcPts val="800"/>
-                        </a:spcAft>
-                      </a:pPr>
-                      <a:r>
-                        <a:rPr lang="pt-BR" sz="1100">
-                          <a:effectLst/>
-                        </a:rPr>
-                        <a:t>Facilita sínteses quantitativas / qualitativas de</a:t>
-                      </a:r>
-                    </a:p>
-                    <a:p>
-                      <a:pPr>
-                        <a:lnSpc>
-                          <a:spcPct val="107000"/>
-                        </a:lnSpc>
-                        <a:spcAft>
-                          <a:spcPts val="800"/>
-                        </a:spcAft>
-                      </a:pPr>
-                      <a:r>
-                        <a:rPr lang="pt-BR" sz="1100">
-                          <a:effectLst/>
-                        </a:rPr>
-                        <a:t>resultados</a:t>
-                      </a:r>
-                      <a:endParaRPr lang="pt-BR" sz="1100">
-                        <a:effectLst/>
-                        <a:latin typeface="Calibri" panose="020F0502020204030204" pitchFamily="34" charset="0"/>
-                        <a:ea typeface="Calibri" panose="020F0502020204030204" pitchFamily="34" charset="0"/>
-                        <a:cs typeface="Times New Roman" panose="02020603050405020304" pitchFamily="18" charset="0"/>
-                      </a:endParaRPr>
-                    </a:p>
-                  </a:txBody>
-                  <a:tcPr marL="65767" marR="65767" marT="0" marB="0"/>
-                </a:tc>
-                <a:tc>
-                  <a:txBody>
-                    <a:bodyPr/>
-                    <a:lstStyle/>
-                    <a:p>
-                      <a:pPr>
-                        <a:lnSpc>
-                          <a:spcPct val="107000"/>
-                        </a:lnSpc>
-                        <a:spcAft>
-                          <a:spcPts val="800"/>
-                        </a:spcAft>
-                      </a:pPr>
-                      <a:r>
-                        <a:rPr lang="pt-BR" sz="1100">
-                          <a:effectLst/>
-                        </a:rPr>
-                        <a:t>Produção de texto, figuras ou tabelas para auxiliar na redação do relatório</a:t>
-                      </a:r>
-                      <a:endParaRPr lang="pt-BR" sz="1100">
-                        <a:effectLst/>
-                        <a:latin typeface="Calibri" panose="020F0502020204030204" pitchFamily="34" charset="0"/>
-                        <a:ea typeface="Calibri" panose="020F0502020204030204" pitchFamily="34" charset="0"/>
-                        <a:cs typeface="Times New Roman" panose="02020603050405020304" pitchFamily="18" charset="0"/>
-                      </a:endParaRPr>
-                    </a:p>
-                  </a:txBody>
-                  <a:tcPr marL="65767" marR="65767" marT="0" marB="0"/>
-                </a:tc>
-                <a:extLst>
-                  <a:ext uri="{0D108BD9-81ED-4DB2-BD59-A6C34878D82A}">
-                    <a16:rowId xmlns:a16="http://schemas.microsoft.com/office/drawing/2014/main" val="834856783"/>
-                  </a:ext>
-                </a:extLst>
-              </a:tr>
-              <a:tr h="164418">
-                <a:tc>
-                  <a:txBody>
-                    <a:bodyPr/>
-                    <a:lstStyle/>
-                    <a:p>
-                      <a:pPr>
-                        <a:lnSpc>
-                          <a:spcPct val="107000"/>
-                        </a:lnSpc>
-                        <a:spcAft>
-                          <a:spcPts val="800"/>
-                        </a:spcAft>
-                      </a:pPr>
-                      <a:r>
-                        <a:rPr lang="pt-BR" sz="1100">
-                          <a:effectLst/>
-                        </a:rPr>
-                        <a:t>CADIMA</a:t>
-                      </a:r>
-                      <a:endParaRPr lang="pt-BR" sz="1100">
-                        <a:effectLst/>
-                        <a:latin typeface="Calibri" panose="020F0502020204030204" pitchFamily="34" charset="0"/>
-                        <a:ea typeface="Calibri" panose="020F0502020204030204" pitchFamily="34" charset="0"/>
-                        <a:cs typeface="Times New Roman" panose="02020603050405020304" pitchFamily="18" charset="0"/>
-                      </a:endParaRPr>
-                    </a:p>
-                  </a:txBody>
-                  <a:tcPr marL="65767" marR="65767" marT="0" marB="0"/>
-                </a:tc>
-                <a:tc>
-                  <a:txBody>
-                    <a:bodyPr/>
-                    <a:lstStyle/>
-                    <a:p>
-                      <a:pPr algn="ctr">
-                        <a:lnSpc>
-                          <a:spcPct val="107000"/>
-                        </a:lnSpc>
-                        <a:spcAft>
-                          <a:spcPts val="800"/>
-                        </a:spcAft>
-                      </a:pPr>
-                      <a:r>
-                        <a:rPr lang="pt-BR" sz="1100">
-                          <a:effectLst/>
-                        </a:rPr>
-                        <a:t>X</a:t>
-                      </a:r>
-                      <a:endParaRPr lang="pt-BR" sz="1100">
-                        <a:effectLst/>
-                        <a:latin typeface="Calibri" panose="020F0502020204030204" pitchFamily="34" charset="0"/>
-                        <a:ea typeface="Calibri" panose="020F0502020204030204" pitchFamily="34" charset="0"/>
-                        <a:cs typeface="Times New Roman" panose="02020603050405020304" pitchFamily="18" charset="0"/>
-                      </a:endParaRPr>
-                    </a:p>
-                  </a:txBody>
-                  <a:tcPr marL="65767" marR="65767" marT="0" marB="0"/>
-                </a:tc>
-                <a:tc>
-                  <a:txBody>
-                    <a:bodyPr/>
-                    <a:lstStyle/>
-                    <a:p>
-                      <a:pPr algn="ctr">
-                        <a:lnSpc>
-                          <a:spcPct val="107000"/>
-                        </a:lnSpc>
-                        <a:spcAft>
-                          <a:spcPts val="800"/>
-                        </a:spcAft>
-                      </a:pPr>
-                      <a:r>
-                        <a:rPr lang="pt-BR" sz="1100">
-                          <a:effectLst/>
-                        </a:rPr>
-                        <a:t>X</a:t>
-                      </a:r>
-                      <a:endParaRPr lang="pt-BR" sz="1100">
-                        <a:effectLst/>
-                        <a:latin typeface="Calibri" panose="020F0502020204030204" pitchFamily="34" charset="0"/>
-                        <a:ea typeface="Calibri" panose="020F0502020204030204" pitchFamily="34" charset="0"/>
-                        <a:cs typeface="Times New Roman" panose="02020603050405020304" pitchFamily="18" charset="0"/>
-                      </a:endParaRPr>
-                    </a:p>
-                  </a:txBody>
-                  <a:tcPr marL="65767" marR="65767" marT="0" marB="0"/>
-                </a:tc>
-                <a:tc>
-                  <a:txBody>
-                    <a:bodyPr/>
-                    <a:lstStyle/>
-                    <a:p>
-                      <a:pPr algn="ctr">
-                        <a:lnSpc>
-                          <a:spcPct val="107000"/>
-                        </a:lnSpc>
-                        <a:spcAft>
-                          <a:spcPts val="800"/>
-                        </a:spcAft>
-                      </a:pPr>
-                      <a:r>
-                        <a:rPr lang="pt-BR" sz="1100">
-                          <a:effectLst/>
-                        </a:rPr>
-                        <a:t> </a:t>
-                      </a:r>
-                      <a:endParaRPr lang="pt-BR" sz="1100">
-                        <a:effectLst/>
-                        <a:latin typeface="Calibri" panose="020F0502020204030204" pitchFamily="34" charset="0"/>
-                        <a:ea typeface="Calibri" panose="020F0502020204030204" pitchFamily="34" charset="0"/>
-                        <a:cs typeface="Times New Roman" panose="02020603050405020304" pitchFamily="18" charset="0"/>
-                      </a:endParaRPr>
-                    </a:p>
-                  </a:txBody>
-                  <a:tcPr marL="65767" marR="65767" marT="0" marB="0"/>
-                </a:tc>
-                <a:tc>
-                  <a:txBody>
-                    <a:bodyPr/>
-                    <a:lstStyle/>
-                    <a:p>
-                      <a:pPr algn="ctr">
-                        <a:lnSpc>
-                          <a:spcPct val="107000"/>
-                        </a:lnSpc>
-                        <a:spcAft>
-                          <a:spcPts val="800"/>
-                        </a:spcAft>
-                      </a:pPr>
-                      <a:r>
-                        <a:rPr lang="pt-BR" sz="1100">
-                          <a:effectLst/>
-                        </a:rPr>
-                        <a:t>X</a:t>
-                      </a:r>
-                      <a:endParaRPr lang="pt-BR" sz="1100">
-                        <a:effectLst/>
-                        <a:latin typeface="Calibri" panose="020F0502020204030204" pitchFamily="34" charset="0"/>
-                        <a:ea typeface="Calibri" panose="020F0502020204030204" pitchFamily="34" charset="0"/>
-                        <a:cs typeface="Times New Roman" panose="02020603050405020304" pitchFamily="18" charset="0"/>
-                      </a:endParaRPr>
-                    </a:p>
-                  </a:txBody>
-                  <a:tcPr marL="65767" marR="65767" marT="0" marB="0"/>
-                </a:tc>
-                <a:tc>
-                  <a:txBody>
-                    <a:bodyPr/>
-                    <a:lstStyle/>
-                    <a:p>
-                      <a:pPr algn="ctr">
-                        <a:lnSpc>
-                          <a:spcPct val="107000"/>
-                        </a:lnSpc>
-                        <a:spcAft>
-                          <a:spcPts val="800"/>
-                        </a:spcAft>
-                      </a:pPr>
-                      <a:r>
-                        <a:rPr lang="pt-BR" sz="1100">
-                          <a:effectLst/>
-                        </a:rPr>
-                        <a:t>X</a:t>
-                      </a:r>
-                      <a:endParaRPr lang="pt-BR" sz="1100">
-                        <a:effectLst/>
-                        <a:latin typeface="Calibri" panose="020F0502020204030204" pitchFamily="34" charset="0"/>
-                        <a:ea typeface="Calibri" panose="020F0502020204030204" pitchFamily="34" charset="0"/>
-                        <a:cs typeface="Times New Roman" panose="02020603050405020304" pitchFamily="18" charset="0"/>
-                      </a:endParaRPr>
-                    </a:p>
-                  </a:txBody>
-                  <a:tcPr marL="65767" marR="65767" marT="0" marB="0"/>
-                </a:tc>
-                <a:tc>
-                  <a:txBody>
-                    <a:bodyPr/>
-                    <a:lstStyle/>
-                    <a:p>
-                      <a:pPr algn="ctr">
-                        <a:lnSpc>
-                          <a:spcPct val="107000"/>
-                        </a:lnSpc>
-                        <a:spcAft>
-                          <a:spcPts val="800"/>
-                        </a:spcAft>
-                      </a:pPr>
-                      <a:r>
-                        <a:rPr lang="pt-BR" sz="1100">
-                          <a:effectLst/>
-                        </a:rPr>
-                        <a:t>X</a:t>
-                      </a:r>
-                      <a:endParaRPr lang="pt-BR" sz="1100">
-                        <a:effectLst/>
-                        <a:latin typeface="Calibri" panose="020F0502020204030204" pitchFamily="34" charset="0"/>
-                        <a:ea typeface="Calibri" panose="020F0502020204030204" pitchFamily="34" charset="0"/>
-                        <a:cs typeface="Times New Roman" panose="02020603050405020304" pitchFamily="18" charset="0"/>
-                      </a:endParaRPr>
-                    </a:p>
-                  </a:txBody>
-                  <a:tcPr marL="65767" marR="65767" marT="0" marB="0"/>
-                </a:tc>
-                <a:tc>
-                  <a:txBody>
-                    <a:bodyPr/>
-                    <a:lstStyle/>
-                    <a:p>
-                      <a:pPr algn="ctr">
-                        <a:lnSpc>
-                          <a:spcPct val="107000"/>
-                        </a:lnSpc>
-                        <a:spcAft>
-                          <a:spcPts val="800"/>
-                        </a:spcAft>
-                      </a:pPr>
-                      <a:r>
-                        <a:rPr lang="pt-BR" sz="1100">
-                          <a:effectLst/>
-                        </a:rPr>
-                        <a:t>X</a:t>
-                      </a:r>
-                      <a:endParaRPr lang="pt-BR" sz="1100">
-                        <a:effectLst/>
-                        <a:latin typeface="Calibri" panose="020F0502020204030204" pitchFamily="34" charset="0"/>
-                        <a:ea typeface="Calibri" panose="020F0502020204030204" pitchFamily="34" charset="0"/>
-                        <a:cs typeface="Times New Roman" panose="02020603050405020304" pitchFamily="18" charset="0"/>
-                      </a:endParaRPr>
-                    </a:p>
-                  </a:txBody>
-                  <a:tcPr marL="65767" marR="65767" marT="0" marB="0"/>
-                </a:tc>
-                <a:tc>
-                  <a:txBody>
-                    <a:bodyPr/>
-                    <a:lstStyle/>
-                    <a:p>
-                      <a:pPr algn="ctr">
-                        <a:lnSpc>
-                          <a:spcPct val="107000"/>
-                        </a:lnSpc>
-                        <a:spcAft>
-                          <a:spcPts val="800"/>
-                        </a:spcAft>
-                      </a:pPr>
-                      <a:r>
-                        <a:rPr lang="pt-BR" sz="1100">
-                          <a:effectLst/>
-                        </a:rPr>
-                        <a:t> </a:t>
-                      </a:r>
-                      <a:endParaRPr lang="pt-BR" sz="1100">
-                        <a:effectLst/>
-                        <a:latin typeface="Calibri" panose="020F0502020204030204" pitchFamily="34" charset="0"/>
-                        <a:ea typeface="Calibri" panose="020F0502020204030204" pitchFamily="34" charset="0"/>
-                        <a:cs typeface="Times New Roman" panose="02020603050405020304" pitchFamily="18" charset="0"/>
-                      </a:endParaRPr>
-                    </a:p>
-                  </a:txBody>
-                  <a:tcPr marL="65767" marR="65767" marT="0" marB="0"/>
-                </a:tc>
-                <a:tc>
-                  <a:txBody>
-                    <a:bodyPr/>
-                    <a:lstStyle/>
-                    <a:p>
-                      <a:pPr algn="ctr">
-                        <a:lnSpc>
-                          <a:spcPct val="107000"/>
-                        </a:lnSpc>
-                        <a:spcAft>
-                          <a:spcPts val="800"/>
-                        </a:spcAft>
-                      </a:pPr>
-                      <a:r>
-                        <a:rPr lang="pt-BR" sz="1100">
-                          <a:effectLst/>
-                        </a:rPr>
-                        <a:t>X</a:t>
-                      </a:r>
-                      <a:endParaRPr lang="pt-BR" sz="1100">
-                        <a:effectLst/>
-                        <a:latin typeface="Calibri" panose="020F0502020204030204" pitchFamily="34" charset="0"/>
-                        <a:ea typeface="Calibri" panose="020F0502020204030204" pitchFamily="34" charset="0"/>
-                        <a:cs typeface="Times New Roman" panose="02020603050405020304" pitchFamily="18" charset="0"/>
-                      </a:endParaRPr>
-                    </a:p>
-                  </a:txBody>
-                  <a:tcPr marL="65767" marR="65767" marT="0" marB="0"/>
-                </a:tc>
-                <a:extLst>
-                  <a:ext uri="{0D108BD9-81ED-4DB2-BD59-A6C34878D82A}">
-                    <a16:rowId xmlns:a16="http://schemas.microsoft.com/office/drawing/2014/main" val="3061428419"/>
-                  </a:ext>
-                </a:extLst>
-              </a:tr>
-              <a:tr h="164418">
-                <a:tc>
-                  <a:txBody>
-                    <a:bodyPr/>
-                    <a:lstStyle/>
-                    <a:p>
-                      <a:pPr>
-                        <a:lnSpc>
-                          <a:spcPct val="107000"/>
-                        </a:lnSpc>
-                        <a:spcAft>
-                          <a:spcPts val="800"/>
-                        </a:spcAft>
-                      </a:pPr>
-                      <a:r>
-                        <a:rPr lang="pt-BR" sz="1100">
-                          <a:effectLst/>
-                        </a:rPr>
-                        <a:t>Covidence</a:t>
-                      </a:r>
-                      <a:endParaRPr lang="pt-BR" sz="1100">
-                        <a:effectLst/>
-                        <a:latin typeface="Calibri" panose="020F0502020204030204" pitchFamily="34" charset="0"/>
-                        <a:ea typeface="Calibri" panose="020F0502020204030204" pitchFamily="34" charset="0"/>
-                        <a:cs typeface="Times New Roman" panose="02020603050405020304" pitchFamily="18" charset="0"/>
-                      </a:endParaRPr>
-                    </a:p>
-                  </a:txBody>
-                  <a:tcPr marL="65767" marR="65767" marT="0" marB="0"/>
-                </a:tc>
-                <a:tc>
-                  <a:txBody>
-                    <a:bodyPr/>
-                    <a:lstStyle/>
-                    <a:p>
-                      <a:pPr algn="ctr">
-                        <a:lnSpc>
-                          <a:spcPct val="107000"/>
-                        </a:lnSpc>
-                        <a:spcAft>
-                          <a:spcPts val="800"/>
-                        </a:spcAft>
-                      </a:pPr>
-                      <a:r>
-                        <a:rPr lang="pt-BR" sz="1100">
-                          <a:effectLst/>
-                        </a:rPr>
-                        <a:t> </a:t>
-                      </a:r>
-                      <a:endParaRPr lang="pt-BR" sz="1100">
-                        <a:effectLst/>
-                        <a:latin typeface="Calibri" panose="020F0502020204030204" pitchFamily="34" charset="0"/>
-                        <a:ea typeface="Calibri" panose="020F0502020204030204" pitchFamily="34" charset="0"/>
-                        <a:cs typeface="Times New Roman" panose="02020603050405020304" pitchFamily="18" charset="0"/>
-                      </a:endParaRPr>
-                    </a:p>
-                  </a:txBody>
-                  <a:tcPr marL="65767" marR="65767" marT="0" marB="0"/>
-                </a:tc>
-                <a:tc>
-                  <a:txBody>
-                    <a:bodyPr/>
-                    <a:lstStyle/>
-                    <a:p>
-                      <a:pPr algn="ctr">
-                        <a:lnSpc>
-                          <a:spcPct val="107000"/>
-                        </a:lnSpc>
-                        <a:spcAft>
-                          <a:spcPts val="800"/>
-                        </a:spcAft>
-                      </a:pPr>
-                      <a:r>
-                        <a:rPr lang="pt-BR" sz="1100">
-                          <a:effectLst/>
-                        </a:rPr>
-                        <a:t> </a:t>
-                      </a:r>
-                      <a:endParaRPr lang="pt-BR" sz="1100">
-                        <a:effectLst/>
-                        <a:latin typeface="Calibri" panose="020F0502020204030204" pitchFamily="34" charset="0"/>
-                        <a:ea typeface="Calibri" panose="020F0502020204030204" pitchFamily="34" charset="0"/>
-                        <a:cs typeface="Times New Roman" panose="02020603050405020304" pitchFamily="18" charset="0"/>
-                      </a:endParaRPr>
-                    </a:p>
-                  </a:txBody>
-                  <a:tcPr marL="65767" marR="65767" marT="0" marB="0"/>
-                </a:tc>
-                <a:tc>
-                  <a:txBody>
-                    <a:bodyPr/>
-                    <a:lstStyle/>
-                    <a:p>
-                      <a:pPr algn="ctr">
-                        <a:lnSpc>
-                          <a:spcPct val="107000"/>
-                        </a:lnSpc>
-                        <a:spcAft>
-                          <a:spcPts val="800"/>
-                        </a:spcAft>
-                      </a:pPr>
-                      <a:r>
-                        <a:rPr lang="pt-BR" sz="1100">
-                          <a:effectLst/>
-                        </a:rPr>
-                        <a:t> </a:t>
-                      </a:r>
-                      <a:endParaRPr lang="pt-BR" sz="1100">
-                        <a:effectLst/>
-                        <a:latin typeface="Calibri" panose="020F0502020204030204" pitchFamily="34" charset="0"/>
-                        <a:ea typeface="Calibri" panose="020F0502020204030204" pitchFamily="34" charset="0"/>
-                        <a:cs typeface="Times New Roman" panose="02020603050405020304" pitchFamily="18" charset="0"/>
-                      </a:endParaRPr>
-                    </a:p>
-                  </a:txBody>
-                  <a:tcPr marL="65767" marR="65767" marT="0" marB="0"/>
-                </a:tc>
-                <a:tc>
-                  <a:txBody>
-                    <a:bodyPr/>
-                    <a:lstStyle/>
-                    <a:p>
-                      <a:pPr algn="ctr">
-                        <a:lnSpc>
-                          <a:spcPct val="107000"/>
-                        </a:lnSpc>
-                        <a:spcAft>
-                          <a:spcPts val="800"/>
-                        </a:spcAft>
-                      </a:pPr>
-                      <a:r>
-                        <a:rPr lang="pt-BR" sz="1100">
-                          <a:effectLst/>
-                        </a:rPr>
-                        <a:t>X</a:t>
-                      </a:r>
-                      <a:endParaRPr lang="pt-BR" sz="1100">
-                        <a:effectLst/>
-                        <a:latin typeface="Calibri" panose="020F0502020204030204" pitchFamily="34" charset="0"/>
-                        <a:ea typeface="Calibri" panose="020F0502020204030204" pitchFamily="34" charset="0"/>
-                        <a:cs typeface="Times New Roman" panose="02020603050405020304" pitchFamily="18" charset="0"/>
-                      </a:endParaRPr>
-                    </a:p>
-                  </a:txBody>
-                  <a:tcPr marL="65767" marR="65767" marT="0" marB="0"/>
-                </a:tc>
-                <a:tc>
-                  <a:txBody>
-                    <a:bodyPr/>
-                    <a:lstStyle/>
-                    <a:p>
-                      <a:pPr algn="ctr">
-                        <a:lnSpc>
-                          <a:spcPct val="107000"/>
-                        </a:lnSpc>
-                        <a:spcAft>
-                          <a:spcPts val="800"/>
-                        </a:spcAft>
-                      </a:pPr>
-                      <a:r>
-                        <a:rPr lang="pt-BR" sz="1100">
-                          <a:effectLst/>
-                        </a:rPr>
-                        <a:t>X</a:t>
-                      </a:r>
-                      <a:endParaRPr lang="pt-BR" sz="1100">
-                        <a:effectLst/>
-                        <a:latin typeface="Calibri" panose="020F0502020204030204" pitchFamily="34" charset="0"/>
-                        <a:ea typeface="Calibri" panose="020F0502020204030204" pitchFamily="34" charset="0"/>
-                        <a:cs typeface="Times New Roman" panose="02020603050405020304" pitchFamily="18" charset="0"/>
-                      </a:endParaRPr>
-                    </a:p>
-                  </a:txBody>
-                  <a:tcPr marL="65767" marR="65767" marT="0" marB="0"/>
-                </a:tc>
-                <a:tc>
-                  <a:txBody>
-                    <a:bodyPr/>
-                    <a:lstStyle/>
-                    <a:p>
-                      <a:pPr algn="ctr">
-                        <a:lnSpc>
-                          <a:spcPct val="107000"/>
-                        </a:lnSpc>
-                        <a:spcAft>
-                          <a:spcPts val="800"/>
-                        </a:spcAft>
-                      </a:pPr>
-                      <a:r>
-                        <a:rPr lang="pt-BR" sz="1100">
-                          <a:effectLst/>
-                        </a:rPr>
-                        <a:t>X</a:t>
-                      </a:r>
-                      <a:endParaRPr lang="pt-BR" sz="1100">
-                        <a:effectLst/>
-                        <a:latin typeface="Calibri" panose="020F0502020204030204" pitchFamily="34" charset="0"/>
-                        <a:ea typeface="Calibri" panose="020F0502020204030204" pitchFamily="34" charset="0"/>
-                        <a:cs typeface="Times New Roman" panose="02020603050405020304" pitchFamily="18" charset="0"/>
-                      </a:endParaRPr>
-                    </a:p>
-                  </a:txBody>
-                  <a:tcPr marL="65767" marR="65767" marT="0" marB="0"/>
-                </a:tc>
-                <a:tc>
-                  <a:txBody>
-                    <a:bodyPr/>
-                    <a:lstStyle/>
-                    <a:p>
-                      <a:pPr algn="ctr">
-                        <a:lnSpc>
-                          <a:spcPct val="107000"/>
-                        </a:lnSpc>
-                        <a:spcAft>
-                          <a:spcPts val="800"/>
-                        </a:spcAft>
-                      </a:pPr>
-                      <a:r>
-                        <a:rPr lang="pt-BR" sz="1100">
-                          <a:effectLst/>
-                        </a:rPr>
-                        <a:t>X</a:t>
-                      </a:r>
-                      <a:endParaRPr lang="pt-BR" sz="1100">
-                        <a:effectLst/>
-                        <a:latin typeface="Calibri" panose="020F0502020204030204" pitchFamily="34" charset="0"/>
-                        <a:ea typeface="Calibri" panose="020F0502020204030204" pitchFamily="34" charset="0"/>
-                        <a:cs typeface="Times New Roman" panose="02020603050405020304" pitchFamily="18" charset="0"/>
-                      </a:endParaRPr>
-                    </a:p>
-                  </a:txBody>
-                  <a:tcPr marL="65767" marR="65767" marT="0" marB="0"/>
-                </a:tc>
-                <a:tc>
-                  <a:txBody>
-                    <a:bodyPr/>
-                    <a:lstStyle/>
-                    <a:p>
-                      <a:pPr algn="ctr">
-                        <a:lnSpc>
-                          <a:spcPct val="107000"/>
-                        </a:lnSpc>
-                        <a:spcAft>
-                          <a:spcPts val="800"/>
-                        </a:spcAft>
-                      </a:pPr>
-                      <a:r>
-                        <a:rPr lang="pt-BR" sz="1100">
-                          <a:effectLst/>
-                        </a:rPr>
-                        <a:t> </a:t>
-                      </a:r>
-                      <a:endParaRPr lang="pt-BR" sz="1100">
-                        <a:effectLst/>
-                        <a:latin typeface="Calibri" panose="020F0502020204030204" pitchFamily="34" charset="0"/>
-                        <a:ea typeface="Calibri" panose="020F0502020204030204" pitchFamily="34" charset="0"/>
-                        <a:cs typeface="Times New Roman" panose="02020603050405020304" pitchFamily="18" charset="0"/>
-                      </a:endParaRPr>
-                    </a:p>
-                  </a:txBody>
-                  <a:tcPr marL="65767" marR="65767" marT="0" marB="0"/>
-                </a:tc>
-                <a:tc>
-                  <a:txBody>
-                    <a:bodyPr/>
-                    <a:lstStyle/>
-                    <a:p>
-                      <a:pPr algn="ctr">
-                        <a:lnSpc>
-                          <a:spcPct val="107000"/>
-                        </a:lnSpc>
-                        <a:spcAft>
-                          <a:spcPts val="800"/>
-                        </a:spcAft>
-                      </a:pPr>
-                      <a:r>
-                        <a:rPr lang="pt-BR" sz="1100">
-                          <a:effectLst/>
-                        </a:rPr>
-                        <a:t> </a:t>
-                      </a:r>
-                      <a:endParaRPr lang="pt-BR" sz="1100">
-                        <a:effectLst/>
-                        <a:latin typeface="Calibri" panose="020F0502020204030204" pitchFamily="34" charset="0"/>
-                        <a:ea typeface="Calibri" panose="020F0502020204030204" pitchFamily="34" charset="0"/>
-                        <a:cs typeface="Times New Roman" panose="02020603050405020304" pitchFamily="18" charset="0"/>
-                      </a:endParaRPr>
-                    </a:p>
-                  </a:txBody>
-                  <a:tcPr marL="65767" marR="65767" marT="0" marB="0"/>
-                </a:tc>
-                <a:extLst>
-                  <a:ext uri="{0D108BD9-81ED-4DB2-BD59-A6C34878D82A}">
-                    <a16:rowId xmlns:a16="http://schemas.microsoft.com/office/drawing/2014/main" val="1026037351"/>
-                  </a:ext>
-                </a:extLst>
-              </a:tr>
-              <a:tr h="336447">
-                <a:tc>
-                  <a:txBody>
-                    <a:bodyPr/>
-                    <a:lstStyle/>
-                    <a:p>
-                      <a:pPr>
-                        <a:lnSpc>
-                          <a:spcPct val="107000"/>
-                        </a:lnSpc>
-                        <a:spcAft>
-                          <a:spcPts val="800"/>
-                        </a:spcAft>
-                      </a:pPr>
-                      <a:r>
-                        <a:rPr lang="pt-BR" sz="1100">
-                          <a:effectLst/>
-                        </a:rPr>
-                        <a:t>EPPI-Reviewer 4</a:t>
-                      </a:r>
-                      <a:endParaRPr lang="pt-BR" sz="1100">
-                        <a:effectLst/>
-                        <a:latin typeface="Calibri" panose="020F0502020204030204" pitchFamily="34" charset="0"/>
-                        <a:ea typeface="Calibri" panose="020F0502020204030204" pitchFamily="34" charset="0"/>
-                        <a:cs typeface="Times New Roman" panose="02020603050405020304" pitchFamily="18" charset="0"/>
-                      </a:endParaRPr>
-                    </a:p>
-                  </a:txBody>
-                  <a:tcPr marL="65767" marR="65767" marT="0" marB="0"/>
-                </a:tc>
-                <a:tc>
-                  <a:txBody>
-                    <a:bodyPr/>
-                    <a:lstStyle/>
-                    <a:p>
-                      <a:pPr algn="ctr">
-                        <a:lnSpc>
-                          <a:spcPct val="107000"/>
-                        </a:lnSpc>
-                        <a:spcAft>
-                          <a:spcPts val="800"/>
-                        </a:spcAft>
-                      </a:pPr>
-                      <a:r>
-                        <a:rPr lang="pt-BR" sz="1100">
-                          <a:effectLst/>
-                        </a:rPr>
-                        <a:t> </a:t>
-                      </a:r>
-                      <a:endParaRPr lang="pt-BR" sz="1100">
-                        <a:effectLst/>
-                        <a:latin typeface="Calibri" panose="020F0502020204030204" pitchFamily="34" charset="0"/>
-                        <a:ea typeface="Calibri" panose="020F0502020204030204" pitchFamily="34" charset="0"/>
-                        <a:cs typeface="Times New Roman" panose="02020603050405020304" pitchFamily="18" charset="0"/>
-                      </a:endParaRPr>
-                    </a:p>
-                  </a:txBody>
-                  <a:tcPr marL="65767" marR="65767" marT="0" marB="0"/>
-                </a:tc>
-                <a:tc>
-                  <a:txBody>
-                    <a:bodyPr/>
-                    <a:lstStyle/>
-                    <a:p>
-                      <a:pPr algn="ctr">
-                        <a:lnSpc>
-                          <a:spcPct val="107000"/>
-                        </a:lnSpc>
-                        <a:spcAft>
-                          <a:spcPts val="800"/>
-                        </a:spcAft>
-                      </a:pPr>
-                      <a:r>
-                        <a:rPr lang="pt-BR" sz="1100">
-                          <a:effectLst/>
-                        </a:rPr>
-                        <a:t> </a:t>
-                      </a:r>
-                      <a:endParaRPr lang="pt-BR" sz="1100">
-                        <a:effectLst/>
-                        <a:latin typeface="Calibri" panose="020F0502020204030204" pitchFamily="34" charset="0"/>
-                        <a:ea typeface="Calibri" panose="020F0502020204030204" pitchFamily="34" charset="0"/>
-                        <a:cs typeface="Times New Roman" panose="02020603050405020304" pitchFamily="18" charset="0"/>
-                      </a:endParaRPr>
-                    </a:p>
-                  </a:txBody>
-                  <a:tcPr marL="65767" marR="65767" marT="0" marB="0"/>
-                </a:tc>
-                <a:tc>
-                  <a:txBody>
-                    <a:bodyPr/>
-                    <a:lstStyle/>
-                    <a:p>
-                      <a:pPr algn="ctr">
-                        <a:lnSpc>
-                          <a:spcPct val="107000"/>
-                        </a:lnSpc>
-                        <a:spcAft>
-                          <a:spcPts val="800"/>
-                        </a:spcAft>
-                      </a:pPr>
-                      <a:r>
-                        <a:rPr lang="pt-BR" sz="1100">
-                          <a:effectLst/>
-                        </a:rPr>
-                        <a:t>X</a:t>
-                      </a:r>
-                      <a:endParaRPr lang="pt-BR" sz="1100">
-                        <a:effectLst/>
-                        <a:latin typeface="Calibri" panose="020F0502020204030204" pitchFamily="34" charset="0"/>
-                        <a:ea typeface="Calibri" panose="020F0502020204030204" pitchFamily="34" charset="0"/>
-                        <a:cs typeface="Times New Roman" panose="02020603050405020304" pitchFamily="18" charset="0"/>
-                      </a:endParaRPr>
-                    </a:p>
-                  </a:txBody>
-                  <a:tcPr marL="65767" marR="65767" marT="0" marB="0"/>
-                </a:tc>
-                <a:tc>
-                  <a:txBody>
-                    <a:bodyPr/>
-                    <a:lstStyle/>
-                    <a:p>
-                      <a:pPr algn="ctr">
-                        <a:lnSpc>
-                          <a:spcPct val="107000"/>
-                        </a:lnSpc>
-                        <a:spcAft>
-                          <a:spcPts val="800"/>
-                        </a:spcAft>
-                      </a:pPr>
-                      <a:r>
-                        <a:rPr lang="pt-BR" sz="1100">
-                          <a:effectLst/>
-                        </a:rPr>
-                        <a:t>X</a:t>
-                      </a:r>
-                      <a:endParaRPr lang="pt-BR" sz="1100">
-                        <a:effectLst/>
-                        <a:latin typeface="Calibri" panose="020F0502020204030204" pitchFamily="34" charset="0"/>
-                        <a:ea typeface="Calibri" panose="020F0502020204030204" pitchFamily="34" charset="0"/>
-                        <a:cs typeface="Times New Roman" panose="02020603050405020304" pitchFamily="18" charset="0"/>
-                      </a:endParaRPr>
-                    </a:p>
-                  </a:txBody>
-                  <a:tcPr marL="65767" marR="65767" marT="0" marB="0"/>
-                </a:tc>
-                <a:tc>
-                  <a:txBody>
-                    <a:bodyPr/>
-                    <a:lstStyle/>
-                    <a:p>
-                      <a:pPr algn="ctr">
-                        <a:lnSpc>
-                          <a:spcPct val="107000"/>
-                        </a:lnSpc>
-                        <a:spcAft>
-                          <a:spcPts val="800"/>
-                        </a:spcAft>
-                      </a:pPr>
-                      <a:r>
-                        <a:rPr lang="pt-BR" sz="1100">
-                          <a:effectLst/>
-                        </a:rPr>
-                        <a:t>X</a:t>
-                      </a:r>
-                      <a:endParaRPr lang="pt-BR" sz="1100">
-                        <a:effectLst/>
-                        <a:latin typeface="Calibri" panose="020F0502020204030204" pitchFamily="34" charset="0"/>
-                        <a:ea typeface="Calibri" panose="020F0502020204030204" pitchFamily="34" charset="0"/>
-                        <a:cs typeface="Times New Roman" panose="02020603050405020304" pitchFamily="18" charset="0"/>
-                      </a:endParaRPr>
-                    </a:p>
-                  </a:txBody>
-                  <a:tcPr marL="65767" marR="65767" marT="0" marB="0"/>
-                </a:tc>
-                <a:tc>
-                  <a:txBody>
-                    <a:bodyPr/>
-                    <a:lstStyle/>
-                    <a:p>
-                      <a:pPr algn="ctr">
-                        <a:lnSpc>
-                          <a:spcPct val="107000"/>
-                        </a:lnSpc>
-                        <a:spcAft>
-                          <a:spcPts val="800"/>
-                        </a:spcAft>
-                      </a:pPr>
-                      <a:r>
-                        <a:rPr lang="pt-BR" sz="1100">
-                          <a:effectLst/>
-                        </a:rPr>
-                        <a:t>X</a:t>
-                      </a:r>
-                      <a:endParaRPr lang="pt-BR" sz="1100">
-                        <a:effectLst/>
-                        <a:latin typeface="Calibri" panose="020F0502020204030204" pitchFamily="34" charset="0"/>
-                        <a:ea typeface="Calibri" panose="020F0502020204030204" pitchFamily="34" charset="0"/>
-                        <a:cs typeface="Times New Roman" panose="02020603050405020304" pitchFamily="18" charset="0"/>
-                      </a:endParaRPr>
-                    </a:p>
-                  </a:txBody>
-                  <a:tcPr marL="65767" marR="65767" marT="0" marB="0"/>
-                </a:tc>
-                <a:tc>
-                  <a:txBody>
-                    <a:bodyPr/>
-                    <a:lstStyle/>
-                    <a:p>
-                      <a:pPr algn="ctr">
-                        <a:lnSpc>
-                          <a:spcPct val="107000"/>
-                        </a:lnSpc>
-                        <a:spcAft>
-                          <a:spcPts val="800"/>
-                        </a:spcAft>
-                      </a:pPr>
-                      <a:r>
-                        <a:rPr lang="pt-BR" sz="1100">
-                          <a:effectLst/>
-                        </a:rPr>
-                        <a:t>X</a:t>
-                      </a:r>
-                      <a:endParaRPr lang="pt-BR" sz="1100">
-                        <a:effectLst/>
-                        <a:latin typeface="Calibri" panose="020F0502020204030204" pitchFamily="34" charset="0"/>
-                        <a:ea typeface="Calibri" panose="020F0502020204030204" pitchFamily="34" charset="0"/>
-                        <a:cs typeface="Times New Roman" panose="02020603050405020304" pitchFamily="18" charset="0"/>
-                      </a:endParaRPr>
-                    </a:p>
-                  </a:txBody>
-                  <a:tcPr marL="65767" marR="65767" marT="0" marB="0"/>
-                </a:tc>
-                <a:tc>
-                  <a:txBody>
-                    <a:bodyPr/>
-                    <a:lstStyle/>
-                    <a:p>
-                      <a:pPr algn="ctr">
-                        <a:lnSpc>
-                          <a:spcPct val="107000"/>
-                        </a:lnSpc>
-                        <a:spcAft>
-                          <a:spcPts val="800"/>
-                        </a:spcAft>
-                      </a:pPr>
-                      <a:r>
-                        <a:rPr lang="pt-BR" sz="1100">
-                          <a:effectLst/>
-                        </a:rPr>
-                        <a:t>X</a:t>
-                      </a:r>
-                      <a:endParaRPr lang="pt-BR" sz="1100">
-                        <a:effectLst/>
-                        <a:latin typeface="Calibri" panose="020F0502020204030204" pitchFamily="34" charset="0"/>
-                        <a:ea typeface="Calibri" panose="020F0502020204030204" pitchFamily="34" charset="0"/>
-                        <a:cs typeface="Times New Roman" panose="02020603050405020304" pitchFamily="18" charset="0"/>
-                      </a:endParaRPr>
-                    </a:p>
-                  </a:txBody>
-                  <a:tcPr marL="65767" marR="65767" marT="0" marB="0"/>
-                </a:tc>
-                <a:tc>
-                  <a:txBody>
-                    <a:bodyPr/>
-                    <a:lstStyle/>
-                    <a:p>
-                      <a:pPr algn="ctr">
-                        <a:lnSpc>
-                          <a:spcPct val="107000"/>
-                        </a:lnSpc>
-                        <a:spcAft>
-                          <a:spcPts val="800"/>
-                        </a:spcAft>
-                      </a:pPr>
-                      <a:r>
-                        <a:rPr lang="pt-BR" sz="1100">
-                          <a:effectLst/>
-                        </a:rPr>
-                        <a:t>X</a:t>
-                      </a:r>
-                      <a:endParaRPr lang="pt-BR" sz="1100">
-                        <a:effectLst/>
-                        <a:latin typeface="Calibri" panose="020F0502020204030204" pitchFamily="34" charset="0"/>
-                        <a:ea typeface="Calibri" panose="020F0502020204030204" pitchFamily="34" charset="0"/>
-                        <a:cs typeface="Times New Roman" panose="02020603050405020304" pitchFamily="18" charset="0"/>
-                      </a:endParaRPr>
-                    </a:p>
-                  </a:txBody>
-                  <a:tcPr marL="65767" marR="65767" marT="0" marB="0"/>
-                </a:tc>
-                <a:extLst>
-                  <a:ext uri="{0D108BD9-81ED-4DB2-BD59-A6C34878D82A}">
-                    <a16:rowId xmlns:a16="http://schemas.microsoft.com/office/drawing/2014/main" val="4013694539"/>
-                  </a:ext>
-                </a:extLst>
-              </a:tr>
-              <a:tr h="164418">
-                <a:tc>
-                  <a:txBody>
-                    <a:bodyPr/>
-                    <a:lstStyle/>
-                    <a:p>
-                      <a:pPr>
-                        <a:lnSpc>
-                          <a:spcPct val="107000"/>
-                        </a:lnSpc>
-                        <a:spcAft>
-                          <a:spcPts val="800"/>
-                        </a:spcAft>
-                      </a:pPr>
-                      <a:r>
-                        <a:rPr lang="pt-BR" sz="1100">
-                          <a:effectLst/>
-                        </a:rPr>
-                        <a:t>Rayyan</a:t>
-                      </a:r>
-                      <a:endParaRPr lang="pt-BR" sz="1100">
-                        <a:effectLst/>
-                        <a:latin typeface="Calibri" panose="020F0502020204030204" pitchFamily="34" charset="0"/>
-                        <a:ea typeface="Calibri" panose="020F0502020204030204" pitchFamily="34" charset="0"/>
-                        <a:cs typeface="Times New Roman" panose="02020603050405020304" pitchFamily="18" charset="0"/>
-                      </a:endParaRPr>
-                    </a:p>
-                  </a:txBody>
-                  <a:tcPr marL="65767" marR="65767" marT="0" marB="0"/>
-                </a:tc>
-                <a:tc>
-                  <a:txBody>
-                    <a:bodyPr/>
-                    <a:lstStyle/>
-                    <a:p>
-                      <a:pPr algn="ctr">
-                        <a:lnSpc>
-                          <a:spcPct val="107000"/>
-                        </a:lnSpc>
-                        <a:spcAft>
-                          <a:spcPts val="800"/>
-                        </a:spcAft>
-                      </a:pPr>
-                      <a:r>
-                        <a:rPr lang="pt-BR" sz="1100">
-                          <a:effectLst/>
-                        </a:rPr>
-                        <a:t> </a:t>
-                      </a:r>
-                      <a:endParaRPr lang="pt-BR" sz="1100">
-                        <a:effectLst/>
-                        <a:latin typeface="Calibri" panose="020F0502020204030204" pitchFamily="34" charset="0"/>
-                        <a:ea typeface="Calibri" panose="020F0502020204030204" pitchFamily="34" charset="0"/>
-                        <a:cs typeface="Times New Roman" panose="02020603050405020304" pitchFamily="18" charset="0"/>
-                      </a:endParaRPr>
-                    </a:p>
-                  </a:txBody>
-                  <a:tcPr marL="65767" marR="65767" marT="0" marB="0"/>
-                </a:tc>
-                <a:tc>
-                  <a:txBody>
-                    <a:bodyPr/>
-                    <a:lstStyle/>
-                    <a:p>
-                      <a:pPr algn="ctr">
-                        <a:lnSpc>
-                          <a:spcPct val="107000"/>
-                        </a:lnSpc>
-                        <a:spcAft>
-                          <a:spcPts val="800"/>
-                        </a:spcAft>
-                      </a:pPr>
-                      <a:r>
-                        <a:rPr lang="pt-BR" sz="1100">
-                          <a:effectLst/>
-                        </a:rPr>
-                        <a:t>X</a:t>
-                      </a:r>
-                      <a:endParaRPr lang="pt-BR" sz="1100">
-                        <a:effectLst/>
-                        <a:latin typeface="Calibri" panose="020F0502020204030204" pitchFamily="34" charset="0"/>
-                        <a:ea typeface="Calibri" panose="020F0502020204030204" pitchFamily="34" charset="0"/>
-                        <a:cs typeface="Times New Roman" panose="02020603050405020304" pitchFamily="18" charset="0"/>
-                      </a:endParaRPr>
-                    </a:p>
-                  </a:txBody>
-                  <a:tcPr marL="65767" marR="65767" marT="0" marB="0"/>
-                </a:tc>
-                <a:tc>
-                  <a:txBody>
-                    <a:bodyPr/>
-                    <a:lstStyle/>
-                    <a:p>
-                      <a:pPr algn="ctr">
-                        <a:lnSpc>
-                          <a:spcPct val="107000"/>
-                        </a:lnSpc>
-                        <a:spcAft>
-                          <a:spcPts val="800"/>
-                        </a:spcAft>
-                      </a:pPr>
-                      <a:r>
-                        <a:rPr lang="pt-BR" sz="1100">
-                          <a:effectLst/>
-                        </a:rPr>
-                        <a:t>X</a:t>
-                      </a:r>
-                      <a:endParaRPr lang="pt-BR" sz="1100">
-                        <a:effectLst/>
-                        <a:latin typeface="Calibri" panose="020F0502020204030204" pitchFamily="34" charset="0"/>
-                        <a:ea typeface="Calibri" panose="020F0502020204030204" pitchFamily="34" charset="0"/>
-                        <a:cs typeface="Times New Roman" panose="02020603050405020304" pitchFamily="18" charset="0"/>
-                      </a:endParaRPr>
-                    </a:p>
-                  </a:txBody>
-                  <a:tcPr marL="65767" marR="65767" marT="0" marB="0"/>
-                </a:tc>
-                <a:tc>
-                  <a:txBody>
-                    <a:bodyPr/>
-                    <a:lstStyle/>
-                    <a:p>
-                      <a:pPr algn="ctr">
-                        <a:lnSpc>
-                          <a:spcPct val="107000"/>
-                        </a:lnSpc>
-                        <a:spcAft>
-                          <a:spcPts val="800"/>
-                        </a:spcAft>
-                      </a:pPr>
-                      <a:r>
-                        <a:rPr lang="pt-BR" sz="1100">
-                          <a:effectLst/>
-                        </a:rPr>
-                        <a:t>X</a:t>
-                      </a:r>
-                      <a:endParaRPr lang="pt-BR" sz="1100">
-                        <a:effectLst/>
-                        <a:latin typeface="Calibri" panose="020F0502020204030204" pitchFamily="34" charset="0"/>
-                        <a:ea typeface="Calibri" panose="020F0502020204030204" pitchFamily="34" charset="0"/>
-                        <a:cs typeface="Times New Roman" panose="02020603050405020304" pitchFamily="18" charset="0"/>
-                      </a:endParaRPr>
-                    </a:p>
-                  </a:txBody>
-                  <a:tcPr marL="65767" marR="65767" marT="0" marB="0"/>
-                </a:tc>
-                <a:tc>
-                  <a:txBody>
-                    <a:bodyPr/>
-                    <a:lstStyle/>
-                    <a:p>
-                      <a:pPr algn="ctr">
-                        <a:lnSpc>
-                          <a:spcPct val="107000"/>
-                        </a:lnSpc>
-                        <a:spcAft>
-                          <a:spcPts val="800"/>
-                        </a:spcAft>
-                      </a:pPr>
-                      <a:r>
-                        <a:rPr lang="pt-BR" sz="1100">
-                          <a:effectLst/>
-                        </a:rPr>
-                        <a:t>X</a:t>
-                      </a:r>
-                      <a:endParaRPr lang="pt-BR" sz="1100">
-                        <a:effectLst/>
-                        <a:latin typeface="Calibri" panose="020F0502020204030204" pitchFamily="34" charset="0"/>
-                        <a:ea typeface="Calibri" panose="020F0502020204030204" pitchFamily="34" charset="0"/>
-                        <a:cs typeface="Times New Roman" panose="02020603050405020304" pitchFamily="18" charset="0"/>
-                      </a:endParaRPr>
-                    </a:p>
-                  </a:txBody>
-                  <a:tcPr marL="65767" marR="65767" marT="0" marB="0"/>
-                </a:tc>
-                <a:tc>
-                  <a:txBody>
-                    <a:bodyPr/>
-                    <a:lstStyle/>
-                    <a:p>
-                      <a:pPr algn="ctr">
-                        <a:lnSpc>
-                          <a:spcPct val="107000"/>
-                        </a:lnSpc>
-                        <a:spcAft>
-                          <a:spcPts val="800"/>
-                        </a:spcAft>
-                      </a:pPr>
-                      <a:r>
-                        <a:rPr lang="pt-BR" sz="1100">
-                          <a:effectLst/>
-                        </a:rPr>
-                        <a:t> </a:t>
-                      </a:r>
-                      <a:endParaRPr lang="pt-BR" sz="1100">
-                        <a:effectLst/>
-                        <a:latin typeface="Calibri" panose="020F0502020204030204" pitchFamily="34" charset="0"/>
-                        <a:ea typeface="Calibri" panose="020F0502020204030204" pitchFamily="34" charset="0"/>
-                        <a:cs typeface="Times New Roman" panose="02020603050405020304" pitchFamily="18" charset="0"/>
-                      </a:endParaRPr>
-                    </a:p>
-                  </a:txBody>
-                  <a:tcPr marL="65767" marR="65767" marT="0" marB="0"/>
-                </a:tc>
-                <a:tc>
-                  <a:txBody>
-                    <a:bodyPr/>
-                    <a:lstStyle/>
-                    <a:p>
-                      <a:pPr algn="ctr">
-                        <a:lnSpc>
-                          <a:spcPct val="107000"/>
-                        </a:lnSpc>
-                        <a:spcAft>
-                          <a:spcPts val="800"/>
-                        </a:spcAft>
-                      </a:pPr>
-                      <a:r>
-                        <a:rPr lang="pt-BR" sz="1100">
-                          <a:effectLst/>
-                        </a:rPr>
-                        <a:t> </a:t>
-                      </a:r>
-                      <a:endParaRPr lang="pt-BR" sz="1100">
-                        <a:effectLst/>
-                        <a:latin typeface="Calibri" panose="020F0502020204030204" pitchFamily="34" charset="0"/>
-                        <a:ea typeface="Calibri" panose="020F0502020204030204" pitchFamily="34" charset="0"/>
-                        <a:cs typeface="Times New Roman" panose="02020603050405020304" pitchFamily="18" charset="0"/>
-                      </a:endParaRPr>
-                    </a:p>
-                  </a:txBody>
-                  <a:tcPr marL="65767" marR="65767" marT="0" marB="0"/>
-                </a:tc>
-                <a:tc>
-                  <a:txBody>
-                    <a:bodyPr/>
-                    <a:lstStyle/>
-                    <a:p>
-                      <a:pPr algn="ctr">
-                        <a:lnSpc>
-                          <a:spcPct val="107000"/>
-                        </a:lnSpc>
-                        <a:spcAft>
-                          <a:spcPts val="800"/>
-                        </a:spcAft>
-                      </a:pPr>
-                      <a:r>
-                        <a:rPr lang="pt-BR" sz="1100">
-                          <a:effectLst/>
-                        </a:rPr>
-                        <a:t> </a:t>
-                      </a:r>
-                      <a:endParaRPr lang="pt-BR" sz="1100">
-                        <a:effectLst/>
-                        <a:latin typeface="Calibri" panose="020F0502020204030204" pitchFamily="34" charset="0"/>
-                        <a:ea typeface="Calibri" panose="020F0502020204030204" pitchFamily="34" charset="0"/>
-                        <a:cs typeface="Times New Roman" panose="02020603050405020304" pitchFamily="18" charset="0"/>
-                      </a:endParaRPr>
-                    </a:p>
-                  </a:txBody>
-                  <a:tcPr marL="65767" marR="65767" marT="0" marB="0"/>
-                </a:tc>
-                <a:tc>
-                  <a:txBody>
-                    <a:bodyPr/>
-                    <a:lstStyle/>
-                    <a:p>
-                      <a:pPr algn="ctr">
-                        <a:lnSpc>
-                          <a:spcPct val="107000"/>
-                        </a:lnSpc>
-                        <a:spcAft>
-                          <a:spcPts val="800"/>
-                        </a:spcAft>
-                      </a:pPr>
-                      <a:r>
-                        <a:rPr lang="pt-BR" sz="1100">
-                          <a:effectLst/>
-                        </a:rPr>
-                        <a:t> </a:t>
-                      </a:r>
-                      <a:endParaRPr lang="pt-BR" sz="1100">
-                        <a:effectLst/>
-                        <a:latin typeface="Calibri" panose="020F0502020204030204" pitchFamily="34" charset="0"/>
-                        <a:ea typeface="Calibri" panose="020F0502020204030204" pitchFamily="34" charset="0"/>
-                        <a:cs typeface="Times New Roman" panose="02020603050405020304" pitchFamily="18" charset="0"/>
-                      </a:endParaRPr>
-                    </a:p>
-                  </a:txBody>
-                  <a:tcPr marL="65767" marR="65767" marT="0" marB="0"/>
-                </a:tc>
-                <a:extLst>
-                  <a:ext uri="{0D108BD9-81ED-4DB2-BD59-A6C34878D82A}">
-                    <a16:rowId xmlns:a16="http://schemas.microsoft.com/office/drawing/2014/main" val="635228259"/>
-                  </a:ext>
-                </a:extLst>
-              </a:tr>
-              <a:tr h="164418">
-                <a:tc>
-                  <a:txBody>
-                    <a:bodyPr/>
-                    <a:lstStyle/>
-                    <a:p>
-                      <a:pPr>
-                        <a:lnSpc>
-                          <a:spcPct val="107000"/>
-                        </a:lnSpc>
-                        <a:spcAft>
-                          <a:spcPts val="800"/>
-                        </a:spcAft>
-                      </a:pPr>
-                      <a:r>
-                        <a:rPr lang="pt-BR" sz="1100">
-                          <a:effectLst/>
-                        </a:rPr>
-                        <a:t>RevMan5</a:t>
-                      </a:r>
-                      <a:endParaRPr lang="pt-BR" sz="1100">
-                        <a:effectLst/>
-                        <a:latin typeface="Calibri" panose="020F0502020204030204" pitchFamily="34" charset="0"/>
-                        <a:ea typeface="Calibri" panose="020F0502020204030204" pitchFamily="34" charset="0"/>
-                        <a:cs typeface="Times New Roman" panose="02020603050405020304" pitchFamily="18" charset="0"/>
-                      </a:endParaRPr>
-                    </a:p>
-                  </a:txBody>
-                  <a:tcPr marL="65767" marR="65767" marT="0" marB="0"/>
-                </a:tc>
-                <a:tc>
-                  <a:txBody>
-                    <a:bodyPr/>
-                    <a:lstStyle/>
-                    <a:p>
-                      <a:pPr algn="ctr">
-                        <a:lnSpc>
-                          <a:spcPct val="107000"/>
-                        </a:lnSpc>
-                        <a:spcAft>
-                          <a:spcPts val="800"/>
-                        </a:spcAft>
-                      </a:pPr>
-                      <a:r>
-                        <a:rPr lang="pt-BR" sz="1100">
-                          <a:effectLst/>
-                        </a:rPr>
-                        <a:t> </a:t>
-                      </a:r>
-                      <a:endParaRPr lang="pt-BR" sz="1100">
-                        <a:effectLst/>
-                        <a:latin typeface="Calibri" panose="020F0502020204030204" pitchFamily="34" charset="0"/>
-                        <a:ea typeface="Calibri" panose="020F0502020204030204" pitchFamily="34" charset="0"/>
-                        <a:cs typeface="Times New Roman" panose="02020603050405020304" pitchFamily="18" charset="0"/>
-                      </a:endParaRPr>
-                    </a:p>
-                  </a:txBody>
-                  <a:tcPr marL="65767" marR="65767" marT="0" marB="0"/>
-                </a:tc>
-                <a:tc>
-                  <a:txBody>
-                    <a:bodyPr/>
-                    <a:lstStyle/>
-                    <a:p>
-                      <a:pPr algn="ctr">
-                        <a:lnSpc>
-                          <a:spcPct val="107000"/>
-                        </a:lnSpc>
-                        <a:spcAft>
-                          <a:spcPts val="800"/>
-                        </a:spcAft>
-                      </a:pPr>
-                      <a:r>
-                        <a:rPr lang="pt-BR" sz="1100">
-                          <a:effectLst/>
-                        </a:rPr>
-                        <a:t>X</a:t>
-                      </a:r>
-                      <a:endParaRPr lang="pt-BR" sz="1100">
-                        <a:effectLst/>
-                        <a:latin typeface="Calibri" panose="020F0502020204030204" pitchFamily="34" charset="0"/>
-                        <a:ea typeface="Calibri" panose="020F0502020204030204" pitchFamily="34" charset="0"/>
-                        <a:cs typeface="Times New Roman" panose="02020603050405020304" pitchFamily="18" charset="0"/>
-                      </a:endParaRPr>
-                    </a:p>
-                  </a:txBody>
-                  <a:tcPr marL="65767" marR="65767" marT="0" marB="0"/>
-                </a:tc>
-                <a:tc>
-                  <a:txBody>
-                    <a:bodyPr/>
-                    <a:lstStyle/>
-                    <a:p>
-                      <a:pPr algn="ctr">
-                        <a:lnSpc>
-                          <a:spcPct val="107000"/>
-                        </a:lnSpc>
-                        <a:spcAft>
-                          <a:spcPts val="800"/>
-                        </a:spcAft>
-                      </a:pPr>
-                      <a:r>
-                        <a:rPr lang="pt-BR" sz="1100">
-                          <a:effectLst/>
-                        </a:rPr>
-                        <a:t> </a:t>
-                      </a:r>
-                      <a:endParaRPr lang="pt-BR" sz="1100">
-                        <a:effectLst/>
-                        <a:latin typeface="Calibri" panose="020F0502020204030204" pitchFamily="34" charset="0"/>
-                        <a:ea typeface="Calibri" panose="020F0502020204030204" pitchFamily="34" charset="0"/>
-                        <a:cs typeface="Times New Roman" panose="02020603050405020304" pitchFamily="18" charset="0"/>
-                      </a:endParaRPr>
-                    </a:p>
-                  </a:txBody>
-                  <a:tcPr marL="65767" marR="65767" marT="0" marB="0"/>
-                </a:tc>
-                <a:tc>
-                  <a:txBody>
-                    <a:bodyPr/>
-                    <a:lstStyle/>
-                    <a:p>
-                      <a:pPr algn="ctr">
-                        <a:lnSpc>
-                          <a:spcPct val="107000"/>
-                        </a:lnSpc>
-                        <a:spcAft>
-                          <a:spcPts val="800"/>
-                        </a:spcAft>
-                      </a:pPr>
-                      <a:r>
-                        <a:rPr lang="pt-BR" sz="1100">
-                          <a:effectLst/>
-                        </a:rPr>
-                        <a:t> </a:t>
-                      </a:r>
-                      <a:endParaRPr lang="pt-BR" sz="1100">
-                        <a:effectLst/>
-                        <a:latin typeface="Calibri" panose="020F0502020204030204" pitchFamily="34" charset="0"/>
-                        <a:ea typeface="Calibri" panose="020F0502020204030204" pitchFamily="34" charset="0"/>
-                        <a:cs typeface="Times New Roman" panose="02020603050405020304" pitchFamily="18" charset="0"/>
-                      </a:endParaRPr>
-                    </a:p>
-                  </a:txBody>
-                  <a:tcPr marL="65767" marR="65767" marT="0" marB="0"/>
-                </a:tc>
-                <a:tc>
-                  <a:txBody>
-                    <a:bodyPr/>
-                    <a:lstStyle/>
-                    <a:p>
-                      <a:pPr algn="ctr">
-                        <a:lnSpc>
-                          <a:spcPct val="107000"/>
-                        </a:lnSpc>
-                        <a:spcAft>
-                          <a:spcPts val="800"/>
-                        </a:spcAft>
-                      </a:pPr>
-                      <a:r>
-                        <a:rPr lang="pt-BR" sz="1100">
-                          <a:effectLst/>
-                        </a:rPr>
-                        <a:t>X</a:t>
-                      </a:r>
-                      <a:endParaRPr lang="pt-BR" sz="1100">
-                        <a:effectLst/>
-                        <a:latin typeface="Calibri" panose="020F0502020204030204" pitchFamily="34" charset="0"/>
-                        <a:ea typeface="Calibri" panose="020F0502020204030204" pitchFamily="34" charset="0"/>
-                        <a:cs typeface="Times New Roman" panose="02020603050405020304" pitchFamily="18" charset="0"/>
-                      </a:endParaRPr>
-                    </a:p>
-                  </a:txBody>
-                  <a:tcPr marL="65767" marR="65767" marT="0" marB="0"/>
-                </a:tc>
-                <a:tc>
-                  <a:txBody>
-                    <a:bodyPr/>
-                    <a:lstStyle/>
-                    <a:p>
-                      <a:pPr algn="ctr">
-                        <a:lnSpc>
-                          <a:spcPct val="107000"/>
-                        </a:lnSpc>
-                        <a:spcAft>
-                          <a:spcPts val="800"/>
-                        </a:spcAft>
-                      </a:pPr>
-                      <a:r>
-                        <a:rPr lang="pt-BR" sz="1100">
-                          <a:effectLst/>
-                        </a:rPr>
-                        <a:t>X</a:t>
-                      </a:r>
-                      <a:endParaRPr lang="pt-BR" sz="1100">
-                        <a:effectLst/>
-                        <a:latin typeface="Calibri" panose="020F0502020204030204" pitchFamily="34" charset="0"/>
-                        <a:ea typeface="Calibri" panose="020F0502020204030204" pitchFamily="34" charset="0"/>
-                        <a:cs typeface="Times New Roman" panose="02020603050405020304" pitchFamily="18" charset="0"/>
-                      </a:endParaRPr>
-                    </a:p>
-                  </a:txBody>
-                  <a:tcPr marL="65767" marR="65767" marT="0" marB="0"/>
-                </a:tc>
-                <a:tc>
-                  <a:txBody>
-                    <a:bodyPr/>
-                    <a:lstStyle/>
-                    <a:p>
-                      <a:pPr algn="ctr">
-                        <a:lnSpc>
-                          <a:spcPct val="107000"/>
-                        </a:lnSpc>
-                        <a:spcAft>
-                          <a:spcPts val="800"/>
-                        </a:spcAft>
-                      </a:pPr>
-                      <a:r>
-                        <a:rPr lang="pt-BR" sz="1100">
-                          <a:effectLst/>
-                        </a:rPr>
-                        <a:t>X</a:t>
-                      </a:r>
-                      <a:endParaRPr lang="pt-BR" sz="1100">
-                        <a:effectLst/>
-                        <a:latin typeface="Calibri" panose="020F0502020204030204" pitchFamily="34" charset="0"/>
-                        <a:ea typeface="Calibri" panose="020F0502020204030204" pitchFamily="34" charset="0"/>
-                        <a:cs typeface="Times New Roman" panose="02020603050405020304" pitchFamily="18" charset="0"/>
-                      </a:endParaRPr>
-                    </a:p>
-                  </a:txBody>
-                  <a:tcPr marL="65767" marR="65767" marT="0" marB="0"/>
-                </a:tc>
-                <a:tc>
-                  <a:txBody>
-                    <a:bodyPr/>
-                    <a:lstStyle/>
-                    <a:p>
-                      <a:pPr algn="ctr">
-                        <a:lnSpc>
-                          <a:spcPct val="107000"/>
-                        </a:lnSpc>
-                        <a:spcAft>
-                          <a:spcPts val="800"/>
-                        </a:spcAft>
-                      </a:pPr>
-                      <a:r>
-                        <a:rPr lang="pt-BR" sz="1100">
-                          <a:effectLst/>
-                        </a:rPr>
-                        <a:t>X</a:t>
-                      </a:r>
-                      <a:endParaRPr lang="pt-BR" sz="1100">
-                        <a:effectLst/>
-                        <a:latin typeface="Calibri" panose="020F0502020204030204" pitchFamily="34" charset="0"/>
-                        <a:ea typeface="Calibri" panose="020F0502020204030204" pitchFamily="34" charset="0"/>
-                        <a:cs typeface="Times New Roman" panose="02020603050405020304" pitchFamily="18" charset="0"/>
-                      </a:endParaRPr>
-                    </a:p>
-                  </a:txBody>
-                  <a:tcPr marL="65767" marR="65767" marT="0" marB="0"/>
-                </a:tc>
-                <a:tc>
-                  <a:txBody>
-                    <a:bodyPr/>
-                    <a:lstStyle/>
-                    <a:p>
-                      <a:pPr algn="ctr">
-                        <a:lnSpc>
-                          <a:spcPct val="107000"/>
-                        </a:lnSpc>
-                        <a:spcAft>
-                          <a:spcPts val="800"/>
-                        </a:spcAft>
-                      </a:pPr>
-                      <a:r>
-                        <a:rPr lang="pt-BR" sz="1100">
-                          <a:effectLst/>
-                        </a:rPr>
-                        <a:t>X</a:t>
-                      </a:r>
-                      <a:endParaRPr lang="pt-BR" sz="1100">
-                        <a:effectLst/>
-                        <a:latin typeface="Calibri" panose="020F0502020204030204" pitchFamily="34" charset="0"/>
-                        <a:ea typeface="Calibri" panose="020F0502020204030204" pitchFamily="34" charset="0"/>
-                        <a:cs typeface="Times New Roman" panose="02020603050405020304" pitchFamily="18" charset="0"/>
-                      </a:endParaRPr>
-                    </a:p>
-                  </a:txBody>
-                  <a:tcPr marL="65767" marR="65767" marT="0" marB="0"/>
-                </a:tc>
-                <a:extLst>
-                  <a:ext uri="{0D108BD9-81ED-4DB2-BD59-A6C34878D82A}">
-                    <a16:rowId xmlns:a16="http://schemas.microsoft.com/office/drawing/2014/main" val="2851366193"/>
-                  </a:ext>
-                </a:extLst>
-              </a:tr>
-              <a:tr h="336447">
-                <a:tc>
-                  <a:txBody>
-                    <a:bodyPr/>
-                    <a:lstStyle/>
-                    <a:p>
-                      <a:pPr>
-                        <a:lnSpc>
-                          <a:spcPct val="107000"/>
-                        </a:lnSpc>
-                        <a:spcAft>
-                          <a:spcPts val="800"/>
-                        </a:spcAft>
-                      </a:pPr>
-                      <a:r>
-                        <a:rPr lang="pt-BR" sz="1100">
-                          <a:effectLst/>
-                        </a:rPr>
-                        <a:t>RevMan Web</a:t>
-                      </a:r>
-                      <a:endParaRPr lang="pt-BR" sz="1100">
-                        <a:effectLst/>
-                        <a:latin typeface="Calibri" panose="020F0502020204030204" pitchFamily="34" charset="0"/>
-                        <a:ea typeface="Calibri" panose="020F0502020204030204" pitchFamily="34" charset="0"/>
-                        <a:cs typeface="Times New Roman" panose="02020603050405020304" pitchFamily="18" charset="0"/>
-                      </a:endParaRPr>
-                    </a:p>
-                  </a:txBody>
-                  <a:tcPr marL="65767" marR="65767" marT="0" marB="0"/>
-                </a:tc>
-                <a:tc gridSpan="9">
-                  <a:txBody>
-                    <a:bodyPr/>
-                    <a:lstStyle/>
-                    <a:p>
-                      <a:pPr algn="ctr">
-                        <a:lnSpc>
-                          <a:spcPct val="107000"/>
-                        </a:lnSpc>
-                        <a:spcAft>
-                          <a:spcPts val="800"/>
-                        </a:spcAft>
-                      </a:pPr>
-                      <a:r>
-                        <a:rPr lang="pt-BR" sz="1100" dirty="0">
-                          <a:effectLst/>
-                        </a:rPr>
-                        <a:t>Indisponível</a:t>
-                      </a:r>
-                      <a:endParaRPr lang="pt-BR" sz="1100" dirty="0">
-                        <a:effectLst/>
-                        <a:latin typeface="Calibri" panose="020F0502020204030204" pitchFamily="34" charset="0"/>
-                        <a:ea typeface="Calibri" panose="020F0502020204030204" pitchFamily="34" charset="0"/>
-                        <a:cs typeface="Times New Roman" panose="02020603050405020304" pitchFamily="18" charset="0"/>
-                      </a:endParaRPr>
-                    </a:p>
-                  </a:txBody>
-                  <a:tcPr marL="65767" marR="65767" marT="0" marB="0"/>
-                </a:tc>
-                <a:tc hMerge="1">
-                  <a:txBody>
-                    <a:bodyPr/>
-                    <a:lstStyle/>
-                    <a:p>
-                      <a:endParaRPr lang="pt-BR"/>
-                    </a:p>
-                  </a:txBody>
-                  <a:tcPr/>
-                </a:tc>
-                <a:tc hMerge="1">
-                  <a:txBody>
-                    <a:bodyPr/>
-                    <a:lstStyle/>
-                    <a:p>
-                      <a:endParaRPr lang="pt-BR"/>
-                    </a:p>
-                  </a:txBody>
-                  <a:tcPr/>
-                </a:tc>
-                <a:tc hMerge="1">
-                  <a:txBody>
-                    <a:bodyPr/>
-                    <a:lstStyle/>
-                    <a:p>
-                      <a:endParaRPr lang="pt-BR"/>
-                    </a:p>
-                  </a:txBody>
-                  <a:tcPr/>
-                </a:tc>
-                <a:tc hMerge="1">
-                  <a:txBody>
-                    <a:bodyPr/>
-                    <a:lstStyle/>
-                    <a:p>
-                      <a:endParaRPr lang="pt-BR"/>
-                    </a:p>
-                  </a:txBody>
-                  <a:tcPr/>
-                </a:tc>
-                <a:tc hMerge="1">
-                  <a:txBody>
-                    <a:bodyPr/>
-                    <a:lstStyle/>
-                    <a:p>
-                      <a:endParaRPr lang="pt-BR"/>
-                    </a:p>
-                  </a:txBody>
-                  <a:tcPr/>
-                </a:tc>
-                <a:tc hMerge="1">
-                  <a:txBody>
-                    <a:bodyPr/>
-                    <a:lstStyle/>
-                    <a:p>
-                      <a:endParaRPr lang="pt-BR"/>
-                    </a:p>
-                  </a:txBody>
-                  <a:tcPr/>
-                </a:tc>
-                <a:tc hMerge="1">
-                  <a:txBody>
-                    <a:bodyPr/>
-                    <a:lstStyle/>
-                    <a:p>
-                      <a:endParaRPr lang="pt-BR"/>
-                    </a:p>
-                  </a:txBody>
-                  <a:tcPr/>
-                </a:tc>
-                <a:tc hMerge="1">
-                  <a:txBody>
-                    <a:bodyPr/>
-                    <a:lstStyle/>
-                    <a:p>
-                      <a:endParaRPr lang="pt-BR"/>
-                    </a:p>
-                  </a:txBody>
-                  <a:tcPr/>
-                </a:tc>
-                <a:extLst>
-                  <a:ext uri="{0D108BD9-81ED-4DB2-BD59-A6C34878D82A}">
-                    <a16:rowId xmlns:a16="http://schemas.microsoft.com/office/drawing/2014/main" val="1667250145"/>
-                  </a:ext>
-                </a:extLst>
-              </a:tr>
-            </a:tbl>
-          </a:graphicData>
-        </a:graphic>
-      </p:graphicFrame>
-    </p:spTree>
-    <p:extLst>
-      <p:ext uri="{BB962C8B-B14F-4D97-AF65-F5344CB8AC3E}">
-        <p14:creationId xmlns:p14="http://schemas.microsoft.com/office/powerpoint/2010/main" val="2960640519"/>
-      </p:ext>
-    </p:extLst>
-  </p:cSld>
-  <p:clrMapOvr>
-    <a:masterClrMapping/>
-  </p:clrMapOvr>
-</p:sld>
-</file>
-
-<file path=ppt/slides/slide9.xml><?xml version="1.0" encoding="utf-8"?>
-<p:sld xmlns:a="http://schemas.openxmlformats.org/drawingml/2006/main" xmlns:r="http://schemas.openxmlformats.org/officeDocument/2006/relationships" xmlns:p="http://schemas.openxmlformats.org/presentationml/2006/main">
-  <p:cSld>
-    <p:spTree>
-      <p:nvGrpSpPr>
         <p:cNvPr id="1" name="Shape 349"/>
         <p:cNvGrpSpPr/>
         <p:nvPr/>
@@ -27535,6 +25009,91 @@
         </p:txBody>
       </p:sp>
     </p:spTree>
+  </p:cSld>
+  <p:clrMapOvr>
+    <a:masterClrMapping/>
+  </p:clrMapOvr>
+</p:sld>
+</file>
+
+<file path=ppt/slides/slide9.xml><?xml version="1.0" encoding="utf-8"?>
+<p:sld xmlns:a="http://schemas.openxmlformats.org/drawingml/2006/main" xmlns:r="http://schemas.openxmlformats.org/officeDocument/2006/relationships" xmlns:p="http://schemas.openxmlformats.org/presentationml/2006/main">
+  <p:cSld>
+    <p:spTree>
+      <p:nvGrpSpPr>
+        <p:cNvPr id="1" name=""/>
+        <p:cNvGrpSpPr/>
+        <p:nvPr/>
+      </p:nvGrpSpPr>
+      <p:grpSpPr>
+        <a:xfrm>
+          <a:off x="0" y="0"/>
+          <a:ext cx="0" cy="0"/>
+          <a:chOff x="0" y="0"/>
+          <a:chExt cx="0" cy="0"/>
+        </a:xfrm>
+      </p:grpSpPr>
+      <p:sp>
+        <p:nvSpPr>
+          <p:cNvPr id="2" name="Título 1">
+            <a:extLst>
+              <a:ext uri="{FF2B5EF4-FFF2-40B4-BE49-F238E27FC236}">
+                <a16:creationId xmlns:a16="http://schemas.microsoft.com/office/drawing/2014/main" id="{F6C4B51F-0372-4C26-85B8-F6054AE0B5EF}"/>
+              </a:ext>
+            </a:extLst>
+          </p:cNvPr>
+          <p:cNvSpPr>
+            <a:spLocks noGrp="1"/>
+          </p:cNvSpPr>
+          <p:nvPr>
+            <p:ph type="title"/>
+          </p:nvPr>
+        </p:nvSpPr>
+        <p:spPr>
+          <a:xfrm>
+            <a:off x="1303800" y="598575"/>
+            <a:ext cx="7030500" cy="999300"/>
+          </a:xfrm>
+        </p:spPr>
+        <p:txBody>
+          <a:bodyPr/>
+          <a:lstStyle/>
+          <a:p>
+            <a:r>
+              <a:rPr lang="pt-BR" dirty="0"/>
+              <a:t>CADIMA</a:t>
+            </a:r>
+          </a:p>
+        </p:txBody>
+      </p:sp>
+      <p:graphicFrame>
+        <p:nvGraphicFramePr>
+          <p:cNvPr id="6" name="Diagrama 5">
+            <a:extLst>
+              <a:ext uri="{FF2B5EF4-FFF2-40B4-BE49-F238E27FC236}">
+                <a16:creationId xmlns:a16="http://schemas.microsoft.com/office/drawing/2014/main" id="{8FCD1805-A8C1-46C2-81C2-0C4ABBFCECD9}"/>
+              </a:ext>
+            </a:extLst>
+          </p:cNvPr>
+          <p:cNvGraphicFramePr/>
+          <p:nvPr/>
+        </p:nvGraphicFramePr>
+        <p:xfrm>
+          <a:off x="1303338" y="1990725"/>
+          <a:ext cx="7031037" cy="2541588"/>
+        </p:xfrm>
+        <a:graphic>
+          <a:graphicData uri="http://schemas.openxmlformats.org/drawingml/2006/diagram">
+            <dgm:relIds xmlns:dgm="http://schemas.openxmlformats.org/drawingml/2006/diagram" xmlns:r="http://schemas.openxmlformats.org/officeDocument/2006/relationships" r:dm="rId2" r:lo="rId3" r:qs="rId4" r:cs="rId5"/>
+          </a:graphicData>
+        </a:graphic>
+      </p:graphicFrame>
+    </p:spTree>
+    <p:extLst>
+      <p:ext uri="{BB962C8B-B14F-4D97-AF65-F5344CB8AC3E}">
+        <p14:creationId xmlns:p14="http://schemas.microsoft.com/office/powerpoint/2010/main" val="3846482829"/>
+      </p:ext>
+    </p:extLst>
   </p:cSld>
   <p:clrMapOvr>
     <a:masterClrMapping/>

</xml_diff>

<commit_message>
Organização das referencias e alteração na formatação de alguns slides
</commit_message>
<xml_diff>
--- a/apresentacao-revisao-sistematica.pptx
+++ b/apresentacao-revisao-sistematica.pptx
@@ -2525,11 +2525,758 @@
 </dgm:colorsDef>
 </file>
 
+<file path=ppt/diagrams/colors4.xml><?xml version="1.0" encoding="utf-8"?>
+<dgm:colorsDef xmlns:dgm="http://schemas.openxmlformats.org/drawingml/2006/diagram" xmlns:a="http://schemas.openxmlformats.org/drawingml/2006/main" uniqueId="urn:microsoft.com/office/officeart/2005/8/colors/accent1_2">
+  <dgm:title val=""/>
+  <dgm:desc val=""/>
+  <dgm:catLst>
+    <dgm:cat type="accent1" pri="11200"/>
+  </dgm:catLst>
+  <dgm:styleLbl name="node0">
+    <dgm:fillClrLst meth="repeat">
+      <a:schemeClr val="accent1"/>
+    </dgm:fillClrLst>
+    <dgm:linClrLst meth="repeat">
+      <a:schemeClr val="lt1"/>
+    </dgm:linClrLst>
+    <dgm:effectClrLst/>
+    <dgm:txLinClrLst/>
+    <dgm:txFillClrLst/>
+    <dgm:txEffectClrLst/>
+  </dgm:styleLbl>
+  <dgm:styleLbl name="alignNode1">
+    <dgm:fillClrLst meth="repeat">
+      <a:schemeClr val="accent1"/>
+    </dgm:fillClrLst>
+    <dgm:linClrLst meth="repeat">
+      <a:schemeClr val="accent1"/>
+    </dgm:linClrLst>
+    <dgm:effectClrLst/>
+    <dgm:txLinClrLst/>
+    <dgm:txFillClrLst/>
+    <dgm:txEffectClrLst/>
+  </dgm:styleLbl>
+  <dgm:styleLbl name="node1">
+    <dgm:fillClrLst meth="repeat">
+      <a:schemeClr val="accent1"/>
+    </dgm:fillClrLst>
+    <dgm:linClrLst meth="repeat">
+      <a:schemeClr val="lt1"/>
+    </dgm:linClrLst>
+    <dgm:effectClrLst/>
+    <dgm:txLinClrLst/>
+    <dgm:txFillClrLst/>
+    <dgm:txEffectClrLst/>
+  </dgm:styleLbl>
+  <dgm:styleLbl name="lnNode1">
+    <dgm:fillClrLst meth="repeat">
+      <a:schemeClr val="accent1"/>
+    </dgm:fillClrLst>
+    <dgm:linClrLst meth="repeat">
+      <a:schemeClr val="lt1"/>
+    </dgm:linClrLst>
+    <dgm:effectClrLst/>
+    <dgm:txLinClrLst/>
+    <dgm:txFillClrLst/>
+    <dgm:txEffectClrLst/>
+  </dgm:styleLbl>
+  <dgm:styleLbl name="vennNode1">
+    <dgm:fillClrLst meth="repeat">
+      <a:schemeClr val="accent1">
+        <a:alpha val="50000"/>
+      </a:schemeClr>
+    </dgm:fillClrLst>
+    <dgm:linClrLst meth="repeat">
+      <a:schemeClr val="lt1"/>
+    </dgm:linClrLst>
+    <dgm:effectClrLst/>
+    <dgm:txLinClrLst/>
+    <dgm:txFillClrLst/>
+    <dgm:txEffectClrLst/>
+  </dgm:styleLbl>
+  <dgm:styleLbl name="node2">
+    <dgm:fillClrLst meth="repeat">
+      <a:schemeClr val="accent1"/>
+    </dgm:fillClrLst>
+    <dgm:linClrLst meth="repeat">
+      <a:schemeClr val="lt1"/>
+    </dgm:linClrLst>
+    <dgm:effectClrLst/>
+    <dgm:txLinClrLst/>
+    <dgm:txFillClrLst/>
+    <dgm:txEffectClrLst/>
+  </dgm:styleLbl>
+  <dgm:styleLbl name="node3">
+    <dgm:fillClrLst meth="repeat">
+      <a:schemeClr val="accent1"/>
+    </dgm:fillClrLst>
+    <dgm:linClrLst meth="repeat">
+      <a:schemeClr val="lt1"/>
+    </dgm:linClrLst>
+    <dgm:effectClrLst/>
+    <dgm:txLinClrLst/>
+    <dgm:txFillClrLst/>
+    <dgm:txEffectClrLst/>
+  </dgm:styleLbl>
+  <dgm:styleLbl name="node4">
+    <dgm:fillClrLst meth="repeat">
+      <a:schemeClr val="accent1"/>
+    </dgm:fillClrLst>
+    <dgm:linClrLst meth="repeat">
+      <a:schemeClr val="lt1"/>
+    </dgm:linClrLst>
+    <dgm:effectClrLst/>
+    <dgm:txLinClrLst/>
+    <dgm:txFillClrLst/>
+    <dgm:txEffectClrLst/>
+  </dgm:styleLbl>
+  <dgm:styleLbl name="fgImgPlace1">
+    <dgm:fillClrLst meth="repeat">
+      <a:schemeClr val="accent1">
+        <a:tint val="50000"/>
+      </a:schemeClr>
+    </dgm:fillClrLst>
+    <dgm:linClrLst meth="repeat">
+      <a:schemeClr val="lt1"/>
+    </dgm:linClrLst>
+    <dgm:effectClrLst/>
+    <dgm:txLinClrLst/>
+    <dgm:txFillClrLst meth="repeat">
+      <a:schemeClr val="lt1"/>
+    </dgm:txFillClrLst>
+    <dgm:txEffectClrLst/>
+  </dgm:styleLbl>
+  <dgm:styleLbl name="alignImgPlace1">
+    <dgm:fillClrLst meth="repeat">
+      <a:schemeClr val="accent1">
+        <a:tint val="50000"/>
+      </a:schemeClr>
+    </dgm:fillClrLst>
+    <dgm:linClrLst meth="repeat">
+      <a:schemeClr val="lt1"/>
+    </dgm:linClrLst>
+    <dgm:effectClrLst/>
+    <dgm:txLinClrLst/>
+    <dgm:txFillClrLst meth="repeat">
+      <a:schemeClr val="lt1"/>
+    </dgm:txFillClrLst>
+    <dgm:txEffectClrLst/>
+  </dgm:styleLbl>
+  <dgm:styleLbl name="bgImgPlace1">
+    <dgm:fillClrLst meth="repeat">
+      <a:schemeClr val="accent1">
+        <a:tint val="50000"/>
+      </a:schemeClr>
+    </dgm:fillClrLst>
+    <dgm:linClrLst meth="repeat">
+      <a:schemeClr val="lt1"/>
+    </dgm:linClrLst>
+    <dgm:effectClrLst/>
+    <dgm:txLinClrLst/>
+    <dgm:txFillClrLst meth="repeat">
+      <a:schemeClr val="lt1"/>
+    </dgm:txFillClrLst>
+    <dgm:txEffectClrLst/>
+  </dgm:styleLbl>
+  <dgm:styleLbl name="sibTrans2D1">
+    <dgm:fillClrLst meth="repeat">
+      <a:schemeClr val="accent1">
+        <a:tint val="60000"/>
+      </a:schemeClr>
+    </dgm:fillClrLst>
+    <dgm:linClrLst meth="repeat">
+      <a:schemeClr val="accent1">
+        <a:tint val="60000"/>
+      </a:schemeClr>
+    </dgm:linClrLst>
+    <dgm:effectClrLst/>
+    <dgm:txLinClrLst/>
+    <dgm:txFillClrLst/>
+    <dgm:txEffectClrLst/>
+  </dgm:styleLbl>
+  <dgm:styleLbl name="fgSibTrans2D1">
+    <dgm:fillClrLst meth="repeat">
+      <a:schemeClr val="accent1">
+        <a:tint val="60000"/>
+      </a:schemeClr>
+    </dgm:fillClrLst>
+    <dgm:linClrLst meth="repeat">
+      <a:schemeClr val="accent1">
+        <a:tint val="60000"/>
+      </a:schemeClr>
+    </dgm:linClrLst>
+    <dgm:effectClrLst/>
+    <dgm:txLinClrLst/>
+    <dgm:txFillClrLst/>
+    <dgm:txEffectClrLst/>
+  </dgm:styleLbl>
+  <dgm:styleLbl name="bgSibTrans2D1">
+    <dgm:fillClrLst meth="repeat">
+      <a:schemeClr val="accent1">
+        <a:tint val="60000"/>
+      </a:schemeClr>
+    </dgm:fillClrLst>
+    <dgm:linClrLst meth="repeat">
+      <a:schemeClr val="accent1">
+        <a:tint val="60000"/>
+      </a:schemeClr>
+    </dgm:linClrLst>
+    <dgm:effectClrLst/>
+    <dgm:txLinClrLst/>
+    <dgm:txFillClrLst/>
+    <dgm:txEffectClrLst/>
+  </dgm:styleLbl>
+  <dgm:styleLbl name="sibTrans1D1">
+    <dgm:fillClrLst meth="repeat">
+      <a:schemeClr val="accent1"/>
+    </dgm:fillClrLst>
+    <dgm:linClrLst meth="repeat">
+      <a:schemeClr val="accent1"/>
+    </dgm:linClrLst>
+    <dgm:effectClrLst/>
+    <dgm:txLinClrLst/>
+    <dgm:txFillClrLst meth="repeat">
+      <a:schemeClr val="tx1"/>
+    </dgm:txFillClrLst>
+    <dgm:txEffectClrLst/>
+  </dgm:styleLbl>
+  <dgm:styleLbl name="callout">
+    <dgm:fillClrLst meth="repeat">
+      <a:schemeClr val="accent1"/>
+    </dgm:fillClrLst>
+    <dgm:linClrLst meth="repeat">
+      <a:schemeClr val="accent1">
+        <a:tint val="50000"/>
+      </a:schemeClr>
+    </dgm:linClrLst>
+    <dgm:effectClrLst/>
+    <dgm:txLinClrLst/>
+    <dgm:txFillClrLst meth="repeat">
+      <a:schemeClr val="tx1"/>
+    </dgm:txFillClrLst>
+    <dgm:txEffectClrLst/>
+  </dgm:styleLbl>
+  <dgm:styleLbl name="asst0">
+    <dgm:fillClrLst meth="repeat">
+      <a:schemeClr val="accent1"/>
+    </dgm:fillClrLst>
+    <dgm:linClrLst meth="repeat">
+      <a:schemeClr val="lt1"/>
+    </dgm:linClrLst>
+    <dgm:effectClrLst/>
+    <dgm:txLinClrLst/>
+    <dgm:txFillClrLst/>
+    <dgm:txEffectClrLst/>
+  </dgm:styleLbl>
+  <dgm:styleLbl name="asst1">
+    <dgm:fillClrLst meth="repeat">
+      <a:schemeClr val="accent1"/>
+    </dgm:fillClrLst>
+    <dgm:linClrLst meth="repeat">
+      <a:schemeClr val="lt1"/>
+    </dgm:linClrLst>
+    <dgm:effectClrLst/>
+    <dgm:txLinClrLst/>
+    <dgm:txFillClrLst/>
+    <dgm:txEffectClrLst/>
+  </dgm:styleLbl>
+  <dgm:styleLbl name="asst2">
+    <dgm:fillClrLst meth="repeat">
+      <a:schemeClr val="accent1"/>
+    </dgm:fillClrLst>
+    <dgm:linClrLst meth="repeat">
+      <a:schemeClr val="lt1"/>
+    </dgm:linClrLst>
+    <dgm:effectClrLst/>
+    <dgm:txLinClrLst/>
+    <dgm:txFillClrLst/>
+    <dgm:txEffectClrLst/>
+  </dgm:styleLbl>
+  <dgm:styleLbl name="asst3">
+    <dgm:fillClrLst meth="repeat">
+      <a:schemeClr val="accent1"/>
+    </dgm:fillClrLst>
+    <dgm:linClrLst meth="repeat">
+      <a:schemeClr val="lt1"/>
+    </dgm:linClrLst>
+    <dgm:effectClrLst/>
+    <dgm:txLinClrLst/>
+    <dgm:txFillClrLst/>
+    <dgm:txEffectClrLst/>
+  </dgm:styleLbl>
+  <dgm:styleLbl name="asst4">
+    <dgm:fillClrLst meth="repeat">
+      <a:schemeClr val="accent1"/>
+    </dgm:fillClrLst>
+    <dgm:linClrLst meth="repeat">
+      <a:schemeClr val="lt1"/>
+    </dgm:linClrLst>
+    <dgm:effectClrLst/>
+    <dgm:txLinClrLst/>
+    <dgm:txFillClrLst/>
+    <dgm:txEffectClrLst/>
+  </dgm:styleLbl>
+  <dgm:styleLbl name="parChTrans2D1">
+    <dgm:fillClrLst meth="repeat">
+      <a:schemeClr val="accent1">
+        <a:tint val="60000"/>
+      </a:schemeClr>
+    </dgm:fillClrLst>
+    <dgm:linClrLst meth="repeat">
+      <a:schemeClr val="accent1">
+        <a:tint val="60000"/>
+      </a:schemeClr>
+    </dgm:linClrLst>
+    <dgm:effectClrLst/>
+    <dgm:txLinClrLst/>
+    <dgm:txFillClrLst meth="repeat">
+      <a:schemeClr val="lt1"/>
+    </dgm:txFillClrLst>
+    <dgm:txEffectClrLst/>
+  </dgm:styleLbl>
+  <dgm:styleLbl name="parChTrans2D2">
+    <dgm:fillClrLst meth="repeat">
+      <a:schemeClr val="accent1"/>
+    </dgm:fillClrLst>
+    <dgm:linClrLst meth="repeat">
+      <a:schemeClr val="accent1"/>
+    </dgm:linClrLst>
+    <dgm:effectClrLst/>
+    <dgm:txLinClrLst/>
+    <dgm:txFillClrLst meth="repeat">
+      <a:schemeClr val="lt1"/>
+    </dgm:txFillClrLst>
+    <dgm:txEffectClrLst/>
+  </dgm:styleLbl>
+  <dgm:styleLbl name="parChTrans2D3">
+    <dgm:fillClrLst meth="repeat">
+      <a:schemeClr val="accent1"/>
+    </dgm:fillClrLst>
+    <dgm:linClrLst meth="repeat">
+      <a:schemeClr val="accent1"/>
+    </dgm:linClrLst>
+    <dgm:effectClrLst/>
+    <dgm:txLinClrLst/>
+    <dgm:txFillClrLst meth="repeat">
+      <a:schemeClr val="lt1"/>
+    </dgm:txFillClrLst>
+    <dgm:txEffectClrLst/>
+  </dgm:styleLbl>
+  <dgm:styleLbl name="parChTrans2D4">
+    <dgm:fillClrLst meth="repeat">
+      <a:schemeClr val="accent1"/>
+    </dgm:fillClrLst>
+    <dgm:linClrLst meth="repeat">
+      <a:schemeClr val="accent1"/>
+    </dgm:linClrLst>
+    <dgm:effectClrLst/>
+    <dgm:txLinClrLst/>
+    <dgm:txFillClrLst meth="repeat">
+      <a:schemeClr val="lt1"/>
+    </dgm:txFillClrLst>
+    <dgm:txEffectClrLst/>
+  </dgm:styleLbl>
+  <dgm:styleLbl name="parChTrans1D1">
+    <dgm:fillClrLst meth="repeat">
+      <a:schemeClr val="accent1"/>
+    </dgm:fillClrLst>
+    <dgm:linClrLst meth="repeat">
+      <a:schemeClr val="accent1">
+        <a:shade val="60000"/>
+      </a:schemeClr>
+    </dgm:linClrLst>
+    <dgm:effectClrLst/>
+    <dgm:txLinClrLst/>
+    <dgm:txFillClrLst meth="repeat">
+      <a:schemeClr val="tx1"/>
+    </dgm:txFillClrLst>
+    <dgm:txEffectClrLst/>
+  </dgm:styleLbl>
+  <dgm:styleLbl name="parChTrans1D2">
+    <dgm:fillClrLst meth="repeat">
+      <a:schemeClr val="accent1"/>
+    </dgm:fillClrLst>
+    <dgm:linClrLst meth="repeat">
+      <a:schemeClr val="accent1">
+        <a:shade val="60000"/>
+      </a:schemeClr>
+    </dgm:linClrLst>
+    <dgm:effectClrLst/>
+    <dgm:txLinClrLst/>
+    <dgm:txFillClrLst meth="repeat">
+      <a:schemeClr val="tx1"/>
+    </dgm:txFillClrLst>
+    <dgm:txEffectClrLst/>
+  </dgm:styleLbl>
+  <dgm:styleLbl name="parChTrans1D3">
+    <dgm:fillClrLst meth="repeat">
+      <a:schemeClr val="accent1"/>
+    </dgm:fillClrLst>
+    <dgm:linClrLst meth="repeat">
+      <a:schemeClr val="accent1">
+        <a:shade val="80000"/>
+      </a:schemeClr>
+    </dgm:linClrLst>
+    <dgm:effectClrLst/>
+    <dgm:txLinClrLst/>
+    <dgm:txFillClrLst meth="repeat">
+      <a:schemeClr val="tx1"/>
+    </dgm:txFillClrLst>
+    <dgm:txEffectClrLst/>
+  </dgm:styleLbl>
+  <dgm:styleLbl name="parChTrans1D4">
+    <dgm:fillClrLst meth="repeat">
+      <a:schemeClr val="accent1"/>
+    </dgm:fillClrLst>
+    <dgm:linClrLst meth="repeat">
+      <a:schemeClr val="accent1">
+        <a:shade val="80000"/>
+      </a:schemeClr>
+    </dgm:linClrLst>
+    <dgm:effectClrLst/>
+    <dgm:txLinClrLst/>
+    <dgm:txFillClrLst meth="repeat">
+      <a:schemeClr val="tx1"/>
+    </dgm:txFillClrLst>
+    <dgm:txEffectClrLst/>
+  </dgm:styleLbl>
+  <dgm:styleLbl name="fgAcc1">
+    <dgm:fillClrLst meth="repeat">
+      <a:schemeClr val="lt1">
+        <a:alpha val="90000"/>
+      </a:schemeClr>
+    </dgm:fillClrLst>
+    <dgm:linClrLst meth="repeat">
+      <a:schemeClr val="accent1"/>
+    </dgm:linClrLst>
+    <dgm:effectClrLst/>
+    <dgm:txLinClrLst/>
+    <dgm:txFillClrLst meth="repeat">
+      <a:schemeClr val="dk1"/>
+    </dgm:txFillClrLst>
+    <dgm:txEffectClrLst/>
+  </dgm:styleLbl>
+  <dgm:styleLbl name="conFgAcc1">
+    <dgm:fillClrLst meth="repeat">
+      <a:schemeClr val="lt1">
+        <a:alpha val="90000"/>
+      </a:schemeClr>
+    </dgm:fillClrLst>
+    <dgm:linClrLst meth="repeat">
+      <a:schemeClr val="accent1"/>
+    </dgm:linClrLst>
+    <dgm:effectClrLst/>
+    <dgm:txLinClrLst/>
+    <dgm:txFillClrLst meth="repeat">
+      <a:schemeClr val="dk1"/>
+    </dgm:txFillClrLst>
+    <dgm:txEffectClrLst/>
+  </dgm:styleLbl>
+  <dgm:styleLbl name="alignAcc1">
+    <dgm:fillClrLst meth="repeat">
+      <a:schemeClr val="lt1">
+        <a:alpha val="90000"/>
+      </a:schemeClr>
+    </dgm:fillClrLst>
+    <dgm:linClrLst meth="repeat">
+      <a:schemeClr val="accent1"/>
+    </dgm:linClrLst>
+    <dgm:effectClrLst/>
+    <dgm:txLinClrLst/>
+    <dgm:txFillClrLst meth="repeat">
+      <a:schemeClr val="dk1"/>
+    </dgm:txFillClrLst>
+    <dgm:txEffectClrLst/>
+  </dgm:styleLbl>
+  <dgm:styleLbl name="trAlignAcc1">
+    <dgm:fillClrLst meth="repeat">
+      <a:schemeClr val="lt1">
+        <a:alpha val="40000"/>
+      </a:schemeClr>
+    </dgm:fillClrLst>
+    <dgm:linClrLst meth="repeat">
+      <a:schemeClr val="accent1"/>
+    </dgm:linClrLst>
+    <dgm:effectClrLst/>
+    <dgm:txLinClrLst/>
+    <dgm:txFillClrLst meth="repeat">
+      <a:schemeClr val="dk1"/>
+    </dgm:txFillClrLst>
+    <dgm:txEffectClrLst/>
+  </dgm:styleLbl>
+  <dgm:styleLbl name="bgAcc1">
+    <dgm:fillClrLst meth="repeat">
+      <a:schemeClr val="lt1">
+        <a:alpha val="90000"/>
+      </a:schemeClr>
+    </dgm:fillClrLst>
+    <dgm:linClrLst meth="repeat">
+      <a:schemeClr val="accent1"/>
+    </dgm:linClrLst>
+    <dgm:effectClrLst/>
+    <dgm:txLinClrLst/>
+    <dgm:txFillClrLst meth="repeat">
+      <a:schemeClr val="dk1"/>
+    </dgm:txFillClrLst>
+    <dgm:txEffectClrLst/>
+  </dgm:styleLbl>
+  <dgm:styleLbl name="solidFgAcc1">
+    <dgm:fillClrLst meth="repeat">
+      <a:schemeClr val="lt1"/>
+    </dgm:fillClrLst>
+    <dgm:linClrLst meth="repeat">
+      <a:schemeClr val="accent1"/>
+    </dgm:linClrLst>
+    <dgm:effectClrLst/>
+    <dgm:txLinClrLst/>
+    <dgm:txFillClrLst meth="repeat">
+      <a:schemeClr val="dk1"/>
+    </dgm:txFillClrLst>
+    <dgm:txEffectClrLst/>
+  </dgm:styleLbl>
+  <dgm:styleLbl name="solidAlignAcc1">
+    <dgm:fillClrLst meth="repeat">
+      <a:schemeClr val="lt1"/>
+    </dgm:fillClrLst>
+    <dgm:linClrLst meth="repeat">
+      <a:schemeClr val="accent1"/>
+    </dgm:linClrLst>
+    <dgm:effectClrLst/>
+    <dgm:txLinClrLst/>
+    <dgm:txFillClrLst meth="repeat">
+      <a:schemeClr val="dk1"/>
+    </dgm:txFillClrLst>
+    <dgm:txEffectClrLst/>
+  </dgm:styleLbl>
+  <dgm:styleLbl name="solidBgAcc1">
+    <dgm:fillClrLst meth="repeat">
+      <a:schemeClr val="lt1"/>
+    </dgm:fillClrLst>
+    <dgm:linClrLst meth="repeat">
+      <a:schemeClr val="accent1"/>
+    </dgm:linClrLst>
+    <dgm:effectClrLst/>
+    <dgm:txLinClrLst/>
+    <dgm:txFillClrLst meth="repeat">
+      <a:schemeClr val="dk1"/>
+    </dgm:txFillClrLst>
+    <dgm:txEffectClrLst/>
+  </dgm:styleLbl>
+  <dgm:styleLbl name="fgAccFollowNode1">
+    <dgm:fillClrLst meth="repeat">
+      <a:schemeClr val="accent1">
+        <a:alpha val="90000"/>
+        <a:tint val="40000"/>
+      </a:schemeClr>
+    </dgm:fillClrLst>
+    <dgm:linClrLst meth="repeat">
+      <a:schemeClr val="accent1">
+        <a:alpha val="90000"/>
+        <a:tint val="40000"/>
+      </a:schemeClr>
+    </dgm:linClrLst>
+    <dgm:effectClrLst/>
+    <dgm:txLinClrLst/>
+    <dgm:txFillClrLst meth="repeat">
+      <a:schemeClr val="dk1"/>
+    </dgm:txFillClrLst>
+    <dgm:txEffectClrLst/>
+  </dgm:styleLbl>
+  <dgm:styleLbl name="alignAccFollowNode1">
+    <dgm:fillClrLst meth="repeat">
+      <a:schemeClr val="accent1">
+        <a:alpha val="90000"/>
+        <a:tint val="40000"/>
+      </a:schemeClr>
+    </dgm:fillClrLst>
+    <dgm:linClrLst meth="repeat">
+      <a:schemeClr val="accent1">
+        <a:alpha val="90000"/>
+        <a:tint val="40000"/>
+      </a:schemeClr>
+    </dgm:linClrLst>
+    <dgm:effectClrLst/>
+    <dgm:txLinClrLst/>
+    <dgm:txFillClrLst meth="repeat">
+      <a:schemeClr val="dk1"/>
+    </dgm:txFillClrLst>
+    <dgm:txEffectClrLst/>
+  </dgm:styleLbl>
+  <dgm:styleLbl name="bgAccFollowNode1">
+    <dgm:fillClrLst meth="repeat">
+      <a:schemeClr val="accent1">
+        <a:alpha val="90000"/>
+        <a:tint val="40000"/>
+      </a:schemeClr>
+    </dgm:fillClrLst>
+    <dgm:linClrLst meth="repeat">
+      <a:schemeClr val="accent1">
+        <a:alpha val="90000"/>
+        <a:tint val="40000"/>
+      </a:schemeClr>
+    </dgm:linClrLst>
+    <dgm:effectClrLst/>
+    <dgm:txLinClrLst/>
+    <dgm:txFillClrLst meth="repeat">
+      <a:schemeClr val="dk1"/>
+    </dgm:txFillClrLst>
+    <dgm:txEffectClrLst/>
+  </dgm:styleLbl>
+  <dgm:styleLbl name="fgAcc0">
+    <dgm:fillClrLst meth="repeat">
+      <a:schemeClr val="lt1">
+        <a:alpha val="90000"/>
+      </a:schemeClr>
+    </dgm:fillClrLst>
+    <dgm:linClrLst meth="repeat">
+      <a:schemeClr val="accent1"/>
+    </dgm:linClrLst>
+    <dgm:effectClrLst/>
+    <dgm:txLinClrLst/>
+    <dgm:txFillClrLst meth="repeat">
+      <a:schemeClr val="dk1"/>
+    </dgm:txFillClrLst>
+    <dgm:txEffectClrLst/>
+  </dgm:styleLbl>
+  <dgm:styleLbl name="fgAcc2">
+    <dgm:fillClrLst meth="repeat">
+      <a:schemeClr val="lt1">
+        <a:alpha val="90000"/>
+      </a:schemeClr>
+    </dgm:fillClrLst>
+    <dgm:linClrLst meth="repeat">
+      <a:schemeClr val="accent1"/>
+    </dgm:linClrLst>
+    <dgm:effectClrLst/>
+    <dgm:txLinClrLst/>
+    <dgm:txFillClrLst meth="repeat">
+      <a:schemeClr val="dk1"/>
+    </dgm:txFillClrLst>
+    <dgm:txEffectClrLst/>
+  </dgm:styleLbl>
+  <dgm:styleLbl name="fgAcc3">
+    <dgm:fillClrLst meth="repeat">
+      <a:schemeClr val="lt1">
+        <a:alpha val="90000"/>
+      </a:schemeClr>
+    </dgm:fillClrLst>
+    <dgm:linClrLst meth="repeat">
+      <a:schemeClr val="accent1"/>
+    </dgm:linClrLst>
+    <dgm:effectClrLst/>
+    <dgm:txLinClrLst/>
+    <dgm:txFillClrLst meth="repeat">
+      <a:schemeClr val="dk1"/>
+    </dgm:txFillClrLst>
+    <dgm:txEffectClrLst/>
+  </dgm:styleLbl>
+  <dgm:styleLbl name="fgAcc4">
+    <dgm:fillClrLst meth="repeat">
+      <a:schemeClr val="lt1">
+        <a:alpha val="90000"/>
+      </a:schemeClr>
+    </dgm:fillClrLst>
+    <dgm:linClrLst meth="repeat">
+      <a:schemeClr val="accent1"/>
+    </dgm:linClrLst>
+    <dgm:effectClrLst/>
+    <dgm:txLinClrLst/>
+    <dgm:txFillClrLst meth="repeat">
+      <a:schemeClr val="dk1"/>
+    </dgm:txFillClrLst>
+    <dgm:txEffectClrLst/>
+  </dgm:styleLbl>
+  <dgm:styleLbl name="bgShp">
+    <dgm:fillClrLst meth="repeat">
+      <a:schemeClr val="accent1">
+        <a:tint val="40000"/>
+      </a:schemeClr>
+    </dgm:fillClrLst>
+    <dgm:linClrLst meth="repeat">
+      <a:schemeClr val="accent1"/>
+    </dgm:linClrLst>
+    <dgm:effectClrLst/>
+    <dgm:txLinClrLst/>
+    <dgm:txFillClrLst meth="repeat">
+      <a:schemeClr val="dk1"/>
+    </dgm:txFillClrLst>
+    <dgm:txEffectClrLst/>
+  </dgm:styleLbl>
+  <dgm:styleLbl name="dkBgShp">
+    <dgm:fillClrLst meth="repeat">
+      <a:schemeClr val="accent1">
+        <a:shade val="80000"/>
+      </a:schemeClr>
+    </dgm:fillClrLst>
+    <dgm:linClrLst meth="repeat">
+      <a:schemeClr val="accent1"/>
+    </dgm:linClrLst>
+    <dgm:effectClrLst/>
+    <dgm:txLinClrLst/>
+    <dgm:txFillClrLst meth="repeat">
+      <a:schemeClr val="lt1"/>
+    </dgm:txFillClrLst>
+    <dgm:txEffectClrLst/>
+  </dgm:styleLbl>
+  <dgm:styleLbl name="trBgShp">
+    <dgm:fillClrLst meth="repeat">
+      <a:schemeClr val="accent1">
+        <a:tint val="50000"/>
+        <a:alpha val="40000"/>
+      </a:schemeClr>
+    </dgm:fillClrLst>
+    <dgm:linClrLst meth="repeat">
+      <a:schemeClr val="accent1"/>
+    </dgm:linClrLst>
+    <dgm:effectClrLst/>
+    <dgm:txLinClrLst/>
+    <dgm:txFillClrLst meth="repeat">
+      <a:schemeClr val="lt1"/>
+    </dgm:txFillClrLst>
+    <dgm:txEffectClrLst/>
+  </dgm:styleLbl>
+  <dgm:styleLbl name="fgShp">
+    <dgm:fillClrLst meth="repeat">
+      <a:schemeClr val="accent1">
+        <a:tint val="60000"/>
+      </a:schemeClr>
+    </dgm:fillClrLst>
+    <dgm:linClrLst meth="repeat">
+      <a:schemeClr val="lt1"/>
+    </dgm:linClrLst>
+    <dgm:effectClrLst/>
+    <dgm:txLinClrLst/>
+    <dgm:txFillClrLst meth="repeat">
+      <a:schemeClr val="dk1"/>
+    </dgm:txFillClrLst>
+    <dgm:txEffectClrLst/>
+  </dgm:styleLbl>
+  <dgm:styleLbl name="revTx">
+    <dgm:fillClrLst meth="repeat">
+      <a:schemeClr val="lt1">
+        <a:alpha val="0"/>
+      </a:schemeClr>
+    </dgm:fillClrLst>
+    <dgm:linClrLst meth="repeat">
+      <a:schemeClr val="dk1">
+        <a:alpha val="0"/>
+      </a:schemeClr>
+    </dgm:linClrLst>
+    <dgm:effectClrLst/>
+    <dgm:txLinClrLst/>
+    <dgm:txFillClrLst meth="repeat">
+      <a:schemeClr val="tx1"/>
+    </dgm:txFillClrLst>
+    <dgm:txEffectClrLst/>
+  </dgm:styleLbl>
+</dgm:colorsDef>
+</file>
+
 <file path=ppt/diagrams/data1.xml><?xml version="1.0" encoding="utf-8"?>
 <dgm:dataModel xmlns:dgm="http://schemas.openxmlformats.org/drawingml/2006/diagram" xmlns:a="http://schemas.openxmlformats.org/drawingml/2006/main">
   <dgm:ptLst>
     <dgm:pt modelId="{8F1DC385-56D8-4FDD-A3F1-CEAF4E69649C}" type="doc">
-      <dgm:prSet loTypeId="urn:microsoft.com/office/officeart/2005/8/layout/vList3" loCatId="list" qsTypeId="urn:microsoft.com/office/officeart/2005/8/quickstyle/simple1" qsCatId="simple" csTypeId="urn:microsoft.com/office/officeart/2005/8/colors/accent1_2" csCatId="accent1"/>
+      <dgm:prSet loTypeId="urn:microsoft.com/office/officeart/2005/8/layout/vList3" loCatId="list" qsTypeId="urn:microsoft.com/office/officeart/2005/8/quickstyle/simple1" qsCatId="simple" csTypeId="urn:microsoft.com/office/officeart/2005/8/colors/accent1_2" csCatId="accent1" phldr="1"/>
       <dgm:spPr/>
       <dgm:t>
         <a:bodyPr/>
@@ -2600,7 +3347,21 @@
     </dgm:pt>
     <dgm:pt modelId="{BD8170D4-36DD-41AE-9B05-A0864E1C8182}" type="pres">
       <dgm:prSet presAssocID="{E523665D-51AE-4FC1-8725-B0550AF14B51}" presName="imgShp" presStyleLbl="fgImgPlace1" presStyleIdx="0" presStyleCnt="1"/>
-      <dgm:spPr/>
+      <dgm:spPr>
+        <a:blipFill rotWithShape="1">
+          <a:blip xmlns:r="http://schemas.openxmlformats.org/officeDocument/2006/relationships" r:embed="rId1">
+            <a:extLst>
+              <a:ext uri="{96DAC541-7B7A-43D3-8B79-37D633B846F1}">
+                <asvg:svgBlip xmlns:asvg="http://schemas.microsoft.com/office/drawing/2016/SVG/main" r:embed="rId2"/>
+              </a:ext>
+            </a:extLst>
+          </a:blip>
+          <a:srcRect/>
+          <a:stretch>
+            <a:fillRect l="-5000" r="-5000"/>
+          </a:stretch>
+        </a:blipFill>
+      </dgm:spPr>
     </dgm:pt>
     <dgm:pt modelId="{184E58CF-1B90-480C-8E34-5E308E8F399E}" type="pres">
       <dgm:prSet presAssocID="{E523665D-51AE-4FC1-8725-B0550AF14B51}" presName="txShp" presStyleLbl="node1" presStyleIdx="0" presStyleCnt="1">
@@ -2619,7 +3380,9 @@
     <dgm:cxn modelId="{7CED0D22-5FF4-4A6E-AD43-5FA589E3F5F3}" type="presParOf" srcId="{24464D0D-9ABE-4099-A8A3-12041B87B787}" destId="{BD8170D4-36DD-41AE-9B05-A0864E1C8182}" srcOrd="0" destOrd="0" presId="urn:microsoft.com/office/officeart/2005/8/layout/vList3"/>
     <dgm:cxn modelId="{A2F311D7-8484-4E22-915D-44C0AC08694E}" type="presParOf" srcId="{24464D0D-9ABE-4099-A8A3-12041B87B787}" destId="{184E58CF-1B90-480C-8E34-5E308E8F399E}" srcOrd="1" destOrd="0" presId="urn:microsoft.com/office/officeart/2005/8/layout/vList3"/>
   </dgm:cxnLst>
-  <dgm:bg/>
+  <dgm:bg>
+    <a:noFill/>
+  </dgm:bg>
   <dgm:whole/>
   <dgm:extLst>
     <a:ext uri="http://schemas.microsoft.com/office/drawing/2008/diagram">
@@ -3007,10 +3770,14 @@
         <a:lstStyle/>
         <a:p>
           <a:r>
-            <a:rPr lang="pt-BR" b="0" i="0"/>
+            <a:rPr lang="pt-BR" b="0" i="0" dirty="0">
+              <a:latin typeface="Nunito" panose="00000500000000000000" pitchFamily="2" charset="0"/>
+            </a:rPr>
             <a:t>Ferramenta online de acesso aberto</a:t>
           </a:r>
-          <a:endParaRPr lang="pt-BR"/>
+          <a:endParaRPr lang="pt-BR" dirty="0">
+            <a:latin typeface="Nunito" panose="00000500000000000000" pitchFamily="2" charset="0"/>
+          </a:endParaRPr>
         </a:p>
       </dgm:t>
     </dgm:pt>
@@ -3021,7 +3788,9 @@
         <a:bodyPr/>
         <a:lstStyle/>
         <a:p>
-          <a:endParaRPr lang="pt-BR"/>
+          <a:endParaRPr lang="pt-BR">
+            <a:latin typeface="Nunito" panose="00000500000000000000" pitchFamily="2" charset="0"/>
+          </a:endParaRPr>
         </a:p>
       </dgm:t>
     </dgm:pt>
@@ -3032,7 +3801,9 @@
         <a:bodyPr/>
         <a:lstStyle/>
         <a:p>
-          <a:endParaRPr lang="pt-BR"/>
+          <a:endParaRPr lang="pt-BR">
+            <a:latin typeface="Nunito" panose="00000500000000000000" pitchFamily="2" charset="0"/>
+          </a:endParaRPr>
         </a:p>
       </dgm:t>
     </dgm:pt>
@@ -3044,10 +3815,14 @@
         <a:lstStyle/>
         <a:p>
           <a:r>
-            <a:rPr lang="pt-BR" b="0" i="0"/>
+            <a:rPr lang="pt-BR" b="0" i="0" dirty="0">
+              <a:latin typeface="Nunito" panose="00000500000000000000" pitchFamily="2" charset="0"/>
+            </a:rPr>
             <a:t>Criada por Julius Kuhn-Institut (JKI) durante um projeto financiado pela União Europeia </a:t>
           </a:r>
-          <a:endParaRPr lang="pt-BR"/>
+          <a:endParaRPr lang="pt-BR" dirty="0">
+            <a:latin typeface="Nunito" panose="00000500000000000000" pitchFamily="2" charset="0"/>
+          </a:endParaRPr>
         </a:p>
       </dgm:t>
     </dgm:pt>
@@ -3058,7 +3833,9 @@
         <a:bodyPr/>
         <a:lstStyle/>
         <a:p>
-          <a:endParaRPr lang="pt-BR"/>
+          <a:endParaRPr lang="pt-BR">
+            <a:latin typeface="Nunito" panose="00000500000000000000" pitchFamily="2" charset="0"/>
+          </a:endParaRPr>
         </a:p>
       </dgm:t>
     </dgm:pt>
@@ -3069,7 +3846,9 @@
         <a:bodyPr/>
         <a:lstStyle/>
         <a:p>
-          <a:endParaRPr lang="pt-BR"/>
+          <a:endParaRPr lang="pt-BR">
+            <a:latin typeface="Nunito" panose="00000500000000000000" pitchFamily="2" charset="0"/>
+          </a:endParaRPr>
         </a:p>
       </dgm:t>
     </dgm:pt>
@@ -3081,10 +3860,14 @@
         <a:lstStyle/>
         <a:p>
           <a:r>
-            <a:rPr lang="pt-BR" b="0" i="0"/>
+            <a:rPr lang="pt-BR" b="0" i="0">
+              <a:latin typeface="Nunito" panose="00000500000000000000" pitchFamily="2" charset="0"/>
+            </a:rPr>
             <a:t>Facilitar a condução de revisões sistemáticas e mapas sobre agricultura e questões ambientais</a:t>
           </a:r>
-          <a:endParaRPr lang="pt-BR"/>
+          <a:endParaRPr lang="pt-BR">
+            <a:latin typeface="Nunito" panose="00000500000000000000" pitchFamily="2" charset="0"/>
+          </a:endParaRPr>
         </a:p>
       </dgm:t>
     </dgm:pt>
@@ -3095,7 +3878,9 @@
         <a:bodyPr/>
         <a:lstStyle/>
         <a:p>
-          <a:endParaRPr lang="pt-BR"/>
+          <a:endParaRPr lang="pt-BR">
+            <a:latin typeface="Nunito" panose="00000500000000000000" pitchFamily="2" charset="0"/>
+          </a:endParaRPr>
         </a:p>
       </dgm:t>
     </dgm:pt>
@@ -3106,7 +3891,9 @@
         <a:bodyPr/>
         <a:lstStyle/>
         <a:p>
-          <a:endParaRPr lang="pt-BR"/>
+          <a:endParaRPr lang="pt-BR">
+            <a:latin typeface="Nunito" panose="00000500000000000000" pitchFamily="2" charset="0"/>
+          </a:endParaRPr>
         </a:p>
       </dgm:t>
     </dgm:pt>
@@ -3174,6 +3961,410 @@
   <dgm:extLst>
     <a:ext uri="http://schemas.microsoft.com/office/drawing/2008/diagram">
       <dsp:dataModelExt xmlns:dsp="http://schemas.microsoft.com/office/drawing/2008/diagram" relId="rId6" minVer="http://schemas.openxmlformats.org/drawingml/2006/diagram"/>
+    </a:ext>
+  </dgm:extLst>
+</dgm:dataModel>
+</file>
+
+<file path=ppt/diagrams/data4.xml><?xml version="1.0" encoding="utf-8"?>
+<dgm:dataModel xmlns:dgm="http://schemas.openxmlformats.org/drawingml/2006/diagram" xmlns:a="http://schemas.openxmlformats.org/drawingml/2006/main">
+  <dgm:ptLst>
+    <dgm:pt modelId="{FC74C568-0C07-4DF4-945E-6710EFD655ED}" type="doc">
+      <dgm:prSet loTypeId="urn:microsoft.com/office/officeart/2005/8/layout/vList2" loCatId="list" qsTypeId="urn:microsoft.com/office/officeart/2005/8/quickstyle/simple1" qsCatId="simple" csTypeId="urn:microsoft.com/office/officeart/2005/8/colors/accent1_2" csCatId="accent1"/>
+      <dgm:spPr/>
+      <dgm:t>
+        <a:bodyPr/>
+        <a:lstStyle/>
+        <a:p>
+          <a:endParaRPr lang="pt-BR"/>
+        </a:p>
+      </dgm:t>
+    </dgm:pt>
+    <dgm:pt modelId="{C4E8E6FF-ABD8-4C98-AC7F-7294C6881503}">
+      <dgm:prSet/>
+      <dgm:spPr/>
+      <dgm:t>
+        <a:bodyPr/>
+        <a:lstStyle/>
+        <a:p>
+          <a:r>
+            <a:rPr lang="pt-BR" b="0" i="0" dirty="0">
+              <a:latin typeface="Nunito" panose="00000500000000000000" pitchFamily="2" charset="0"/>
+            </a:rPr>
+            <a:t>Desenvolvimento do protocolo de revisão</a:t>
+          </a:r>
+          <a:endParaRPr lang="pt-BR" dirty="0">
+            <a:latin typeface="Nunito" panose="00000500000000000000" pitchFamily="2" charset="0"/>
+          </a:endParaRPr>
+        </a:p>
+      </dgm:t>
+    </dgm:pt>
+    <dgm:pt modelId="{7B819095-14ED-4005-BBF1-7F1A91B73344}" type="parTrans" cxnId="{E48397F5-8D54-45D1-A7B5-863589341C80}">
+      <dgm:prSet/>
+      <dgm:spPr/>
+      <dgm:t>
+        <a:bodyPr/>
+        <a:lstStyle/>
+        <a:p>
+          <a:endParaRPr lang="pt-BR">
+            <a:latin typeface="Nunito" panose="00000500000000000000" pitchFamily="2" charset="0"/>
+          </a:endParaRPr>
+        </a:p>
+      </dgm:t>
+    </dgm:pt>
+    <dgm:pt modelId="{264668C7-DF49-4018-839C-59CB30FF7E5F}" type="sibTrans" cxnId="{E48397F5-8D54-45D1-A7B5-863589341C80}">
+      <dgm:prSet/>
+      <dgm:spPr/>
+      <dgm:t>
+        <a:bodyPr/>
+        <a:lstStyle/>
+        <a:p>
+          <a:endParaRPr lang="pt-BR">
+            <a:latin typeface="Nunito" panose="00000500000000000000" pitchFamily="2" charset="0"/>
+          </a:endParaRPr>
+        </a:p>
+      </dgm:t>
+    </dgm:pt>
+    <dgm:pt modelId="{2AB5A74F-C856-4FAB-809A-C3599D08EBE0}">
+      <dgm:prSet/>
+      <dgm:spPr/>
+      <dgm:t>
+        <a:bodyPr/>
+        <a:lstStyle/>
+        <a:p>
+          <a:r>
+            <a:rPr lang="pt-BR" b="0" i="0" dirty="0">
+              <a:latin typeface="Nunito" panose="00000500000000000000" pitchFamily="2" charset="0"/>
+            </a:rPr>
+            <a:t>Gestão dos resultados da pesquisa (Incluindo identificação de duplicatas)</a:t>
+          </a:r>
+          <a:endParaRPr lang="pt-BR" dirty="0">
+            <a:latin typeface="Nunito" panose="00000500000000000000" pitchFamily="2" charset="0"/>
+          </a:endParaRPr>
+        </a:p>
+      </dgm:t>
+    </dgm:pt>
+    <dgm:pt modelId="{33B1EF2E-0986-4A29-B451-67812C7C1420}" type="parTrans" cxnId="{5FF3918E-D2F2-4255-B1B4-E19E4DA2D546}">
+      <dgm:prSet/>
+      <dgm:spPr/>
+      <dgm:t>
+        <a:bodyPr/>
+        <a:lstStyle/>
+        <a:p>
+          <a:endParaRPr lang="pt-BR">
+            <a:latin typeface="Nunito" panose="00000500000000000000" pitchFamily="2" charset="0"/>
+          </a:endParaRPr>
+        </a:p>
+      </dgm:t>
+    </dgm:pt>
+    <dgm:pt modelId="{3D16BC18-D142-422F-9D79-4FDC84409D00}" type="sibTrans" cxnId="{5FF3918E-D2F2-4255-B1B4-E19E4DA2D546}">
+      <dgm:prSet/>
+      <dgm:spPr/>
+      <dgm:t>
+        <a:bodyPr/>
+        <a:lstStyle/>
+        <a:p>
+          <a:endParaRPr lang="pt-BR">
+            <a:latin typeface="Nunito" panose="00000500000000000000" pitchFamily="2" charset="0"/>
+          </a:endParaRPr>
+        </a:p>
+      </dgm:t>
+    </dgm:pt>
+    <dgm:pt modelId="{BB4D8C78-4791-4EB2-88CE-948B1518DF43}">
+      <dgm:prSet/>
+      <dgm:spPr/>
+      <dgm:t>
+        <a:bodyPr/>
+        <a:lstStyle/>
+        <a:p>
+          <a:r>
+            <a:rPr lang="pt-BR" b="0" i="0" dirty="0">
+              <a:latin typeface="Nunito" panose="00000500000000000000" pitchFamily="2" charset="0"/>
+            </a:rPr>
+            <a:t>Gestão e condução do processo de seleção do estudo (incluindo a realização de uma verificação de consistência)</a:t>
+          </a:r>
+          <a:endParaRPr lang="pt-BR" dirty="0">
+            <a:latin typeface="Nunito" panose="00000500000000000000" pitchFamily="2" charset="0"/>
+          </a:endParaRPr>
+        </a:p>
+      </dgm:t>
+    </dgm:pt>
+    <dgm:pt modelId="{DEBA95F8-FB4F-44FF-BAB6-1EE921C4F914}" type="parTrans" cxnId="{23C1FE10-FC14-415A-924F-52D6981641A4}">
+      <dgm:prSet/>
+      <dgm:spPr/>
+      <dgm:t>
+        <a:bodyPr/>
+        <a:lstStyle/>
+        <a:p>
+          <a:endParaRPr lang="pt-BR">
+            <a:latin typeface="Nunito" panose="00000500000000000000" pitchFamily="2" charset="0"/>
+          </a:endParaRPr>
+        </a:p>
+      </dgm:t>
+    </dgm:pt>
+    <dgm:pt modelId="{6FCFF8EB-0480-4D21-9EF7-1403BB2484C1}" type="sibTrans" cxnId="{23C1FE10-FC14-415A-924F-52D6981641A4}">
+      <dgm:prSet/>
+      <dgm:spPr/>
+      <dgm:t>
+        <a:bodyPr/>
+        <a:lstStyle/>
+        <a:p>
+          <a:endParaRPr lang="pt-BR">
+            <a:latin typeface="Nunito" panose="00000500000000000000" pitchFamily="2" charset="0"/>
+          </a:endParaRPr>
+        </a:p>
+      </dgm:t>
+    </dgm:pt>
+    <dgm:pt modelId="{D719FC92-08B7-4F5D-BE7C-ACD40FFA966C}">
+      <dgm:prSet/>
+      <dgm:spPr/>
+      <dgm:t>
+        <a:bodyPr/>
+        <a:lstStyle/>
+        <a:p>
+          <a:r>
+            <a:rPr lang="pt-BR" b="0" i="0" dirty="0">
+              <a:latin typeface="Nunito" panose="00000500000000000000" pitchFamily="2" charset="0"/>
+            </a:rPr>
+            <a:t>Gerenciamento e condução de extração de dados on-line e off-line </a:t>
+          </a:r>
+          <a:endParaRPr lang="pt-BR" dirty="0">
+            <a:latin typeface="Nunito" panose="00000500000000000000" pitchFamily="2" charset="0"/>
+          </a:endParaRPr>
+        </a:p>
+      </dgm:t>
+    </dgm:pt>
+    <dgm:pt modelId="{0EA15C85-FA26-4360-8EC4-EA5221D5C797}" type="parTrans" cxnId="{33825E9C-6842-47AC-9D98-E266B7CC4CFC}">
+      <dgm:prSet/>
+      <dgm:spPr/>
+      <dgm:t>
+        <a:bodyPr/>
+        <a:lstStyle/>
+        <a:p>
+          <a:endParaRPr lang="pt-BR">
+            <a:latin typeface="Nunito" panose="00000500000000000000" pitchFamily="2" charset="0"/>
+          </a:endParaRPr>
+        </a:p>
+      </dgm:t>
+    </dgm:pt>
+    <dgm:pt modelId="{EA3E89AF-B4F3-4E4E-9242-179D01640EF7}" type="sibTrans" cxnId="{33825E9C-6842-47AC-9D98-E266B7CC4CFC}">
+      <dgm:prSet/>
+      <dgm:spPr/>
+      <dgm:t>
+        <a:bodyPr/>
+        <a:lstStyle/>
+        <a:p>
+          <a:endParaRPr lang="pt-BR">
+            <a:latin typeface="Nunito" panose="00000500000000000000" pitchFamily="2" charset="0"/>
+          </a:endParaRPr>
+        </a:p>
+      </dgm:t>
+    </dgm:pt>
+    <dgm:pt modelId="{E3E3118A-F727-49DB-8057-30A4B1CAB9D2}">
+      <dgm:prSet/>
+      <dgm:spPr/>
+      <dgm:t>
+        <a:bodyPr/>
+        <a:lstStyle/>
+        <a:p>
+          <a:r>
+            <a:rPr lang="pt-BR" b="0" i="0" dirty="0">
+              <a:latin typeface="Nunito" panose="00000500000000000000" pitchFamily="2" charset="0"/>
+            </a:rPr>
+            <a:t>Gestão e condução do processo de avaliação crítica</a:t>
+          </a:r>
+          <a:endParaRPr lang="pt-BR" dirty="0">
+            <a:latin typeface="Nunito" panose="00000500000000000000" pitchFamily="2" charset="0"/>
+          </a:endParaRPr>
+        </a:p>
+      </dgm:t>
+    </dgm:pt>
+    <dgm:pt modelId="{4CBD3A83-BA3D-4FFC-9E04-A4E189E5396E}" type="parTrans" cxnId="{DF3E75AB-1F61-478E-A272-F706F615AB38}">
+      <dgm:prSet/>
+      <dgm:spPr/>
+      <dgm:t>
+        <a:bodyPr/>
+        <a:lstStyle/>
+        <a:p>
+          <a:endParaRPr lang="pt-BR">
+            <a:latin typeface="Nunito" panose="00000500000000000000" pitchFamily="2" charset="0"/>
+          </a:endParaRPr>
+        </a:p>
+      </dgm:t>
+    </dgm:pt>
+    <dgm:pt modelId="{10141622-FF13-4590-88CD-ADDFEC972092}" type="sibTrans" cxnId="{DF3E75AB-1F61-478E-A272-F706F615AB38}">
+      <dgm:prSet/>
+      <dgm:spPr/>
+      <dgm:t>
+        <a:bodyPr/>
+        <a:lstStyle/>
+        <a:p>
+          <a:endParaRPr lang="pt-BR">
+            <a:latin typeface="Nunito" panose="00000500000000000000" pitchFamily="2" charset="0"/>
+          </a:endParaRPr>
+        </a:p>
+      </dgm:t>
+    </dgm:pt>
+    <dgm:pt modelId="{1999BE31-5866-4A5B-B7CD-239D8055E0DD}">
+      <dgm:prSet/>
+      <dgm:spPr/>
+      <dgm:t>
+        <a:bodyPr/>
+        <a:lstStyle/>
+        <a:p>
+          <a:r>
+            <a:rPr lang="pt-BR" b="0" i="0">
+              <a:latin typeface="Nunito" panose="00000500000000000000" pitchFamily="2" charset="0"/>
+            </a:rPr>
+            <a:t>Garante documentação completa de todo o processo de síntese de evidências</a:t>
+          </a:r>
+          <a:endParaRPr lang="pt-BR">
+            <a:latin typeface="Nunito" panose="00000500000000000000" pitchFamily="2" charset="0"/>
+          </a:endParaRPr>
+        </a:p>
+      </dgm:t>
+    </dgm:pt>
+    <dgm:pt modelId="{64C1E74E-293D-492C-8B18-1D20119BD949}" type="parTrans" cxnId="{CCFF674F-E64F-4A27-897B-BEC47E3BA1DC}">
+      <dgm:prSet/>
+      <dgm:spPr/>
+      <dgm:t>
+        <a:bodyPr/>
+        <a:lstStyle/>
+        <a:p>
+          <a:endParaRPr lang="pt-BR">
+            <a:latin typeface="Nunito" panose="00000500000000000000" pitchFamily="2" charset="0"/>
+          </a:endParaRPr>
+        </a:p>
+      </dgm:t>
+    </dgm:pt>
+    <dgm:pt modelId="{1272DE15-1E4B-4F37-8710-5450C34FA042}" type="sibTrans" cxnId="{CCFF674F-E64F-4A27-897B-BEC47E3BA1DC}">
+      <dgm:prSet/>
+      <dgm:spPr/>
+      <dgm:t>
+        <a:bodyPr/>
+        <a:lstStyle/>
+        <a:p>
+          <a:endParaRPr lang="pt-BR">
+            <a:latin typeface="Nunito" panose="00000500000000000000" pitchFamily="2" charset="0"/>
+          </a:endParaRPr>
+        </a:p>
+      </dgm:t>
+    </dgm:pt>
+    <dgm:pt modelId="{F531F142-79D1-4DA3-A631-006E1B0523DF}" type="pres">
+      <dgm:prSet presAssocID="{FC74C568-0C07-4DF4-945E-6710EFD655ED}" presName="linear" presStyleCnt="0">
+        <dgm:presLayoutVars>
+          <dgm:animLvl val="lvl"/>
+          <dgm:resizeHandles val="exact"/>
+        </dgm:presLayoutVars>
+      </dgm:prSet>
+      <dgm:spPr/>
+    </dgm:pt>
+    <dgm:pt modelId="{E169FEC5-1C5A-4DB1-B8E6-B5D3F057A021}" type="pres">
+      <dgm:prSet presAssocID="{C4E8E6FF-ABD8-4C98-AC7F-7294C6881503}" presName="parentText" presStyleLbl="node1" presStyleIdx="0" presStyleCnt="6">
+        <dgm:presLayoutVars>
+          <dgm:chMax val="0"/>
+          <dgm:bulletEnabled val="1"/>
+        </dgm:presLayoutVars>
+      </dgm:prSet>
+      <dgm:spPr/>
+    </dgm:pt>
+    <dgm:pt modelId="{13EE8757-E08A-40FE-9CF4-4A23610124B6}" type="pres">
+      <dgm:prSet presAssocID="{264668C7-DF49-4018-839C-59CB30FF7E5F}" presName="spacer" presStyleCnt="0"/>
+      <dgm:spPr/>
+    </dgm:pt>
+    <dgm:pt modelId="{4B799AA8-B21D-4721-BE00-AE2B27D01930}" type="pres">
+      <dgm:prSet presAssocID="{2AB5A74F-C856-4FAB-809A-C3599D08EBE0}" presName="parentText" presStyleLbl="node1" presStyleIdx="1" presStyleCnt="6">
+        <dgm:presLayoutVars>
+          <dgm:chMax val="0"/>
+          <dgm:bulletEnabled val="1"/>
+        </dgm:presLayoutVars>
+      </dgm:prSet>
+      <dgm:spPr/>
+    </dgm:pt>
+    <dgm:pt modelId="{257C5C0A-91F2-47EF-AA16-A9BCD8D3973E}" type="pres">
+      <dgm:prSet presAssocID="{3D16BC18-D142-422F-9D79-4FDC84409D00}" presName="spacer" presStyleCnt="0"/>
+      <dgm:spPr/>
+    </dgm:pt>
+    <dgm:pt modelId="{D22B53F8-3C3C-4D50-BA68-B600DCED2D13}" type="pres">
+      <dgm:prSet presAssocID="{BB4D8C78-4791-4EB2-88CE-948B1518DF43}" presName="parentText" presStyleLbl="node1" presStyleIdx="2" presStyleCnt="6">
+        <dgm:presLayoutVars>
+          <dgm:chMax val="0"/>
+          <dgm:bulletEnabled val="1"/>
+        </dgm:presLayoutVars>
+      </dgm:prSet>
+      <dgm:spPr/>
+    </dgm:pt>
+    <dgm:pt modelId="{97A642CD-532F-4D40-ACA6-1842FADF0213}" type="pres">
+      <dgm:prSet presAssocID="{6FCFF8EB-0480-4D21-9EF7-1403BB2484C1}" presName="spacer" presStyleCnt="0"/>
+      <dgm:spPr/>
+    </dgm:pt>
+    <dgm:pt modelId="{3900B73D-ABAD-4316-9259-D9D1B970DD4D}" type="pres">
+      <dgm:prSet presAssocID="{D719FC92-08B7-4F5D-BE7C-ACD40FFA966C}" presName="parentText" presStyleLbl="node1" presStyleIdx="3" presStyleCnt="6">
+        <dgm:presLayoutVars>
+          <dgm:chMax val="0"/>
+          <dgm:bulletEnabled val="1"/>
+        </dgm:presLayoutVars>
+      </dgm:prSet>
+      <dgm:spPr/>
+    </dgm:pt>
+    <dgm:pt modelId="{D6C952D7-B312-4BA2-8352-EAFBAD5784F2}" type="pres">
+      <dgm:prSet presAssocID="{EA3E89AF-B4F3-4E4E-9242-179D01640EF7}" presName="spacer" presStyleCnt="0"/>
+      <dgm:spPr/>
+    </dgm:pt>
+    <dgm:pt modelId="{D81EF03C-A791-420A-A9B4-15DB51C0C5D8}" type="pres">
+      <dgm:prSet presAssocID="{E3E3118A-F727-49DB-8057-30A4B1CAB9D2}" presName="parentText" presStyleLbl="node1" presStyleIdx="4" presStyleCnt="6">
+        <dgm:presLayoutVars>
+          <dgm:chMax val="0"/>
+          <dgm:bulletEnabled val="1"/>
+        </dgm:presLayoutVars>
+      </dgm:prSet>
+      <dgm:spPr/>
+    </dgm:pt>
+    <dgm:pt modelId="{0410B1BD-998D-4A72-8175-973347B6AB30}" type="pres">
+      <dgm:prSet presAssocID="{10141622-FF13-4590-88CD-ADDFEC972092}" presName="spacer" presStyleCnt="0"/>
+      <dgm:spPr/>
+    </dgm:pt>
+    <dgm:pt modelId="{D3BA6514-C365-4B33-8AF6-CC9C51244383}" type="pres">
+      <dgm:prSet presAssocID="{1999BE31-5866-4A5B-B7CD-239D8055E0DD}" presName="parentText" presStyleLbl="node1" presStyleIdx="5" presStyleCnt="6">
+        <dgm:presLayoutVars>
+          <dgm:chMax val="0"/>
+          <dgm:bulletEnabled val="1"/>
+        </dgm:presLayoutVars>
+      </dgm:prSet>
+      <dgm:spPr/>
+    </dgm:pt>
+  </dgm:ptLst>
+  <dgm:cxnLst>
+    <dgm:cxn modelId="{23C1FE10-FC14-415A-924F-52D6981641A4}" srcId="{FC74C568-0C07-4DF4-945E-6710EFD655ED}" destId="{BB4D8C78-4791-4EB2-88CE-948B1518DF43}" srcOrd="2" destOrd="0" parTransId="{DEBA95F8-FB4F-44FF-BAB6-1EE921C4F914}" sibTransId="{6FCFF8EB-0480-4D21-9EF7-1403BB2484C1}"/>
+    <dgm:cxn modelId="{AD44A814-17DA-4C1C-BA42-3FBCE5D8CC49}" type="presOf" srcId="{E3E3118A-F727-49DB-8057-30A4B1CAB9D2}" destId="{D81EF03C-A791-420A-A9B4-15DB51C0C5D8}" srcOrd="0" destOrd="0" presId="urn:microsoft.com/office/officeart/2005/8/layout/vList2"/>
+    <dgm:cxn modelId="{2CB65B63-1F72-4B81-A4E7-6764B71F6C4A}" type="presOf" srcId="{C4E8E6FF-ABD8-4C98-AC7F-7294C6881503}" destId="{E169FEC5-1C5A-4DB1-B8E6-B5D3F057A021}" srcOrd="0" destOrd="0" presId="urn:microsoft.com/office/officeart/2005/8/layout/vList2"/>
+    <dgm:cxn modelId="{7611DA49-BD43-440C-9FCD-78C37A518DAA}" type="presOf" srcId="{BB4D8C78-4791-4EB2-88CE-948B1518DF43}" destId="{D22B53F8-3C3C-4D50-BA68-B600DCED2D13}" srcOrd="0" destOrd="0" presId="urn:microsoft.com/office/officeart/2005/8/layout/vList2"/>
+    <dgm:cxn modelId="{CCFF674F-E64F-4A27-897B-BEC47E3BA1DC}" srcId="{FC74C568-0C07-4DF4-945E-6710EFD655ED}" destId="{1999BE31-5866-4A5B-B7CD-239D8055E0DD}" srcOrd="5" destOrd="0" parTransId="{64C1E74E-293D-492C-8B18-1D20119BD949}" sibTransId="{1272DE15-1E4B-4F37-8710-5450C34FA042}"/>
+    <dgm:cxn modelId="{5C5B6F78-3735-4BC1-BD03-D9EA241C46C3}" type="presOf" srcId="{1999BE31-5866-4A5B-B7CD-239D8055E0DD}" destId="{D3BA6514-C365-4B33-8AF6-CC9C51244383}" srcOrd="0" destOrd="0" presId="urn:microsoft.com/office/officeart/2005/8/layout/vList2"/>
+    <dgm:cxn modelId="{D6710585-9C42-433E-B7BC-F826607912D5}" type="presOf" srcId="{FC74C568-0C07-4DF4-945E-6710EFD655ED}" destId="{F531F142-79D1-4DA3-A631-006E1B0523DF}" srcOrd="0" destOrd="0" presId="urn:microsoft.com/office/officeart/2005/8/layout/vList2"/>
+    <dgm:cxn modelId="{5FF3918E-D2F2-4255-B1B4-E19E4DA2D546}" srcId="{FC74C568-0C07-4DF4-945E-6710EFD655ED}" destId="{2AB5A74F-C856-4FAB-809A-C3599D08EBE0}" srcOrd="1" destOrd="0" parTransId="{33B1EF2E-0986-4A29-B451-67812C7C1420}" sibTransId="{3D16BC18-D142-422F-9D79-4FDC84409D00}"/>
+    <dgm:cxn modelId="{33825E9C-6842-47AC-9D98-E266B7CC4CFC}" srcId="{FC74C568-0C07-4DF4-945E-6710EFD655ED}" destId="{D719FC92-08B7-4F5D-BE7C-ACD40FFA966C}" srcOrd="3" destOrd="0" parTransId="{0EA15C85-FA26-4360-8EC4-EA5221D5C797}" sibTransId="{EA3E89AF-B4F3-4E4E-9242-179D01640EF7}"/>
+    <dgm:cxn modelId="{DF3E75AB-1F61-478E-A272-F706F615AB38}" srcId="{FC74C568-0C07-4DF4-945E-6710EFD655ED}" destId="{E3E3118A-F727-49DB-8057-30A4B1CAB9D2}" srcOrd="4" destOrd="0" parTransId="{4CBD3A83-BA3D-4FFC-9E04-A4E189E5396E}" sibTransId="{10141622-FF13-4590-88CD-ADDFEC972092}"/>
+    <dgm:cxn modelId="{480EECF0-8266-4086-A658-98D6ED43E3BC}" type="presOf" srcId="{2AB5A74F-C856-4FAB-809A-C3599D08EBE0}" destId="{4B799AA8-B21D-4721-BE00-AE2B27D01930}" srcOrd="0" destOrd="0" presId="urn:microsoft.com/office/officeart/2005/8/layout/vList2"/>
+    <dgm:cxn modelId="{E48397F5-8D54-45D1-A7B5-863589341C80}" srcId="{FC74C568-0C07-4DF4-945E-6710EFD655ED}" destId="{C4E8E6FF-ABD8-4C98-AC7F-7294C6881503}" srcOrd="0" destOrd="0" parTransId="{7B819095-14ED-4005-BBF1-7F1A91B73344}" sibTransId="{264668C7-DF49-4018-839C-59CB30FF7E5F}"/>
+    <dgm:cxn modelId="{A12AEBF9-A06F-4D5B-ABCB-0AA6859E6129}" type="presOf" srcId="{D719FC92-08B7-4F5D-BE7C-ACD40FFA966C}" destId="{3900B73D-ABAD-4316-9259-D9D1B970DD4D}" srcOrd="0" destOrd="0" presId="urn:microsoft.com/office/officeart/2005/8/layout/vList2"/>
+    <dgm:cxn modelId="{7A43C260-2E8D-4B50-908D-57580372A0C1}" type="presParOf" srcId="{F531F142-79D1-4DA3-A631-006E1B0523DF}" destId="{E169FEC5-1C5A-4DB1-B8E6-B5D3F057A021}" srcOrd="0" destOrd="0" presId="urn:microsoft.com/office/officeart/2005/8/layout/vList2"/>
+    <dgm:cxn modelId="{E445BCFA-D1A2-412B-B73F-9D7106F05537}" type="presParOf" srcId="{F531F142-79D1-4DA3-A631-006E1B0523DF}" destId="{13EE8757-E08A-40FE-9CF4-4A23610124B6}" srcOrd="1" destOrd="0" presId="urn:microsoft.com/office/officeart/2005/8/layout/vList2"/>
+    <dgm:cxn modelId="{5F1B94FE-4F27-48CE-9349-DB560E7A3BEA}" type="presParOf" srcId="{F531F142-79D1-4DA3-A631-006E1B0523DF}" destId="{4B799AA8-B21D-4721-BE00-AE2B27D01930}" srcOrd="2" destOrd="0" presId="urn:microsoft.com/office/officeart/2005/8/layout/vList2"/>
+    <dgm:cxn modelId="{05C51A01-F02B-4E87-B84E-A8E5B61579B8}" type="presParOf" srcId="{F531F142-79D1-4DA3-A631-006E1B0523DF}" destId="{257C5C0A-91F2-47EF-AA16-A9BCD8D3973E}" srcOrd="3" destOrd="0" presId="urn:microsoft.com/office/officeart/2005/8/layout/vList2"/>
+    <dgm:cxn modelId="{A778E38D-4522-46FC-BB84-72FC8B4D24BE}" type="presParOf" srcId="{F531F142-79D1-4DA3-A631-006E1B0523DF}" destId="{D22B53F8-3C3C-4D50-BA68-B600DCED2D13}" srcOrd="4" destOrd="0" presId="urn:microsoft.com/office/officeart/2005/8/layout/vList2"/>
+    <dgm:cxn modelId="{83A6727B-A5EF-4B47-BC9A-2C99E443666A}" type="presParOf" srcId="{F531F142-79D1-4DA3-A631-006E1B0523DF}" destId="{97A642CD-532F-4D40-ACA6-1842FADF0213}" srcOrd="5" destOrd="0" presId="urn:microsoft.com/office/officeart/2005/8/layout/vList2"/>
+    <dgm:cxn modelId="{42B7FEB1-3485-4F5B-BC5A-26D871428369}" type="presParOf" srcId="{F531F142-79D1-4DA3-A631-006E1B0523DF}" destId="{3900B73D-ABAD-4316-9259-D9D1B970DD4D}" srcOrd="6" destOrd="0" presId="urn:microsoft.com/office/officeart/2005/8/layout/vList2"/>
+    <dgm:cxn modelId="{71B33A19-4876-40DC-9FAC-3663979C23EF}" type="presParOf" srcId="{F531F142-79D1-4DA3-A631-006E1B0523DF}" destId="{D6C952D7-B312-4BA2-8352-EAFBAD5784F2}" srcOrd="7" destOrd="0" presId="urn:microsoft.com/office/officeart/2005/8/layout/vList2"/>
+    <dgm:cxn modelId="{7312BD4F-B2EF-4A60-926B-B831546295DD}" type="presParOf" srcId="{F531F142-79D1-4DA3-A631-006E1B0523DF}" destId="{D81EF03C-A791-420A-A9B4-15DB51C0C5D8}" srcOrd="8" destOrd="0" presId="urn:microsoft.com/office/officeart/2005/8/layout/vList2"/>
+    <dgm:cxn modelId="{17B4DF6B-F9CE-4097-B89D-550A6B273C4C}" type="presParOf" srcId="{F531F142-79D1-4DA3-A631-006E1B0523DF}" destId="{0410B1BD-998D-4A72-8175-973347B6AB30}" srcOrd="9" destOrd="0" presId="urn:microsoft.com/office/officeart/2005/8/layout/vList2"/>
+    <dgm:cxn modelId="{20846F72-A55D-44F2-A7F4-7BB17E875C3C}" type="presParOf" srcId="{F531F142-79D1-4DA3-A631-006E1B0523DF}" destId="{D3BA6514-C365-4B33-8AF6-CC9C51244383}" srcOrd="10" destOrd="0" presId="urn:microsoft.com/office/officeart/2005/8/layout/vList2"/>
+  </dgm:cxnLst>
+  <dgm:bg/>
+  <dgm:whole/>
+  <dgm:extLst>
+    <a:ext uri="http://schemas.microsoft.com/office/drawing/2008/diagram">
+      <dsp:dataModelExt xmlns:dsp="http://schemas.microsoft.com/office/drawing/2008/diagram" relId="rId7" minVer="http://schemas.openxmlformats.org/drawingml/2006/diagram"/>
     </a:ext>
   </dgm:extLst>
 </dgm:dataModel>
@@ -3286,15 +4477,19 @@
         <a:prstGeom prst="ellipse">
           <a:avLst/>
         </a:prstGeom>
-        <a:solidFill>
-          <a:schemeClr val="accent1">
-            <a:tint val="50000"/>
-            <a:hueOff val="0"/>
-            <a:satOff val="0"/>
-            <a:lumOff val="0"/>
-            <a:alphaOff val="0"/>
-          </a:schemeClr>
-        </a:solidFill>
+        <a:blipFill rotWithShape="1">
+          <a:blip xmlns:r="http://schemas.openxmlformats.org/officeDocument/2006/relationships" r:embed="rId1">
+            <a:extLst>
+              <a:ext uri="{96DAC541-7B7A-43D3-8B79-37D633B846F1}">
+                <asvg:svgBlip xmlns:asvg="http://schemas.microsoft.com/office/drawing/2016/SVG/main" r:embed="rId2"/>
+              </a:ext>
+            </a:extLst>
+          </a:blip>
+          <a:srcRect/>
+          <a:stretch>
+            <a:fillRect l="-5000" r="-5000"/>
+          </a:stretch>
+        </a:blipFill>
         <a:ln w="25400" cap="flat" cmpd="sng" algn="ctr">
           <a:solidFill>
             <a:schemeClr val="lt1">
@@ -3817,8 +5012,8 @@
       </dsp:nvSpPr>
       <dsp:spPr>
         <a:xfrm>
-          <a:off x="0" y="12526"/>
-          <a:ext cx="7031037" cy="798524"/>
+          <a:off x="0" y="41732"/>
+          <a:ext cx="7031037" cy="784814"/>
         </a:xfrm>
         <a:prstGeom prst="roundRect">
           <a:avLst/>
@@ -3859,12 +5054,12 @@
         </a:fontRef>
       </dsp:style>
       <dsp:txBody>
-        <a:bodyPr spcFirstLastPara="0" vert="horz" wrap="square" lIns="80010" tIns="80010" rIns="80010" bIns="80010" numCol="1" spcCol="1270" anchor="ctr" anchorCtr="0">
+        <a:bodyPr spcFirstLastPara="0" vert="horz" wrap="square" lIns="68580" tIns="68580" rIns="68580" bIns="68580" numCol="1" spcCol="1270" anchor="ctr" anchorCtr="0">
           <a:noAutofit/>
         </a:bodyPr>
         <a:lstStyle/>
         <a:p>
-          <a:pPr marL="0" lvl="0" indent="0" algn="l" defTabSz="933450">
+          <a:pPr marL="0" lvl="0" indent="0" algn="l" defTabSz="800100">
             <a:lnSpc>
               <a:spcPct val="90000"/>
             </a:lnSpc>
@@ -3877,15 +5072,19 @@
             <a:buNone/>
           </a:pPr>
           <a:r>
-            <a:rPr lang="pt-BR" sz="2100" b="0" i="0" kern="1200"/>
+            <a:rPr lang="pt-BR" sz="1800" b="0" i="0" kern="1200" dirty="0">
+              <a:latin typeface="Nunito" panose="00000500000000000000" pitchFamily="2" charset="0"/>
+            </a:rPr>
             <a:t>Ferramenta online de acesso aberto</a:t>
           </a:r>
-          <a:endParaRPr lang="pt-BR" sz="2100" kern="1200"/>
+          <a:endParaRPr lang="pt-BR" sz="1800" kern="1200" dirty="0">
+            <a:latin typeface="Nunito" panose="00000500000000000000" pitchFamily="2" charset="0"/>
+          </a:endParaRPr>
         </a:p>
       </dsp:txBody>
       <dsp:txXfrm>
-        <a:off x="38981" y="51507"/>
-        <a:ext cx="6953075" cy="720562"/>
+        <a:off x="38311" y="80043"/>
+        <a:ext cx="6954415" cy="708192"/>
       </dsp:txXfrm>
     </dsp:sp>
     <dsp:sp modelId="{96D5B181-D485-495F-B59F-C715E1B1A2A4}">
@@ -3895,8 +5094,8 @@
       </dsp:nvSpPr>
       <dsp:spPr>
         <a:xfrm>
-          <a:off x="0" y="871531"/>
-          <a:ext cx="7031037" cy="798524"/>
+          <a:off x="0" y="878386"/>
+          <a:ext cx="7031037" cy="784814"/>
         </a:xfrm>
         <a:prstGeom prst="roundRect">
           <a:avLst/>
@@ -3937,12 +5136,12 @@
         </a:fontRef>
       </dsp:style>
       <dsp:txBody>
-        <a:bodyPr spcFirstLastPara="0" vert="horz" wrap="square" lIns="80010" tIns="80010" rIns="80010" bIns="80010" numCol="1" spcCol="1270" anchor="ctr" anchorCtr="0">
+        <a:bodyPr spcFirstLastPara="0" vert="horz" wrap="square" lIns="68580" tIns="68580" rIns="68580" bIns="68580" numCol="1" spcCol="1270" anchor="ctr" anchorCtr="0">
           <a:noAutofit/>
         </a:bodyPr>
         <a:lstStyle/>
         <a:p>
-          <a:pPr marL="0" lvl="0" indent="0" algn="l" defTabSz="933450">
+          <a:pPr marL="0" lvl="0" indent="0" algn="l" defTabSz="800100">
             <a:lnSpc>
               <a:spcPct val="90000"/>
             </a:lnSpc>
@@ -3955,15 +5154,19 @@
             <a:buNone/>
           </a:pPr>
           <a:r>
-            <a:rPr lang="pt-BR" sz="2100" b="0" i="0" kern="1200"/>
+            <a:rPr lang="pt-BR" sz="1800" b="0" i="0" kern="1200" dirty="0">
+              <a:latin typeface="Nunito" panose="00000500000000000000" pitchFamily="2" charset="0"/>
+            </a:rPr>
             <a:t>Criada por Julius Kuhn-Institut (JKI) durante um projeto financiado pela União Europeia </a:t>
           </a:r>
-          <a:endParaRPr lang="pt-BR" sz="2100" kern="1200"/>
+          <a:endParaRPr lang="pt-BR" sz="1800" kern="1200" dirty="0">
+            <a:latin typeface="Nunito" panose="00000500000000000000" pitchFamily="2" charset="0"/>
+          </a:endParaRPr>
         </a:p>
       </dsp:txBody>
       <dsp:txXfrm>
-        <a:off x="38981" y="910512"/>
-        <a:ext cx="6953075" cy="720562"/>
+        <a:off x="38311" y="916697"/>
+        <a:ext cx="6954415" cy="708192"/>
       </dsp:txXfrm>
     </dsp:sp>
     <dsp:sp modelId="{49123473-C036-488B-856E-7B0EE66E3472}">
@@ -3973,8 +5176,8 @@
       </dsp:nvSpPr>
       <dsp:spPr>
         <a:xfrm>
-          <a:off x="0" y="1730536"/>
-          <a:ext cx="7031037" cy="798524"/>
+          <a:off x="0" y="1715041"/>
+          <a:ext cx="7031037" cy="784814"/>
         </a:xfrm>
         <a:prstGeom prst="roundRect">
           <a:avLst/>
@@ -4015,12 +5218,12 @@
         </a:fontRef>
       </dsp:style>
       <dsp:txBody>
-        <a:bodyPr spcFirstLastPara="0" vert="horz" wrap="square" lIns="80010" tIns="80010" rIns="80010" bIns="80010" numCol="1" spcCol="1270" anchor="ctr" anchorCtr="0">
+        <a:bodyPr spcFirstLastPara="0" vert="horz" wrap="square" lIns="68580" tIns="68580" rIns="68580" bIns="68580" numCol="1" spcCol="1270" anchor="ctr" anchorCtr="0">
           <a:noAutofit/>
         </a:bodyPr>
         <a:lstStyle/>
         <a:p>
-          <a:pPr marL="0" lvl="0" indent="0" algn="l" defTabSz="933450">
+          <a:pPr marL="0" lvl="0" indent="0" algn="l" defTabSz="800100">
             <a:lnSpc>
               <a:spcPct val="90000"/>
             </a:lnSpc>
@@ -4033,15 +5236,523 @@
             <a:buNone/>
           </a:pPr>
           <a:r>
-            <a:rPr lang="pt-BR" sz="2100" b="0" i="0" kern="1200"/>
+            <a:rPr lang="pt-BR" sz="1800" b="0" i="0" kern="1200">
+              <a:latin typeface="Nunito" panose="00000500000000000000" pitchFamily="2" charset="0"/>
+            </a:rPr>
             <a:t>Facilitar a condução de revisões sistemáticas e mapas sobre agricultura e questões ambientais</a:t>
           </a:r>
-          <a:endParaRPr lang="pt-BR" sz="2100" kern="1200"/>
+          <a:endParaRPr lang="pt-BR" sz="1800" kern="1200">
+            <a:latin typeface="Nunito" panose="00000500000000000000" pitchFamily="2" charset="0"/>
+          </a:endParaRPr>
         </a:p>
       </dsp:txBody>
       <dsp:txXfrm>
-        <a:off x="38981" y="1769517"/>
-        <a:ext cx="6953075" cy="720562"/>
+        <a:off x="38311" y="1753352"/>
+        <a:ext cx="6954415" cy="708192"/>
+      </dsp:txXfrm>
+    </dsp:sp>
+  </dsp:spTree>
+</dsp:drawing>
+</file>
+
+<file path=ppt/diagrams/drawing4.xml><?xml version="1.0" encoding="utf-8"?>
+<dsp:drawing xmlns:dgm="http://schemas.openxmlformats.org/drawingml/2006/diagram" xmlns:dsp="http://schemas.microsoft.com/office/drawing/2008/diagram" xmlns:a="http://schemas.openxmlformats.org/drawingml/2006/main">
+  <dsp:spTree>
+    <dsp:nvGrpSpPr>
+      <dsp:cNvPr id="0" name=""/>
+      <dsp:cNvGrpSpPr/>
+    </dsp:nvGrpSpPr>
+    <dsp:grpSpPr/>
+    <dsp:sp modelId="{E169FEC5-1C5A-4DB1-B8E6-B5D3F057A021}">
+      <dsp:nvSpPr>
+        <dsp:cNvPr id="0" name=""/>
+        <dsp:cNvSpPr/>
+      </dsp:nvSpPr>
+      <dsp:spPr>
+        <a:xfrm>
+          <a:off x="0" y="31291"/>
+          <a:ext cx="7030500" cy="479608"/>
+        </a:xfrm>
+        <a:prstGeom prst="roundRect">
+          <a:avLst/>
+        </a:prstGeom>
+        <a:solidFill>
+          <a:schemeClr val="accent1">
+            <a:hueOff val="0"/>
+            <a:satOff val="0"/>
+            <a:lumOff val="0"/>
+            <a:alphaOff val="0"/>
+          </a:schemeClr>
+        </a:solidFill>
+        <a:ln w="25400" cap="flat" cmpd="sng" algn="ctr">
+          <a:solidFill>
+            <a:schemeClr val="lt1">
+              <a:hueOff val="0"/>
+              <a:satOff val="0"/>
+              <a:lumOff val="0"/>
+              <a:alphaOff val="0"/>
+            </a:schemeClr>
+          </a:solidFill>
+          <a:prstDash val="solid"/>
+        </a:ln>
+        <a:effectLst/>
+      </dsp:spPr>
+      <dsp:style>
+        <a:lnRef idx="2">
+          <a:scrgbClr r="0" g="0" b="0"/>
+        </a:lnRef>
+        <a:fillRef idx="1">
+          <a:scrgbClr r="0" g="0" b="0"/>
+        </a:fillRef>
+        <a:effectRef idx="0">
+          <a:scrgbClr r="0" g="0" b="0"/>
+        </a:effectRef>
+        <a:fontRef idx="minor">
+          <a:schemeClr val="lt1"/>
+        </a:fontRef>
+      </dsp:style>
+      <dsp:txBody>
+        <a:bodyPr spcFirstLastPara="0" vert="horz" wrap="square" lIns="41910" tIns="41910" rIns="41910" bIns="41910" numCol="1" spcCol="1270" anchor="ctr" anchorCtr="0">
+          <a:noAutofit/>
+        </a:bodyPr>
+        <a:lstStyle/>
+        <a:p>
+          <a:pPr marL="0" lvl="0" indent="0" algn="l" defTabSz="488950">
+            <a:lnSpc>
+              <a:spcPct val="90000"/>
+            </a:lnSpc>
+            <a:spcBef>
+              <a:spcPct val="0"/>
+            </a:spcBef>
+            <a:spcAft>
+              <a:spcPct val="35000"/>
+            </a:spcAft>
+            <a:buNone/>
+          </a:pPr>
+          <a:r>
+            <a:rPr lang="pt-BR" sz="1100" b="0" i="0" kern="1200" dirty="0">
+              <a:latin typeface="Nunito" panose="00000500000000000000" pitchFamily="2" charset="0"/>
+            </a:rPr>
+            <a:t>Desenvolvimento do protocolo de revisão</a:t>
+          </a:r>
+          <a:endParaRPr lang="pt-BR" sz="1100" kern="1200" dirty="0">
+            <a:latin typeface="Nunito" panose="00000500000000000000" pitchFamily="2" charset="0"/>
+          </a:endParaRPr>
+        </a:p>
+      </dsp:txBody>
+      <dsp:txXfrm>
+        <a:off x="23413" y="54704"/>
+        <a:ext cx="6983674" cy="432782"/>
+      </dsp:txXfrm>
+    </dsp:sp>
+    <dsp:sp modelId="{4B799AA8-B21D-4721-BE00-AE2B27D01930}">
+      <dsp:nvSpPr>
+        <dsp:cNvPr id="0" name=""/>
+        <dsp:cNvSpPr/>
+      </dsp:nvSpPr>
+      <dsp:spPr>
+        <a:xfrm>
+          <a:off x="0" y="542580"/>
+          <a:ext cx="7030500" cy="479608"/>
+        </a:xfrm>
+        <a:prstGeom prst="roundRect">
+          <a:avLst/>
+        </a:prstGeom>
+        <a:solidFill>
+          <a:schemeClr val="accent1">
+            <a:hueOff val="0"/>
+            <a:satOff val="0"/>
+            <a:lumOff val="0"/>
+            <a:alphaOff val="0"/>
+          </a:schemeClr>
+        </a:solidFill>
+        <a:ln w="25400" cap="flat" cmpd="sng" algn="ctr">
+          <a:solidFill>
+            <a:schemeClr val="lt1">
+              <a:hueOff val="0"/>
+              <a:satOff val="0"/>
+              <a:lumOff val="0"/>
+              <a:alphaOff val="0"/>
+            </a:schemeClr>
+          </a:solidFill>
+          <a:prstDash val="solid"/>
+        </a:ln>
+        <a:effectLst/>
+      </dsp:spPr>
+      <dsp:style>
+        <a:lnRef idx="2">
+          <a:scrgbClr r="0" g="0" b="0"/>
+        </a:lnRef>
+        <a:fillRef idx="1">
+          <a:scrgbClr r="0" g="0" b="0"/>
+        </a:fillRef>
+        <a:effectRef idx="0">
+          <a:scrgbClr r="0" g="0" b="0"/>
+        </a:effectRef>
+        <a:fontRef idx="minor">
+          <a:schemeClr val="lt1"/>
+        </a:fontRef>
+      </dsp:style>
+      <dsp:txBody>
+        <a:bodyPr spcFirstLastPara="0" vert="horz" wrap="square" lIns="41910" tIns="41910" rIns="41910" bIns="41910" numCol="1" spcCol="1270" anchor="ctr" anchorCtr="0">
+          <a:noAutofit/>
+        </a:bodyPr>
+        <a:lstStyle/>
+        <a:p>
+          <a:pPr marL="0" lvl="0" indent="0" algn="l" defTabSz="488950">
+            <a:lnSpc>
+              <a:spcPct val="90000"/>
+            </a:lnSpc>
+            <a:spcBef>
+              <a:spcPct val="0"/>
+            </a:spcBef>
+            <a:spcAft>
+              <a:spcPct val="35000"/>
+            </a:spcAft>
+            <a:buNone/>
+          </a:pPr>
+          <a:r>
+            <a:rPr lang="pt-BR" sz="1100" b="0" i="0" kern="1200" dirty="0">
+              <a:latin typeface="Nunito" panose="00000500000000000000" pitchFamily="2" charset="0"/>
+            </a:rPr>
+            <a:t>Gestão dos resultados da pesquisa (Incluindo identificação de duplicatas)</a:t>
+          </a:r>
+          <a:endParaRPr lang="pt-BR" sz="1100" kern="1200" dirty="0">
+            <a:latin typeface="Nunito" panose="00000500000000000000" pitchFamily="2" charset="0"/>
+          </a:endParaRPr>
+        </a:p>
+      </dsp:txBody>
+      <dsp:txXfrm>
+        <a:off x="23413" y="565993"/>
+        <a:ext cx="6983674" cy="432782"/>
+      </dsp:txXfrm>
+    </dsp:sp>
+    <dsp:sp modelId="{D22B53F8-3C3C-4D50-BA68-B600DCED2D13}">
+      <dsp:nvSpPr>
+        <dsp:cNvPr id="0" name=""/>
+        <dsp:cNvSpPr/>
+      </dsp:nvSpPr>
+      <dsp:spPr>
+        <a:xfrm>
+          <a:off x="0" y="1053868"/>
+          <a:ext cx="7030500" cy="479608"/>
+        </a:xfrm>
+        <a:prstGeom prst="roundRect">
+          <a:avLst/>
+        </a:prstGeom>
+        <a:solidFill>
+          <a:schemeClr val="accent1">
+            <a:hueOff val="0"/>
+            <a:satOff val="0"/>
+            <a:lumOff val="0"/>
+            <a:alphaOff val="0"/>
+          </a:schemeClr>
+        </a:solidFill>
+        <a:ln w="25400" cap="flat" cmpd="sng" algn="ctr">
+          <a:solidFill>
+            <a:schemeClr val="lt1">
+              <a:hueOff val="0"/>
+              <a:satOff val="0"/>
+              <a:lumOff val="0"/>
+              <a:alphaOff val="0"/>
+            </a:schemeClr>
+          </a:solidFill>
+          <a:prstDash val="solid"/>
+        </a:ln>
+        <a:effectLst/>
+      </dsp:spPr>
+      <dsp:style>
+        <a:lnRef idx="2">
+          <a:scrgbClr r="0" g="0" b="0"/>
+        </a:lnRef>
+        <a:fillRef idx="1">
+          <a:scrgbClr r="0" g="0" b="0"/>
+        </a:fillRef>
+        <a:effectRef idx="0">
+          <a:scrgbClr r="0" g="0" b="0"/>
+        </a:effectRef>
+        <a:fontRef idx="minor">
+          <a:schemeClr val="lt1"/>
+        </a:fontRef>
+      </dsp:style>
+      <dsp:txBody>
+        <a:bodyPr spcFirstLastPara="0" vert="horz" wrap="square" lIns="41910" tIns="41910" rIns="41910" bIns="41910" numCol="1" spcCol="1270" anchor="ctr" anchorCtr="0">
+          <a:noAutofit/>
+        </a:bodyPr>
+        <a:lstStyle/>
+        <a:p>
+          <a:pPr marL="0" lvl="0" indent="0" algn="l" defTabSz="488950">
+            <a:lnSpc>
+              <a:spcPct val="90000"/>
+            </a:lnSpc>
+            <a:spcBef>
+              <a:spcPct val="0"/>
+            </a:spcBef>
+            <a:spcAft>
+              <a:spcPct val="35000"/>
+            </a:spcAft>
+            <a:buNone/>
+          </a:pPr>
+          <a:r>
+            <a:rPr lang="pt-BR" sz="1100" b="0" i="0" kern="1200" dirty="0">
+              <a:latin typeface="Nunito" panose="00000500000000000000" pitchFamily="2" charset="0"/>
+            </a:rPr>
+            <a:t>Gestão e condução do processo de seleção do estudo (incluindo a realização de uma verificação de consistência)</a:t>
+          </a:r>
+          <a:endParaRPr lang="pt-BR" sz="1100" kern="1200" dirty="0">
+            <a:latin typeface="Nunito" panose="00000500000000000000" pitchFamily="2" charset="0"/>
+          </a:endParaRPr>
+        </a:p>
+      </dsp:txBody>
+      <dsp:txXfrm>
+        <a:off x="23413" y="1077281"/>
+        <a:ext cx="6983674" cy="432782"/>
+      </dsp:txXfrm>
+    </dsp:sp>
+    <dsp:sp modelId="{3900B73D-ABAD-4316-9259-D9D1B970DD4D}">
+      <dsp:nvSpPr>
+        <dsp:cNvPr id="0" name=""/>
+        <dsp:cNvSpPr/>
+      </dsp:nvSpPr>
+      <dsp:spPr>
+        <a:xfrm>
+          <a:off x="0" y="1565157"/>
+          <a:ext cx="7030500" cy="479608"/>
+        </a:xfrm>
+        <a:prstGeom prst="roundRect">
+          <a:avLst/>
+        </a:prstGeom>
+        <a:solidFill>
+          <a:schemeClr val="accent1">
+            <a:hueOff val="0"/>
+            <a:satOff val="0"/>
+            <a:lumOff val="0"/>
+            <a:alphaOff val="0"/>
+          </a:schemeClr>
+        </a:solidFill>
+        <a:ln w="25400" cap="flat" cmpd="sng" algn="ctr">
+          <a:solidFill>
+            <a:schemeClr val="lt1">
+              <a:hueOff val="0"/>
+              <a:satOff val="0"/>
+              <a:lumOff val="0"/>
+              <a:alphaOff val="0"/>
+            </a:schemeClr>
+          </a:solidFill>
+          <a:prstDash val="solid"/>
+        </a:ln>
+        <a:effectLst/>
+      </dsp:spPr>
+      <dsp:style>
+        <a:lnRef idx="2">
+          <a:scrgbClr r="0" g="0" b="0"/>
+        </a:lnRef>
+        <a:fillRef idx="1">
+          <a:scrgbClr r="0" g="0" b="0"/>
+        </a:fillRef>
+        <a:effectRef idx="0">
+          <a:scrgbClr r="0" g="0" b="0"/>
+        </a:effectRef>
+        <a:fontRef idx="minor">
+          <a:schemeClr val="lt1"/>
+        </a:fontRef>
+      </dsp:style>
+      <dsp:txBody>
+        <a:bodyPr spcFirstLastPara="0" vert="horz" wrap="square" lIns="41910" tIns="41910" rIns="41910" bIns="41910" numCol="1" spcCol="1270" anchor="ctr" anchorCtr="0">
+          <a:noAutofit/>
+        </a:bodyPr>
+        <a:lstStyle/>
+        <a:p>
+          <a:pPr marL="0" lvl="0" indent="0" algn="l" defTabSz="488950">
+            <a:lnSpc>
+              <a:spcPct val="90000"/>
+            </a:lnSpc>
+            <a:spcBef>
+              <a:spcPct val="0"/>
+            </a:spcBef>
+            <a:spcAft>
+              <a:spcPct val="35000"/>
+            </a:spcAft>
+            <a:buNone/>
+          </a:pPr>
+          <a:r>
+            <a:rPr lang="pt-BR" sz="1100" b="0" i="0" kern="1200" dirty="0">
+              <a:latin typeface="Nunito" panose="00000500000000000000" pitchFamily="2" charset="0"/>
+            </a:rPr>
+            <a:t>Gerenciamento e condução de extração de dados on-line e off-line </a:t>
+          </a:r>
+          <a:endParaRPr lang="pt-BR" sz="1100" kern="1200" dirty="0">
+            <a:latin typeface="Nunito" panose="00000500000000000000" pitchFamily="2" charset="0"/>
+          </a:endParaRPr>
+        </a:p>
+      </dsp:txBody>
+      <dsp:txXfrm>
+        <a:off x="23413" y="1588570"/>
+        <a:ext cx="6983674" cy="432782"/>
+      </dsp:txXfrm>
+    </dsp:sp>
+    <dsp:sp modelId="{D81EF03C-A791-420A-A9B4-15DB51C0C5D8}">
+      <dsp:nvSpPr>
+        <dsp:cNvPr id="0" name=""/>
+        <dsp:cNvSpPr/>
+      </dsp:nvSpPr>
+      <dsp:spPr>
+        <a:xfrm>
+          <a:off x="0" y="2076446"/>
+          <a:ext cx="7030500" cy="479608"/>
+        </a:xfrm>
+        <a:prstGeom prst="roundRect">
+          <a:avLst/>
+        </a:prstGeom>
+        <a:solidFill>
+          <a:schemeClr val="accent1">
+            <a:hueOff val="0"/>
+            <a:satOff val="0"/>
+            <a:lumOff val="0"/>
+            <a:alphaOff val="0"/>
+          </a:schemeClr>
+        </a:solidFill>
+        <a:ln w="25400" cap="flat" cmpd="sng" algn="ctr">
+          <a:solidFill>
+            <a:schemeClr val="lt1">
+              <a:hueOff val="0"/>
+              <a:satOff val="0"/>
+              <a:lumOff val="0"/>
+              <a:alphaOff val="0"/>
+            </a:schemeClr>
+          </a:solidFill>
+          <a:prstDash val="solid"/>
+        </a:ln>
+        <a:effectLst/>
+      </dsp:spPr>
+      <dsp:style>
+        <a:lnRef idx="2">
+          <a:scrgbClr r="0" g="0" b="0"/>
+        </a:lnRef>
+        <a:fillRef idx="1">
+          <a:scrgbClr r="0" g="0" b="0"/>
+        </a:fillRef>
+        <a:effectRef idx="0">
+          <a:scrgbClr r="0" g="0" b="0"/>
+        </a:effectRef>
+        <a:fontRef idx="minor">
+          <a:schemeClr val="lt1"/>
+        </a:fontRef>
+      </dsp:style>
+      <dsp:txBody>
+        <a:bodyPr spcFirstLastPara="0" vert="horz" wrap="square" lIns="41910" tIns="41910" rIns="41910" bIns="41910" numCol="1" spcCol="1270" anchor="ctr" anchorCtr="0">
+          <a:noAutofit/>
+        </a:bodyPr>
+        <a:lstStyle/>
+        <a:p>
+          <a:pPr marL="0" lvl="0" indent="0" algn="l" defTabSz="488950">
+            <a:lnSpc>
+              <a:spcPct val="90000"/>
+            </a:lnSpc>
+            <a:spcBef>
+              <a:spcPct val="0"/>
+            </a:spcBef>
+            <a:spcAft>
+              <a:spcPct val="35000"/>
+            </a:spcAft>
+            <a:buNone/>
+          </a:pPr>
+          <a:r>
+            <a:rPr lang="pt-BR" sz="1100" b="0" i="0" kern="1200" dirty="0">
+              <a:latin typeface="Nunito" panose="00000500000000000000" pitchFamily="2" charset="0"/>
+            </a:rPr>
+            <a:t>Gestão e condução do processo de avaliação crítica</a:t>
+          </a:r>
+          <a:endParaRPr lang="pt-BR" sz="1100" kern="1200" dirty="0">
+            <a:latin typeface="Nunito" panose="00000500000000000000" pitchFamily="2" charset="0"/>
+          </a:endParaRPr>
+        </a:p>
+      </dsp:txBody>
+      <dsp:txXfrm>
+        <a:off x="23413" y="2099859"/>
+        <a:ext cx="6983674" cy="432782"/>
+      </dsp:txXfrm>
+    </dsp:sp>
+    <dsp:sp modelId="{D3BA6514-C365-4B33-8AF6-CC9C51244383}">
+      <dsp:nvSpPr>
+        <dsp:cNvPr id="0" name=""/>
+        <dsp:cNvSpPr/>
+      </dsp:nvSpPr>
+      <dsp:spPr>
+        <a:xfrm>
+          <a:off x="0" y="2587734"/>
+          <a:ext cx="7030500" cy="479608"/>
+        </a:xfrm>
+        <a:prstGeom prst="roundRect">
+          <a:avLst/>
+        </a:prstGeom>
+        <a:solidFill>
+          <a:schemeClr val="accent1">
+            <a:hueOff val="0"/>
+            <a:satOff val="0"/>
+            <a:lumOff val="0"/>
+            <a:alphaOff val="0"/>
+          </a:schemeClr>
+        </a:solidFill>
+        <a:ln w="25400" cap="flat" cmpd="sng" algn="ctr">
+          <a:solidFill>
+            <a:schemeClr val="lt1">
+              <a:hueOff val="0"/>
+              <a:satOff val="0"/>
+              <a:lumOff val="0"/>
+              <a:alphaOff val="0"/>
+            </a:schemeClr>
+          </a:solidFill>
+          <a:prstDash val="solid"/>
+        </a:ln>
+        <a:effectLst/>
+      </dsp:spPr>
+      <dsp:style>
+        <a:lnRef idx="2">
+          <a:scrgbClr r="0" g="0" b="0"/>
+        </a:lnRef>
+        <a:fillRef idx="1">
+          <a:scrgbClr r="0" g="0" b="0"/>
+        </a:fillRef>
+        <a:effectRef idx="0">
+          <a:scrgbClr r="0" g="0" b="0"/>
+        </a:effectRef>
+        <a:fontRef idx="minor">
+          <a:schemeClr val="lt1"/>
+        </a:fontRef>
+      </dsp:style>
+      <dsp:txBody>
+        <a:bodyPr spcFirstLastPara="0" vert="horz" wrap="square" lIns="41910" tIns="41910" rIns="41910" bIns="41910" numCol="1" spcCol="1270" anchor="ctr" anchorCtr="0">
+          <a:noAutofit/>
+        </a:bodyPr>
+        <a:lstStyle/>
+        <a:p>
+          <a:pPr marL="0" lvl="0" indent="0" algn="l" defTabSz="488950">
+            <a:lnSpc>
+              <a:spcPct val="90000"/>
+            </a:lnSpc>
+            <a:spcBef>
+              <a:spcPct val="0"/>
+            </a:spcBef>
+            <a:spcAft>
+              <a:spcPct val="35000"/>
+            </a:spcAft>
+            <a:buNone/>
+          </a:pPr>
+          <a:r>
+            <a:rPr lang="pt-BR" sz="1100" b="0" i="0" kern="1200">
+              <a:latin typeface="Nunito" panose="00000500000000000000" pitchFamily="2" charset="0"/>
+            </a:rPr>
+            <a:t>Garante documentação completa de todo o processo de síntese de evidências</a:t>
+          </a:r>
+          <a:endParaRPr lang="pt-BR" sz="1100" kern="1200">
+            <a:latin typeface="Nunito" panose="00000500000000000000" pitchFamily="2" charset="0"/>
+          </a:endParaRPr>
+        </a:p>
+      </dsp:txBody>
+      <dsp:txXfrm>
+        <a:off x="23413" y="2611147"/>
+        <a:ext cx="6983674" cy="432782"/>
       </dsp:txXfrm>
     </dsp:sp>
   </dsp:spTree>
@@ -4525,6 +6236,173 @@
 </dgm:layoutDef>
 </file>
 
+<file path=ppt/diagrams/layout4.xml><?xml version="1.0" encoding="utf-8"?>
+<dgm:layoutDef xmlns:dgm="http://schemas.openxmlformats.org/drawingml/2006/diagram" xmlns:a="http://schemas.openxmlformats.org/drawingml/2006/main" uniqueId="urn:microsoft.com/office/officeart/2005/8/layout/vList2">
+  <dgm:title val=""/>
+  <dgm:desc val=""/>
+  <dgm:catLst>
+    <dgm:cat type="list" pri="3000"/>
+    <dgm:cat type="convert" pri="1000"/>
+  </dgm:catLst>
+  <dgm:sampData>
+    <dgm:dataModel>
+      <dgm:ptLst>
+        <dgm:pt modelId="0" type="doc"/>
+        <dgm:pt modelId="1">
+          <dgm:prSet phldr="1"/>
+        </dgm:pt>
+        <dgm:pt modelId="11">
+          <dgm:prSet phldr="1"/>
+        </dgm:pt>
+        <dgm:pt modelId="2">
+          <dgm:prSet phldr="1"/>
+        </dgm:pt>
+        <dgm:pt modelId="21">
+          <dgm:prSet phldr="1"/>
+        </dgm:pt>
+      </dgm:ptLst>
+      <dgm:cxnLst>
+        <dgm:cxn modelId="4" srcId="0" destId="1" srcOrd="0" destOrd="0"/>
+        <dgm:cxn modelId="5" srcId="0" destId="2" srcOrd="1" destOrd="0"/>
+        <dgm:cxn modelId="12" srcId="1" destId="11" srcOrd="0" destOrd="0"/>
+        <dgm:cxn modelId="23" srcId="2" destId="21" srcOrd="0" destOrd="0"/>
+      </dgm:cxnLst>
+      <dgm:bg/>
+      <dgm:whole/>
+    </dgm:dataModel>
+  </dgm:sampData>
+  <dgm:styleData>
+    <dgm:dataModel>
+      <dgm:ptLst>
+        <dgm:pt modelId="0" type="doc"/>
+        <dgm:pt modelId="1"/>
+        <dgm:pt modelId="2"/>
+      </dgm:ptLst>
+      <dgm:cxnLst>
+        <dgm:cxn modelId="3" srcId="0" destId="1" srcOrd="0" destOrd="0"/>
+        <dgm:cxn modelId="4" srcId="0" destId="2" srcOrd="1" destOrd="0"/>
+      </dgm:cxnLst>
+      <dgm:bg/>
+      <dgm:whole/>
+    </dgm:dataModel>
+  </dgm:styleData>
+  <dgm:clrData>
+    <dgm:dataModel>
+      <dgm:ptLst>
+        <dgm:pt modelId="0" type="doc"/>
+        <dgm:pt modelId="1"/>
+        <dgm:pt modelId="2"/>
+        <dgm:pt modelId="3"/>
+        <dgm:pt modelId="4"/>
+      </dgm:ptLst>
+      <dgm:cxnLst>
+        <dgm:cxn modelId="5" srcId="0" destId="1" srcOrd="0" destOrd="0"/>
+        <dgm:cxn modelId="6" srcId="0" destId="2" srcOrd="1" destOrd="0"/>
+        <dgm:cxn modelId="7" srcId="0" destId="3" srcOrd="2" destOrd="0"/>
+        <dgm:cxn modelId="8" srcId="0" destId="4" srcOrd="3" destOrd="0"/>
+      </dgm:cxnLst>
+      <dgm:bg/>
+      <dgm:whole/>
+    </dgm:dataModel>
+  </dgm:clrData>
+  <dgm:layoutNode name="linear">
+    <dgm:varLst>
+      <dgm:animLvl val="lvl"/>
+      <dgm:resizeHandles val="exact"/>
+    </dgm:varLst>
+    <dgm:alg type="lin">
+      <dgm:param type="linDir" val="fromT"/>
+      <dgm:param type="vertAlign" val="mid"/>
+    </dgm:alg>
+    <dgm:shape xmlns:r="http://schemas.openxmlformats.org/officeDocument/2006/relationships" r:blip="">
+      <dgm:adjLst/>
+    </dgm:shape>
+    <dgm:presOf/>
+    <dgm:constrLst>
+      <dgm:constr type="w" for="ch" forName="parentText" refType="w"/>
+      <dgm:constr type="h" for="ch" forName="parentText" refType="primFontSz" refFor="ch" refForName="parentText" fact="0.52"/>
+      <dgm:constr type="w" for="ch" forName="childText" refType="w"/>
+      <dgm:constr type="h" for="ch" forName="childText" refType="primFontSz" refFor="ch" refForName="parentText" fact="0.46"/>
+      <dgm:constr type="h" for="ch" forName="parentText" op="equ"/>
+      <dgm:constr type="primFontSz" for="ch" forName="parentText" op="equ" val="65"/>
+      <dgm:constr type="primFontSz" for="ch" forName="childText" refType="primFontSz" refFor="ch" refForName="parentText" op="equ"/>
+      <dgm:constr type="h" for="ch" forName="spacer" refType="primFontSz" refFor="ch" refForName="parentText" fact="0.08"/>
+    </dgm:constrLst>
+    <dgm:ruleLst>
+      <dgm:rule type="primFontSz" for="ch" forName="parentText" val="5" fact="NaN" max="NaN"/>
+    </dgm:ruleLst>
+    <dgm:forEach name="Name0" axis="ch" ptType="node">
+      <dgm:layoutNode name="parentText" styleLbl="node1">
+        <dgm:varLst>
+          <dgm:chMax val="0"/>
+          <dgm:bulletEnabled val="1"/>
+        </dgm:varLst>
+        <dgm:alg type="tx">
+          <dgm:param type="parTxLTRAlign" val="l"/>
+          <dgm:param type="parTxRTLAlign" val="r"/>
+        </dgm:alg>
+        <dgm:shape xmlns:r="http://schemas.openxmlformats.org/officeDocument/2006/relationships" type="roundRect" r:blip="">
+          <dgm:adjLst/>
+        </dgm:shape>
+        <dgm:presOf axis="self"/>
+        <dgm:constrLst>
+          <dgm:constr type="tMarg" refType="primFontSz" fact="0.3"/>
+          <dgm:constr type="bMarg" refType="primFontSz" fact="0.3"/>
+          <dgm:constr type="lMarg" refType="primFontSz" fact="0.3"/>
+          <dgm:constr type="rMarg" refType="primFontSz" fact="0.3"/>
+        </dgm:constrLst>
+        <dgm:ruleLst>
+          <dgm:rule type="h" val="INF" fact="NaN" max="NaN"/>
+        </dgm:ruleLst>
+      </dgm:layoutNode>
+      <dgm:choose name="Name1">
+        <dgm:if name="Name2" axis="ch" ptType="node" func="cnt" op="gte" val="1">
+          <dgm:layoutNode name="childText" styleLbl="revTx">
+            <dgm:varLst>
+              <dgm:bulletEnabled val="1"/>
+            </dgm:varLst>
+            <dgm:alg type="tx">
+              <dgm:param type="stBulletLvl" val="1"/>
+              <dgm:param type="lnSpAfChP" val="20"/>
+            </dgm:alg>
+            <dgm:shape xmlns:r="http://schemas.openxmlformats.org/officeDocument/2006/relationships" type="rect" r:blip="">
+              <dgm:adjLst/>
+            </dgm:shape>
+            <dgm:presOf axis="des" ptType="node"/>
+            <dgm:constrLst>
+              <dgm:constr type="tMarg" refType="primFontSz" fact="0.1"/>
+              <dgm:constr type="bMarg" refType="primFontSz" fact="0.1"/>
+              <dgm:constr type="lMarg" refType="w" fact="0.09"/>
+            </dgm:constrLst>
+            <dgm:ruleLst>
+              <dgm:rule type="h" val="INF" fact="NaN" max="NaN"/>
+            </dgm:ruleLst>
+          </dgm:layoutNode>
+        </dgm:if>
+        <dgm:else name="Name3">
+          <dgm:choose name="Name4">
+            <dgm:if name="Name5" axis="par ch" ptType="doc node" func="cnt" op="gte" val="2">
+              <dgm:forEach name="Name6" axis="followSib" ptType="sibTrans" cnt="1">
+                <dgm:layoutNode name="spacer">
+                  <dgm:alg type="sp"/>
+                  <dgm:shape xmlns:r="http://schemas.openxmlformats.org/officeDocument/2006/relationships" r:blip="">
+                    <dgm:adjLst/>
+                  </dgm:shape>
+                  <dgm:presOf/>
+                  <dgm:constrLst/>
+                  <dgm:ruleLst/>
+                </dgm:layoutNode>
+              </dgm:forEach>
+            </dgm:if>
+            <dgm:else name="Name7"/>
+          </dgm:choose>
+        </dgm:else>
+      </dgm:choose>
+    </dgm:forEach>
+  </dgm:layoutNode>
+</dgm:layoutDef>
+</file>
+
 <file path=ppt/diagrams/quickStyle1.xml><?xml version="1.0" encoding="utf-8"?>
 <dgm:styleDef xmlns:dgm="http://schemas.openxmlformats.org/drawingml/2006/diagram" xmlns:a="http://schemas.openxmlformats.org/drawingml/2006/main" uniqueId="urn:microsoft.com/office/officeart/2005/8/quickstyle/simple1">
   <dgm:title val=""/>
@@ -6594,6 +8472,1040 @@
 </file>
 
 <file path=ppt/diagrams/quickStyle3.xml><?xml version="1.0" encoding="utf-8"?>
+<dgm:styleDef xmlns:dgm="http://schemas.openxmlformats.org/drawingml/2006/diagram" xmlns:a="http://schemas.openxmlformats.org/drawingml/2006/main" uniqueId="urn:microsoft.com/office/officeart/2005/8/quickstyle/simple1">
+  <dgm:title val=""/>
+  <dgm:desc val=""/>
+  <dgm:catLst>
+    <dgm:cat type="simple" pri="10100"/>
+  </dgm:catLst>
+  <dgm:scene3d>
+    <a:camera prst="orthographicFront"/>
+    <a:lightRig rig="threePt" dir="t"/>
+  </dgm:scene3d>
+  <dgm:styleLbl name="node0">
+    <dgm:scene3d>
+      <a:camera prst="orthographicFront"/>
+      <a:lightRig rig="threePt" dir="t"/>
+    </dgm:scene3d>
+    <dgm:sp3d/>
+    <dgm:txPr/>
+    <dgm:style>
+      <a:lnRef idx="2">
+        <a:scrgbClr r="0" g="0" b="0"/>
+      </a:lnRef>
+      <a:fillRef idx="1">
+        <a:scrgbClr r="0" g="0" b="0"/>
+      </a:fillRef>
+      <a:effectRef idx="0">
+        <a:scrgbClr r="0" g="0" b="0"/>
+      </a:effectRef>
+      <a:fontRef idx="minor">
+        <a:schemeClr val="lt1"/>
+      </a:fontRef>
+    </dgm:style>
+  </dgm:styleLbl>
+  <dgm:styleLbl name="lnNode1">
+    <dgm:scene3d>
+      <a:camera prst="orthographicFront"/>
+      <a:lightRig rig="threePt" dir="t"/>
+    </dgm:scene3d>
+    <dgm:sp3d/>
+    <dgm:txPr/>
+    <dgm:style>
+      <a:lnRef idx="2">
+        <a:scrgbClr r="0" g="0" b="0"/>
+      </a:lnRef>
+      <a:fillRef idx="1">
+        <a:scrgbClr r="0" g="0" b="0"/>
+      </a:fillRef>
+      <a:effectRef idx="0">
+        <a:scrgbClr r="0" g="0" b="0"/>
+      </a:effectRef>
+      <a:fontRef idx="minor">
+        <a:schemeClr val="lt1"/>
+      </a:fontRef>
+    </dgm:style>
+  </dgm:styleLbl>
+  <dgm:styleLbl name="vennNode1">
+    <dgm:scene3d>
+      <a:camera prst="orthographicFront"/>
+      <a:lightRig rig="threePt" dir="t"/>
+    </dgm:scene3d>
+    <dgm:sp3d/>
+    <dgm:txPr/>
+    <dgm:style>
+      <a:lnRef idx="2">
+        <a:scrgbClr r="0" g="0" b="0"/>
+      </a:lnRef>
+      <a:fillRef idx="1">
+        <a:scrgbClr r="0" g="0" b="0"/>
+      </a:fillRef>
+      <a:effectRef idx="0">
+        <a:scrgbClr r="0" g="0" b="0"/>
+      </a:effectRef>
+      <a:fontRef idx="minor">
+        <a:schemeClr val="tx1"/>
+      </a:fontRef>
+    </dgm:style>
+  </dgm:styleLbl>
+  <dgm:styleLbl name="alignNode1">
+    <dgm:scene3d>
+      <a:camera prst="orthographicFront"/>
+      <a:lightRig rig="threePt" dir="t"/>
+    </dgm:scene3d>
+    <dgm:sp3d/>
+    <dgm:txPr/>
+    <dgm:style>
+      <a:lnRef idx="2">
+        <a:scrgbClr r="0" g="0" b="0"/>
+      </a:lnRef>
+      <a:fillRef idx="1">
+        <a:scrgbClr r="0" g="0" b="0"/>
+      </a:fillRef>
+      <a:effectRef idx="0">
+        <a:scrgbClr r="0" g="0" b="0"/>
+      </a:effectRef>
+      <a:fontRef idx="minor">
+        <a:schemeClr val="lt1"/>
+      </a:fontRef>
+    </dgm:style>
+  </dgm:styleLbl>
+  <dgm:styleLbl name="node1">
+    <dgm:scene3d>
+      <a:camera prst="orthographicFront"/>
+      <a:lightRig rig="threePt" dir="t"/>
+    </dgm:scene3d>
+    <dgm:sp3d/>
+    <dgm:txPr/>
+    <dgm:style>
+      <a:lnRef idx="2">
+        <a:scrgbClr r="0" g="0" b="0"/>
+      </a:lnRef>
+      <a:fillRef idx="1">
+        <a:scrgbClr r="0" g="0" b="0"/>
+      </a:fillRef>
+      <a:effectRef idx="0">
+        <a:scrgbClr r="0" g="0" b="0"/>
+      </a:effectRef>
+      <a:fontRef idx="minor">
+        <a:schemeClr val="lt1"/>
+      </a:fontRef>
+    </dgm:style>
+  </dgm:styleLbl>
+  <dgm:styleLbl name="node2">
+    <dgm:scene3d>
+      <a:camera prst="orthographicFront"/>
+      <a:lightRig rig="threePt" dir="t"/>
+    </dgm:scene3d>
+    <dgm:sp3d/>
+    <dgm:txPr/>
+    <dgm:style>
+      <a:lnRef idx="2">
+        <a:scrgbClr r="0" g="0" b="0"/>
+      </a:lnRef>
+      <a:fillRef idx="1">
+        <a:scrgbClr r="0" g="0" b="0"/>
+      </a:fillRef>
+      <a:effectRef idx="0">
+        <a:scrgbClr r="0" g="0" b="0"/>
+      </a:effectRef>
+      <a:fontRef idx="minor">
+        <a:schemeClr val="lt1"/>
+      </a:fontRef>
+    </dgm:style>
+  </dgm:styleLbl>
+  <dgm:styleLbl name="node3">
+    <dgm:scene3d>
+      <a:camera prst="orthographicFront"/>
+      <a:lightRig rig="threePt" dir="t"/>
+    </dgm:scene3d>
+    <dgm:sp3d/>
+    <dgm:txPr/>
+    <dgm:style>
+      <a:lnRef idx="2">
+        <a:scrgbClr r="0" g="0" b="0"/>
+      </a:lnRef>
+      <a:fillRef idx="1">
+        <a:scrgbClr r="0" g="0" b="0"/>
+      </a:fillRef>
+      <a:effectRef idx="0">
+        <a:scrgbClr r="0" g="0" b="0"/>
+      </a:effectRef>
+      <a:fontRef idx="minor">
+        <a:schemeClr val="lt1"/>
+      </a:fontRef>
+    </dgm:style>
+  </dgm:styleLbl>
+  <dgm:styleLbl name="node4">
+    <dgm:scene3d>
+      <a:camera prst="orthographicFront"/>
+      <a:lightRig rig="threePt" dir="t"/>
+    </dgm:scene3d>
+    <dgm:sp3d/>
+    <dgm:txPr/>
+    <dgm:style>
+      <a:lnRef idx="2">
+        <a:scrgbClr r="0" g="0" b="0"/>
+      </a:lnRef>
+      <a:fillRef idx="1">
+        <a:scrgbClr r="0" g="0" b="0"/>
+      </a:fillRef>
+      <a:effectRef idx="0">
+        <a:scrgbClr r="0" g="0" b="0"/>
+      </a:effectRef>
+      <a:fontRef idx="minor">
+        <a:schemeClr val="lt1"/>
+      </a:fontRef>
+    </dgm:style>
+  </dgm:styleLbl>
+  <dgm:styleLbl name="fgImgPlace1">
+    <dgm:scene3d>
+      <a:camera prst="orthographicFront"/>
+      <a:lightRig rig="threePt" dir="t"/>
+    </dgm:scene3d>
+    <dgm:sp3d/>
+    <dgm:txPr/>
+    <dgm:style>
+      <a:lnRef idx="2">
+        <a:scrgbClr r="0" g="0" b="0"/>
+      </a:lnRef>
+      <a:fillRef idx="1">
+        <a:scrgbClr r="0" g="0" b="0"/>
+      </a:fillRef>
+      <a:effectRef idx="0">
+        <a:scrgbClr r="0" g="0" b="0"/>
+      </a:effectRef>
+      <a:fontRef idx="minor"/>
+    </dgm:style>
+  </dgm:styleLbl>
+  <dgm:styleLbl name="alignImgPlace1">
+    <dgm:scene3d>
+      <a:camera prst="orthographicFront"/>
+      <a:lightRig rig="threePt" dir="t"/>
+    </dgm:scene3d>
+    <dgm:sp3d/>
+    <dgm:txPr/>
+    <dgm:style>
+      <a:lnRef idx="2">
+        <a:scrgbClr r="0" g="0" b="0"/>
+      </a:lnRef>
+      <a:fillRef idx="1">
+        <a:scrgbClr r="0" g="0" b="0"/>
+      </a:fillRef>
+      <a:effectRef idx="0">
+        <a:scrgbClr r="0" g="0" b="0"/>
+      </a:effectRef>
+      <a:fontRef idx="minor"/>
+    </dgm:style>
+  </dgm:styleLbl>
+  <dgm:styleLbl name="bgImgPlace1">
+    <dgm:scene3d>
+      <a:camera prst="orthographicFront"/>
+      <a:lightRig rig="threePt" dir="t"/>
+    </dgm:scene3d>
+    <dgm:sp3d/>
+    <dgm:txPr/>
+    <dgm:style>
+      <a:lnRef idx="2">
+        <a:scrgbClr r="0" g="0" b="0"/>
+      </a:lnRef>
+      <a:fillRef idx="1">
+        <a:scrgbClr r="0" g="0" b="0"/>
+      </a:fillRef>
+      <a:effectRef idx="0">
+        <a:scrgbClr r="0" g="0" b="0"/>
+      </a:effectRef>
+      <a:fontRef idx="minor"/>
+    </dgm:style>
+  </dgm:styleLbl>
+  <dgm:styleLbl name="sibTrans2D1">
+    <dgm:scene3d>
+      <a:camera prst="orthographicFront"/>
+      <a:lightRig rig="threePt" dir="t"/>
+    </dgm:scene3d>
+    <dgm:sp3d/>
+    <dgm:txPr/>
+    <dgm:style>
+      <a:lnRef idx="0">
+        <a:scrgbClr r="0" g="0" b="0"/>
+      </a:lnRef>
+      <a:fillRef idx="1">
+        <a:scrgbClr r="0" g="0" b="0"/>
+      </a:fillRef>
+      <a:effectRef idx="0">
+        <a:scrgbClr r="0" g="0" b="0"/>
+      </a:effectRef>
+      <a:fontRef idx="minor">
+        <a:schemeClr val="lt1"/>
+      </a:fontRef>
+    </dgm:style>
+  </dgm:styleLbl>
+  <dgm:styleLbl name="fgSibTrans2D1">
+    <dgm:scene3d>
+      <a:camera prst="orthographicFront"/>
+      <a:lightRig rig="threePt" dir="t"/>
+    </dgm:scene3d>
+    <dgm:sp3d/>
+    <dgm:txPr/>
+    <dgm:style>
+      <a:lnRef idx="0">
+        <a:scrgbClr r="0" g="0" b="0"/>
+      </a:lnRef>
+      <a:fillRef idx="1">
+        <a:scrgbClr r="0" g="0" b="0"/>
+      </a:fillRef>
+      <a:effectRef idx="0">
+        <a:scrgbClr r="0" g="0" b="0"/>
+      </a:effectRef>
+      <a:fontRef idx="minor">
+        <a:schemeClr val="lt1"/>
+      </a:fontRef>
+    </dgm:style>
+  </dgm:styleLbl>
+  <dgm:styleLbl name="bgSibTrans2D1">
+    <dgm:scene3d>
+      <a:camera prst="orthographicFront"/>
+      <a:lightRig rig="threePt" dir="t"/>
+    </dgm:scene3d>
+    <dgm:sp3d/>
+    <dgm:txPr/>
+    <dgm:style>
+      <a:lnRef idx="0">
+        <a:scrgbClr r="0" g="0" b="0"/>
+      </a:lnRef>
+      <a:fillRef idx="1">
+        <a:scrgbClr r="0" g="0" b="0"/>
+      </a:fillRef>
+      <a:effectRef idx="0">
+        <a:scrgbClr r="0" g="0" b="0"/>
+      </a:effectRef>
+      <a:fontRef idx="minor">
+        <a:schemeClr val="lt1"/>
+      </a:fontRef>
+    </dgm:style>
+  </dgm:styleLbl>
+  <dgm:styleLbl name="sibTrans1D1">
+    <dgm:scene3d>
+      <a:camera prst="orthographicFront"/>
+      <a:lightRig rig="threePt" dir="t"/>
+    </dgm:scene3d>
+    <dgm:sp3d/>
+    <dgm:txPr/>
+    <dgm:style>
+      <a:lnRef idx="1">
+        <a:scrgbClr r="0" g="0" b="0"/>
+      </a:lnRef>
+      <a:fillRef idx="0">
+        <a:scrgbClr r="0" g="0" b="0"/>
+      </a:fillRef>
+      <a:effectRef idx="0">
+        <a:scrgbClr r="0" g="0" b="0"/>
+      </a:effectRef>
+      <a:fontRef idx="minor"/>
+    </dgm:style>
+  </dgm:styleLbl>
+  <dgm:styleLbl name="callout">
+    <dgm:scene3d>
+      <a:camera prst="orthographicFront"/>
+      <a:lightRig rig="threePt" dir="t"/>
+    </dgm:scene3d>
+    <dgm:sp3d/>
+    <dgm:txPr/>
+    <dgm:style>
+      <a:lnRef idx="2">
+        <a:scrgbClr r="0" g="0" b="0"/>
+      </a:lnRef>
+      <a:fillRef idx="1">
+        <a:scrgbClr r="0" g="0" b="0"/>
+      </a:fillRef>
+      <a:effectRef idx="0">
+        <a:scrgbClr r="0" g="0" b="0"/>
+      </a:effectRef>
+      <a:fontRef idx="minor"/>
+    </dgm:style>
+  </dgm:styleLbl>
+  <dgm:styleLbl name="asst0">
+    <dgm:scene3d>
+      <a:camera prst="orthographicFront"/>
+      <a:lightRig rig="threePt" dir="t"/>
+    </dgm:scene3d>
+    <dgm:sp3d/>
+    <dgm:txPr/>
+    <dgm:style>
+      <a:lnRef idx="2">
+        <a:scrgbClr r="0" g="0" b="0"/>
+      </a:lnRef>
+      <a:fillRef idx="1">
+        <a:scrgbClr r="0" g="0" b="0"/>
+      </a:fillRef>
+      <a:effectRef idx="0">
+        <a:scrgbClr r="0" g="0" b="0"/>
+      </a:effectRef>
+      <a:fontRef idx="minor">
+        <a:schemeClr val="lt1"/>
+      </a:fontRef>
+    </dgm:style>
+  </dgm:styleLbl>
+  <dgm:styleLbl name="asst1">
+    <dgm:scene3d>
+      <a:camera prst="orthographicFront"/>
+      <a:lightRig rig="threePt" dir="t"/>
+    </dgm:scene3d>
+    <dgm:sp3d/>
+    <dgm:txPr/>
+    <dgm:style>
+      <a:lnRef idx="2">
+        <a:scrgbClr r="0" g="0" b="0"/>
+      </a:lnRef>
+      <a:fillRef idx="1">
+        <a:scrgbClr r="0" g="0" b="0"/>
+      </a:fillRef>
+      <a:effectRef idx="0">
+        <a:scrgbClr r="0" g="0" b="0"/>
+      </a:effectRef>
+      <a:fontRef idx="minor">
+        <a:schemeClr val="lt1"/>
+      </a:fontRef>
+    </dgm:style>
+  </dgm:styleLbl>
+  <dgm:styleLbl name="asst2">
+    <dgm:scene3d>
+      <a:camera prst="orthographicFront"/>
+      <a:lightRig rig="threePt" dir="t"/>
+    </dgm:scene3d>
+    <dgm:sp3d/>
+    <dgm:txPr/>
+    <dgm:style>
+      <a:lnRef idx="2">
+        <a:scrgbClr r="0" g="0" b="0"/>
+      </a:lnRef>
+      <a:fillRef idx="1">
+        <a:scrgbClr r="0" g="0" b="0"/>
+      </a:fillRef>
+      <a:effectRef idx="0">
+        <a:scrgbClr r="0" g="0" b="0"/>
+      </a:effectRef>
+      <a:fontRef idx="minor">
+        <a:schemeClr val="lt1"/>
+      </a:fontRef>
+    </dgm:style>
+  </dgm:styleLbl>
+  <dgm:styleLbl name="asst3">
+    <dgm:scene3d>
+      <a:camera prst="orthographicFront"/>
+      <a:lightRig rig="threePt" dir="t"/>
+    </dgm:scene3d>
+    <dgm:sp3d/>
+    <dgm:txPr/>
+    <dgm:style>
+      <a:lnRef idx="2">
+        <a:scrgbClr r="0" g="0" b="0"/>
+      </a:lnRef>
+      <a:fillRef idx="1">
+        <a:scrgbClr r="0" g="0" b="0"/>
+      </a:fillRef>
+      <a:effectRef idx="0">
+        <a:scrgbClr r="0" g="0" b="0"/>
+      </a:effectRef>
+      <a:fontRef idx="minor">
+        <a:schemeClr val="lt1"/>
+      </a:fontRef>
+    </dgm:style>
+  </dgm:styleLbl>
+  <dgm:styleLbl name="asst4">
+    <dgm:scene3d>
+      <a:camera prst="orthographicFront"/>
+      <a:lightRig rig="threePt" dir="t"/>
+    </dgm:scene3d>
+    <dgm:sp3d/>
+    <dgm:txPr/>
+    <dgm:style>
+      <a:lnRef idx="2">
+        <a:scrgbClr r="0" g="0" b="0"/>
+      </a:lnRef>
+      <a:fillRef idx="1">
+        <a:scrgbClr r="0" g="0" b="0"/>
+      </a:fillRef>
+      <a:effectRef idx="0">
+        <a:scrgbClr r="0" g="0" b="0"/>
+      </a:effectRef>
+      <a:fontRef idx="minor">
+        <a:schemeClr val="lt1"/>
+      </a:fontRef>
+    </dgm:style>
+  </dgm:styleLbl>
+  <dgm:styleLbl name="parChTrans2D1">
+    <dgm:scene3d>
+      <a:camera prst="orthographicFront"/>
+      <a:lightRig rig="threePt" dir="t"/>
+    </dgm:scene3d>
+    <dgm:sp3d/>
+    <dgm:txPr/>
+    <dgm:style>
+      <a:lnRef idx="2">
+        <a:scrgbClr r="0" g="0" b="0"/>
+      </a:lnRef>
+      <a:fillRef idx="1">
+        <a:scrgbClr r="0" g="0" b="0"/>
+      </a:fillRef>
+      <a:effectRef idx="0">
+        <a:scrgbClr r="0" g="0" b="0"/>
+      </a:effectRef>
+      <a:fontRef idx="minor">
+        <a:schemeClr val="lt1"/>
+      </a:fontRef>
+    </dgm:style>
+  </dgm:styleLbl>
+  <dgm:styleLbl name="parChTrans2D2">
+    <dgm:scene3d>
+      <a:camera prst="orthographicFront"/>
+      <a:lightRig rig="threePt" dir="t"/>
+    </dgm:scene3d>
+    <dgm:sp3d/>
+    <dgm:txPr/>
+    <dgm:style>
+      <a:lnRef idx="2">
+        <a:scrgbClr r="0" g="0" b="0"/>
+      </a:lnRef>
+      <a:fillRef idx="1">
+        <a:scrgbClr r="0" g="0" b="0"/>
+      </a:fillRef>
+      <a:effectRef idx="0">
+        <a:scrgbClr r="0" g="0" b="0"/>
+      </a:effectRef>
+      <a:fontRef idx="minor">
+        <a:schemeClr val="lt1"/>
+      </a:fontRef>
+    </dgm:style>
+  </dgm:styleLbl>
+  <dgm:styleLbl name="parChTrans2D3">
+    <dgm:scene3d>
+      <a:camera prst="orthographicFront"/>
+      <a:lightRig rig="threePt" dir="t"/>
+    </dgm:scene3d>
+    <dgm:sp3d/>
+    <dgm:txPr/>
+    <dgm:style>
+      <a:lnRef idx="2">
+        <a:scrgbClr r="0" g="0" b="0"/>
+      </a:lnRef>
+      <a:fillRef idx="1">
+        <a:scrgbClr r="0" g="0" b="0"/>
+      </a:fillRef>
+      <a:effectRef idx="0">
+        <a:scrgbClr r="0" g="0" b="0"/>
+      </a:effectRef>
+      <a:fontRef idx="minor">
+        <a:schemeClr val="lt1"/>
+      </a:fontRef>
+    </dgm:style>
+  </dgm:styleLbl>
+  <dgm:styleLbl name="parChTrans2D4">
+    <dgm:scene3d>
+      <a:camera prst="orthographicFront"/>
+      <a:lightRig rig="threePt" dir="t"/>
+    </dgm:scene3d>
+    <dgm:sp3d/>
+    <dgm:txPr/>
+    <dgm:style>
+      <a:lnRef idx="2">
+        <a:scrgbClr r="0" g="0" b="0"/>
+      </a:lnRef>
+      <a:fillRef idx="1">
+        <a:scrgbClr r="0" g="0" b="0"/>
+      </a:fillRef>
+      <a:effectRef idx="0">
+        <a:scrgbClr r="0" g="0" b="0"/>
+      </a:effectRef>
+      <a:fontRef idx="minor">
+        <a:schemeClr val="lt1"/>
+      </a:fontRef>
+    </dgm:style>
+  </dgm:styleLbl>
+  <dgm:styleLbl name="parChTrans1D1">
+    <dgm:scene3d>
+      <a:camera prst="orthographicFront"/>
+      <a:lightRig rig="threePt" dir="t"/>
+    </dgm:scene3d>
+    <dgm:sp3d/>
+    <dgm:txPr/>
+    <dgm:style>
+      <a:lnRef idx="2">
+        <a:scrgbClr r="0" g="0" b="0"/>
+      </a:lnRef>
+      <a:fillRef idx="0">
+        <a:scrgbClr r="0" g="0" b="0"/>
+      </a:fillRef>
+      <a:effectRef idx="0">
+        <a:scrgbClr r="0" g="0" b="0"/>
+      </a:effectRef>
+      <a:fontRef idx="minor"/>
+    </dgm:style>
+  </dgm:styleLbl>
+  <dgm:styleLbl name="parChTrans1D2">
+    <dgm:scene3d>
+      <a:camera prst="orthographicFront"/>
+      <a:lightRig rig="threePt" dir="t"/>
+    </dgm:scene3d>
+    <dgm:sp3d/>
+    <dgm:txPr/>
+    <dgm:style>
+      <a:lnRef idx="2">
+        <a:scrgbClr r="0" g="0" b="0"/>
+      </a:lnRef>
+      <a:fillRef idx="0">
+        <a:scrgbClr r="0" g="0" b="0"/>
+      </a:fillRef>
+      <a:effectRef idx="0">
+        <a:scrgbClr r="0" g="0" b="0"/>
+      </a:effectRef>
+      <a:fontRef idx="minor"/>
+    </dgm:style>
+  </dgm:styleLbl>
+  <dgm:styleLbl name="parChTrans1D3">
+    <dgm:scene3d>
+      <a:camera prst="orthographicFront"/>
+      <a:lightRig rig="threePt" dir="t"/>
+    </dgm:scene3d>
+    <dgm:sp3d/>
+    <dgm:txPr/>
+    <dgm:style>
+      <a:lnRef idx="2">
+        <a:scrgbClr r="0" g="0" b="0"/>
+      </a:lnRef>
+      <a:fillRef idx="0">
+        <a:scrgbClr r="0" g="0" b="0"/>
+      </a:fillRef>
+      <a:effectRef idx="0">
+        <a:scrgbClr r="0" g="0" b="0"/>
+      </a:effectRef>
+      <a:fontRef idx="minor"/>
+    </dgm:style>
+  </dgm:styleLbl>
+  <dgm:styleLbl name="parChTrans1D4">
+    <dgm:scene3d>
+      <a:camera prst="orthographicFront"/>
+      <a:lightRig rig="threePt" dir="t"/>
+    </dgm:scene3d>
+    <dgm:sp3d/>
+    <dgm:txPr/>
+    <dgm:style>
+      <a:lnRef idx="2">
+        <a:scrgbClr r="0" g="0" b="0"/>
+      </a:lnRef>
+      <a:fillRef idx="0">
+        <a:scrgbClr r="0" g="0" b="0"/>
+      </a:fillRef>
+      <a:effectRef idx="0">
+        <a:scrgbClr r="0" g="0" b="0"/>
+      </a:effectRef>
+      <a:fontRef idx="minor"/>
+    </dgm:style>
+  </dgm:styleLbl>
+  <dgm:styleLbl name="fgAcc1">
+    <dgm:scene3d>
+      <a:camera prst="orthographicFront"/>
+      <a:lightRig rig="threePt" dir="t"/>
+    </dgm:scene3d>
+    <dgm:sp3d/>
+    <dgm:txPr/>
+    <dgm:style>
+      <a:lnRef idx="2">
+        <a:scrgbClr r="0" g="0" b="0"/>
+      </a:lnRef>
+      <a:fillRef idx="1">
+        <a:scrgbClr r="0" g="0" b="0"/>
+      </a:fillRef>
+      <a:effectRef idx="0">
+        <a:scrgbClr r="0" g="0" b="0"/>
+      </a:effectRef>
+      <a:fontRef idx="minor"/>
+    </dgm:style>
+  </dgm:styleLbl>
+  <dgm:styleLbl name="conFgAcc1">
+    <dgm:scene3d>
+      <a:camera prst="orthographicFront"/>
+      <a:lightRig rig="threePt" dir="t"/>
+    </dgm:scene3d>
+    <dgm:sp3d/>
+    <dgm:txPr/>
+    <dgm:style>
+      <a:lnRef idx="2">
+        <a:scrgbClr r="0" g="0" b="0"/>
+      </a:lnRef>
+      <a:fillRef idx="1">
+        <a:scrgbClr r="0" g="0" b="0"/>
+      </a:fillRef>
+      <a:effectRef idx="0">
+        <a:scrgbClr r="0" g="0" b="0"/>
+      </a:effectRef>
+      <a:fontRef idx="minor"/>
+    </dgm:style>
+  </dgm:styleLbl>
+  <dgm:styleLbl name="alignAcc1">
+    <dgm:scene3d>
+      <a:camera prst="orthographicFront"/>
+      <a:lightRig rig="threePt" dir="t"/>
+    </dgm:scene3d>
+    <dgm:sp3d/>
+    <dgm:txPr/>
+    <dgm:style>
+      <a:lnRef idx="2">
+        <a:scrgbClr r="0" g="0" b="0"/>
+      </a:lnRef>
+      <a:fillRef idx="1">
+        <a:scrgbClr r="0" g="0" b="0"/>
+      </a:fillRef>
+      <a:effectRef idx="0">
+        <a:scrgbClr r="0" g="0" b="0"/>
+      </a:effectRef>
+      <a:fontRef idx="minor"/>
+    </dgm:style>
+  </dgm:styleLbl>
+  <dgm:styleLbl name="trAlignAcc1">
+    <dgm:scene3d>
+      <a:camera prst="orthographicFront"/>
+      <a:lightRig rig="threePt" dir="t"/>
+    </dgm:scene3d>
+    <dgm:sp3d/>
+    <dgm:txPr/>
+    <dgm:style>
+      <a:lnRef idx="1">
+        <a:scrgbClr r="0" g="0" b="0"/>
+      </a:lnRef>
+      <a:fillRef idx="1">
+        <a:scrgbClr r="0" g="0" b="0"/>
+      </a:fillRef>
+      <a:effectRef idx="0">
+        <a:scrgbClr r="0" g="0" b="0"/>
+      </a:effectRef>
+      <a:fontRef idx="minor"/>
+    </dgm:style>
+  </dgm:styleLbl>
+  <dgm:styleLbl name="bgAcc1">
+    <dgm:scene3d>
+      <a:camera prst="orthographicFront"/>
+      <a:lightRig rig="threePt" dir="t"/>
+    </dgm:scene3d>
+    <dgm:sp3d/>
+    <dgm:txPr/>
+    <dgm:style>
+      <a:lnRef idx="2">
+        <a:scrgbClr r="0" g="0" b="0"/>
+      </a:lnRef>
+      <a:fillRef idx="1">
+        <a:scrgbClr r="0" g="0" b="0"/>
+      </a:fillRef>
+      <a:effectRef idx="0">
+        <a:scrgbClr r="0" g="0" b="0"/>
+      </a:effectRef>
+      <a:fontRef idx="minor"/>
+    </dgm:style>
+  </dgm:styleLbl>
+  <dgm:styleLbl name="solidFgAcc1">
+    <dgm:scene3d>
+      <a:camera prst="orthographicFront"/>
+      <a:lightRig rig="threePt" dir="t"/>
+    </dgm:scene3d>
+    <dgm:sp3d/>
+    <dgm:txPr/>
+    <dgm:style>
+      <a:lnRef idx="2">
+        <a:scrgbClr r="0" g="0" b="0"/>
+      </a:lnRef>
+      <a:fillRef idx="1">
+        <a:scrgbClr r="0" g="0" b="0"/>
+      </a:fillRef>
+      <a:effectRef idx="0">
+        <a:scrgbClr r="0" g="0" b="0"/>
+      </a:effectRef>
+      <a:fontRef idx="minor"/>
+    </dgm:style>
+  </dgm:styleLbl>
+  <dgm:styleLbl name="solidAlignAcc1">
+    <dgm:scene3d>
+      <a:camera prst="orthographicFront"/>
+      <a:lightRig rig="threePt" dir="t"/>
+    </dgm:scene3d>
+    <dgm:sp3d/>
+    <dgm:txPr/>
+    <dgm:style>
+      <a:lnRef idx="2">
+        <a:scrgbClr r="0" g="0" b="0"/>
+      </a:lnRef>
+      <a:fillRef idx="1">
+        <a:scrgbClr r="0" g="0" b="0"/>
+      </a:fillRef>
+      <a:effectRef idx="0">
+        <a:scrgbClr r="0" g="0" b="0"/>
+      </a:effectRef>
+      <a:fontRef idx="minor"/>
+    </dgm:style>
+  </dgm:styleLbl>
+  <dgm:styleLbl name="solidBgAcc1">
+    <dgm:scene3d>
+      <a:camera prst="orthographicFront"/>
+      <a:lightRig rig="threePt" dir="t"/>
+    </dgm:scene3d>
+    <dgm:sp3d/>
+    <dgm:txPr/>
+    <dgm:style>
+      <a:lnRef idx="2">
+        <a:scrgbClr r="0" g="0" b="0"/>
+      </a:lnRef>
+      <a:fillRef idx="1">
+        <a:scrgbClr r="0" g="0" b="0"/>
+      </a:fillRef>
+      <a:effectRef idx="0">
+        <a:scrgbClr r="0" g="0" b="0"/>
+      </a:effectRef>
+      <a:fontRef idx="minor"/>
+    </dgm:style>
+  </dgm:styleLbl>
+  <dgm:styleLbl name="fgAccFollowNode1">
+    <dgm:scene3d>
+      <a:camera prst="orthographicFront"/>
+      <a:lightRig rig="threePt" dir="t"/>
+    </dgm:scene3d>
+    <dgm:sp3d/>
+    <dgm:txPr/>
+    <dgm:style>
+      <a:lnRef idx="2">
+        <a:scrgbClr r="0" g="0" b="0"/>
+      </a:lnRef>
+      <a:fillRef idx="1">
+        <a:scrgbClr r="0" g="0" b="0"/>
+      </a:fillRef>
+      <a:effectRef idx="0">
+        <a:scrgbClr r="0" g="0" b="0"/>
+      </a:effectRef>
+      <a:fontRef idx="minor"/>
+    </dgm:style>
+  </dgm:styleLbl>
+  <dgm:styleLbl name="alignAccFollowNode1">
+    <dgm:scene3d>
+      <a:camera prst="orthographicFront"/>
+      <a:lightRig rig="threePt" dir="t"/>
+    </dgm:scene3d>
+    <dgm:sp3d/>
+    <dgm:txPr/>
+    <dgm:style>
+      <a:lnRef idx="2">
+        <a:scrgbClr r="0" g="0" b="0"/>
+      </a:lnRef>
+      <a:fillRef idx="1">
+        <a:scrgbClr r="0" g="0" b="0"/>
+      </a:fillRef>
+      <a:effectRef idx="0">
+        <a:scrgbClr r="0" g="0" b="0"/>
+      </a:effectRef>
+      <a:fontRef idx="minor"/>
+    </dgm:style>
+  </dgm:styleLbl>
+  <dgm:styleLbl name="bgAccFollowNode1">
+    <dgm:scene3d>
+      <a:camera prst="orthographicFront"/>
+      <a:lightRig rig="threePt" dir="t"/>
+    </dgm:scene3d>
+    <dgm:sp3d/>
+    <dgm:txPr/>
+    <dgm:style>
+      <a:lnRef idx="2">
+        <a:scrgbClr r="0" g="0" b="0"/>
+      </a:lnRef>
+      <a:fillRef idx="1">
+        <a:scrgbClr r="0" g="0" b="0"/>
+      </a:fillRef>
+      <a:effectRef idx="0">
+        <a:scrgbClr r="0" g="0" b="0"/>
+      </a:effectRef>
+      <a:fontRef idx="minor"/>
+    </dgm:style>
+  </dgm:styleLbl>
+  <dgm:styleLbl name="fgAcc0">
+    <dgm:scene3d>
+      <a:camera prst="orthographicFront"/>
+      <a:lightRig rig="threePt" dir="t"/>
+    </dgm:scene3d>
+    <dgm:sp3d/>
+    <dgm:txPr/>
+    <dgm:style>
+      <a:lnRef idx="2">
+        <a:scrgbClr r="0" g="0" b="0"/>
+      </a:lnRef>
+      <a:fillRef idx="1">
+        <a:scrgbClr r="0" g="0" b="0"/>
+      </a:fillRef>
+      <a:effectRef idx="0">
+        <a:scrgbClr r="0" g="0" b="0"/>
+      </a:effectRef>
+      <a:fontRef idx="minor"/>
+    </dgm:style>
+  </dgm:styleLbl>
+  <dgm:styleLbl name="fgAcc2">
+    <dgm:scene3d>
+      <a:camera prst="orthographicFront"/>
+      <a:lightRig rig="threePt" dir="t"/>
+    </dgm:scene3d>
+    <dgm:sp3d/>
+    <dgm:txPr/>
+    <dgm:style>
+      <a:lnRef idx="2">
+        <a:scrgbClr r="0" g="0" b="0"/>
+      </a:lnRef>
+      <a:fillRef idx="1">
+        <a:scrgbClr r="0" g="0" b="0"/>
+      </a:fillRef>
+      <a:effectRef idx="0">
+        <a:scrgbClr r="0" g="0" b="0"/>
+      </a:effectRef>
+      <a:fontRef idx="minor"/>
+    </dgm:style>
+  </dgm:styleLbl>
+  <dgm:styleLbl name="fgAcc3">
+    <dgm:scene3d>
+      <a:camera prst="orthographicFront"/>
+      <a:lightRig rig="threePt" dir="t"/>
+    </dgm:scene3d>
+    <dgm:sp3d/>
+    <dgm:txPr/>
+    <dgm:style>
+      <a:lnRef idx="2">
+        <a:scrgbClr r="0" g="0" b="0"/>
+      </a:lnRef>
+      <a:fillRef idx="1">
+        <a:scrgbClr r="0" g="0" b="0"/>
+      </a:fillRef>
+      <a:effectRef idx="0">
+        <a:scrgbClr r="0" g="0" b="0"/>
+      </a:effectRef>
+      <a:fontRef idx="minor"/>
+    </dgm:style>
+  </dgm:styleLbl>
+  <dgm:styleLbl name="fgAcc4">
+    <dgm:scene3d>
+      <a:camera prst="orthographicFront"/>
+      <a:lightRig rig="threePt" dir="t"/>
+    </dgm:scene3d>
+    <dgm:sp3d/>
+    <dgm:txPr/>
+    <dgm:style>
+      <a:lnRef idx="2">
+        <a:scrgbClr r="0" g="0" b="0"/>
+      </a:lnRef>
+      <a:fillRef idx="1">
+        <a:scrgbClr r="0" g="0" b="0"/>
+      </a:fillRef>
+      <a:effectRef idx="0">
+        <a:scrgbClr r="0" g="0" b="0"/>
+      </a:effectRef>
+      <a:fontRef idx="minor"/>
+    </dgm:style>
+  </dgm:styleLbl>
+  <dgm:styleLbl name="bgShp">
+    <dgm:scene3d>
+      <a:camera prst="orthographicFront"/>
+      <a:lightRig rig="threePt" dir="t"/>
+    </dgm:scene3d>
+    <dgm:sp3d/>
+    <dgm:txPr/>
+    <dgm:style>
+      <a:lnRef idx="0">
+        <a:scrgbClr r="0" g="0" b="0"/>
+      </a:lnRef>
+      <a:fillRef idx="1">
+        <a:scrgbClr r="0" g="0" b="0"/>
+      </a:fillRef>
+      <a:effectRef idx="0">
+        <a:scrgbClr r="0" g="0" b="0"/>
+      </a:effectRef>
+      <a:fontRef idx="minor"/>
+    </dgm:style>
+  </dgm:styleLbl>
+  <dgm:styleLbl name="dkBgShp">
+    <dgm:scene3d>
+      <a:camera prst="orthographicFront"/>
+      <a:lightRig rig="threePt" dir="t"/>
+    </dgm:scene3d>
+    <dgm:sp3d/>
+    <dgm:txPr/>
+    <dgm:style>
+      <a:lnRef idx="0">
+        <a:scrgbClr r="0" g="0" b="0"/>
+      </a:lnRef>
+      <a:fillRef idx="1">
+        <a:scrgbClr r="0" g="0" b="0"/>
+      </a:fillRef>
+      <a:effectRef idx="0">
+        <a:scrgbClr r="0" g="0" b="0"/>
+      </a:effectRef>
+      <a:fontRef idx="minor"/>
+    </dgm:style>
+  </dgm:styleLbl>
+  <dgm:styleLbl name="trBgShp">
+    <dgm:scene3d>
+      <a:camera prst="orthographicFront"/>
+      <a:lightRig rig="threePt" dir="t"/>
+    </dgm:scene3d>
+    <dgm:sp3d/>
+    <dgm:txPr/>
+    <dgm:style>
+      <a:lnRef idx="0">
+        <a:scrgbClr r="0" g="0" b="0"/>
+      </a:lnRef>
+      <a:fillRef idx="1">
+        <a:scrgbClr r="0" g="0" b="0"/>
+      </a:fillRef>
+      <a:effectRef idx="0">
+        <a:scrgbClr r="0" g="0" b="0"/>
+      </a:effectRef>
+      <a:fontRef idx="minor"/>
+    </dgm:style>
+  </dgm:styleLbl>
+  <dgm:styleLbl name="fgShp">
+    <dgm:scene3d>
+      <a:camera prst="orthographicFront"/>
+      <a:lightRig rig="threePt" dir="t"/>
+    </dgm:scene3d>
+    <dgm:sp3d/>
+    <dgm:txPr/>
+    <dgm:style>
+      <a:lnRef idx="2">
+        <a:scrgbClr r="0" g="0" b="0"/>
+      </a:lnRef>
+      <a:fillRef idx="1">
+        <a:scrgbClr r="0" g="0" b="0"/>
+      </a:fillRef>
+      <a:effectRef idx="0">
+        <a:scrgbClr r="0" g="0" b="0"/>
+      </a:effectRef>
+      <a:fontRef idx="minor"/>
+    </dgm:style>
+  </dgm:styleLbl>
+  <dgm:styleLbl name="revTx">
+    <dgm:scene3d>
+      <a:camera prst="orthographicFront"/>
+      <a:lightRig rig="threePt" dir="t"/>
+    </dgm:scene3d>
+    <dgm:sp3d/>
+    <dgm:txPr/>
+    <dgm:style>
+      <a:lnRef idx="0">
+        <a:scrgbClr r="0" g="0" b="0"/>
+      </a:lnRef>
+      <a:fillRef idx="0">
+        <a:scrgbClr r="0" g="0" b="0"/>
+      </a:fillRef>
+      <a:effectRef idx="0">
+        <a:scrgbClr r="0" g="0" b="0"/>
+      </a:effectRef>
+      <a:fontRef idx="minor"/>
+    </dgm:style>
+  </dgm:styleLbl>
+</dgm:styleDef>
+</file>
+
+<file path=ppt/diagrams/quickStyle4.xml><?xml version="1.0" encoding="utf-8"?>
 <dgm:styleDef xmlns:dgm="http://schemas.openxmlformats.org/drawingml/2006/diagram" xmlns:a="http://schemas.openxmlformats.org/drawingml/2006/main" uniqueId="urn:microsoft.com/office/officeart/2005/8/quickstyle/simple1">
   <dgm:title val=""/>
   <dgm:desc val=""/>
@@ -8779,6 +11691,92 @@
 </file>
 
 <file path=ppt/notesSlides/notesSlide7.xml><?xml version="1.0" encoding="utf-8"?>
+<p:notes xmlns:a="http://schemas.openxmlformats.org/drawingml/2006/main" xmlns:r="http://schemas.openxmlformats.org/officeDocument/2006/relationships" xmlns:p="http://schemas.openxmlformats.org/presentationml/2006/main">
+  <p:cSld>
+    <p:spTree>
+      <p:nvGrpSpPr>
+        <p:cNvPr id="1" name=""/>
+        <p:cNvGrpSpPr/>
+        <p:nvPr/>
+      </p:nvGrpSpPr>
+      <p:grpSpPr>
+        <a:xfrm>
+          <a:off x="0" y="0"/>
+          <a:ext cx="0" cy="0"/>
+          <a:chOff x="0" y="0"/>
+          <a:chExt cx="0" cy="0"/>
+        </a:xfrm>
+      </p:grpSpPr>
+      <p:sp>
+        <p:nvSpPr>
+          <p:cNvPr id="2" name="Espaço Reservado para Imagem de Slide 1"/>
+          <p:cNvSpPr>
+            <a:spLocks noGrp="1" noRot="1" noChangeAspect="1"/>
+          </p:cNvSpPr>
+          <p:nvPr>
+            <p:ph type="sldImg"/>
+          </p:nvPr>
+        </p:nvSpPr>
+        <p:spPr>
+          <a:xfrm>
+            <a:off x="381000" y="685800"/>
+            <a:ext cx="6096000" cy="3429000"/>
+          </a:xfrm>
+        </p:spPr>
+      </p:sp>
+      <p:sp>
+        <p:nvSpPr>
+          <p:cNvPr id="3" name="Espaço Reservado para Anotações 2"/>
+          <p:cNvSpPr>
+            <a:spLocks noGrp="1"/>
+          </p:cNvSpPr>
+          <p:nvPr>
+            <p:ph type="body" idx="1"/>
+          </p:nvPr>
+        </p:nvSpPr>
+        <p:spPr/>
+        <p:txBody>
+          <a:bodyPr/>
+          <a:lstStyle/>
+          <a:p>
+            <a:pPr marL="158750" indent="0">
+              <a:buNone/>
+            </a:pPr>
+            <a:r>
+              <a:rPr lang="pt-BR" dirty="0"/>
+              <a:t>O CADIMA não é  um software  integrado com bancos de dados de publicação</a:t>
+            </a:r>
+          </a:p>
+          <a:p>
+            <a:pPr marL="158750" indent="0">
+              <a:buNone/>
+            </a:pPr>
+            <a:r>
+              <a:rPr lang="pt-BR" dirty="0"/>
+              <a:t>Não auxilia na síntese quantitativa/ qualitativa </a:t>
+            </a:r>
+            <a:r>
+              <a:rPr lang="pt-BR"/>
+              <a:t>de resultados</a:t>
+            </a:r>
+            <a:endParaRPr lang="pt-BR" dirty="0"/>
+          </a:p>
+        </p:txBody>
+      </p:sp>
+    </p:spTree>
+    <p:extLst>
+      <p:ext uri="{BB962C8B-B14F-4D97-AF65-F5344CB8AC3E}">
+        <p14:creationId xmlns:p14="http://schemas.microsoft.com/office/powerpoint/2010/main" val="2793931585"/>
+      </p:ext>
+    </p:extLst>
+  </p:cSld>
+  <p:clrMapOvr>
+    <a:masterClrMapping/>
+  </p:clrMapOvr>
+</p:notes>
+</file>
+
+<file path=ppt/notesSlides/notesSlide8.xml><?xml version="1.0" encoding="utf-8"?>
 <p:notes xmlns:a="http://schemas.openxmlformats.org/drawingml/2006/main" xmlns:r="http://schemas.openxmlformats.org/officeDocument/2006/relationships" xmlns:p="http://schemas.openxmlformats.org/presentationml/2006/main" showMasterSp="0" showMasterPhAnim="0">
   <p:cSld>
     <p:spTree>
@@ -8870,7 +11868,7 @@
               </a:spcAft>
               <a:buNone/>
             </a:pPr>
-            <a:endParaRPr/>
+            <a:endParaRPr dirty="0"/>
           </a:p>
         </p:txBody>
       </p:sp>
@@ -22920,24 +25918,29 @@
             <p:ph type="title"/>
           </p:nvPr>
         </p:nvSpPr>
-        <p:spPr/>
+        <p:spPr>
+          <a:xfrm>
+            <a:off x="1303800" y="598575"/>
+            <a:ext cx="7030500" cy="999300"/>
+          </a:xfrm>
+        </p:spPr>
         <p:txBody>
           <a:bodyPr/>
           <a:lstStyle/>
           <a:p>
             <a:r>
               <a:rPr lang="pt-BR" dirty="0"/>
-              <a:t>Funcionalidades CADIMA</a:t>
+              <a:t>Funcionalidades do CADIMA</a:t>
             </a:r>
           </a:p>
         </p:txBody>
       </p:sp>
       <p:sp>
         <p:nvSpPr>
-          <p:cNvPr id="3" name="Espaço Reservado para Texto 2">
+          <p:cNvPr id="17" name="Espaço Reservado para Texto 16">
             <a:extLst>
               <a:ext uri="{FF2B5EF4-FFF2-40B4-BE49-F238E27FC236}">
-                <a16:creationId xmlns:a16="http://schemas.microsoft.com/office/drawing/2014/main" id="{2785D4E1-9B1B-491C-8E9D-4AC33BDF0499}"/>
+                <a16:creationId xmlns:a16="http://schemas.microsoft.com/office/drawing/2014/main" id="{BFA38DC7-F080-4328-9D2A-4C8D5BAD4175}"/>
               </a:ext>
             </a:extLst>
           </p:cNvPr>
@@ -22957,6 +25960,34 @@
           </a:p>
         </p:txBody>
       </p:sp>
+      <p:graphicFrame>
+        <p:nvGraphicFramePr>
+          <p:cNvPr id="5" name="Diagrama 4">
+            <a:extLst>
+              <a:ext uri="{FF2B5EF4-FFF2-40B4-BE49-F238E27FC236}">
+                <a16:creationId xmlns:a16="http://schemas.microsoft.com/office/drawing/2014/main" id="{176C933F-E201-4433-A4E2-372330767F97}"/>
+              </a:ext>
+            </a:extLst>
+          </p:cNvPr>
+          <p:cNvGraphicFramePr/>
+          <p:nvPr>
+            <p:extLst>
+              <p:ext uri="{D42A27DB-BD31-4B8C-83A1-F6EECF244321}">
+                <p14:modId xmlns:p14="http://schemas.microsoft.com/office/powerpoint/2010/main" val="1633437892"/>
+              </p:ext>
+            </p:extLst>
+          </p:nvPr>
+        </p:nvGraphicFramePr>
+        <p:xfrm>
+          <a:off x="1056750" y="1433015"/>
+          <a:ext cx="7030500" cy="3098635"/>
+        </p:xfrm>
+        <a:graphic>
+          <a:graphicData uri="http://schemas.openxmlformats.org/drawingml/2006/diagram">
+            <dgm:relIds xmlns:dgm="http://schemas.openxmlformats.org/drawingml/2006/diagram" xmlns:r="http://schemas.openxmlformats.org/officeDocument/2006/relationships" r:dm="rId3" r:lo="rId4" r:qs="rId5" r:cs="rId6"/>
+          </a:graphicData>
+        </a:graphic>
+      </p:graphicFrame>
     </p:spTree>
     <p:extLst>
       <p:ext uri="{BB962C8B-B14F-4D97-AF65-F5344CB8AC3E}">
@@ -23050,38 +26081,11 @@
         </p:spPr>
         <p:txBody>
           <a:bodyPr spcFirstLastPara="1" wrap="square" lIns="91425" tIns="91425" rIns="91425" bIns="91425" anchor="t" anchorCtr="0">
-            <a:normAutofit/>
+            <a:normAutofit fontScale="85000" lnSpcReduction="20000"/>
           </a:bodyPr>
           <a:lstStyle/>
           <a:p>
-            <a:pPr marL="0" indent="0">
-              <a:spcAft>
-                <a:spcPts val="1200"/>
-              </a:spcAft>
-              <a:buNone/>
-            </a:pPr>
-            <a:r>
-              <a:rPr lang="pt-BR" sz="1400" u="sng" dirty="0">
-                <a:solidFill>
-                  <a:schemeClr val="dk2"/>
-                </a:solidFill>
-                <a:hlinkClick r:id="rId3">
-                  <a:extLst>
-                    <a:ext uri="{A12FA001-AC4F-418D-AE19-62706E023703}">
-                      <ahyp:hlinkClr xmlns:ahyp="http://schemas.microsoft.com/office/drawing/2018/hyperlinkcolor" val="tx"/>
-                    </a:ext>
-                  </a:extLst>
-                </a:hlinkClick>
-              </a:rPr>
-              <a:t>https://bvsms.saude.gov.br/bvs/publicacoes/diretrizes_metodologicas_elaboracao_sistematica.pdf</a:t>
-            </a:r>
-            <a:r>
-              <a:rPr lang="pt-BR" sz="1400" dirty="0"/>
-              <a:t> (pág.11,13)</a:t>
-            </a:r>
-          </a:p>
-          <a:p>
-            <a:pPr marL="0" indent="0">
+            <a:pPr marL="0" indent="0" algn="just">
               <a:spcAft>
                 <a:spcPts val="1200"/>
               </a:spcAft>
@@ -23089,11 +26093,115 @@
             </a:pPr>
             <a:r>
               <a:rPr lang="pt-BR" sz="1400" dirty="0"/>
-              <a:t>https://training.cochrane.org/handbook/current/chapter-04</a:t>
+              <a:t>Brasil. Ministério da Saúde. Secretaria de Ciência, Tecnologia e Insumos Estratégicos. Departamento de Ciência e Tecnologia. Diretrizes metodológicas : elaboração de revisão sistemática e </a:t>
+            </a:r>
+            <a:r>
+              <a:rPr lang="pt-BR" sz="1400" dirty="0" err="1"/>
+              <a:t>metanálise</a:t>
+            </a:r>
+            <a:r>
+              <a:rPr lang="pt-BR" sz="1400" dirty="0"/>
+              <a:t> de ensaios clínicos randomizados/ Ministério da Saúde, Secretaria de Ciência, Tecnologia e Insumos Estratégicos, Departamento de Ciência e Tecnologia. – Brasília: Editora do Ministério da Saúde, 2012. 92 p. : il. – (Série A: Normas e Manuais Técnicos).</a:t>
             </a:r>
           </a:p>
           <a:p>
-            <a:pPr marL="0" indent="0">
+            <a:pPr marL="0" indent="0" algn="just">
+              <a:spcAft>
+                <a:spcPts val="1200"/>
+              </a:spcAft>
+              <a:buNone/>
+            </a:pPr>
+            <a:r>
+              <a:rPr lang="pt-BR" sz="1400" dirty="0"/>
+              <a:t>Cochrane. </a:t>
+            </a:r>
+            <a:r>
+              <a:rPr lang="pt-BR" sz="1400" dirty="0" err="1"/>
+              <a:t>Chapter</a:t>
+            </a:r>
+            <a:r>
+              <a:rPr lang="pt-BR" sz="1400" dirty="0"/>
+              <a:t> 4: </a:t>
+            </a:r>
+            <a:r>
+              <a:rPr lang="pt-BR" sz="1400" dirty="0" err="1"/>
+              <a:t>Searching</a:t>
+            </a:r>
+            <a:r>
+              <a:rPr lang="pt-BR" sz="1400" dirty="0"/>
+              <a:t> for </a:t>
+            </a:r>
+            <a:r>
+              <a:rPr lang="pt-BR" sz="1400" dirty="0" err="1"/>
+              <a:t>and</a:t>
+            </a:r>
+            <a:r>
+              <a:rPr lang="pt-BR" sz="1400" dirty="0"/>
+              <a:t> </a:t>
+            </a:r>
+            <a:r>
+              <a:rPr lang="pt-BR" sz="1400" dirty="0" err="1"/>
+              <a:t>selecting</a:t>
+            </a:r>
+            <a:r>
+              <a:rPr lang="pt-BR" sz="1400" dirty="0"/>
+              <a:t> </a:t>
+            </a:r>
+            <a:r>
+              <a:rPr lang="pt-BR" sz="1400" dirty="0" err="1"/>
+              <a:t>studies</a:t>
+            </a:r>
+            <a:r>
+              <a:rPr lang="pt-BR" sz="1400" dirty="0"/>
+              <a:t>. Disponível em: &lt;https://training.cochrane.org/handbook/</a:t>
+            </a:r>
+            <a:r>
+              <a:rPr lang="pt-BR" sz="1400" dirty="0" err="1"/>
+              <a:t>current</a:t>
+            </a:r>
+            <a:r>
+              <a:rPr lang="pt-BR" sz="1400" dirty="0"/>
+              <a:t>/chapter-04&gt;. Acesso em 18 de agosto de 2021.</a:t>
+            </a:r>
+          </a:p>
+          <a:p>
+            <a:pPr marL="0" indent="0" algn="just">
+              <a:spcAft>
+                <a:spcPts val="1200"/>
+              </a:spcAft>
+              <a:buNone/>
+            </a:pPr>
+            <a:r>
+              <a:rPr lang="pt-BR" sz="1400" dirty="0"/>
+              <a:t>HTANALYZE. Etapas de uma Revisão Sistemática. Disponível em: &lt;https://www.htanalyze.com/</a:t>
+            </a:r>
+            <a:r>
+              <a:rPr lang="pt-BR" sz="1400" dirty="0" err="1"/>
+              <a:t>metanalise</a:t>
+            </a:r>
+            <a:r>
+              <a:rPr lang="pt-BR" sz="1400" dirty="0"/>
+              <a:t>/etapas-</a:t>
+            </a:r>
+            <a:r>
+              <a:rPr lang="pt-BR" sz="1400" dirty="0" err="1"/>
+              <a:t>revisao</a:t>
+            </a:r>
+            <a:r>
+              <a:rPr lang="pt-BR" sz="1400" dirty="0"/>
+              <a:t>-</a:t>
+            </a:r>
+            <a:r>
+              <a:rPr lang="pt-BR" sz="1400" dirty="0" err="1"/>
+              <a:t>sistematica</a:t>
+            </a:r>
+            <a:r>
+              <a:rPr lang="pt-BR" sz="1400" dirty="0"/>
+              <a:t>/&gt;. Acesso em 18 de agosto de 2021.</a:t>
+            </a:r>
+          </a:p>
+          <a:p>
+            <a:pPr marL="0" indent="0" algn="just">
               <a:spcAft>
                 <a:spcPts val="1200"/>
               </a:spcAft>
@@ -23239,30 +26347,6 @@
               </a:spcAft>
               <a:buNone/>
             </a:pPr>
-            <a:r>
-              <a:rPr lang="pt-BR" sz="1400" dirty="0"/>
-              <a:t>https://training.cochrane.org/handbook/current/chapter-04</a:t>
-            </a:r>
-          </a:p>
-          <a:p>
-            <a:pPr marL="0" indent="0">
-              <a:spcAft>
-                <a:spcPts val="1200"/>
-              </a:spcAft>
-              <a:buNone/>
-            </a:pPr>
-            <a:r>
-              <a:rPr lang="pt-BR" sz="1400" dirty="0"/>
-              <a:t>https://www.htanalyze.com/metanalise/etapas-revisao-sistematica/</a:t>
-            </a:r>
-          </a:p>
-          <a:p>
-            <a:pPr marL="0" indent="0">
-              <a:spcAft>
-                <a:spcPts val="1200"/>
-              </a:spcAft>
-              <a:buNone/>
-            </a:pPr>
             <a:endParaRPr lang="pt-BR" sz="1400" dirty="0"/>
           </a:p>
           <a:p>
@@ -23373,6 +26457,10 @@
           </a:p>
           <a:p>
             <a:pPr lvl="0"/>
+            <a:endParaRPr lang="pt-BR" dirty="0"/>
+          </a:p>
+          <a:p>
+            <a:pPr lvl="0"/>
             <a:r>
               <a:rPr lang="pt-BR" dirty="0"/>
               <a:t>“Utiliza um processo de revisão de literatura abrangente, imparcial e reprodutível, que localiza, avalia e sintetiza o conjunto de evidências dos estudos científicos para obter uma visão geral e confiável da estimativa do efeito da intervenção”.</a:t>
@@ -23388,8 +26476,8 @@
         </p:nvSpPr>
         <p:spPr>
           <a:xfrm>
-            <a:off x="1303800" y="4599700"/>
-            <a:ext cx="7588200" cy="354000"/>
+            <a:off x="7607776" y="3808129"/>
+            <a:ext cx="1453048" cy="353913"/>
           </a:xfrm>
           <a:prstGeom prst="rect">
             <a:avLst/>
@@ -23415,25 +26503,20 @@
               <a:buNone/>
             </a:pPr>
             <a:r>
-              <a:rPr lang="pt-BR" sz="1100" u="sng" dirty="0">
+              <a:rPr lang="pt-BR" sz="1100" dirty="0">
                 <a:solidFill>
-                  <a:schemeClr val="dk2"/>
+                  <a:srgbClr val="424242"/>
                 </a:solidFill>
-                <a:hlinkClick r:id="rId3">
-                  <a:extLst>
-                    <a:ext uri="{A12FA001-AC4F-418D-AE19-62706E023703}">
-                      <ahyp:hlinkClr xmlns:ahyp="http://schemas.microsoft.com/office/drawing/2018/hyperlinkcolor" val="tx"/>
-                    </a:ext>
-                  </a:extLst>
-                </a:hlinkClick>
+                <a:latin typeface="Nunito" panose="00000500000000000000" pitchFamily="2" charset="0"/>
               </a:rPr>
-              <a:t>https://bvsms.saude.gov.br/bvs/publicacoes/diretrizes_metodologicas_elaboracao_sistematica.pdf</a:t>
+              <a:t>(Brasil, 2012) </a:t>
             </a:r>
-            <a:r>
-              <a:rPr lang="pt-BR" sz="1100" dirty="0"/>
-              <a:t> (pág.11,13)</a:t>
-            </a:r>
-            <a:endParaRPr sz="1100" dirty="0"/>
+            <a:endParaRPr sz="1100" dirty="0">
+              <a:solidFill>
+                <a:srgbClr val="424242"/>
+              </a:solidFill>
+              <a:latin typeface="Nunito" panose="00000500000000000000" pitchFamily="2" charset="0"/>
+            </a:endParaRPr>
           </a:p>
         </p:txBody>
       </p:sp>
@@ -23517,7 +26600,7 @@
           <p:nvPr>
             <p:extLst>
               <p:ext uri="{D42A27DB-BD31-4B8C-83A1-F6EECF244321}">
-                <p14:modId xmlns:p14="http://schemas.microsoft.com/office/powerpoint/2010/main" val="3459109887"/>
+                <p14:modId xmlns:p14="http://schemas.microsoft.com/office/powerpoint/2010/main" val="430044894"/>
               </p:ext>
             </p:extLst>
           </p:nvPr>
@@ -23534,14 +26617,20 @@
       </p:graphicFrame>
       <p:sp>
         <p:nvSpPr>
-          <p:cNvPr id="292" name="Google Shape;292;p15"/>
+          <p:cNvPr id="7" name="Google Shape;285;p14">
+            <a:extLst>
+              <a:ext uri="{FF2B5EF4-FFF2-40B4-BE49-F238E27FC236}">
+                <a16:creationId xmlns:a16="http://schemas.microsoft.com/office/drawing/2014/main" id="{49412E3E-9FBF-4757-B80A-5482B90A5173}"/>
+              </a:ext>
+            </a:extLst>
+          </p:cNvPr>
           <p:cNvSpPr txBox="1"/>
           <p:nvPr/>
         </p:nvSpPr>
         <p:spPr>
           <a:xfrm>
-            <a:off x="1303800" y="4599700"/>
-            <a:ext cx="7588200" cy="354000"/>
+            <a:off x="7360726" y="4531650"/>
+            <a:ext cx="1453048" cy="353913"/>
           </a:xfrm>
           <a:prstGeom prst="rect">
             <a:avLst/>
@@ -23567,25 +26656,20 @@
               <a:buNone/>
             </a:pPr>
             <a:r>
-              <a:rPr lang="pt-BR" sz="1100" u="sng" dirty="0">
+              <a:rPr lang="pt-BR" sz="1100" dirty="0">
                 <a:solidFill>
-                  <a:schemeClr val="dk2"/>
+                  <a:srgbClr val="424242"/>
                 </a:solidFill>
-                <a:hlinkClick r:id="rId8">
-                  <a:extLst>
-                    <a:ext uri="{A12FA001-AC4F-418D-AE19-62706E023703}">
-                      <ahyp:hlinkClr xmlns:ahyp="http://schemas.microsoft.com/office/drawing/2018/hyperlinkcolor" val="tx"/>
-                    </a:ext>
-                  </a:extLst>
-                </a:hlinkClick>
+                <a:latin typeface="Nunito" panose="00000500000000000000" pitchFamily="2" charset="0"/>
               </a:rPr>
-              <a:t>https://bvsms.saude.gov.br/bvs/publicacoes/diretrizes_metodologicas_elaboracao_sistematica.pdf</a:t>
+              <a:t>(Brasil, 2012) </a:t>
             </a:r>
-            <a:r>
-              <a:rPr lang="pt-BR" sz="1100" dirty="0"/>
-              <a:t> (pág.13)</a:t>
-            </a:r>
-            <a:endParaRPr sz="1100" dirty="0"/>
+            <a:endParaRPr sz="1100" dirty="0">
+              <a:solidFill>
+                <a:srgbClr val="424242"/>
+              </a:solidFill>
+              <a:latin typeface="Nunito" panose="00000500000000000000" pitchFamily="2" charset="0"/>
+            </a:endParaRPr>
           </a:p>
         </p:txBody>
       </p:sp>
@@ -23726,14 +26810,20 @@
       </p:sp>
       <p:sp>
         <p:nvSpPr>
-          <p:cNvPr id="299" name="Google Shape;299;p16"/>
+          <p:cNvPr id="5" name="Google Shape;285;p14">
+            <a:extLst>
+              <a:ext uri="{FF2B5EF4-FFF2-40B4-BE49-F238E27FC236}">
+                <a16:creationId xmlns:a16="http://schemas.microsoft.com/office/drawing/2014/main" id="{0112154A-02D0-42CA-A6F9-61D249F80A81}"/>
+              </a:ext>
+            </a:extLst>
+          </p:cNvPr>
           <p:cNvSpPr txBox="1"/>
           <p:nvPr/>
         </p:nvSpPr>
         <p:spPr>
           <a:xfrm>
-            <a:off x="1303800" y="4599700"/>
-            <a:ext cx="7588200" cy="354000"/>
+            <a:off x="7607776" y="4177737"/>
+            <a:ext cx="1453048" cy="353913"/>
           </a:xfrm>
           <a:prstGeom prst="rect">
             <a:avLst/>
@@ -23759,25 +26849,20 @@
               <a:buNone/>
             </a:pPr>
             <a:r>
-              <a:rPr lang="pt-BR" sz="1100" u="sng">
+              <a:rPr lang="pt-BR" sz="1100" dirty="0">
                 <a:solidFill>
-                  <a:schemeClr val="dk2"/>
+                  <a:srgbClr val="424242"/>
                 </a:solidFill>
-                <a:hlinkClick r:id="rId3">
-                  <a:extLst>
-                    <a:ext uri="{A12FA001-AC4F-418D-AE19-62706E023703}">
-                      <ahyp:hlinkClr xmlns:ahyp="http://schemas.microsoft.com/office/drawing/2018/hyperlinkcolor" val="tx"/>
-                    </a:ext>
-                  </a:extLst>
-                </a:hlinkClick>
+                <a:latin typeface="Nunito" panose="00000500000000000000" pitchFamily="2" charset="0"/>
               </a:rPr>
-              <a:t>https://bvsms.saude.gov.br/bvs/publicacoes/diretrizes_metodologicas_elaboracao_sistematica.pdf</a:t>
+              <a:t>(Brasil, 2012) </a:t>
             </a:r>
-            <a:r>
-              <a:rPr lang="pt-BR" sz="1100"/>
-              <a:t> (pág.15)</a:t>
-            </a:r>
-            <a:endParaRPr sz="1100"/>
+            <a:endParaRPr sz="1100" dirty="0">
+              <a:solidFill>
+                <a:srgbClr val="424242"/>
+              </a:solidFill>
+              <a:latin typeface="Nunito" panose="00000500000000000000" pitchFamily="2" charset="0"/>
+            </a:endParaRPr>
           </a:p>
         </p:txBody>
       </p:sp>
@@ -25076,10 +28161,16 @@
             </a:extLst>
           </p:cNvPr>
           <p:cNvGraphicFramePr/>
-          <p:nvPr/>
+          <p:nvPr>
+            <p:extLst>
+              <p:ext uri="{D42A27DB-BD31-4B8C-83A1-F6EECF244321}">
+                <p14:modId xmlns:p14="http://schemas.microsoft.com/office/powerpoint/2010/main" val="2503875711"/>
+              </p:ext>
+            </p:extLst>
+          </p:nvPr>
         </p:nvGraphicFramePr>
         <p:xfrm>
-          <a:off x="1303338" y="1990725"/>
+          <a:off x="1056482" y="1990725"/>
           <a:ext cx="7031037" cy="2541588"/>
         </p:xfrm>
         <a:graphic>

</xml_diff>

<commit_message>
Inserção de prints simulando o funcionamento do CADIMA nos slides da apresentação.
</commit_message>
<xml_diff>
--- a/apresentacao-revisao-sistematica.pptx
+++ b/apresentacao-revisao-sistematica.pptx
@@ -5,7 +5,7 @@
     <p:sldMasterId id="2147483659" r:id="rId1"/>
   </p:sldMasterIdLst>
   <p:notesMasterIdLst>
-    <p:notesMasterId r:id="rId13"/>
+    <p:notesMasterId r:id="rId23"/>
   </p:notesMasterIdLst>
   <p:sldIdLst>
     <p:sldId id="256" r:id="rId2"/>
@@ -18,22 +18,32 @@
     <p:sldId id="267" r:id="rId9"/>
     <p:sldId id="273" r:id="rId10"/>
     <p:sldId id="276" r:id="rId11"/>
-    <p:sldId id="270" r:id="rId12"/>
+    <p:sldId id="278" r:id="rId12"/>
+    <p:sldId id="279" r:id="rId13"/>
+    <p:sldId id="280" r:id="rId14"/>
+    <p:sldId id="281" r:id="rId15"/>
+    <p:sldId id="282" r:id="rId16"/>
+    <p:sldId id="283" r:id="rId17"/>
+    <p:sldId id="285" r:id="rId18"/>
+    <p:sldId id="277" r:id="rId19"/>
+    <p:sldId id="286" r:id="rId20"/>
+    <p:sldId id="287" r:id="rId21"/>
+    <p:sldId id="270" r:id="rId22"/>
   </p:sldIdLst>
   <p:sldSz cx="9144000" cy="5143500" type="screen16x9"/>
   <p:notesSz cx="6858000" cy="9144000"/>
   <p:embeddedFontLst>
     <p:embeddedFont>
       <p:font typeface="Maven Pro" panose="020B0604020202020204" charset="0"/>
-      <p:regular r:id="rId14"/>
-      <p:bold r:id="rId15"/>
+      <p:regular r:id="rId24"/>
+      <p:bold r:id="rId25"/>
     </p:embeddedFont>
     <p:embeddedFont>
       <p:font typeface="Nunito" panose="00000500000000000000" pitchFamily="2" charset="0"/>
-      <p:regular r:id="rId16"/>
-      <p:bold r:id="rId17"/>
-      <p:italic r:id="rId18"/>
-      <p:boldItalic r:id="rId19"/>
+      <p:regular r:id="rId26"/>
+      <p:bold r:id="rId27"/>
+      <p:italic r:id="rId28"/>
+      <p:boldItalic r:id="rId29"/>
     </p:embeddedFont>
   </p:embeddedFontLst>
   <p:defaultTextStyle>
@@ -11435,6 +11445,67 @@
             <p:ph type="sldImg"/>
           </p:nvPr>
         </p:nvSpPr>
+        <p:spPr/>
+      </p:sp>
+      <p:sp>
+        <p:nvSpPr>
+          <p:cNvPr id="3" name="Espaço Reservado para Anotações 2"/>
+          <p:cNvSpPr>
+            <a:spLocks noGrp="1"/>
+          </p:cNvSpPr>
+          <p:nvPr>
+            <p:ph type="body" idx="1"/>
+          </p:nvPr>
+        </p:nvSpPr>
+        <p:spPr/>
+        <p:txBody>
+          <a:bodyPr/>
+          <a:lstStyle/>
+          <a:p>
+            <a:endParaRPr lang="pt-BR" dirty="0"/>
+          </a:p>
+        </p:txBody>
+      </p:sp>
+    </p:spTree>
+    <p:extLst>
+      <p:ext uri="{BB962C8B-B14F-4D97-AF65-F5344CB8AC3E}">
+        <p14:creationId xmlns:p14="http://schemas.microsoft.com/office/powerpoint/2010/main" val="2487968321"/>
+      </p:ext>
+    </p:extLst>
+  </p:cSld>
+  <p:clrMapOvr>
+    <a:masterClrMapping/>
+  </p:clrMapOvr>
+</p:notes>
+</file>
+
+<file path=ppt/notesSlides/notesSlide6.xml><?xml version="1.0" encoding="utf-8"?>
+<p:notes xmlns:a="http://schemas.openxmlformats.org/drawingml/2006/main" xmlns:r="http://schemas.openxmlformats.org/officeDocument/2006/relationships" xmlns:p="http://schemas.openxmlformats.org/presentationml/2006/main">
+  <p:cSld>
+    <p:spTree>
+      <p:nvGrpSpPr>
+        <p:cNvPr id="1" name=""/>
+        <p:cNvGrpSpPr/>
+        <p:nvPr/>
+      </p:nvGrpSpPr>
+      <p:grpSpPr>
+        <a:xfrm>
+          <a:off x="0" y="0"/>
+          <a:ext cx="0" cy="0"/>
+          <a:chOff x="0" y="0"/>
+          <a:chExt cx="0" cy="0"/>
+        </a:xfrm>
+      </p:grpSpPr>
+      <p:sp>
+        <p:nvSpPr>
+          <p:cNvPr id="2" name="Espaço Reservado para Imagem de Slide 1"/>
+          <p:cNvSpPr>
+            <a:spLocks noGrp="1" noRot="1" noChangeAspect="1"/>
+          </p:cNvSpPr>
+          <p:nvPr>
+            <p:ph type="sldImg"/>
+          </p:nvPr>
+        </p:nvSpPr>
         <p:spPr>
           <a:xfrm>
             <a:off x="381000" y="685800"/>
@@ -11543,7 +11614,7 @@
 </p:notes>
 </file>
 
-<file path=ppt/notesSlides/notesSlide6.xml><?xml version="1.0" encoding="utf-8"?>
+<file path=ppt/notesSlides/notesSlide7.xml><?xml version="1.0" encoding="utf-8"?>
 <p:notes xmlns:a="http://schemas.openxmlformats.org/drawingml/2006/main" xmlns:r="http://schemas.openxmlformats.org/officeDocument/2006/relationships" xmlns:p="http://schemas.openxmlformats.org/presentationml/2006/main" showMasterSp="0" showMasterPhAnim="0">
   <p:cSld>
     <p:spTree>
@@ -11690,7 +11761,7 @@
 </p:notes>
 </file>
 
-<file path=ppt/notesSlides/notesSlide7.xml><?xml version="1.0" encoding="utf-8"?>
+<file path=ppt/notesSlides/notesSlide8.xml><?xml version="1.0" encoding="utf-8"?>
 <p:notes xmlns:a="http://schemas.openxmlformats.org/drawingml/2006/main" xmlns:r="http://schemas.openxmlformats.org/officeDocument/2006/relationships" xmlns:p="http://schemas.openxmlformats.org/presentationml/2006/main">
   <p:cSld>
     <p:spTree>
@@ -11753,13 +11824,8 @@
             </a:pPr>
             <a:r>
               <a:rPr lang="pt-BR" dirty="0"/>
-              <a:t>Não auxilia na síntese quantitativa/ qualitativa </a:t>
+              <a:t>Não auxilia na síntese quantitativa/ qualitativa de resultados</a:t>
             </a:r>
-            <a:r>
-              <a:rPr lang="pt-BR"/>
-              <a:t>de resultados</a:t>
-            </a:r>
-            <a:endParaRPr lang="pt-BR" dirty="0"/>
           </a:p>
         </p:txBody>
       </p:sp>
@@ -11776,7 +11842,7 @@
 </p:notes>
 </file>
 
-<file path=ppt/notesSlides/notesSlide8.xml><?xml version="1.0" encoding="utf-8"?>
+<file path=ppt/notesSlides/notesSlide9.xml><?xml version="1.0" encoding="utf-8"?>
 <p:notes xmlns:a="http://schemas.openxmlformats.org/drawingml/2006/main" xmlns:r="http://schemas.openxmlformats.org/officeDocument/2006/relationships" xmlns:p="http://schemas.openxmlformats.org/presentationml/2006/main" showMasterSp="0" showMasterPhAnim="0">
   <p:cSld>
     <p:spTree>
@@ -26006,6 +26072,1372 @@
   <p:cSld>
     <p:spTree>
       <p:nvGrpSpPr>
+        <p:cNvPr id="1" name=""/>
+        <p:cNvGrpSpPr/>
+        <p:nvPr/>
+      </p:nvGrpSpPr>
+      <p:grpSpPr>
+        <a:xfrm>
+          <a:off x="0" y="0"/>
+          <a:ext cx="0" cy="0"/>
+          <a:chOff x="0" y="0"/>
+          <a:chExt cx="0" cy="0"/>
+        </a:xfrm>
+      </p:grpSpPr>
+      <p:sp>
+        <p:nvSpPr>
+          <p:cNvPr id="2" name="Título 1">
+            <a:extLst>
+              <a:ext uri="{FF2B5EF4-FFF2-40B4-BE49-F238E27FC236}">
+                <a16:creationId xmlns:a16="http://schemas.microsoft.com/office/drawing/2014/main" id="{1B4FBBE5-5B27-4589-9B36-19C6A7EC7BDB}"/>
+              </a:ext>
+            </a:extLst>
+          </p:cNvPr>
+          <p:cNvSpPr>
+            <a:spLocks noGrp="1"/>
+          </p:cNvSpPr>
+          <p:nvPr>
+            <p:ph type="title"/>
+          </p:nvPr>
+        </p:nvSpPr>
+        <p:spPr/>
+        <p:txBody>
+          <a:bodyPr>
+            <a:normAutofit fontScale="90000"/>
+          </a:bodyPr>
+          <a:lstStyle/>
+          <a:p>
+            <a:r>
+              <a:rPr lang="pt-BR" dirty="0"/>
+              <a:t>CADIMA na prática -</a:t>
+            </a:r>
+            <a:br>
+              <a:rPr lang="pt-BR" dirty="0"/>
+            </a:br>
+            <a:r>
+              <a:rPr lang="pt-BR" dirty="0"/>
+              <a:t>Identificando duplicatas</a:t>
+            </a:r>
+          </a:p>
+        </p:txBody>
+      </p:sp>
+      <p:sp>
+        <p:nvSpPr>
+          <p:cNvPr id="3" name="Espaço Reservado para Texto 2">
+            <a:extLst>
+              <a:ext uri="{FF2B5EF4-FFF2-40B4-BE49-F238E27FC236}">
+                <a16:creationId xmlns:a16="http://schemas.microsoft.com/office/drawing/2014/main" id="{25E2CF39-AE02-4F69-8AF6-5E67EA3CB6B4}"/>
+              </a:ext>
+            </a:extLst>
+          </p:cNvPr>
+          <p:cNvSpPr>
+            <a:spLocks noGrp="1"/>
+          </p:cNvSpPr>
+          <p:nvPr>
+            <p:ph type="body" idx="1"/>
+          </p:nvPr>
+        </p:nvSpPr>
+        <p:spPr/>
+        <p:txBody>
+          <a:bodyPr/>
+          <a:lstStyle/>
+          <a:p>
+            <a:endParaRPr lang="pt-BR" dirty="0"/>
+          </a:p>
+        </p:txBody>
+      </p:sp>
+      <p:pic>
+        <p:nvPicPr>
+          <p:cNvPr id="5" name="Imagem 4" descr="Interface gráfica do usuário, Texto, Aplicativo, Email&#10;&#10;Descrição gerada automaticamente">
+            <a:extLst>
+              <a:ext uri="{FF2B5EF4-FFF2-40B4-BE49-F238E27FC236}">
+                <a16:creationId xmlns:a16="http://schemas.microsoft.com/office/drawing/2014/main" id="{99E66356-14E8-4F82-BB34-8E16C18A6A30}"/>
+              </a:ext>
+            </a:extLst>
+          </p:cNvPr>
+          <p:cNvPicPr>
+            <a:picLocks noChangeAspect="1"/>
+          </p:cNvPicPr>
+          <p:nvPr/>
+        </p:nvPicPr>
+        <p:blipFill>
+          <a:blip r:embed="rId2"/>
+          <a:stretch>
+            <a:fillRect/>
+          </a:stretch>
+        </p:blipFill>
+        <p:spPr>
+          <a:xfrm>
+            <a:off x="299001" y="1494338"/>
+            <a:ext cx="8545998" cy="3493918"/>
+          </a:xfrm>
+          <a:prstGeom prst="rect">
+            <a:avLst/>
+          </a:prstGeom>
+        </p:spPr>
+      </p:pic>
+    </p:spTree>
+    <p:extLst>
+      <p:ext uri="{BB962C8B-B14F-4D97-AF65-F5344CB8AC3E}">
+        <p14:creationId xmlns:p14="http://schemas.microsoft.com/office/powerpoint/2010/main" val="1976452351"/>
+      </p:ext>
+    </p:extLst>
+  </p:cSld>
+  <p:clrMapOvr>
+    <a:masterClrMapping/>
+  </p:clrMapOvr>
+</p:sld>
+</file>
+
+<file path=ppt/slides/slide12.xml><?xml version="1.0" encoding="utf-8"?>
+<p:sld xmlns:a="http://schemas.openxmlformats.org/drawingml/2006/main" xmlns:r="http://schemas.openxmlformats.org/officeDocument/2006/relationships" xmlns:p="http://schemas.openxmlformats.org/presentationml/2006/main">
+  <p:cSld>
+    <p:spTree>
+      <p:nvGrpSpPr>
+        <p:cNvPr id="1" name=""/>
+        <p:cNvGrpSpPr/>
+        <p:nvPr/>
+      </p:nvGrpSpPr>
+      <p:grpSpPr>
+        <a:xfrm>
+          <a:off x="0" y="0"/>
+          <a:ext cx="0" cy="0"/>
+          <a:chOff x="0" y="0"/>
+          <a:chExt cx="0" cy="0"/>
+        </a:xfrm>
+      </p:grpSpPr>
+      <p:sp>
+        <p:nvSpPr>
+          <p:cNvPr id="2" name="Título 1">
+            <a:extLst>
+              <a:ext uri="{FF2B5EF4-FFF2-40B4-BE49-F238E27FC236}">
+                <a16:creationId xmlns:a16="http://schemas.microsoft.com/office/drawing/2014/main" id="{932687AC-B7C4-4497-B6DC-EE821CDBB8FB}"/>
+              </a:ext>
+            </a:extLst>
+          </p:cNvPr>
+          <p:cNvSpPr>
+            <a:spLocks noGrp="1"/>
+          </p:cNvSpPr>
+          <p:nvPr>
+            <p:ph type="title"/>
+          </p:nvPr>
+        </p:nvSpPr>
+        <p:spPr/>
+        <p:txBody>
+          <a:bodyPr>
+            <a:normAutofit fontScale="90000"/>
+          </a:bodyPr>
+          <a:lstStyle/>
+          <a:p>
+            <a:r>
+              <a:rPr lang="pt-BR" dirty="0"/>
+              <a:t>CADIMA na prática -</a:t>
+            </a:r>
+            <a:br>
+              <a:rPr lang="pt-BR" dirty="0"/>
+            </a:br>
+            <a:r>
+              <a:rPr lang="pt-BR" dirty="0"/>
+              <a:t>Identificando duplicatas</a:t>
+            </a:r>
+          </a:p>
+        </p:txBody>
+      </p:sp>
+      <p:sp>
+        <p:nvSpPr>
+          <p:cNvPr id="3" name="Espaço Reservado para Texto 2">
+            <a:extLst>
+              <a:ext uri="{FF2B5EF4-FFF2-40B4-BE49-F238E27FC236}">
+                <a16:creationId xmlns:a16="http://schemas.microsoft.com/office/drawing/2014/main" id="{5027AAD3-5BF7-449D-92C5-63CF5B49A919}"/>
+              </a:ext>
+            </a:extLst>
+          </p:cNvPr>
+          <p:cNvSpPr>
+            <a:spLocks noGrp="1"/>
+          </p:cNvSpPr>
+          <p:nvPr>
+            <p:ph type="body" idx="1"/>
+          </p:nvPr>
+        </p:nvSpPr>
+        <p:spPr/>
+        <p:txBody>
+          <a:bodyPr/>
+          <a:lstStyle/>
+          <a:p>
+            <a:endParaRPr lang="pt-BR"/>
+          </a:p>
+        </p:txBody>
+      </p:sp>
+      <p:pic>
+        <p:nvPicPr>
+          <p:cNvPr id="5" name="Imagem 4" descr="Texto&#10;&#10;Descrição gerada automaticamente">
+            <a:extLst>
+              <a:ext uri="{FF2B5EF4-FFF2-40B4-BE49-F238E27FC236}">
+                <a16:creationId xmlns:a16="http://schemas.microsoft.com/office/drawing/2014/main" id="{0811DB37-CFAC-4FB0-8C80-3A2E636DA6DA}"/>
+              </a:ext>
+            </a:extLst>
+          </p:cNvPr>
+          <p:cNvPicPr>
+            <a:picLocks noChangeAspect="1"/>
+          </p:cNvPicPr>
+          <p:nvPr/>
+        </p:nvPicPr>
+        <p:blipFill>
+          <a:blip r:embed="rId2"/>
+          <a:stretch>
+            <a:fillRect/>
+          </a:stretch>
+        </p:blipFill>
+        <p:spPr>
+          <a:xfrm>
+            <a:off x="404294" y="1458957"/>
+            <a:ext cx="8526482" cy="3603786"/>
+          </a:xfrm>
+          <a:prstGeom prst="rect">
+            <a:avLst/>
+          </a:prstGeom>
+        </p:spPr>
+      </p:pic>
+    </p:spTree>
+    <p:extLst>
+      <p:ext uri="{BB962C8B-B14F-4D97-AF65-F5344CB8AC3E}">
+        <p14:creationId xmlns:p14="http://schemas.microsoft.com/office/powerpoint/2010/main" val="1617703763"/>
+      </p:ext>
+    </p:extLst>
+  </p:cSld>
+  <p:clrMapOvr>
+    <a:masterClrMapping/>
+  </p:clrMapOvr>
+</p:sld>
+</file>
+
+<file path=ppt/slides/slide13.xml><?xml version="1.0" encoding="utf-8"?>
+<p:sld xmlns:a="http://schemas.openxmlformats.org/drawingml/2006/main" xmlns:r="http://schemas.openxmlformats.org/officeDocument/2006/relationships" xmlns:p="http://schemas.openxmlformats.org/presentationml/2006/main">
+  <p:cSld>
+    <p:spTree>
+      <p:nvGrpSpPr>
+        <p:cNvPr id="1" name=""/>
+        <p:cNvGrpSpPr/>
+        <p:nvPr/>
+      </p:nvGrpSpPr>
+      <p:grpSpPr>
+        <a:xfrm>
+          <a:off x="0" y="0"/>
+          <a:ext cx="0" cy="0"/>
+          <a:chOff x="0" y="0"/>
+          <a:chExt cx="0" cy="0"/>
+        </a:xfrm>
+      </p:grpSpPr>
+      <p:sp>
+        <p:nvSpPr>
+          <p:cNvPr id="2" name="Título 1">
+            <a:extLst>
+              <a:ext uri="{FF2B5EF4-FFF2-40B4-BE49-F238E27FC236}">
+                <a16:creationId xmlns:a16="http://schemas.microsoft.com/office/drawing/2014/main" id="{292865CE-CB3E-491A-B9EF-C4837F5303CF}"/>
+              </a:ext>
+            </a:extLst>
+          </p:cNvPr>
+          <p:cNvSpPr>
+            <a:spLocks noGrp="1"/>
+          </p:cNvSpPr>
+          <p:nvPr>
+            <p:ph type="title"/>
+          </p:nvPr>
+        </p:nvSpPr>
+        <p:spPr/>
+        <p:txBody>
+          <a:bodyPr>
+            <a:normAutofit fontScale="90000"/>
+          </a:bodyPr>
+          <a:lstStyle/>
+          <a:p>
+            <a:r>
+              <a:rPr lang="pt-BR" dirty="0"/>
+              <a:t>CADIMA na prática -</a:t>
+            </a:r>
+            <a:br>
+              <a:rPr lang="pt-BR" dirty="0"/>
+            </a:br>
+            <a:r>
+              <a:rPr lang="pt-BR" dirty="0"/>
+              <a:t>Definindo critérios (</a:t>
+            </a:r>
+            <a:r>
+              <a:rPr lang="pt-BR" dirty="0" err="1"/>
+              <a:t>Title</a:t>
+            </a:r>
+            <a:r>
+              <a:rPr lang="pt-BR" dirty="0"/>
+              <a:t>/Abstract)</a:t>
+            </a:r>
+          </a:p>
+        </p:txBody>
+      </p:sp>
+      <p:sp>
+        <p:nvSpPr>
+          <p:cNvPr id="3" name="Espaço Reservado para Texto 2">
+            <a:extLst>
+              <a:ext uri="{FF2B5EF4-FFF2-40B4-BE49-F238E27FC236}">
+                <a16:creationId xmlns:a16="http://schemas.microsoft.com/office/drawing/2014/main" id="{84C93A86-16F2-4B8E-B6A3-3B3519B8CDD2}"/>
+              </a:ext>
+            </a:extLst>
+          </p:cNvPr>
+          <p:cNvSpPr>
+            <a:spLocks noGrp="1"/>
+          </p:cNvSpPr>
+          <p:nvPr>
+            <p:ph type="body" idx="1"/>
+          </p:nvPr>
+        </p:nvSpPr>
+        <p:spPr/>
+        <p:txBody>
+          <a:bodyPr/>
+          <a:lstStyle/>
+          <a:p>
+            <a:endParaRPr lang="pt-BR"/>
+          </a:p>
+        </p:txBody>
+      </p:sp>
+      <p:pic>
+        <p:nvPicPr>
+          <p:cNvPr id="7" name="Imagem 6" descr="Interface gráfica do usuário, Texto, Aplicativo, Email&#10;&#10;Descrição gerada automaticamente">
+            <a:extLst>
+              <a:ext uri="{FF2B5EF4-FFF2-40B4-BE49-F238E27FC236}">
+                <a16:creationId xmlns:a16="http://schemas.microsoft.com/office/drawing/2014/main" id="{038E1E54-0B4B-45FF-AA17-CB8AB1913160}"/>
+              </a:ext>
+            </a:extLst>
+          </p:cNvPr>
+          <p:cNvPicPr>
+            <a:picLocks noChangeAspect="1"/>
+          </p:cNvPicPr>
+          <p:nvPr/>
+        </p:nvPicPr>
+        <p:blipFill>
+          <a:blip r:embed="rId2"/>
+          <a:stretch>
+            <a:fillRect/>
+          </a:stretch>
+        </p:blipFill>
+        <p:spPr>
+          <a:xfrm>
+            <a:off x="686870" y="1411524"/>
+            <a:ext cx="7647430" cy="3589694"/>
+          </a:xfrm>
+          <a:prstGeom prst="rect">
+            <a:avLst/>
+          </a:prstGeom>
+        </p:spPr>
+      </p:pic>
+    </p:spTree>
+    <p:extLst>
+      <p:ext uri="{BB962C8B-B14F-4D97-AF65-F5344CB8AC3E}">
+        <p14:creationId xmlns:p14="http://schemas.microsoft.com/office/powerpoint/2010/main" val="3532828614"/>
+      </p:ext>
+    </p:extLst>
+  </p:cSld>
+  <p:clrMapOvr>
+    <a:masterClrMapping/>
+  </p:clrMapOvr>
+</p:sld>
+</file>
+
+<file path=ppt/slides/slide14.xml><?xml version="1.0" encoding="utf-8"?>
+<p:sld xmlns:a="http://schemas.openxmlformats.org/drawingml/2006/main" xmlns:r="http://schemas.openxmlformats.org/officeDocument/2006/relationships" xmlns:p="http://schemas.openxmlformats.org/presentationml/2006/main">
+  <p:cSld>
+    <p:spTree>
+      <p:nvGrpSpPr>
+        <p:cNvPr id="1" name=""/>
+        <p:cNvGrpSpPr/>
+        <p:nvPr/>
+      </p:nvGrpSpPr>
+      <p:grpSpPr>
+        <a:xfrm>
+          <a:off x="0" y="0"/>
+          <a:ext cx="0" cy="0"/>
+          <a:chOff x="0" y="0"/>
+          <a:chExt cx="0" cy="0"/>
+        </a:xfrm>
+      </p:grpSpPr>
+      <p:sp>
+        <p:nvSpPr>
+          <p:cNvPr id="2" name="Título 1">
+            <a:extLst>
+              <a:ext uri="{FF2B5EF4-FFF2-40B4-BE49-F238E27FC236}">
+                <a16:creationId xmlns:a16="http://schemas.microsoft.com/office/drawing/2014/main" id="{EF5EC579-9149-430A-9ADC-C9A8F44FB118}"/>
+              </a:ext>
+            </a:extLst>
+          </p:cNvPr>
+          <p:cNvSpPr>
+            <a:spLocks noGrp="1"/>
+          </p:cNvSpPr>
+          <p:nvPr>
+            <p:ph type="title"/>
+          </p:nvPr>
+        </p:nvSpPr>
+        <p:spPr/>
+        <p:txBody>
+          <a:bodyPr>
+            <a:normAutofit fontScale="90000"/>
+          </a:bodyPr>
+          <a:lstStyle/>
+          <a:p>
+            <a:r>
+              <a:rPr lang="pt-BR" dirty="0"/>
+              <a:t>CADIMA na prática – </a:t>
+            </a:r>
+            <a:br>
+              <a:rPr lang="pt-BR" dirty="0"/>
+            </a:br>
+            <a:r>
+              <a:rPr lang="pt-BR" dirty="0"/>
+              <a:t>Definindo critérios (Full </a:t>
+            </a:r>
+            <a:r>
+              <a:rPr lang="pt-BR" dirty="0" err="1"/>
+              <a:t>Text</a:t>
+            </a:r>
+            <a:r>
+              <a:rPr lang="pt-BR" dirty="0"/>
+              <a:t>)</a:t>
+            </a:r>
+          </a:p>
+        </p:txBody>
+      </p:sp>
+      <p:sp>
+        <p:nvSpPr>
+          <p:cNvPr id="3" name="Espaço Reservado para Texto 2">
+            <a:extLst>
+              <a:ext uri="{FF2B5EF4-FFF2-40B4-BE49-F238E27FC236}">
+                <a16:creationId xmlns:a16="http://schemas.microsoft.com/office/drawing/2014/main" id="{6AAE8968-88DC-45E0-BB62-D92CE2BC88C3}"/>
+              </a:ext>
+            </a:extLst>
+          </p:cNvPr>
+          <p:cNvSpPr>
+            <a:spLocks noGrp="1"/>
+          </p:cNvSpPr>
+          <p:nvPr>
+            <p:ph type="body" idx="1"/>
+          </p:nvPr>
+        </p:nvSpPr>
+        <p:spPr/>
+        <p:txBody>
+          <a:bodyPr/>
+          <a:lstStyle/>
+          <a:p>
+            <a:endParaRPr lang="pt-BR"/>
+          </a:p>
+        </p:txBody>
+      </p:sp>
+      <p:pic>
+        <p:nvPicPr>
+          <p:cNvPr id="5" name="Imagem 4" descr="Interface gráfica do usuário, Texto, Aplicativo, Email&#10;&#10;Descrição gerada automaticamente">
+            <a:extLst>
+              <a:ext uri="{FF2B5EF4-FFF2-40B4-BE49-F238E27FC236}">
+                <a16:creationId xmlns:a16="http://schemas.microsoft.com/office/drawing/2014/main" id="{56D6167E-E3C3-49AA-ACD5-03CF07F7A280}"/>
+              </a:ext>
+            </a:extLst>
+          </p:cNvPr>
+          <p:cNvPicPr>
+            <a:picLocks noChangeAspect="1"/>
+          </p:cNvPicPr>
+          <p:nvPr/>
+        </p:nvPicPr>
+        <p:blipFill>
+          <a:blip r:embed="rId2"/>
+          <a:stretch>
+            <a:fillRect/>
+          </a:stretch>
+        </p:blipFill>
+        <p:spPr>
+          <a:xfrm>
+            <a:off x="695662" y="1458381"/>
+            <a:ext cx="7638638" cy="3604938"/>
+          </a:xfrm>
+          <a:prstGeom prst="rect">
+            <a:avLst/>
+          </a:prstGeom>
+        </p:spPr>
+      </p:pic>
+    </p:spTree>
+    <p:extLst>
+      <p:ext uri="{BB962C8B-B14F-4D97-AF65-F5344CB8AC3E}">
+        <p14:creationId xmlns:p14="http://schemas.microsoft.com/office/powerpoint/2010/main" val="3261683230"/>
+      </p:ext>
+    </p:extLst>
+  </p:cSld>
+  <p:clrMapOvr>
+    <a:masterClrMapping/>
+  </p:clrMapOvr>
+</p:sld>
+</file>
+
+<file path=ppt/slides/slide15.xml><?xml version="1.0" encoding="utf-8"?>
+<p:sld xmlns:a="http://schemas.openxmlformats.org/drawingml/2006/main" xmlns:r="http://schemas.openxmlformats.org/officeDocument/2006/relationships" xmlns:p="http://schemas.openxmlformats.org/presentationml/2006/main">
+  <p:cSld>
+    <p:spTree>
+      <p:nvGrpSpPr>
+        <p:cNvPr id="1" name=""/>
+        <p:cNvGrpSpPr/>
+        <p:nvPr/>
+      </p:nvGrpSpPr>
+      <p:grpSpPr>
+        <a:xfrm>
+          <a:off x="0" y="0"/>
+          <a:ext cx="0" cy="0"/>
+          <a:chOff x="0" y="0"/>
+          <a:chExt cx="0" cy="0"/>
+        </a:xfrm>
+      </p:grpSpPr>
+      <p:sp>
+        <p:nvSpPr>
+          <p:cNvPr id="2" name="Título 1">
+            <a:extLst>
+              <a:ext uri="{FF2B5EF4-FFF2-40B4-BE49-F238E27FC236}">
+                <a16:creationId xmlns:a16="http://schemas.microsoft.com/office/drawing/2014/main" id="{8C7A3A92-30F1-460F-B6F4-01CA6BF15AFC}"/>
+              </a:ext>
+            </a:extLst>
+          </p:cNvPr>
+          <p:cNvSpPr>
+            <a:spLocks noGrp="1"/>
+          </p:cNvSpPr>
+          <p:nvPr>
+            <p:ph type="title"/>
+          </p:nvPr>
+        </p:nvSpPr>
+        <p:spPr/>
+        <p:txBody>
+          <a:bodyPr>
+            <a:normAutofit fontScale="90000"/>
+          </a:bodyPr>
+          <a:lstStyle/>
+          <a:p>
+            <a:r>
+              <a:rPr lang="pt-BR" dirty="0"/>
+              <a:t>CADIMA na prática – </a:t>
+            </a:r>
+            <a:br>
+              <a:rPr lang="pt-BR" dirty="0"/>
+            </a:br>
+            <a:r>
+              <a:rPr lang="pt-BR" dirty="0"/>
+              <a:t>Definindo </a:t>
+            </a:r>
+            <a:r>
+              <a:rPr lang="pt-BR" dirty="0" err="1"/>
+              <a:t>keywords</a:t>
+            </a:r>
+            <a:endParaRPr lang="pt-BR" dirty="0"/>
+          </a:p>
+        </p:txBody>
+      </p:sp>
+      <p:sp>
+        <p:nvSpPr>
+          <p:cNvPr id="3" name="Espaço Reservado para Texto 2">
+            <a:extLst>
+              <a:ext uri="{FF2B5EF4-FFF2-40B4-BE49-F238E27FC236}">
+                <a16:creationId xmlns:a16="http://schemas.microsoft.com/office/drawing/2014/main" id="{35E2E5A6-0F51-4608-9DF6-3E7E96B1BF3B}"/>
+              </a:ext>
+            </a:extLst>
+          </p:cNvPr>
+          <p:cNvSpPr>
+            <a:spLocks noGrp="1"/>
+          </p:cNvSpPr>
+          <p:nvPr>
+            <p:ph type="body" idx="1"/>
+          </p:nvPr>
+        </p:nvSpPr>
+        <p:spPr/>
+        <p:txBody>
+          <a:bodyPr/>
+          <a:lstStyle/>
+          <a:p>
+            <a:endParaRPr lang="pt-BR"/>
+          </a:p>
+        </p:txBody>
+      </p:sp>
+      <p:pic>
+        <p:nvPicPr>
+          <p:cNvPr id="5" name="Imagem 4" descr="Interface gráfica do usuário, Texto, Aplicativo, Email&#10;&#10;Descrição gerada automaticamente">
+            <a:extLst>
+              <a:ext uri="{FF2B5EF4-FFF2-40B4-BE49-F238E27FC236}">
+                <a16:creationId xmlns:a16="http://schemas.microsoft.com/office/drawing/2014/main" id="{4BD8D02C-5AF3-4291-8B2B-E0B5A70049A0}"/>
+              </a:ext>
+            </a:extLst>
+          </p:cNvPr>
+          <p:cNvPicPr>
+            <a:picLocks noChangeAspect="1"/>
+          </p:cNvPicPr>
+          <p:nvPr/>
+        </p:nvPicPr>
+        <p:blipFill>
+          <a:blip r:embed="rId2"/>
+          <a:stretch>
+            <a:fillRect/>
+          </a:stretch>
+        </p:blipFill>
+        <p:spPr>
+          <a:xfrm>
+            <a:off x="330544" y="1597875"/>
+            <a:ext cx="8687628" cy="3072454"/>
+          </a:xfrm>
+          <a:prstGeom prst="rect">
+            <a:avLst/>
+          </a:prstGeom>
+        </p:spPr>
+      </p:pic>
+    </p:spTree>
+    <p:extLst>
+      <p:ext uri="{BB962C8B-B14F-4D97-AF65-F5344CB8AC3E}">
+        <p14:creationId xmlns:p14="http://schemas.microsoft.com/office/powerpoint/2010/main" val="3752210900"/>
+      </p:ext>
+    </p:extLst>
+  </p:cSld>
+  <p:clrMapOvr>
+    <a:masterClrMapping/>
+  </p:clrMapOvr>
+</p:sld>
+</file>
+
+<file path=ppt/slides/slide16.xml><?xml version="1.0" encoding="utf-8"?>
+<p:sld xmlns:a="http://schemas.openxmlformats.org/drawingml/2006/main" xmlns:r="http://schemas.openxmlformats.org/officeDocument/2006/relationships" xmlns:p="http://schemas.openxmlformats.org/presentationml/2006/main">
+  <p:cSld>
+    <p:spTree>
+      <p:nvGrpSpPr>
+        <p:cNvPr id="1" name=""/>
+        <p:cNvGrpSpPr/>
+        <p:nvPr/>
+      </p:nvGrpSpPr>
+      <p:grpSpPr>
+        <a:xfrm>
+          <a:off x="0" y="0"/>
+          <a:ext cx="0" cy="0"/>
+          <a:chOff x="0" y="0"/>
+          <a:chExt cx="0" cy="0"/>
+        </a:xfrm>
+      </p:grpSpPr>
+      <p:sp>
+        <p:nvSpPr>
+          <p:cNvPr id="2" name="Título 1">
+            <a:extLst>
+              <a:ext uri="{FF2B5EF4-FFF2-40B4-BE49-F238E27FC236}">
+                <a16:creationId xmlns:a16="http://schemas.microsoft.com/office/drawing/2014/main" id="{FC32537B-B4A5-48F5-AB60-7F487285061A}"/>
+              </a:ext>
+            </a:extLst>
+          </p:cNvPr>
+          <p:cNvSpPr>
+            <a:spLocks noGrp="1"/>
+          </p:cNvSpPr>
+          <p:nvPr>
+            <p:ph type="title"/>
+          </p:nvPr>
+        </p:nvSpPr>
+        <p:spPr/>
+        <p:txBody>
+          <a:bodyPr>
+            <a:normAutofit fontScale="90000"/>
+          </a:bodyPr>
+          <a:lstStyle/>
+          <a:p>
+            <a:r>
+              <a:rPr lang="pt-BR" dirty="0"/>
+              <a:t>CADIMA na prática – </a:t>
+            </a:r>
+            <a:br>
+              <a:rPr lang="pt-BR" dirty="0"/>
+            </a:br>
+            <a:r>
+              <a:rPr lang="pt-BR" dirty="0"/>
+              <a:t>Verificando a consistência </a:t>
+            </a:r>
+          </a:p>
+        </p:txBody>
+      </p:sp>
+      <p:sp>
+        <p:nvSpPr>
+          <p:cNvPr id="3" name="Espaço Reservado para Texto 2">
+            <a:extLst>
+              <a:ext uri="{FF2B5EF4-FFF2-40B4-BE49-F238E27FC236}">
+                <a16:creationId xmlns:a16="http://schemas.microsoft.com/office/drawing/2014/main" id="{4E1349F3-4FBB-4A28-93AF-A5503E2452BD}"/>
+              </a:ext>
+            </a:extLst>
+          </p:cNvPr>
+          <p:cNvSpPr>
+            <a:spLocks noGrp="1"/>
+          </p:cNvSpPr>
+          <p:nvPr>
+            <p:ph type="body" idx="1"/>
+          </p:nvPr>
+        </p:nvSpPr>
+        <p:spPr/>
+        <p:txBody>
+          <a:bodyPr/>
+          <a:lstStyle/>
+          <a:p>
+            <a:endParaRPr lang="pt-BR"/>
+          </a:p>
+        </p:txBody>
+      </p:sp>
+      <p:pic>
+        <p:nvPicPr>
+          <p:cNvPr id="5" name="Imagem 4" descr="Uma imagem contendo Calendário&#10;&#10;Descrição gerada automaticamente">
+            <a:extLst>
+              <a:ext uri="{FF2B5EF4-FFF2-40B4-BE49-F238E27FC236}">
+                <a16:creationId xmlns:a16="http://schemas.microsoft.com/office/drawing/2014/main" id="{06CB20CA-390A-4132-88B1-0F9B3B3B3D2E}"/>
+              </a:ext>
+            </a:extLst>
+          </p:cNvPr>
+          <p:cNvPicPr>
+            <a:picLocks noChangeAspect="1"/>
+          </p:cNvPicPr>
+          <p:nvPr/>
+        </p:nvPicPr>
+        <p:blipFill>
+          <a:blip r:embed="rId2"/>
+          <a:stretch>
+            <a:fillRect/>
+          </a:stretch>
+        </p:blipFill>
+        <p:spPr>
+          <a:xfrm>
+            <a:off x="727814" y="1391273"/>
+            <a:ext cx="7688372" cy="3739154"/>
+          </a:xfrm>
+          <a:prstGeom prst="rect">
+            <a:avLst/>
+          </a:prstGeom>
+        </p:spPr>
+      </p:pic>
+    </p:spTree>
+    <p:extLst>
+      <p:ext uri="{BB962C8B-B14F-4D97-AF65-F5344CB8AC3E}">
+        <p14:creationId xmlns:p14="http://schemas.microsoft.com/office/powerpoint/2010/main" val="595693734"/>
+      </p:ext>
+    </p:extLst>
+  </p:cSld>
+  <p:clrMapOvr>
+    <a:masterClrMapping/>
+  </p:clrMapOvr>
+</p:sld>
+</file>
+
+<file path=ppt/slides/slide17.xml><?xml version="1.0" encoding="utf-8"?>
+<p:sld xmlns:a="http://schemas.openxmlformats.org/drawingml/2006/main" xmlns:r="http://schemas.openxmlformats.org/officeDocument/2006/relationships" xmlns:p="http://schemas.openxmlformats.org/presentationml/2006/main">
+  <p:cSld>
+    <p:spTree>
+      <p:nvGrpSpPr>
+        <p:cNvPr id="1" name=""/>
+        <p:cNvGrpSpPr/>
+        <p:nvPr/>
+      </p:nvGrpSpPr>
+      <p:grpSpPr>
+        <a:xfrm>
+          <a:off x="0" y="0"/>
+          <a:ext cx="0" cy="0"/>
+          <a:chOff x="0" y="0"/>
+          <a:chExt cx="0" cy="0"/>
+        </a:xfrm>
+      </p:grpSpPr>
+      <p:sp>
+        <p:nvSpPr>
+          <p:cNvPr id="2" name="Título 1">
+            <a:extLst>
+              <a:ext uri="{FF2B5EF4-FFF2-40B4-BE49-F238E27FC236}">
+                <a16:creationId xmlns:a16="http://schemas.microsoft.com/office/drawing/2014/main" id="{D779F1AA-F847-4CEB-AC4D-733F82223805}"/>
+              </a:ext>
+            </a:extLst>
+          </p:cNvPr>
+          <p:cNvSpPr>
+            <a:spLocks noGrp="1"/>
+          </p:cNvSpPr>
+          <p:nvPr>
+            <p:ph type="title"/>
+          </p:nvPr>
+        </p:nvSpPr>
+        <p:spPr/>
+        <p:txBody>
+          <a:bodyPr>
+            <a:normAutofit fontScale="90000"/>
+          </a:bodyPr>
+          <a:lstStyle/>
+          <a:p>
+            <a:r>
+              <a:rPr lang="pt-BR" dirty="0"/>
+              <a:t>CADIMA na prática – </a:t>
+            </a:r>
+            <a:br>
+              <a:rPr lang="pt-BR" dirty="0"/>
+            </a:br>
+            <a:r>
+              <a:rPr lang="pt-BR" dirty="0"/>
+              <a:t>Aplicando critérios no título</a:t>
+            </a:r>
+          </a:p>
+        </p:txBody>
+      </p:sp>
+      <p:sp>
+        <p:nvSpPr>
+          <p:cNvPr id="3" name="Espaço Reservado para Texto 2">
+            <a:extLst>
+              <a:ext uri="{FF2B5EF4-FFF2-40B4-BE49-F238E27FC236}">
+                <a16:creationId xmlns:a16="http://schemas.microsoft.com/office/drawing/2014/main" id="{B87EF6E7-5E6D-4429-A2BF-E4FD37721D7D}"/>
+              </a:ext>
+            </a:extLst>
+          </p:cNvPr>
+          <p:cNvSpPr>
+            <a:spLocks noGrp="1"/>
+          </p:cNvSpPr>
+          <p:nvPr>
+            <p:ph type="body" idx="1"/>
+          </p:nvPr>
+        </p:nvSpPr>
+        <p:spPr/>
+        <p:txBody>
+          <a:bodyPr/>
+          <a:lstStyle/>
+          <a:p>
+            <a:endParaRPr lang="pt-BR"/>
+          </a:p>
+        </p:txBody>
+      </p:sp>
+      <p:pic>
+        <p:nvPicPr>
+          <p:cNvPr id="7" name="Imagem 6" descr="Interface gráfica do usuário, Texto, Aplicativo, Email&#10;&#10;Descrição gerada automaticamente">
+            <a:extLst>
+              <a:ext uri="{FF2B5EF4-FFF2-40B4-BE49-F238E27FC236}">
+                <a16:creationId xmlns:a16="http://schemas.microsoft.com/office/drawing/2014/main" id="{563E98EE-36C3-4AD8-8CDA-40582E7657F7}"/>
+              </a:ext>
+            </a:extLst>
+          </p:cNvPr>
+          <p:cNvPicPr>
+            <a:picLocks noChangeAspect="1"/>
+          </p:cNvPicPr>
+          <p:nvPr/>
+        </p:nvPicPr>
+        <p:blipFill>
+          <a:blip r:embed="rId2"/>
+          <a:stretch>
+            <a:fillRect/>
+          </a:stretch>
+        </p:blipFill>
+        <p:spPr>
+          <a:xfrm>
+            <a:off x="743803" y="1418120"/>
+            <a:ext cx="7779224" cy="3725380"/>
+          </a:xfrm>
+          <a:prstGeom prst="rect">
+            <a:avLst/>
+          </a:prstGeom>
+        </p:spPr>
+      </p:pic>
+    </p:spTree>
+    <p:extLst>
+      <p:ext uri="{BB962C8B-B14F-4D97-AF65-F5344CB8AC3E}">
+        <p14:creationId xmlns:p14="http://schemas.microsoft.com/office/powerpoint/2010/main" val="1777527954"/>
+      </p:ext>
+    </p:extLst>
+  </p:cSld>
+  <p:clrMapOvr>
+    <a:masterClrMapping/>
+  </p:clrMapOvr>
+</p:sld>
+</file>
+
+<file path=ppt/slides/slide18.xml><?xml version="1.0" encoding="utf-8"?>
+<p:sld xmlns:a="http://schemas.openxmlformats.org/drawingml/2006/main" xmlns:r="http://schemas.openxmlformats.org/officeDocument/2006/relationships" xmlns:p="http://schemas.openxmlformats.org/presentationml/2006/main">
+  <p:cSld>
+    <p:spTree>
+      <p:nvGrpSpPr>
+        <p:cNvPr id="1" name=""/>
+        <p:cNvGrpSpPr/>
+        <p:nvPr/>
+      </p:nvGrpSpPr>
+      <p:grpSpPr>
+        <a:xfrm>
+          <a:off x="0" y="0"/>
+          <a:ext cx="0" cy="0"/>
+          <a:chOff x="0" y="0"/>
+          <a:chExt cx="0" cy="0"/>
+        </a:xfrm>
+      </p:grpSpPr>
+      <p:sp>
+        <p:nvSpPr>
+          <p:cNvPr id="2" name="Título 1">
+            <a:extLst>
+              <a:ext uri="{FF2B5EF4-FFF2-40B4-BE49-F238E27FC236}">
+                <a16:creationId xmlns:a16="http://schemas.microsoft.com/office/drawing/2014/main" id="{10B88F02-4667-49E3-8502-C40E778EF98C}"/>
+              </a:ext>
+            </a:extLst>
+          </p:cNvPr>
+          <p:cNvSpPr>
+            <a:spLocks noGrp="1"/>
+          </p:cNvSpPr>
+          <p:nvPr>
+            <p:ph type="title"/>
+          </p:nvPr>
+        </p:nvSpPr>
+        <p:spPr/>
+        <p:txBody>
+          <a:bodyPr/>
+          <a:lstStyle/>
+          <a:p>
+            <a:r>
+              <a:rPr lang="pt-BR" dirty="0"/>
+              <a:t>Resultados CADIMA</a:t>
+            </a:r>
+          </a:p>
+        </p:txBody>
+      </p:sp>
+      <p:sp>
+        <p:nvSpPr>
+          <p:cNvPr id="3" name="Espaço Reservado para Texto 2">
+            <a:extLst>
+              <a:ext uri="{FF2B5EF4-FFF2-40B4-BE49-F238E27FC236}">
+                <a16:creationId xmlns:a16="http://schemas.microsoft.com/office/drawing/2014/main" id="{EE4DDF1D-D49F-4238-BDFC-99A59521136E}"/>
+              </a:ext>
+            </a:extLst>
+          </p:cNvPr>
+          <p:cNvSpPr>
+            <a:spLocks noGrp="1"/>
+          </p:cNvSpPr>
+          <p:nvPr>
+            <p:ph type="body" idx="1"/>
+          </p:nvPr>
+        </p:nvSpPr>
+        <p:spPr/>
+        <p:txBody>
+          <a:bodyPr>
+            <a:normAutofit/>
+          </a:bodyPr>
+          <a:lstStyle/>
+          <a:p>
+            <a:r>
+              <a:rPr lang="pt-BR" dirty="0"/>
+              <a:t>CADIMA garante uma documentação completa de todo o processo de revisão</a:t>
+            </a:r>
+          </a:p>
+          <a:p>
+            <a:endParaRPr lang="pt-BR" dirty="0"/>
+          </a:p>
+          <a:p>
+            <a:pPr lvl="1"/>
+            <a:r>
+              <a:rPr lang="pt-BR" dirty="0"/>
+              <a:t>Protocolo da Revisão</a:t>
+            </a:r>
+          </a:p>
+          <a:p>
+            <a:pPr lvl="1"/>
+            <a:r>
+              <a:rPr lang="pt-BR" dirty="0"/>
+              <a:t>Artigo de Revisão Sistemática </a:t>
+            </a:r>
+          </a:p>
+          <a:p>
+            <a:endParaRPr lang="pt-BR" dirty="0"/>
+          </a:p>
+          <a:p>
+            <a:endParaRPr lang="pt-BR" dirty="0"/>
+          </a:p>
+          <a:p>
+            <a:endParaRPr lang="pt-BR" dirty="0"/>
+          </a:p>
+          <a:p>
+            <a:endParaRPr lang="pt-BR" dirty="0"/>
+          </a:p>
+        </p:txBody>
+      </p:sp>
+    </p:spTree>
+    <p:extLst>
+      <p:ext uri="{BB962C8B-B14F-4D97-AF65-F5344CB8AC3E}">
+        <p14:creationId xmlns:p14="http://schemas.microsoft.com/office/powerpoint/2010/main" val="1717494546"/>
+      </p:ext>
+    </p:extLst>
+  </p:cSld>
+  <p:clrMapOvr>
+    <a:masterClrMapping/>
+  </p:clrMapOvr>
+</p:sld>
+</file>
+
+<file path=ppt/slides/slide19.xml><?xml version="1.0" encoding="utf-8"?>
+<p:sld xmlns:a="http://schemas.openxmlformats.org/drawingml/2006/main" xmlns:r="http://schemas.openxmlformats.org/officeDocument/2006/relationships" xmlns:p="http://schemas.openxmlformats.org/presentationml/2006/main">
+  <p:cSld>
+    <p:spTree>
+      <p:nvGrpSpPr>
+        <p:cNvPr id="1" name=""/>
+        <p:cNvGrpSpPr/>
+        <p:nvPr/>
+      </p:nvGrpSpPr>
+      <p:grpSpPr>
+        <a:xfrm>
+          <a:off x="0" y="0"/>
+          <a:ext cx="0" cy="0"/>
+          <a:chOff x="0" y="0"/>
+          <a:chExt cx="0" cy="0"/>
+        </a:xfrm>
+      </p:grpSpPr>
+      <p:sp>
+        <p:nvSpPr>
+          <p:cNvPr id="2" name="Título 1">
+            <a:extLst>
+              <a:ext uri="{FF2B5EF4-FFF2-40B4-BE49-F238E27FC236}">
+                <a16:creationId xmlns:a16="http://schemas.microsoft.com/office/drawing/2014/main" id="{CE1335B8-A5CA-4310-901C-CC99D529A40D}"/>
+              </a:ext>
+            </a:extLst>
+          </p:cNvPr>
+          <p:cNvSpPr>
+            <a:spLocks noGrp="1"/>
+          </p:cNvSpPr>
+          <p:nvPr>
+            <p:ph type="title"/>
+          </p:nvPr>
+        </p:nvSpPr>
+        <p:spPr/>
+        <p:txBody>
+          <a:bodyPr/>
+          <a:lstStyle/>
+          <a:p>
+            <a:r>
+              <a:rPr lang="pt-BR" dirty="0"/>
+              <a:t>CADIMA - Diagrama de fluxo</a:t>
+            </a:r>
+          </a:p>
+        </p:txBody>
+      </p:sp>
+      <p:sp>
+        <p:nvSpPr>
+          <p:cNvPr id="3" name="Espaço Reservado para Texto 2">
+            <a:extLst>
+              <a:ext uri="{FF2B5EF4-FFF2-40B4-BE49-F238E27FC236}">
+                <a16:creationId xmlns:a16="http://schemas.microsoft.com/office/drawing/2014/main" id="{8C977624-7D71-4812-A4C5-8427577A51EA}"/>
+              </a:ext>
+            </a:extLst>
+          </p:cNvPr>
+          <p:cNvSpPr>
+            <a:spLocks noGrp="1"/>
+          </p:cNvSpPr>
+          <p:nvPr>
+            <p:ph type="body" idx="1"/>
+          </p:nvPr>
+        </p:nvSpPr>
+        <p:spPr/>
+        <p:txBody>
+          <a:bodyPr/>
+          <a:lstStyle/>
+          <a:p>
+            <a:endParaRPr lang="pt-BR" dirty="0"/>
+          </a:p>
+        </p:txBody>
+      </p:sp>
+      <p:pic>
+        <p:nvPicPr>
+          <p:cNvPr id="7" name="Imagem 6" descr="Interface gráfica do usuário&#10;&#10;Descrição gerada automaticamente">
+            <a:extLst>
+              <a:ext uri="{FF2B5EF4-FFF2-40B4-BE49-F238E27FC236}">
+                <a16:creationId xmlns:a16="http://schemas.microsoft.com/office/drawing/2014/main" id="{B93F3AD0-5ECB-4105-9F46-3779C15AFEFE}"/>
+              </a:ext>
+            </a:extLst>
+          </p:cNvPr>
+          <p:cNvPicPr>
+            <a:picLocks noChangeAspect="1"/>
+          </p:cNvPicPr>
+          <p:nvPr/>
+        </p:nvPicPr>
+        <p:blipFill>
+          <a:blip r:embed="rId2"/>
+          <a:stretch>
+            <a:fillRect/>
+          </a:stretch>
+        </p:blipFill>
+        <p:spPr>
+          <a:xfrm>
+            <a:off x="1251187" y="1178826"/>
+            <a:ext cx="6749024" cy="3713896"/>
+          </a:xfrm>
+          <a:prstGeom prst="rect">
+            <a:avLst/>
+          </a:prstGeom>
+        </p:spPr>
+      </p:pic>
+    </p:spTree>
+    <p:extLst>
+      <p:ext uri="{BB962C8B-B14F-4D97-AF65-F5344CB8AC3E}">
+        <p14:creationId xmlns:p14="http://schemas.microsoft.com/office/powerpoint/2010/main" val="3425323785"/>
+      </p:ext>
+    </p:extLst>
+  </p:cSld>
+  <p:clrMapOvr>
+    <a:masterClrMapping/>
+  </p:clrMapOvr>
+</p:sld>
+</file>
+
+<file path=ppt/slides/slide2.xml><?xml version="1.0" encoding="utf-8"?>
+<p:sld xmlns:a="http://schemas.openxmlformats.org/drawingml/2006/main" xmlns:r="http://schemas.openxmlformats.org/officeDocument/2006/relationships" xmlns:p="http://schemas.openxmlformats.org/presentationml/2006/main">
+  <p:cSld>
+    <p:spTree>
+      <p:nvGrpSpPr>
+        <p:cNvPr id="1" name="Shape 282"/>
+        <p:cNvGrpSpPr/>
+        <p:nvPr/>
+      </p:nvGrpSpPr>
+      <p:grpSpPr>
+        <a:xfrm>
+          <a:off x="0" y="0"/>
+          <a:ext cx="0" cy="0"/>
+          <a:chOff x="0" y="0"/>
+          <a:chExt cx="0" cy="0"/>
+        </a:xfrm>
+      </p:grpSpPr>
+      <p:sp>
+        <p:nvSpPr>
+          <p:cNvPr id="283" name="Google Shape;283;p14"/>
+          <p:cNvSpPr txBox="1">
+            <a:spLocks noGrp="1"/>
+          </p:cNvSpPr>
+          <p:nvPr>
+            <p:ph type="title"/>
+          </p:nvPr>
+        </p:nvSpPr>
+        <p:spPr>
+          <a:xfrm>
+            <a:off x="1303800" y="598575"/>
+            <a:ext cx="7030500" cy="999300"/>
+          </a:xfrm>
+        </p:spPr>
+        <p:txBody>
+          <a:bodyPr spcFirstLastPara="1" wrap="square" lIns="91425" tIns="91425" rIns="91425" bIns="91425" anchor="t" anchorCtr="0">
+            <a:normAutofit/>
+          </a:bodyPr>
+          <a:lstStyle/>
+          <a:p>
+            <a:pPr lvl="0"/>
+            <a:r>
+              <a:rPr lang="pt-BR" dirty="0"/>
+              <a:t>Revisão Sistemática</a:t>
+            </a:r>
+          </a:p>
+        </p:txBody>
+      </p:sp>
+      <p:sp>
+        <p:nvSpPr>
+          <p:cNvPr id="284" name="Google Shape;284;p14"/>
+          <p:cNvSpPr txBox="1">
+            <a:spLocks noGrp="1"/>
+          </p:cNvSpPr>
+          <p:nvPr>
+            <p:ph type="body" idx="1"/>
+          </p:nvPr>
+        </p:nvSpPr>
+        <p:spPr>
+          <a:xfrm>
+            <a:off x="1303800" y="1990050"/>
+            <a:ext cx="7030500" cy="2541600"/>
+          </a:xfrm>
+        </p:spPr>
+        <p:txBody>
+          <a:bodyPr spcFirstLastPara="1" wrap="square" lIns="91425" tIns="91425" rIns="91425" bIns="91425" anchor="t" anchorCtr="0">
+            <a:normAutofit/>
+          </a:bodyPr>
+          <a:lstStyle/>
+          <a:p>
+            <a:pPr lvl="0"/>
+            <a:r>
+              <a:rPr lang="pt-BR" dirty="0"/>
+              <a:t>“... é um método de síntese de evidências que avalia criticamente e interpreta todas as pesquisas relevantes disponíveis para uma questão particular, área do conhecimento ou fenômeno de interesse”.</a:t>
+            </a:r>
+          </a:p>
+          <a:p>
+            <a:pPr lvl="0"/>
+            <a:endParaRPr lang="pt-BR" dirty="0"/>
+          </a:p>
+          <a:p>
+            <a:pPr lvl="0"/>
+            <a:r>
+              <a:rPr lang="pt-BR" dirty="0"/>
+              <a:t>“Utiliza um processo de revisão de literatura abrangente, imparcial e reprodutível, que localiza, avalia e sintetiza o conjunto de evidências dos estudos científicos para obter uma visão geral e confiável da estimativa do efeito da intervenção”.</a:t>
+            </a:r>
+          </a:p>
+        </p:txBody>
+      </p:sp>
+      <p:sp>
+        <p:nvSpPr>
+          <p:cNvPr id="285" name="Google Shape;285;p14"/>
+          <p:cNvSpPr txBox="1"/>
+          <p:nvPr/>
+        </p:nvSpPr>
+        <p:spPr>
+          <a:xfrm>
+            <a:off x="7607776" y="3808129"/>
+            <a:ext cx="1453048" cy="353913"/>
+          </a:xfrm>
+          <a:prstGeom prst="rect">
+            <a:avLst/>
+          </a:prstGeom>
+          <a:noFill/>
+          <a:ln>
+            <a:noFill/>
+          </a:ln>
+        </p:spPr>
+        <p:txBody>
+          <a:bodyPr spcFirstLastPara="1" wrap="square" lIns="91425" tIns="91425" rIns="91425" bIns="91425" anchor="t" anchorCtr="0">
+            <a:spAutoFit/>
+          </a:bodyPr>
+          <a:lstStyle/>
+          <a:p>
+            <a:pPr marL="0" lvl="0" indent="0" algn="l" rtl="0">
+              <a:spcBef>
+                <a:spcPts val="0"/>
+              </a:spcBef>
+              <a:spcAft>
+                <a:spcPts val="0"/>
+              </a:spcAft>
+              <a:buNone/>
+            </a:pPr>
+            <a:r>
+              <a:rPr lang="pt-BR" sz="1100" dirty="0">
+                <a:solidFill>
+                  <a:srgbClr val="424242"/>
+                </a:solidFill>
+                <a:latin typeface="Nunito" panose="00000500000000000000" pitchFamily="2" charset="0"/>
+              </a:rPr>
+              <a:t>(Brasil, 2012) </a:t>
+            </a:r>
+            <a:endParaRPr sz="1100" dirty="0">
+              <a:solidFill>
+                <a:srgbClr val="424242"/>
+              </a:solidFill>
+              <a:latin typeface="Nunito" panose="00000500000000000000" pitchFamily="2" charset="0"/>
+            </a:endParaRPr>
+          </a:p>
+        </p:txBody>
+      </p:sp>
+    </p:spTree>
+  </p:cSld>
+  <p:clrMapOvr>
+    <a:masterClrMapping/>
+  </p:clrMapOvr>
+</p:sld>
+</file>
+
+<file path=ppt/slides/slide20.xml><?xml version="1.0" encoding="utf-8"?>
+<p:sld xmlns:a="http://schemas.openxmlformats.org/drawingml/2006/main" xmlns:r="http://schemas.openxmlformats.org/officeDocument/2006/relationships" xmlns:p="http://schemas.openxmlformats.org/presentationml/2006/main">
+  <p:cSld>
+    <p:spTree>
+      <p:nvGrpSpPr>
+        <p:cNvPr id="1" name=""/>
+        <p:cNvGrpSpPr/>
+        <p:nvPr/>
+      </p:nvGrpSpPr>
+      <p:grpSpPr>
+        <a:xfrm>
+          <a:off x="0" y="0"/>
+          <a:ext cx="0" cy="0"/>
+          <a:chOff x="0" y="0"/>
+          <a:chExt cx="0" cy="0"/>
+        </a:xfrm>
+      </p:grpSpPr>
+      <p:sp>
+        <p:nvSpPr>
+          <p:cNvPr id="2" name="Título 1">
+            <a:extLst>
+              <a:ext uri="{FF2B5EF4-FFF2-40B4-BE49-F238E27FC236}">
+                <a16:creationId xmlns:a16="http://schemas.microsoft.com/office/drawing/2014/main" id="{102C0FA0-50C3-4FD4-A5CA-C178788DD0B3}"/>
+              </a:ext>
+            </a:extLst>
+          </p:cNvPr>
+          <p:cNvSpPr>
+            <a:spLocks noGrp="1"/>
+          </p:cNvSpPr>
+          <p:nvPr>
+            <p:ph type="title"/>
+          </p:nvPr>
+        </p:nvSpPr>
+        <p:spPr/>
+        <p:txBody>
+          <a:bodyPr/>
+          <a:lstStyle/>
+          <a:p>
+            <a:r>
+              <a:rPr lang="pt-BR" dirty="0"/>
+              <a:t>CADIMA - Arquivos gerados</a:t>
+            </a:r>
+          </a:p>
+        </p:txBody>
+      </p:sp>
+      <p:sp>
+        <p:nvSpPr>
+          <p:cNvPr id="3" name="Espaço Reservado para Texto 2">
+            <a:extLst>
+              <a:ext uri="{FF2B5EF4-FFF2-40B4-BE49-F238E27FC236}">
+                <a16:creationId xmlns:a16="http://schemas.microsoft.com/office/drawing/2014/main" id="{48A99650-2EDB-4440-807E-33E41567E708}"/>
+              </a:ext>
+            </a:extLst>
+          </p:cNvPr>
+          <p:cNvSpPr>
+            <a:spLocks noGrp="1"/>
+          </p:cNvSpPr>
+          <p:nvPr>
+            <p:ph type="body" idx="1"/>
+          </p:nvPr>
+        </p:nvSpPr>
+        <p:spPr/>
+        <p:txBody>
+          <a:bodyPr/>
+          <a:lstStyle/>
+          <a:p>
+            <a:endParaRPr lang="pt-BR" dirty="0"/>
+          </a:p>
+        </p:txBody>
+      </p:sp>
+      <p:pic>
+        <p:nvPicPr>
+          <p:cNvPr id="5" name="Imagem 4" descr="Interface gráfica do usuário, Texto, Aplicativo, Email&#10;&#10;Descrição gerada automaticamente">
+            <a:extLst>
+              <a:ext uri="{FF2B5EF4-FFF2-40B4-BE49-F238E27FC236}">
+                <a16:creationId xmlns:a16="http://schemas.microsoft.com/office/drawing/2014/main" id="{1355091C-BAD0-4353-BFB7-B977A37479DA}"/>
+              </a:ext>
+            </a:extLst>
+          </p:cNvPr>
+          <p:cNvPicPr>
+            <a:picLocks noChangeAspect="1"/>
+          </p:cNvPicPr>
+          <p:nvPr/>
+        </p:nvPicPr>
+        <p:blipFill>
+          <a:blip r:embed="rId2"/>
+          <a:stretch>
+            <a:fillRect/>
+          </a:stretch>
+        </p:blipFill>
+        <p:spPr>
+          <a:xfrm>
+            <a:off x="232011" y="1597875"/>
+            <a:ext cx="8584442" cy="3332308"/>
+          </a:xfrm>
+          <a:prstGeom prst="rect">
+            <a:avLst/>
+          </a:prstGeom>
+        </p:spPr>
+      </p:pic>
+    </p:spTree>
+    <p:extLst>
+      <p:ext uri="{BB962C8B-B14F-4D97-AF65-F5344CB8AC3E}">
+        <p14:creationId xmlns:p14="http://schemas.microsoft.com/office/powerpoint/2010/main" val="2376732479"/>
+      </p:ext>
+    </p:extLst>
+  </p:cSld>
+  <p:clrMapOvr>
+    <a:masterClrMapping/>
+  </p:clrMapOvr>
+</p:sld>
+</file>
+
+<file path=ppt/slides/slide21.xml><?xml version="1.0" encoding="utf-8"?>
+<p:sld xmlns:a="http://schemas.openxmlformats.org/drawingml/2006/main" xmlns:r="http://schemas.openxmlformats.org/officeDocument/2006/relationships" xmlns:p="http://schemas.openxmlformats.org/presentationml/2006/main">
+  <p:cSld>
+    <p:spTree>
+      <p:nvGrpSpPr>
         <p:cNvPr id="1" name="Shape 367"/>
         <p:cNvGrpSpPr/>
         <p:nvPr/>
@@ -26380,154 +27812,6 @@
 </p:sld>
 </file>
 
-<file path=ppt/slides/slide2.xml><?xml version="1.0" encoding="utf-8"?>
-<p:sld xmlns:a="http://schemas.openxmlformats.org/drawingml/2006/main" xmlns:r="http://schemas.openxmlformats.org/officeDocument/2006/relationships" xmlns:p="http://schemas.openxmlformats.org/presentationml/2006/main">
-  <p:cSld>
-    <p:spTree>
-      <p:nvGrpSpPr>
-        <p:cNvPr id="1" name="Shape 282"/>
-        <p:cNvGrpSpPr/>
-        <p:nvPr/>
-      </p:nvGrpSpPr>
-      <p:grpSpPr>
-        <a:xfrm>
-          <a:off x="0" y="0"/>
-          <a:ext cx="0" cy="0"/>
-          <a:chOff x="0" y="0"/>
-          <a:chExt cx="0" cy="0"/>
-        </a:xfrm>
-      </p:grpSpPr>
-      <p:sp>
-        <p:nvSpPr>
-          <p:cNvPr id="283" name="Google Shape;283;p14"/>
-          <p:cNvSpPr txBox="1">
-            <a:spLocks noGrp="1"/>
-          </p:cNvSpPr>
-          <p:nvPr>
-            <p:ph type="title"/>
-          </p:nvPr>
-        </p:nvSpPr>
-        <p:spPr>
-          <a:xfrm>
-            <a:off x="1303800" y="598575"/>
-            <a:ext cx="7030500" cy="999300"/>
-          </a:xfrm>
-        </p:spPr>
-        <p:txBody>
-          <a:bodyPr spcFirstLastPara="1" wrap="square" lIns="91425" tIns="91425" rIns="91425" bIns="91425" anchor="t" anchorCtr="0">
-            <a:normAutofit/>
-          </a:bodyPr>
-          <a:lstStyle/>
-          <a:p>
-            <a:pPr lvl="0"/>
-            <a:r>
-              <a:rPr lang="pt-BR" dirty="0"/>
-              <a:t>Revisão Sistemática</a:t>
-            </a:r>
-          </a:p>
-        </p:txBody>
-      </p:sp>
-      <p:sp>
-        <p:nvSpPr>
-          <p:cNvPr id="284" name="Google Shape;284;p14"/>
-          <p:cNvSpPr txBox="1">
-            <a:spLocks noGrp="1"/>
-          </p:cNvSpPr>
-          <p:nvPr>
-            <p:ph type="body" idx="1"/>
-          </p:nvPr>
-        </p:nvSpPr>
-        <p:spPr>
-          <a:xfrm>
-            <a:off x="1303800" y="1990050"/>
-            <a:ext cx="7030500" cy="2541600"/>
-          </a:xfrm>
-        </p:spPr>
-        <p:txBody>
-          <a:bodyPr spcFirstLastPara="1" wrap="square" lIns="91425" tIns="91425" rIns="91425" bIns="91425" anchor="t" anchorCtr="0">
-            <a:normAutofit/>
-          </a:bodyPr>
-          <a:lstStyle/>
-          <a:p>
-            <a:pPr lvl="0"/>
-            <a:r>
-              <a:rPr lang="pt-BR" dirty="0"/>
-              <a:t>“... é um método de síntese de evidências que avalia criticamente e interpreta todas as pesquisas relevantes disponíveis para uma questão particular, área do conhecimento ou fenômeno de interesse”.</a:t>
-            </a:r>
-          </a:p>
-          <a:p>
-            <a:pPr lvl="0"/>
-            <a:endParaRPr lang="pt-BR" dirty="0"/>
-          </a:p>
-          <a:p>
-            <a:pPr lvl="0"/>
-            <a:r>
-              <a:rPr lang="pt-BR" dirty="0"/>
-              <a:t>“Utiliza um processo de revisão de literatura abrangente, imparcial e reprodutível, que localiza, avalia e sintetiza o conjunto de evidências dos estudos científicos para obter uma visão geral e confiável da estimativa do efeito da intervenção”.</a:t>
-            </a:r>
-          </a:p>
-        </p:txBody>
-      </p:sp>
-      <p:sp>
-        <p:nvSpPr>
-          <p:cNvPr id="285" name="Google Shape;285;p14"/>
-          <p:cNvSpPr txBox="1"/>
-          <p:nvPr/>
-        </p:nvSpPr>
-        <p:spPr>
-          <a:xfrm>
-            <a:off x="7607776" y="3808129"/>
-            <a:ext cx="1453048" cy="353913"/>
-          </a:xfrm>
-          <a:prstGeom prst="rect">
-            <a:avLst/>
-          </a:prstGeom>
-          <a:noFill/>
-          <a:ln>
-            <a:noFill/>
-          </a:ln>
-        </p:spPr>
-        <p:txBody>
-          <a:bodyPr spcFirstLastPara="1" wrap="square" lIns="91425" tIns="91425" rIns="91425" bIns="91425" anchor="t" anchorCtr="0">
-            <a:spAutoFit/>
-          </a:bodyPr>
-          <a:lstStyle/>
-          <a:p>
-            <a:pPr marL="0" lvl="0" indent="0" algn="l" rtl="0">
-              <a:spcBef>
-                <a:spcPts val="0"/>
-              </a:spcBef>
-              <a:spcAft>
-                <a:spcPts val="0"/>
-              </a:spcAft>
-              <a:buNone/>
-            </a:pPr>
-            <a:r>
-              <a:rPr lang="pt-BR" sz="1100" dirty="0">
-                <a:solidFill>
-                  <a:srgbClr val="424242"/>
-                </a:solidFill>
-                <a:latin typeface="Nunito" panose="00000500000000000000" pitchFamily="2" charset="0"/>
-              </a:rPr>
-              <a:t>(Brasil, 2012) </a:t>
-            </a:r>
-            <a:endParaRPr sz="1100" dirty="0">
-              <a:solidFill>
-                <a:srgbClr val="424242"/>
-              </a:solidFill>
-              <a:latin typeface="Nunito" panose="00000500000000000000" pitchFamily="2" charset="0"/>
-            </a:endParaRPr>
-          </a:p>
-        </p:txBody>
-      </p:sp>
-    </p:spTree>
-  </p:cSld>
-  <p:clrMapOvr>
-    <a:masterClrMapping/>
-  </p:clrMapOvr>
-</p:sld>
-</file>
-
 <file path=ppt/slides/slide3.xml><?xml version="1.0" encoding="utf-8"?>
 <p:sld xmlns:a="http://schemas.openxmlformats.org/drawingml/2006/main" xmlns:r="http://schemas.openxmlformats.org/officeDocument/2006/relationships" xmlns:p="http://schemas.openxmlformats.org/presentationml/2006/main">
   <p:cSld>
@@ -26906,10 +28190,10 @@
           <p:nvPr/>
         </p:nvPicPr>
         <p:blipFill>
-          <a:blip r:embed="rId2">
+          <a:blip r:embed="rId3">
             <a:extLst>
               <a:ext uri="{96DAC541-7B7A-43D3-8B79-37D633B846F1}">
-                <asvg:svgBlip xmlns:asvg="http://schemas.microsoft.com/office/drawing/2016/SVG/main" r:embed="rId3"/>
+                <asvg:svgBlip xmlns:asvg="http://schemas.microsoft.com/office/drawing/2016/SVG/main" r:embed="rId4"/>
               </a:ext>
             </a:extLst>
           </a:blip>
@@ -27165,7 +28449,7 @@
         </p:nvGrpSpPr>
         <p:grpSpPr>
           <a:xfrm>
-            <a:off x="5503030" y="3711617"/>
+            <a:off x="5503030" y="3574925"/>
             <a:ext cx="1555050" cy="1368601"/>
             <a:chOff x="332936" y="2412323"/>
             <a:chExt cx="2975111" cy="2644371"/>

</xml_diff>

<commit_message>
Melhorei alguns prints e inserção de mais alguns slides.
</commit_message>
<xml_diff>
--- a/apresentacao-revisao-sistematica.pptx
+++ b/apresentacao-revisao-sistematica.pptx
@@ -5,7 +5,7 @@
     <p:sldMasterId id="2147483659" r:id="rId1"/>
   </p:sldMasterIdLst>
   <p:notesMasterIdLst>
-    <p:notesMasterId r:id="rId23"/>
+    <p:notesMasterId r:id="rId26"/>
   </p:notesMasterIdLst>
   <p:sldIdLst>
     <p:sldId id="256" r:id="rId2"/>
@@ -18,32 +18,35 @@
     <p:sldId id="267" r:id="rId9"/>
     <p:sldId id="273" r:id="rId10"/>
     <p:sldId id="276" r:id="rId11"/>
-    <p:sldId id="278" r:id="rId12"/>
-    <p:sldId id="279" r:id="rId13"/>
-    <p:sldId id="280" r:id="rId14"/>
-    <p:sldId id="281" r:id="rId15"/>
-    <p:sldId id="282" r:id="rId16"/>
-    <p:sldId id="283" r:id="rId17"/>
-    <p:sldId id="285" r:id="rId18"/>
-    <p:sldId id="277" r:id="rId19"/>
-    <p:sldId id="286" r:id="rId20"/>
-    <p:sldId id="287" r:id="rId21"/>
-    <p:sldId id="270" r:id="rId22"/>
+    <p:sldId id="291" r:id="rId12"/>
+    <p:sldId id="290" r:id="rId13"/>
+    <p:sldId id="278" r:id="rId14"/>
+    <p:sldId id="279" r:id="rId15"/>
+    <p:sldId id="280" r:id="rId16"/>
+    <p:sldId id="281" r:id="rId17"/>
+    <p:sldId id="282" r:id="rId18"/>
+    <p:sldId id="288" r:id="rId19"/>
+    <p:sldId id="283" r:id="rId20"/>
+    <p:sldId id="285" r:id="rId21"/>
+    <p:sldId id="277" r:id="rId22"/>
+    <p:sldId id="286" r:id="rId23"/>
+    <p:sldId id="287" r:id="rId24"/>
+    <p:sldId id="270" r:id="rId25"/>
   </p:sldIdLst>
   <p:sldSz cx="9144000" cy="5143500" type="screen16x9"/>
   <p:notesSz cx="6858000" cy="9144000"/>
   <p:embeddedFontLst>
     <p:embeddedFont>
       <p:font typeface="Maven Pro" panose="020B0604020202020204" charset="0"/>
-      <p:regular r:id="rId24"/>
-      <p:bold r:id="rId25"/>
+      <p:regular r:id="rId27"/>
+      <p:bold r:id="rId28"/>
     </p:embeddedFont>
     <p:embeddedFont>
       <p:font typeface="Nunito" panose="00000500000000000000" pitchFamily="2" charset="0"/>
-      <p:regular r:id="rId26"/>
-      <p:bold r:id="rId27"/>
-      <p:italic r:id="rId28"/>
-      <p:boldItalic r:id="rId29"/>
+      <p:regular r:id="rId29"/>
+      <p:bold r:id="rId30"/>
+      <p:italic r:id="rId31"/>
+      <p:boldItalic r:id="rId32"/>
     </p:embeddedFont>
   </p:embeddedFontLst>
   <p:defaultTextStyle>
@@ -3578,10 +3581,10 @@
         <a:lstStyle/>
         <a:p>
           <a:r>
-            <a:rPr lang="pt-BR" b="0" i="0"/>
+            <a:rPr lang="pt-BR" b="0" i="0" dirty="0"/>
             <a:t>RevMan5</a:t>
           </a:r>
-          <a:endParaRPr lang="pt-BR"/>
+          <a:endParaRPr lang="pt-BR" dirty="0"/>
         </a:p>
       </dgm:t>
     </dgm:pt>
@@ -4914,10 +4917,10 @@
             <a:buNone/>
           </a:pPr>
           <a:r>
-            <a:rPr lang="pt-BR" sz="2800" b="0" i="0" kern="1200"/>
+            <a:rPr lang="pt-BR" sz="2800" b="0" i="0" kern="1200" dirty="0"/>
             <a:t>RevMan5</a:t>
           </a:r>
-          <a:endParaRPr lang="pt-BR" sz="2800" kern="1200"/>
+          <a:endParaRPr lang="pt-BR" sz="2800" kern="1200" dirty="0"/>
         </a:p>
       </dsp:txBody>
       <dsp:txXfrm>
@@ -11094,6 +11097,415 @@
 </p:notes>
 </file>
 
+<file path=ppt/notesSlides/notesSlide10.xml><?xml version="1.0" encoding="utf-8"?>
+<p:notes xmlns:a="http://schemas.openxmlformats.org/drawingml/2006/main" xmlns:r="http://schemas.openxmlformats.org/officeDocument/2006/relationships" xmlns:p="http://schemas.openxmlformats.org/presentationml/2006/main">
+  <p:cSld>
+    <p:spTree>
+      <p:nvGrpSpPr>
+        <p:cNvPr id="1" name=""/>
+        <p:cNvGrpSpPr/>
+        <p:nvPr/>
+      </p:nvGrpSpPr>
+      <p:grpSpPr>
+        <a:xfrm>
+          <a:off x="0" y="0"/>
+          <a:ext cx="0" cy="0"/>
+          <a:chOff x="0" y="0"/>
+          <a:chExt cx="0" cy="0"/>
+        </a:xfrm>
+      </p:grpSpPr>
+      <p:sp>
+        <p:nvSpPr>
+          <p:cNvPr id="2" name="Espaço Reservado para Imagem de Slide 1"/>
+          <p:cNvSpPr>
+            <a:spLocks noGrp="1" noRot="1" noChangeAspect="1"/>
+          </p:cNvSpPr>
+          <p:nvPr>
+            <p:ph type="sldImg"/>
+          </p:nvPr>
+        </p:nvSpPr>
+        <p:spPr>
+          <a:xfrm>
+            <a:off x="381000" y="685800"/>
+            <a:ext cx="6096000" cy="3429000"/>
+          </a:xfrm>
+        </p:spPr>
+      </p:sp>
+      <p:sp>
+        <p:nvSpPr>
+          <p:cNvPr id="3" name="Espaço Reservado para Anotações 2"/>
+          <p:cNvSpPr>
+            <a:spLocks noGrp="1"/>
+          </p:cNvSpPr>
+          <p:nvPr>
+            <p:ph type="body" idx="1"/>
+          </p:nvPr>
+        </p:nvSpPr>
+        <p:spPr/>
+        <p:txBody>
+          <a:bodyPr/>
+          <a:lstStyle/>
+          <a:p>
+            <a:pPr marL="158750" indent="0">
+              <a:buNone/>
+            </a:pPr>
+            <a:r>
+              <a:rPr lang="pt-BR" dirty="0"/>
+              <a:t>Especificar os critérios de seleção a serem aplicados durante o processo de </a:t>
+            </a:r>
+            <a:r>
+              <a:rPr lang="pt-BR" dirty="0" err="1"/>
+              <a:t>screening</a:t>
+            </a:r>
+            <a:r>
+              <a:rPr lang="pt-BR" dirty="0"/>
+              <a:t>. </a:t>
+            </a:r>
+          </a:p>
+        </p:txBody>
+      </p:sp>
+    </p:spTree>
+    <p:extLst>
+      <p:ext uri="{BB962C8B-B14F-4D97-AF65-F5344CB8AC3E}">
+        <p14:creationId xmlns:p14="http://schemas.microsoft.com/office/powerpoint/2010/main" val="290890125"/>
+      </p:ext>
+    </p:extLst>
+  </p:cSld>
+  <p:clrMapOvr>
+    <a:masterClrMapping/>
+  </p:clrMapOvr>
+</p:notes>
+</file>
+
+<file path=ppt/notesSlides/notesSlide11.xml><?xml version="1.0" encoding="utf-8"?>
+<p:notes xmlns:a="http://schemas.openxmlformats.org/drawingml/2006/main" xmlns:r="http://schemas.openxmlformats.org/officeDocument/2006/relationships" xmlns:p="http://schemas.openxmlformats.org/presentationml/2006/main">
+  <p:cSld>
+    <p:spTree>
+      <p:nvGrpSpPr>
+        <p:cNvPr id="1" name=""/>
+        <p:cNvGrpSpPr/>
+        <p:nvPr/>
+      </p:nvGrpSpPr>
+      <p:grpSpPr>
+        <a:xfrm>
+          <a:off x="0" y="0"/>
+          <a:ext cx="0" cy="0"/>
+          <a:chOff x="0" y="0"/>
+          <a:chExt cx="0" cy="0"/>
+        </a:xfrm>
+      </p:grpSpPr>
+      <p:sp>
+        <p:nvSpPr>
+          <p:cNvPr id="2" name="Espaço Reservado para Imagem de Slide 1"/>
+          <p:cNvSpPr>
+            <a:spLocks noGrp="1" noRot="1" noChangeAspect="1"/>
+          </p:cNvSpPr>
+          <p:nvPr>
+            <p:ph type="sldImg"/>
+          </p:nvPr>
+        </p:nvSpPr>
+        <p:spPr>
+          <a:xfrm>
+            <a:off x="381000" y="685800"/>
+            <a:ext cx="6096000" cy="3429000"/>
+          </a:xfrm>
+        </p:spPr>
+      </p:sp>
+      <p:sp>
+        <p:nvSpPr>
+          <p:cNvPr id="3" name="Espaço Reservado para Anotações 2"/>
+          <p:cNvSpPr>
+            <a:spLocks noGrp="1"/>
+          </p:cNvSpPr>
+          <p:nvPr>
+            <p:ph type="body" idx="1"/>
+          </p:nvPr>
+        </p:nvSpPr>
+        <p:spPr/>
+        <p:txBody>
+          <a:bodyPr/>
+          <a:lstStyle/>
+          <a:p>
+            <a:endParaRPr lang="pt-BR" dirty="0"/>
+          </a:p>
+        </p:txBody>
+      </p:sp>
+    </p:spTree>
+    <p:extLst>
+      <p:ext uri="{BB962C8B-B14F-4D97-AF65-F5344CB8AC3E}">
+        <p14:creationId xmlns:p14="http://schemas.microsoft.com/office/powerpoint/2010/main" val="3747805521"/>
+      </p:ext>
+    </p:extLst>
+  </p:cSld>
+  <p:clrMapOvr>
+    <a:masterClrMapping/>
+  </p:clrMapOvr>
+</p:notes>
+</file>
+
+<file path=ppt/notesSlides/notesSlide12.xml><?xml version="1.0" encoding="utf-8"?>
+<p:notes xmlns:a="http://schemas.openxmlformats.org/drawingml/2006/main" xmlns:r="http://schemas.openxmlformats.org/officeDocument/2006/relationships" xmlns:p="http://schemas.openxmlformats.org/presentationml/2006/main">
+  <p:cSld>
+    <p:spTree>
+      <p:nvGrpSpPr>
+        <p:cNvPr id="1" name=""/>
+        <p:cNvGrpSpPr/>
+        <p:nvPr/>
+      </p:nvGrpSpPr>
+      <p:grpSpPr>
+        <a:xfrm>
+          <a:off x="0" y="0"/>
+          <a:ext cx="0" cy="0"/>
+          <a:chOff x="0" y="0"/>
+          <a:chExt cx="0" cy="0"/>
+        </a:xfrm>
+      </p:grpSpPr>
+      <p:sp>
+        <p:nvSpPr>
+          <p:cNvPr id="2" name="Espaço Reservado para Imagem de Slide 1"/>
+          <p:cNvSpPr>
+            <a:spLocks noGrp="1" noRot="1" noChangeAspect="1"/>
+          </p:cNvSpPr>
+          <p:nvPr>
+            <p:ph type="sldImg"/>
+          </p:nvPr>
+        </p:nvSpPr>
+        <p:spPr>
+          <a:xfrm>
+            <a:off x="381000" y="685800"/>
+            <a:ext cx="6096000" cy="3429000"/>
+          </a:xfrm>
+        </p:spPr>
+      </p:sp>
+      <p:sp>
+        <p:nvSpPr>
+          <p:cNvPr id="3" name="Espaço Reservado para Anotações 2"/>
+          <p:cNvSpPr>
+            <a:spLocks noGrp="1"/>
+          </p:cNvSpPr>
+          <p:nvPr>
+            <p:ph type="body" idx="1"/>
+          </p:nvPr>
+        </p:nvSpPr>
+        <p:spPr/>
+        <p:txBody>
+          <a:bodyPr/>
+          <a:lstStyle/>
+          <a:p>
+            <a:pPr marL="158750" indent="0">
+              <a:buNone/>
+            </a:pPr>
+            <a:r>
+              <a:rPr lang="pt-BR" dirty="0"/>
+              <a:t>Teste de concordância usado para medir a confiabilidade entre os avaliadores para itens qualitativos. Quanto mais próximo de 1, maior o indicativo de que existe concordância entre os avaliadores e quanto mais próximo de zero, indicativo de que a concordância é puramente aleatória. </a:t>
+            </a:r>
+          </a:p>
+          <a:p>
+            <a:pPr marL="158750" indent="0">
+              <a:buNone/>
+            </a:pPr>
+            <a:r>
+              <a:rPr lang="pt-BR" dirty="0"/>
+              <a:t>Interpretação: menor que 1 – insignificante </a:t>
+            </a:r>
+          </a:p>
+          <a:p>
+            <a:pPr marL="158750" indent="0">
+              <a:buNone/>
+            </a:pPr>
+            <a:endParaRPr lang="pt-BR" dirty="0"/>
+          </a:p>
+        </p:txBody>
+      </p:sp>
+    </p:spTree>
+    <p:extLst>
+      <p:ext uri="{BB962C8B-B14F-4D97-AF65-F5344CB8AC3E}">
+        <p14:creationId xmlns:p14="http://schemas.microsoft.com/office/powerpoint/2010/main" val="2490895685"/>
+      </p:ext>
+    </p:extLst>
+  </p:cSld>
+  <p:clrMapOvr>
+    <a:masterClrMapping/>
+  </p:clrMapOvr>
+</p:notes>
+</file>
+
+<file path=ppt/notesSlides/notesSlide13.xml><?xml version="1.0" encoding="utf-8"?>
+<p:notes xmlns:a="http://schemas.openxmlformats.org/drawingml/2006/main" xmlns:r="http://schemas.openxmlformats.org/officeDocument/2006/relationships" xmlns:p="http://schemas.openxmlformats.org/presentationml/2006/main">
+  <p:cSld>
+    <p:spTree>
+      <p:nvGrpSpPr>
+        <p:cNvPr id="1" name=""/>
+        <p:cNvGrpSpPr/>
+        <p:nvPr/>
+      </p:nvGrpSpPr>
+      <p:grpSpPr>
+        <a:xfrm>
+          <a:off x="0" y="0"/>
+          <a:ext cx="0" cy="0"/>
+          <a:chOff x="0" y="0"/>
+          <a:chExt cx="0" cy="0"/>
+        </a:xfrm>
+      </p:grpSpPr>
+      <p:sp>
+        <p:nvSpPr>
+          <p:cNvPr id="2" name="Espaço Reservado para Imagem de Slide 1"/>
+          <p:cNvSpPr>
+            <a:spLocks noGrp="1" noRot="1" noChangeAspect="1"/>
+          </p:cNvSpPr>
+          <p:nvPr>
+            <p:ph type="sldImg"/>
+          </p:nvPr>
+        </p:nvSpPr>
+        <p:spPr>
+          <a:xfrm>
+            <a:off x="381000" y="685800"/>
+            <a:ext cx="6096000" cy="3429000"/>
+          </a:xfrm>
+        </p:spPr>
+      </p:sp>
+      <p:sp>
+        <p:nvSpPr>
+          <p:cNvPr id="3" name="Espaço Reservado para Anotações 2"/>
+          <p:cNvSpPr>
+            <a:spLocks noGrp="1"/>
+          </p:cNvSpPr>
+          <p:nvPr>
+            <p:ph type="body" idx="1"/>
+          </p:nvPr>
+        </p:nvSpPr>
+        <p:spPr/>
+        <p:txBody>
+          <a:bodyPr/>
+          <a:lstStyle/>
+          <a:p>
+            <a:pPr marL="158750" indent="0">
+              <a:buNone/>
+            </a:pPr>
+            <a:r>
+              <a:rPr lang="pt-BR" dirty="0"/>
+              <a:t>Fluxograma resumindo o processo de seleção do estudo, satisfazendo os padrões PRISMA</a:t>
+            </a:r>
+          </a:p>
+        </p:txBody>
+      </p:sp>
+    </p:spTree>
+    <p:extLst>
+      <p:ext uri="{BB962C8B-B14F-4D97-AF65-F5344CB8AC3E}">
+        <p14:creationId xmlns:p14="http://schemas.microsoft.com/office/powerpoint/2010/main" val="2840449654"/>
+      </p:ext>
+    </p:extLst>
+  </p:cSld>
+  <p:clrMapOvr>
+    <a:masterClrMapping/>
+  </p:clrMapOvr>
+</p:notes>
+</file>
+
+<file path=ppt/notesSlides/notesSlide14.xml><?xml version="1.0" encoding="utf-8"?>
+<p:notes xmlns:a="http://schemas.openxmlformats.org/drawingml/2006/main" xmlns:r="http://schemas.openxmlformats.org/officeDocument/2006/relationships" xmlns:p="http://schemas.openxmlformats.org/presentationml/2006/main" showMasterSp="0" showMasterPhAnim="0">
+  <p:cSld>
+    <p:spTree>
+      <p:nvGrpSpPr>
+        <p:cNvPr id="1" name="Shape 364"/>
+        <p:cNvGrpSpPr/>
+        <p:nvPr/>
+      </p:nvGrpSpPr>
+      <p:grpSpPr>
+        <a:xfrm>
+          <a:off x="0" y="0"/>
+          <a:ext cx="0" cy="0"/>
+          <a:chOff x="0" y="0"/>
+          <a:chExt cx="0" cy="0"/>
+        </a:xfrm>
+      </p:grpSpPr>
+      <p:sp>
+        <p:nvSpPr>
+          <p:cNvPr id="365" name="Google Shape;365;ge9c08f9734_1_51:notes"/>
+          <p:cNvSpPr>
+            <a:spLocks noGrp="1" noRot="1" noChangeAspect="1"/>
+          </p:cNvSpPr>
+          <p:nvPr>
+            <p:ph type="sldImg" idx="2"/>
+          </p:nvPr>
+        </p:nvSpPr>
+        <p:spPr>
+          <a:xfrm>
+            <a:off x="381000" y="685800"/>
+            <a:ext cx="6096000" cy="3429000"/>
+          </a:xfrm>
+          <a:custGeom>
+            <a:avLst/>
+            <a:gdLst/>
+            <a:ahLst/>
+            <a:cxnLst/>
+            <a:rect l="l" t="t" r="r" b="b"/>
+            <a:pathLst>
+              <a:path w="120000" h="120000" extrusionOk="0">
+                <a:moveTo>
+                  <a:pt x="0" y="0"/>
+                </a:moveTo>
+                <a:lnTo>
+                  <a:pt x="120000" y="0"/>
+                </a:lnTo>
+                <a:lnTo>
+                  <a:pt x="120000" y="120000"/>
+                </a:lnTo>
+                <a:lnTo>
+                  <a:pt x="0" y="120000"/>
+                </a:lnTo>
+                <a:close/>
+              </a:path>
+            </a:pathLst>
+          </a:custGeom>
+        </p:spPr>
+      </p:sp>
+      <p:sp>
+        <p:nvSpPr>
+          <p:cNvPr id="366" name="Google Shape;366;ge9c08f9734_1_51:notes"/>
+          <p:cNvSpPr txBox="1">
+            <a:spLocks noGrp="1"/>
+          </p:cNvSpPr>
+          <p:nvPr>
+            <p:ph type="body" idx="1"/>
+          </p:nvPr>
+        </p:nvSpPr>
+        <p:spPr>
+          <a:xfrm>
+            <a:off x="685800" y="4343400"/>
+            <a:ext cx="5486400" cy="4114800"/>
+          </a:xfrm>
+          <a:prstGeom prst="rect">
+            <a:avLst/>
+          </a:prstGeom>
+        </p:spPr>
+        <p:txBody>
+          <a:bodyPr spcFirstLastPara="1" wrap="square" lIns="91425" tIns="91425" rIns="91425" bIns="91425" anchor="t" anchorCtr="0">
+            <a:noAutofit/>
+          </a:bodyPr>
+          <a:lstStyle/>
+          <a:p>
+            <a:pPr marL="0" lvl="0" indent="0" algn="l" rtl="0">
+              <a:spcBef>
+                <a:spcPts val="0"/>
+              </a:spcBef>
+              <a:spcAft>
+                <a:spcPts val="0"/>
+              </a:spcAft>
+              <a:buNone/>
+            </a:pPr>
+            <a:endParaRPr dirty="0"/>
+          </a:p>
+        </p:txBody>
+      </p:sp>
+    </p:spTree>
+  </p:cSld>
+  <p:clrMapOvr>
+    <a:masterClrMapping/>
+  </p:clrMapOvr>
+</p:notes>
+</file>
+
 <file path=ppt/notesSlides/notesSlide2.xml><?xml version="1.0" encoding="utf-8"?>
 <p:notes xmlns:a="http://schemas.openxmlformats.org/drawingml/2006/main" xmlns:r="http://schemas.openxmlformats.org/officeDocument/2006/relationships" xmlns:p="http://schemas.openxmlformats.org/presentationml/2006/main" showMasterSp="0" showMasterPhAnim="0">
   <p:cSld>
@@ -11445,7 +11857,12 @@
             <p:ph type="sldImg"/>
           </p:nvPr>
         </p:nvSpPr>
-        <p:spPr/>
+        <p:spPr>
+          <a:xfrm>
+            <a:off x="381000" y="685800"/>
+            <a:ext cx="6096000" cy="3429000"/>
+          </a:xfrm>
+        </p:spPr>
       </p:sp>
       <p:sp>
         <p:nvSpPr>
@@ -11527,75 +11944,6 @@
         <p:txBody>
           <a:bodyPr/>
           <a:lstStyle/>
-          <a:p>
-            <a:pPr marL="158750" marR="0" lvl="0" indent="0" algn="l" defTabSz="914400" rtl="0" eaLnBrk="1" fontAlgn="auto" latinLnBrk="0" hangingPunct="1">
-              <a:lnSpc>
-                <a:spcPct val="100000"/>
-              </a:lnSpc>
-              <a:spcBef>
-                <a:spcPts val="0"/>
-              </a:spcBef>
-              <a:spcAft>
-                <a:spcPts val="0"/>
-              </a:spcAft>
-              <a:buClr>
-                <a:srgbClr val="000000"/>
-              </a:buClr>
-              <a:buSzPts val="1100"/>
-              <a:buFont typeface="Arial"/>
-              <a:buNone/>
-              <a:tabLst/>
-              <a:defRPr/>
-            </a:pPr>
-            <a:r>
-              <a:rPr lang="pt-BR" sz="1100" dirty="0" err="1">
-                <a:solidFill>
-                  <a:srgbClr val="333333"/>
-                </a:solidFill>
-              </a:rPr>
-              <a:t>Covidence</a:t>
-            </a:r>
-            <a:r>
-              <a:rPr lang="pt-BR" sz="1100" dirty="0">
-                <a:solidFill>
-                  <a:srgbClr val="333333"/>
-                </a:solidFill>
-              </a:rPr>
-              <a:t> e EPPI-</a:t>
-            </a:r>
-            <a:r>
-              <a:rPr lang="pt-BR" sz="1100" dirty="0" err="1">
-                <a:solidFill>
-                  <a:srgbClr val="333333"/>
-                </a:solidFill>
-              </a:rPr>
-              <a:t>Reviewer</a:t>
-            </a:r>
-            <a:r>
-              <a:rPr lang="pt-BR" sz="1100" dirty="0">
-                <a:solidFill>
-                  <a:srgbClr val="333333"/>
-                </a:solidFill>
-              </a:rPr>
-              <a:t> são as ferramentas preferidas da Cochrane e provavelmente têm a integração mais forte com o </a:t>
-            </a:r>
-            <a:r>
-              <a:rPr lang="pt-BR" sz="1100" dirty="0" err="1">
-                <a:solidFill>
-                  <a:srgbClr val="333333"/>
-                </a:solidFill>
-              </a:rPr>
-              <a:t>RevMan</a:t>
-            </a:r>
-            <a:r>
-              <a:rPr lang="pt-BR" sz="1100" dirty="0">
-                <a:solidFill>
-                  <a:srgbClr val="333333"/>
-                </a:solidFill>
-              </a:rPr>
-              <a:t>.</a:t>
-            </a:r>
-          </a:p>
           <a:p>
             <a:endParaRPr lang="pt-BR" dirty="0"/>
           </a:p>
@@ -11740,6 +12088,75 @@
             </a:endParaRPr>
           </a:p>
           <a:p>
+            <a:pPr marL="0" marR="0" lvl="0" indent="0" algn="l" defTabSz="914400" rtl="0" eaLnBrk="1" fontAlgn="auto" latinLnBrk="0" hangingPunct="1">
+              <a:lnSpc>
+                <a:spcPct val="100000"/>
+              </a:lnSpc>
+              <a:spcBef>
+                <a:spcPts val="0"/>
+              </a:spcBef>
+              <a:spcAft>
+                <a:spcPts val="0"/>
+              </a:spcAft>
+              <a:buClr>
+                <a:srgbClr val="000000"/>
+              </a:buClr>
+              <a:buSzPts val="1100"/>
+              <a:buFont typeface="Arial"/>
+              <a:buNone/>
+              <a:tabLst/>
+              <a:defRPr/>
+            </a:pPr>
+            <a:r>
+              <a:rPr lang="pt-BR" sz="1100" dirty="0" err="1">
+                <a:solidFill>
+                  <a:srgbClr val="333333"/>
+                </a:solidFill>
+              </a:rPr>
+              <a:t>Covidence</a:t>
+            </a:r>
+            <a:r>
+              <a:rPr lang="pt-BR" sz="1100" dirty="0">
+                <a:solidFill>
+                  <a:srgbClr val="333333"/>
+                </a:solidFill>
+              </a:rPr>
+              <a:t> e EPPI-</a:t>
+            </a:r>
+            <a:r>
+              <a:rPr lang="pt-BR" sz="1100" dirty="0" err="1">
+                <a:solidFill>
+                  <a:srgbClr val="333333"/>
+                </a:solidFill>
+              </a:rPr>
+              <a:t>Reviewer</a:t>
+            </a:r>
+            <a:r>
+              <a:rPr lang="pt-BR" sz="1100" dirty="0">
+                <a:solidFill>
+                  <a:srgbClr val="333333"/>
+                </a:solidFill>
+              </a:rPr>
+              <a:t> são as ferramentas preferidas da Cochrane e provavelmente têm a integração mais forte com o </a:t>
+            </a:r>
+            <a:r>
+              <a:rPr lang="pt-BR" sz="1100" dirty="0" err="1">
+                <a:solidFill>
+                  <a:srgbClr val="333333"/>
+                </a:solidFill>
+              </a:rPr>
+              <a:t>RevMan</a:t>
+            </a:r>
+            <a:r>
+              <a:rPr lang="pt-BR" sz="1100" dirty="0">
+                <a:solidFill>
+                  <a:srgbClr val="333333"/>
+                </a:solidFill>
+              </a:rPr>
+              <a:t>.</a:t>
+            </a:r>
+          </a:p>
+          <a:p>
             <a:pPr marL="0" lvl="0" indent="0" algn="l" rtl="0">
               <a:spcBef>
                 <a:spcPts val="0"/>
@@ -11843,11 +12260,11 @@
 </file>
 
 <file path=ppt/notesSlides/notesSlide9.xml><?xml version="1.0" encoding="utf-8"?>
-<p:notes xmlns:a="http://schemas.openxmlformats.org/drawingml/2006/main" xmlns:r="http://schemas.openxmlformats.org/officeDocument/2006/relationships" xmlns:p="http://schemas.openxmlformats.org/presentationml/2006/main" showMasterSp="0" showMasterPhAnim="0">
+<p:notes xmlns:a="http://schemas.openxmlformats.org/drawingml/2006/main" xmlns:r="http://schemas.openxmlformats.org/officeDocument/2006/relationships" xmlns:p="http://schemas.openxmlformats.org/presentationml/2006/main">
   <p:cSld>
     <p:spTree>
       <p:nvGrpSpPr>
-        <p:cNvPr id="1" name="Shape 364"/>
+        <p:cNvPr id="1" name=""/>
         <p:cNvGrpSpPr/>
         <p:nvPr/>
       </p:nvGrpSpPr>
@@ -11861,12 +12278,12 @@
       </p:grpSpPr>
       <p:sp>
         <p:nvSpPr>
-          <p:cNvPr id="365" name="Google Shape;365;ge9c08f9734_1_51:notes"/>
+          <p:cNvPr id="2" name="Espaço Reservado para Imagem de Slide 1"/>
           <p:cNvSpPr>
             <a:spLocks noGrp="1" noRot="1" noChangeAspect="1"/>
           </p:cNvSpPr>
           <p:nvPr>
-            <p:ph type="sldImg" idx="2"/>
+            <p:ph type="sldImg"/>
           </p:nvPr>
         </p:nvSpPr>
         <p:spPr>
@@ -11874,71 +12291,61 @@
             <a:off x="381000" y="685800"/>
             <a:ext cx="6096000" cy="3429000"/>
           </a:xfrm>
-          <a:custGeom>
-            <a:avLst/>
-            <a:gdLst/>
-            <a:ahLst/>
-            <a:cxnLst/>
-            <a:rect l="l" t="t" r="r" b="b"/>
-            <a:pathLst>
-              <a:path w="120000" h="120000" extrusionOk="0">
-                <a:moveTo>
-                  <a:pt x="0" y="0"/>
-                </a:moveTo>
-                <a:lnTo>
-                  <a:pt x="120000" y="0"/>
-                </a:lnTo>
-                <a:lnTo>
-                  <a:pt x="120000" y="120000"/>
-                </a:lnTo>
-                <a:lnTo>
-                  <a:pt x="0" y="120000"/>
-                </a:lnTo>
-                <a:close/>
-              </a:path>
-            </a:pathLst>
-          </a:custGeom>
         </p:spPr>
       </p:sp>
       <p:sp>
         <p:nvSpPr>
-          <p:cNvPr id="366" name="Google Shape;366;ge9c08f9734_1_51:notes"/>
-          <p:cNvSpPr txBox="1">
+          <p:cNvPr id="3" name="Espaço Reservado para Anotações 2"/>
+          <p:cNvSpPr>
             <a:spLocks noGrp="1"/>
           </p:cNvSpPr>
           <p:nvPr>
             <p:ph type="body" idx="1"/>
           </p:nvPr>
         </p:nvSpPr>
-        <p:spPr>
-          <a:xfrm>
-            <a:off x="685800" y="4343400"/>
-            <a:ext cx="5486400" cy="4114800"/>
-          </a:xfrm>
-          <a:prstGeom prst="rect">
-            <a:avLst/>
-          </a:prstGeom>
-        </p:spPr>
+        <p:spPr/>
         <p:txBody>
-          <a:bodyPr spcFirstLastPara="1" wrap="square" lIns="91425" tIns="91425" rIns="91425" bIns="91425" anchor="t" anchorCtr="0">
-            <a:noAutofit/>
-          </a:bodyPr>
+          <a:bodyPr/>
           <a:lstStyle/>
           <a:p>
-            <a:pPr marL="0" lvl="0" indent="0" algn="l" rtl="0">
+            <a:pPr marL="158750" marR="0" lvl="0" indent="0" algn="l" defTabSz="914400" rtl="0" eaLnBrk="1" fontAlgn="auto" latinLnBrk="0" hangingPunct="1">
+              <a:lnSpc>
+                <a:spcPct val="100000"/>
+              </a:lnSpc>
               <a:spcBef>
                 <a:spcPts val="0"/>
               </a:spcBef>
               <a:spcAft>
                 <a:spcPts val="0"/>
               </a:spcAft>
+              <a:buClr>
+                <a:srgbClr val="000000"/>
+              </a:buClr>
+              <a:buSzPts val="1100"/>
+              <a:buFont typeface="Arial"/>
+              <a:buNone/>
+              <a:tabLst/>
+              <a:defRPr/>
+            </a:pPr>
+            <a:r>
+              <a:rPr lang="pt-BR" dirty="0"/>
+              <a:t>As etapas principais não precisam ser realizadas em ordem: por exemplo, os resultados da pesquisa ainda podem ser inseridos uma vez que o processo de seleção tenha iniciado, e o processo de seleção não precisa ser concluído para iniciar a extração de dados ou as etapas de avaliação crítica.</a:t>
+            </a:r>
+          </a:p>
+          <a:p>
+            <a:pPr marL="158750" indent="0">
               <a:buNone/>
             </a:pPr>
-            <a:endParaRPr dirty="0"/>
+            <a:endParaRPr lang="pt-BR" dirty="0"/>
           </a:p>
         </p:txBody>
       </p:sp>
     </p:spTree>
+    <p:extLst>
+      <p:ext uri="{BB962C8B-B14F-4D97-AF65-F5344CB8AC3E}">
+        <p14:creationId xmlns:p14="http://schemas.microsoft.com/office/powerpoint/2010/main" val="1819829119"/>
+      </p:ext>
+    </p:extLst>
   </p:cSld>
   <p:clrMapOvr>
     <a:masterClrMapping/>
@@ -26089,6 +26496,268 @@
           <p:cNvPr id="2" name="Título 1">
             <a:extLst>
               <a:ext uri="{FF2B5EF4-FFF2-40B4-BE49-F238E27FC236}">
+                <a16:creationId xmlns:a16="http://schemas.microsoft.com/office/drawing/2014/main" id="{B40064E3-E316-4A59-84B3-EAD8175D5FC1}"/>
+              </a:ext>
+            </a:extLst>
+          </p:cNvPr>
+          <p:cNvSpPr>
+            <a:spLocks noGrp="1"/>
+          </p:cNvSpPr>
+          <p:nvPr>
+            <p:ph type="title"/>
+          </p:nvPr>
+        </p:nvSpPr>
+        <p:spPr/>
+        <p:txBody>
+          <a:bodyPr/>
+          <a:lstStyle/>
+          <a:p>
+            <a:r>
+              <a:rPr lang="pt-BR" dirty="0"/>
+              <a:t>Sobre o CADIMA</a:t>
+            </a:r>
+          </a:p>
+        </p:txBody>
+      </p:sp>
+      <p:sp>
+        <p:nvSpPr>
+          <p:cNvPr id="3" name="Espaço Reservado para Texto 2">
+            <a:extLst>
+              <a:ext uri="{FF2B5EF4-FFF2-40B4-BE49-F238E27FC236}">
+                <a16:creationId xmlns:a16="http://schemas.microsoft.com/office/drawing/2014/main" id="{5D020EE4-DC1C-4C4D-B029-CF610589F634}"/>
+              </a:ext>
+            </a:extLst>
+          </p:cNvPr>
+          <p:cNvSpPr>
+            <a:spLocks noGrp="1"/>
+          </p:cNvSpPr>
+          <p:nvPr>
+            <p:ph type="body" idx="1"/>
+          </p:nvPr>
+        </p:nvSpPr>
+        <p:spPr/>
+        <p:txBody>
+          <a:bodyPr/>
+          <a:lstStyle/>
+          <a:p>
+            <a:r>
+              <a:rPr lang="pt-BR" b="0" i="0" dirty="0"/>
+              <a:t>Permite atualizar etapas da revisão durante a revisão</a:t>
+            </a:r>
+          </a:p>
+          <a:p>
+            <a:pPr lvl="1"/>
+            <a:r>
+              <a:rPr lang="pt-BR" b="0" i="0" dirty="0"/>
+              <a:t>Exceção dos critérios de seleção</a:t>
+            </a:r>
+          </a:p>
+          <a:p>
+            <a:pPr marL="615950" lvl="1" indent="0">
+              <a:buNone/>
+            </a:pPr>
+            <a:endParaRPr lang="pt-BR" b="0" i="0" dirty="0"/>
+          </a:p>
+          <a:p>
+            <a:r>
+              <a:rPr lang="pt-BR" b="0" i="0" dirty="0"/>
+              <a:t>Etapas principais não precisam ser realizadas em ordem</a:t>
+            </a:r>
+          </a:p>
+          <a:p>
+            <a:pPr marL="146050" indent="0">
+              <a:buNone/>
+            </a:pPr>
+            <a:endParaRPr lang="pt-BR" b="0" i="0" dirty="0"/>
+          </a:p>
+          <a:p>
+            <a:r>
+              <a:rPr lang="pt-BR" b="0" i="0" dirty="0"/>
+              <a:t>Síntese de dados: fornece uma planilha de extração de dados e os resultados da avalição crítica</a:t>
+            </a:r>
+            <a:endParaRPr lang="pt-BR" dirty="0"/>
+          </a:p>
+          <a:p>
+            <a:endParaRPr lang="pt-BR" dirty="0"/>
+          </a:p>
+        </p:txBody>
+      </p:sp>
+    </p:spTree>
+    <p:extLst>
+      <p:ext uri="{BB962C8B-B14F-4D97-AF65-F5344CB8AC3E}">
+        <p14:creationId xmlns:p14="http://schemas.microsoft.com/office/powerpoint/2010/main" val="3261924717"/>
+      </p:ext>
+    </p:extLst>
+  </p:cSld>
+  <p:clrMapOvr>
+    <a:masterClrMapping/>
+  </p:clrMapOvr>
+</p:sld>
+</file>
+
+<file path=ppt/slides/slide12.xml><?xml version="1.0" encoding="utf-8"?>
+<p:sld xmlns:a="http://schemas.openxmlformats.org/drawingml/2006/main" xmlns:r="http://schemas.openxmlformats.org/officeDocument/2006/relationships" xmlns:p="http://schemas.openxmlformats.org/presentationml/2006/main">
+  <p:cSld>
+    <p:spTree>
+      <p:nvGrpSpPr>
+        <p:cNvPr id="1" name=""/>
+        <p:cNvGrpSpPr/>
+        <p:nvPr/>
+      </p:nvGrpSpPr>
+      <p:grpSpPr>
+        <a:xfrm>
+          <a:off x="0" y="0"/>
+          <a:ext cx="0" cy="0"/>
+          <a:chOff x="0" y="0"/>
+          <a:chExt cx="0" cy="0"/>
+        </a:xfrm>
+      </p:grpSpPr>
+      <p:sp>
+        <p:nvSpPr>
+          <p:cNvPr id="2" name="Título 1">
+            <a:extLst>
+              <a:ext uri="{FF2B5EF4-FFF2-40B4-BE49-F238E27FC236}">
+                <a16:creationId xmlns:a16="http://schemas.microsoft.com/office/drawing/2014/main" id="{D12ABBD0-121E-4434-924C-FD90D03A1012}"/>
+              </a:ext>
+            </a:extLst>
+          </p:cNvPr>
+          <p:cNvSpPr>
+            <a:spLocks noGrp="1"/>
+          </p:cNvSpPr>
+          <p:nvPr>
+            <p:ph type="title"/>
+          </p:nvPr>
+        </p:nvSpPr>
+        <p:spPr/>
+        <p:txBody>
+          <a:bodyPr/>
+          <a:lstStyle/>
+          <a:p>
+            <a:r>
+              <a:rPr lang="pt-BR" dirty="0"/>
+              <a:t>Destaques do CADIMA</a:t>
+            </a:r>
+          </a:p>
+        </p:txBody>
+      </p:sp>
+      <p:sp>
+        <p:nvSpPr>
+          <p:cNvPr id="3" name="Espaço Reservado para Texto 2">
+            <a:extLst>
+              <a:ext uri="{FF2B5EF4-FFF2-40B4-BE49-F238E27FC236}">
+                <a16:creationId xmlns:a16="http://schemas.microsoft.com/office/drawing/2014/main" id="{7DDD8897-CC6D-4B79-BDCC-40665A1C866C}"/>
+              </a:ext>
+            </a:extLst>
+          </p:cNvPr>
+          <p:cNvSpPr>
+            <a:spLocks noGrp="1"/>
+          </p:cNvSpPr>
+          <p:nvPr>
+            <p:ph type="body" idx="1"/>
+          </p:nvPr>
+        </p:nvSpPr>
+        <p:spPr/>
+        <p:txBody>
+          <a:bodyPr/>
+          <a:lstStyle/>
+          <a:p>
+            <a:r>
+              <a:rPr lang="pt-BR" dirty="0"/>
+              <a:t>Facilidade de uso</a:t>
+            </a:r>
+          </a:p>
+          <a:p>
+            <a:r>
+              <a:rPr lang="pt-BR" dirty="0"/>
+              <a:t>Suporte a múltiplos usuários</a:t>
+            </a:r>
+          </a:p>
+          <a:p>
+            <a:r>
+              <a:rPr lang="pt-BR" dirty="0"/>
+              <a:t>Suporte para extração de dados online/offline</a:t>
+            </a:r>
+          </a:p>
+          <a:p>
+            <a:r>
+              <a:rPr lang="pt-BR" dirty="0"/>
+              <a:t>Compromisso com manutenção contínua </a:t>
+            </a:r>
+          </a:p>
+          <a:p>
+            <a:r>
+              <a:rPr lang="pt-BR" dirty="0"/>
+              <a:t>Gratuito </a:t>
+            </a:r>
+          </a:p>
+          <a:p>
+            <a:endParaRPr lang="pt-BR" dirty="0"/>
+          </a:p>
+          <a:p>
+            <a:r>
+              <a:rPr lang="pt-BR" dirty="0"/>
+              <a:t>Outros softwares</a:t>
+            </a:r>
+          </a:p>
+          <a:p>
+            <a:pPr lvl="1"/>
+            <a:r>
+              <a:rPr lang="pt-BR" dirty="0"/>
+              <a:t>Exigem experiência anterior em desenvolvimento de software e codificação do programa</a:t>
+            </a:r>
+          </a:p>
+          <a:p>
+            <a:pPr lvl="1"/>
+            <a:r>
+              <a:rPr lang="pt-BR" b="1" dirty="0">
+                <a:solidFill>
+                  <a:schemeClr val="accent1"/>
+                </a:solidFill>
+              </a:rPr>
+              <a:t>CARO</a:t>
+            </a:r>
+            <a:r>
+              <a:rPr lang="pt-BR" dirty="0"/>
+              <a:t> para revisões de equipes de pesquisa pequenas ou organizações sem fins lucrativos</a:t>
+            </a:r>
+          </a:p>
+        </p:txBody>
+      </p:sp>
+    </p:spTree>
+    <p:extLst>
+      <p:ext uri="{BB962C8B-B14F-4D97-AF65-F5344CB8AC3E}">
+        <p14:creationId xmlns:p14="http://schemas.microsoft.com/office/powerpoint/2010/main" val="1105325641"/>
+      </p:ext>
+    </p:extLst>
+  </p:cSld>
+  <p:clrMapOvr>
+    <a:masterClrMapping/>
+  </p:clrMapOvr>
+</p:sld>
+</file>
+
+<file path=ppt/slides/slide13.xml><?xml version="1.0" encoding="utf-8"?>
+<p:sld xmlns:a="http://schemas.openxmlformats.org/drawingml/2006/main" xmlns:r="http://schemas.openxmlformats.org/officeDocument/2006/relationships" xmlns:p="http://schemas.openxmlformats.org/presentationml/2006/main">
+  <p:cSld>
+    <p:spTree>
+      <p:nvGrpSpPr>
+        <p:cNvPr id="1" name=""/>
+        <p:cNvGrpSpPr/>
+        <p:nvPr/>
+      </p:nvGrpSpPr>
+      <p:grpSpPr>
+        <a:xfrm>
+          <a:off x="0" y="0"/>
+          <a:ext cx="0" cy="0"/>
+          <a:chOff x="0" y="0"/>
+          <a:chExt cx="0" cy="0"/>
+        </a:xfrm>
+      </p:grpSpPr>
+      <p:sp>
+        <p:nvSpPr>
+          <p:cNvPr id="2" name="Título 1">
+            <a:extLst>
+              <a:ext uri="{FF2B5EF4-FFF2-40B4-BE49-F238E27FC236}">
                 <a16:creationId xmlns:a16="http://schemas.microsoft.com/office/drawing/2014/main" id="{1B4FBBE5-5B27-4589-9B36-19C6A7EC7BDB}"/>
               </a:ext>
             </a:extLst>
@@ -26160,22 +26829,68 @@
           </p:cNvPicPr>
           <p:nvPr/>
         </p:nvPicPr>
-        <p:blipFill>
+        <p:blipFill rotWithShape="1">
           <a:blip r:embed="rId2"/>
-          <a:stretch>
-            <a:fillRect/>
-          </a:stretch>
+          <a:srcRect l="14632" t="6302"/>
+          <a:stretch/>
         </p:blipFill>
         <p:spPr>
           <a:xfrm>
-            <a:off x="299001" y="1494338"/>
-            <a:ext cx="8545998" cy="3493918"/>
+            <a:off x="664301" y="1439125"/>
+            <a:ext cx="7815398" cy="3507006"/>
           </a:xfrm>
           <a:prstGeom prst="rect">
             <a:avLst/>
           </a:prstGeom>
         </p:spPr>
       </p:pic>
+      <p:sp>
+        <p:nvSpPr>
+          <p:cNvPr id="6" name="Retângulo 5">
+            <a:extLst>
+              <a:ext uri="{FF2B5EF4-FFF2-40B4-BE49-F238E27FC236}">
+                <a16:creationId xmlns:a16="http://schemas.microsoft.com/office/drawing/2014/main" id="{8508A95E-ACB2-4F85-9524-804CB4F74ECE}"/>
+              </a:ext>
+            </a:extLst>
+          </p:cNvPr>
+          <p:cNvSpPr/>
+          <p:nvPr/>
+        </p:nvSpPr>
+        <p:spPr>
+          <a:xfrm>
+            <a:off x="809700" y="3260850"/>
+            <a:ext cx="7574899" cy="1496809"/>
+          </a:xfrm>
+          <a:prstGeom prst="rect">
+            <a:avLst/>
+          </a:prstGeom>
+          <a:noFill/>
+        </p:spPr>
+        <p:style>
+          <a:lnRef idx="2">
+            <a:schemeClr val="accent1">
+              <a:shade val="50000"/>
+            </a:schemeClr>
+          </a:lnRef>
+          <a:fillRef idx="1">
+            <a:schemeClr val="accent1"/>
+          </a:fillRef>
+          <a:effectRef idx="0">
+            <a:schemeClr val="accent1"/>
+          </a:effectRef>
+          <a:fontRef idx="minor">
+            <a:schemeClr val="lt1"/>
+          </a:fontRef>
+        </p:style>
+        <p:txBody>
+          <a:bodyPr rtlCol="0" anchor="ctr"/>
+          <a:lstStyle/>
+          <a:p>
+            <a:pPr algn="ctr"/>
+            <a:endParaRPr lang="pt-BR"/>
+          </a:p>
+        </p:txBody>
+      </p:sp>
     </p:spTree>
     <p:extLst>
       <p:ext uri="{BB962C8B-B14F-4D97-AF65-F5344CB8AC3E}">
@@ -26189,7 +26904,7 @@
 </p:sld>
 </file>
 
-<file path=ppt/slides/slide12.xml><?xml version="1.0" encoding="utf-8"?>
+<file path=ppt/slides/slide14.xml><?xml version="1.0" encoding="utf-8"?>
 <p:sld xmlns:a="http://schemas.openxmlformats.org/drawingml/2006/main" xmlns:r="http://schemas.openxmlformats.org/officeDocument/2006/relationships" xmlns:p="http://schemas.openxmlformats.org/presentationml/2006/main">
   <p:cSld>
     <p:spTree>
@@ -26282,22 +26997,115 @@
           </p:cNvPicPr>
           <p:nvPr/>
         </p:nvPicPr>
-        <p:blipFill>
+        <p:blipFill rotWithShape="1">
           <a:blip r:embed="rId2"/>
-          <a:stretch>
-            <a:fillRect/>
-          </a:stretch>
+          <a:srcRect l="16930" t="5153"/>
+          <a:stretch/>
         </p:blipFill>
         <p:spPr>
           <a:xfrm>
-            <a:off x="404294" y="1458957"/>
-            <a:ext cx="8526482" cy="3603786"/>
+            <a:off x="681287" y="1388324"/>
+            <a:ext cx="7781426" cy="3755176"/>
           </a:xfrm>
           <a:prstGeom prst="rect">
             <a:avLst/>
           </a:prstGeom>
         </p:spPr>
       </p:pic>
+      <p:sp>
+        <p:nvSpPr>
+          <p:cNvPr id="9" name="Retângulo 8">
+            <a:extLst>
+              <a:ext uri="{FF2B5EF4-FFF2-40B4-BE49-F238E27FC236}">
+                <a16:creationId xmlns:a16="http://schemas.microsoft.com/office/drawing/2014/main" id="{4C22DEAF-A41D-4D24-A49B-C165E410621A}"/>
+              </a:ext>
+            </a:extLst>
+          </p:cNvPr>
+          <p:cNvSpPr/>
+          <p:nvPr/>
+        </p:nvSpPr>
+        <p:spPr>
+          <a:xfrm>
+            <a:off x="765674" y="3227650"/>
+            <a:ext cx="7710578" cy="1147500"/>
+          </a:xfrm>
+          <a:prstGeom prst="rect">
+            <a:avLst/>
+          </a:prstGeom>
+          <a:noFill/>
+        </p:spPr>
+        <p:style>
+          <a:lnRef idx="2">
+            <a:schemeClr val="accent1">
+              <a:shade val="50000"/>
+            </a:schemeClr>
+          </a:lnRef>
+          <a:fillRef idx="1">
+            <a:schemeClr val="accent1"/>
+          </a:fillRef>
+          <a:effectRef idx="0">
+            <a:schemeClr val="accent1"/>
+          </a:effectRef>
+          <a:fontRef idx="minor">
+            <a:schemeClr val="lt1"/>
+          </a:fontRef>
+        </p:style>
+        <p:txBody>
+          <a:bodyPr rtlCol="0" anchor="ctr"/>
+          <a:lstStyle/>
+          <a:p>
+            <a:pPr algn="ctr"/>
+            <a:endParaRPr lang="pt-BR"/>
+          </a:p>
+        </p:txBody>
+      </p:sp>
+      <p:sp>
+        <p:nvSpPr>
+          <p:cNvPr id="10" name="Retângulo 9">
+            <a:extLst>
+              <a:ext uri="{FF2B5EF4-FFF2-40B4-BE49-F238E27FC236}">
+                <a16:creationId xmlns:a16="http://schemas.microsoft.com/office/drawing/2014/main" id="{7A4153FF-F080-4D75-BFA7-BF8900D3A423}"/>
+              </a:ext>
+            </a:extLst>
+          </p:cNvPr>
+          <p:cNvSpPr/>
+          <p:nvPr/>
+        </p:nvSpPr>
+        <p:spPr>
+          <a:xfrm>
+            <a:off x="809700" y="1988375"/>
+            <a:ext cx="7666552" cy="999300"/>
+          </a:xfrm>
+          <a:prstGeom prst="rect">
+            <a:avLst/>
+          </a:prstGeom>
+          <a:noFill/>
+        </p:spPr>
+        <p:style>
+          <a:lnRef idx="2">
+            <a:schemeClr val="accent1">
+              <a:shade val="50000"/>
+            </a:schemeClr>
+          </a:lnRef>
+          <a:fillRef idx="1">
+            <a:schemeClr val="accent1"/>
+          </a:fillRef>
+          <a:effectRef idx="0">
+            <a:schemeClr val="accent1"/>
+          </a:effectRef>
+          <a:fontRef idx="minor">
+            <a:schemeClr val="lt1"/>
+          </a:fontRef>
+        </p:style>
+        <p:txBody>
+          <a:bodyPr rtlCol="0" anchor="ctr"/>
+          <a:lstStyle/>
+          <a:p>
+            <a:pPr algn="ctr"/>
+            <a:endParaRPr lang="pt-BR"/>
+          </a:p>
+        </p:txBody>
+      </p:sp>
     </p:spTree>
     <p:extLst>
       <p:ext uri="{BB962C8B-B14F-4D97-AF65-F5344CB8AC3E}">
@@ -26311,7 +27119,7 @@
 </p:sld>
 </file>
 
-<file path=ppt/slides/slide13.xml><?xml version="1.0" encoding="utf-8"?>
+<file path=ppt/slides/slide15.xml><?xml version="1.0" encoding="utf-8"?>
 <p:sld xmlns:a="http://schemas.openxmlformats.org/drawingml/2006/main" xmlns:r="http://schemas.openxmlformats.org/officeDocument/2006/relationships" xmlns:p="http://schemas.openxmlformats.org/presentationml/2006/main">
   <p:cSld>
     <p:spTree>
@@ -26412,16 +27220,15 @@
           </p:cNvPicPr>
           <p:nvPr/>
         </p:nvPicPr>
-        <p:blipFill>
-          <a:blip r:embed="rId2"/>
-          <a:stretch>
-            <a:fillRect/>
-          </a:stretch>
+        <p:blipFill rotWithShape="1">
+          <a:blip r:embed="rId3"/>
+          <a:srcRect l="19898" t="52832" r="13439"/>
+          <a:stretch/>
         </p:blipFill>
         <p:spPr>
           <a:xfrm>
-            <a:off x="686870" y="1411524"/>
-            <a:ext cx="7647430" cy="3589694"/>
+            <a:off x="138882" y="1703500"/>
+            <a:ext cx="8866236" cy="2944700"/>
           </a:xfrm>
           <a:prstGeom prst="rect">
             <a:avLst/>
@@ -26441,7 +27248,7 @@
 </p:sld>
 </file>
 
-<file path=ppt/slides/slide14.xml><?xml version="1.0" encoding="utf-8"?>
+<file path=ppt/slides/slide16.xml><?xml version="1.0" encoding="utf-8"?>
 <p:sld xmlns:a="http://schemas.openxmlformats.org/drawingml/2006/main" xmlns:r="http://schemas.openxmlformats.org/officeDocument/2006/relationships" xmlns:p="http://schemas.openxmlformats.org/presentationml/2006/main">
   <p:cSld>
     <p:spTree>
@@ -26542,16 +27349,15 @@
           </p:cNvPicPr>
           <p:nvPr/>
         </p:nvPicPr>
-        <p:blipFill>
-          <a:blip r:embed="rId2"/>
-          <a:stretch>
-            <a:fillRect/>
-          </a:stretch>
+        <p:blipFill rotWithShape="1">
+          <a:blip r:embed="rId3"/>
+          <a:srcRect l="19989" t="45593" r="10695" b="1"/>
+          <a:stretch/>
         </p:blipFill>
         <p:spPr>
           <a:xfrm>
-            <a:off x="695662" y="1458381"/>
-            <a:ext cx="7638638" cy="3604938"/>
+            <a:off x="297777" y="1677591"/>
+            <a:ext cx="8548446" cy="3166518"/>
           </a:xfrm>
           <a:prstGeom prst="rect">
             <a:avLst/>
@@ -26571,7 +27377,7 @@
 </p:sld>
 </file>
 
-<file path=ppt/slides/slide15.xml><?xml version="1.0" encoding="utf-8"?>
+<file path=ppt/slides/slide17.xml><?xml version="1.0" encoding="utf-8"?>
 <p:sld xmlns:a="http://schemas.openxmlformats.org/drawingml/2006/main" xmlns:r="http://schemas.openxmlformats.org/officeDocument/2006/relationships" xmlns:p="http://schemas.openxmlformats.org/presentationml/2006/main">
   <p:cSld>
     <p:spTree>
@@ -26669,16 +27475,15 @@
           </p:cNvPicPr>
           <p:nvPr/>
         </p:nvPicPr>
-        <p:blipFill>
+        <p:blipFill rotWithShape="1">
           <a:blip r:embed="rId2"/>
-          <a:stretch>
-            <a:fillRect/>
-          </a:stretch>
+          <a:srcRect l="18342" t="8963"/>
+          <a:stretch/>
         </p:blipFill>
         <p:spPr>
           <a:xfrm>
-            <a:off x="330544" y="1597875"/>
-            <a:ext cx="8687628" cy="3072454"/>
+            <a:off x="82007" y="1393519"/>
+            <a:ext cx="8979986" cy="3540640"/>
           </a:xfrm>
           <a:prstGeom prst="rect">
             <a:avLst/>
@@ -26698,7 +27503,169 @@
 </p:sld>
 </file>
 
-<file path=ppt/slides/slide16.xml><?xml version="1.0" encoding="utf-8"?>
+<file path=ppt/slides/slide18.xml><?xml version="1.0" encoding="utf-8"?>
+<p:sld xmlns:a="http://schemas.openxmlformats.org/drawingml/2006/main" xmlns:r="http://schemas.openxmlformats.org/officeDocument/2006/relationships" xmlns:p="http://schemas.openxmlformats.org/presentationml/2006/main">
+  <p:cSld>
+    <p:spTree>
+      <p:nvGrpSpPr>
+        <p:cNvPr id="1" name=""/>
+        <p:cNvGrpSpPr/>
+        <p:nvPr/>
+      </p:nvGrpSpPr>
+      <p:grpSpPr>
+        <a:xfrm>
+          <a:off x="0" y="0"/>
+          <a:ext cx="0" cy="0"/>
+          <a:chOff x="0" y="0"/>
+          <a:chExt cx="0" cy="0"/>
+        </a:xfrm>
+      </p:grpSpPr>
+      <p:sp>
+        <p:nvSpPr>
+          <p:cNvPr id="2" name="Título 1">
+            <a:extLst>
+              <a:ext uri="{FF2B5EF4-FFF2-40B4-BE49-F238E27FC236}">
+                <a16:creationId xmlns:a16="http://schemas.microsoft.com/office/drawing/2014/main" id="{EF182FF0-381C-4394-8D69-A3C40065EF13}"/>
+              </a:ext>
+            </a:extLst>
+          </p:cNvPr>
+          <p:cNvSpPr>
+            <a:spLocks noGrp="1"/>
+          </p:cNvSpPr>
+          <p:nvPr>
+            <p:ph type="title"/>
+          </p:nvPr>
+        </p:nvSpPr>
+        <p:spPr/>
+        <p:txBody>
+          <a:bodyPr>
+            <a:normAutofit fontScale="90000"/>
+          </a:bodyPr>
+          <a:lstStyle/>
+          <a:p>
+            <a:r>
+              <a:rPr lang="pt-BR" dirty="0"/>
+              <a:t>CADIMA na prática –</a:t>
+            </a:r>
+            <a:br>
+              <a:rPr lang="pt-BR" dirty="0"/>
+            </a:br>
+            <a:r>
+              <a:rPr lang="pt-BR" dirty="0"/>
+              <a:t>Teste Kappa</a:t>
+            </a:r>
+          </a:p>
+        </p:txBody>
+      </p:sp>
+      <p:sp>
+        <p:nvSpPr>
+          <p:cNvPr id="3" name="Espaço Reservado para Texto 2">
+            <a:extLst>
+              <a:ext uri="{FF2B5EF4-FFF2-40B4-BE49-F238E27FC236}">
+                <a16:creationId xmlns:a16="http://schemas.microsoft.com/office/drawing/2014/main" id="{5CB2A418-8E1D-4D35-A2EA-77E048CC275C}"/>
+              </a:ext>
+            </a:extLst>
+          </p:cNvPr>
+          <p:cNvSpPr>
+            <a:spLocks noGrp="1"/>
+          </p:cNvSpPr>
+          <p:nvPr>
+            <p:ph type="body" idx="1"/>
+          </p:nvPr>
+        </p:nvSpPr>
+        <p:spPr/>
+        <p:txBody>
+          <a:bodyPr/>
+          <a:lstStyle/>
+          <a:p>
+            <a:endParaRPr lang="pt-BR"/>
+          </a:p>
+        </p:txBody>
+      </p:sp>
+      <p:pic>
+        <p:nvPicPr>
+          <p:cNvPr id="5" name="Imagem 4" descr="Interface gráfica do usuário, Texto, Aplicativo&#10;&#10;Descrição gerada automaticamente">
+            <a:extLst>
+              <a:ext uri="{FF2B5EF4-FFF2-40B4-BE49-F238E27FC236}">
+                <a16:creationId xmlns:a16="http://schemas.microsoft.com/office/drawing/2014/main" id="{A614185A-72E6-4825-BACD-0BEFF5ECF182}"/>
+              </a:ext>
+            </a:extLst>
+          </p:cNvPr>
+          <p:cNvPicPr>
+            <a:picLocks noChangeAspect="1"/>
+          </p:cNvPicPr>
+          <p:nvPr/>
+        </p:nvPicPr>
+        <p:blipFill rotWithShape="1">
+          <a:blip r:embed="rId3"/>
+          <a:srcRect l="18765" b="11242"/>
+          <a:stretch/>
+        </p:blipFill>
+        <p:spPr>
+          <a:xfrm>
+            <a:off x="87306" y="1470875"/>
+            <a:ext cx="8969388" cy="3361476"/>
+          </a:xfrm>
+          <a:prstGeom prst="rect">
+            <a:avLst/>
+          </a:prstGeom>
+        </p:spPr>
+      </p:pic>
+      <p:cxnSp>
+        <p:nvCxnSpPr>
+          <p:cNvPr id="7" name="Conector de Seta Reta 6">
+            <a:extLst>
+              <a:ext uri="{FF2B5EF4-FFF2-40B4-BE49-F238E27FC236}">
+                <a16:creationId xmlns:a16="http://schemas.microsoft.com/office/drawing/2014/main" id="{4729DD4D-CA03-4DE6-8832-F04BC862F944}"/>
+              </a:ext>
+            </a:extLst>
+          </p:cNvPr>
+          <p:cNvCxnSpPr>
+            <a:cxnSpLocks/>
+          </p:cNvCxnSpPr>
+          <p:nvPr/>
+        </p:nvCxnSpPr>
+        <p:spPr>
+          <a:xfrm flipH="1">
+            <a:off x="1840007" y="2989241"/>
+            <a:ext cx="245968" cy="0"/>
+          </a:xfrm>
+          <a:prstGeom prst="straightConnector1">
+            <a:avLst/>
+          </a:prstGeom>
+          <a:ln>
+            <a:tailEnd type="triangle"/>
+          </a:ln>
+        </p:spPr>
+        <p:style>
+          <a:lnRef idx="1">
+            <a:schemeClr val="accent1"/>
+          </a:lnRef>
+          <a:fillRef idx="0">
+            <a:schemeClr val="accent1"/>
+          </a:fillRef>
+          <a:effectRef idx="0">
+            <a:schemeClr val="accent1"/>
+          </a:effectRef>
+          <a:fontRef idx="minor">
+            <a:schemeClr val="tx1"/>
+          </a:fontRef>
+        </p:style>
+      </p:cxnSp>
+    </p:spTree>
+    <p:extLst>
+      <p:ext uri="{BB962C8B-B14F-4D97-AF65-F5344CB8AC3E}">
+        <p14:creationId xmlns:p14="http://schemas.microsoft.com/office/powerpoint/2010/main" val="124561929"/>
+      </p:ext>
+    </p:extLst>
+  </p:cSld>
+  <p:clrMapOvr>
+    <a:masterClrMapping/>
+  </p:clrMapOvr>
+</p:sld>
+</file>
+
+<file path=ppt/slides/slide19.xml><?xml version="1.0" encoding="utf-8"?>
 <p:sld xmlns:a="http://schemas.openxmlformats.org/drawingml/2006/main" xmlns:r="http://schemas.openxmlformats.org/officeDocument/2006/relationships" xmlns:p="http://schemas.openxmlformats.org/presentationml/2006/main">
   <p:cSld>
     <p:spTree>
@@ -26791,16 +27758,15 @@
           </p:cNvPicPr>
           <p:nvPr/>
         </p:nvPicPr>
-        <p:blipFill>
+        <p:blipFill rotWithShape="1">
           <a:blip r:embed="rId2"/>
-          <a:stretch>
-            <a:fillRect/>
-          </a:stretch>
+          <a:srcRect l="-242" t="493" b="41222"/>
+          <a:stretch/>
         </p:blipFill>
         <p:spPr>
           <a:xfrm>
-            <a:off x="727814" y="1391273"/>
-            <a:ext cx="7688372" cy="3739154"/>
+            <a:off x="-2107" y="1643050"/>
+            <a:ext cx="9148214" cy="2586910"/>
           </a:xfrm>
           <a:prstGeom prst="rect">
             <a:avLst/>
@@ -26811,358 +27777,6 @@
     <p:extLst>
       <p:ext uri="{BB962C8B-B14F-4D97-AF65-F5344CB8AC3E}">
         <p14:creationId xmlns:p14="http://schemas.microsoft.com/office/powerpoint/2010/main" val="595693734"/>
-      </p:ext>
-    </p:extLst>
-  </p:cSld>
-  <p:clrMapOvr>
-    <a:masterClrMapping/>
-  </p:clrMapOvr>
-</p:sld>
-</file>
-
-<file path=ppt/slides/slide17.xml><?xml version="1.0" encoding="utf-8"?>
-<p:sld xmlns:a="http://schemas.openxmlformats.org/drawingml/2006/main" xmlns:r="http://schemas.openxmlformats.org/officeDocument/2006/relationships" xmlns:p="http://schemas.openxmlformats.org/presentationml/2006/main">
-  <p:cSld>
-    <p:spTree>
-      <p:nvGrpSpPr>
-        <p:cNvPr id="1" name=""/>
-        <p:cNvGrpSpPr/>
-        <p:nvPr/>
-      </p:nvGrpSpPr>
-      <p:grpSpPr>
-        <a:xfrm>
-          <a:off x="0" y="0"/>
-          <a:ext cx="0" cy="0"/>
-          <a:chOff x="0" y="0"/>
-          <a:chExt cx="0" cy="0"/>
-        </a:xfrm>
-      </p:grpSpPr>
-      <p:sp>
-        <p:nvSpPr>
-          <p:cNvPr id="2" name="Título 1">
-            <a:extLst>
-              <a:ext uri="{FF2B5EF4-FFF2-40B4-BE49-F238E27FC236}">
-                <a16:creationId xmlns:a16="http://schemas.microsoft.com/office/drawing/2014/main" id="{D779F1AA-F847-4CEB-AC4D-733F82223805}"/>
-              </a:ext>
-            </a:extLst>
-          </p:cNvPr>
-          <p:cNvSpPr>
-            <a:spLocks noGrp="1"/>
-          </p:cNvSpPr>
-          <p:nvPr>
-            <p:ph type="title"/>
-          </p:nvPr>
-        </p:nvSpPr>
-        <p:spPr/>
-        <p:txBody>
-          <a:bodyPr>
-            <a:normAutofit fontScale="90000"/>
-          </a:bodyPr>
-          <a:lstStyle/>
-          <a:p>
-            <a:r>
-              <a:rPr lang="pt-BR" dirty="0"/>
-              <a:t>CADIMA na prática – </a:t>
-            </a:r>
-            <a:br>
-              <a:rPr lang="pt-BR" dirty="0"/>
-            </a:br>
-            <a:r>
-              <a:rPr lang="pt-BR" dirty="0"/>
-              <a:t>Aplicando critérios no título</a:t>
-            </a:r>
-          </a:p>
-        </p:txBody>
-      </p:sp>
-      <p:sp>
-        <p:nvSpPr>
-          <p:cNvPr id="3" name="Espaço Reservado para Texto 2">
-            <a:extLst>
-              <a:ext uri="{FF2B5EF4-FFF2-40B4-BE49-F238E27FC236}">
-                <a16:creationId xmlns:a16="http://schemas.microsoft.com/office/drawing/2014/main" id="{B87EF6E7-5E6D-4429-A2BF-E4FD37721D7D}"/>
-              </a:ext>
-            </a:extLst>
-          </p:cNvPr>
-          <p:cNvSpPr>
-            <a:spLocks noGrp="1"/>
-          </p:cNvSpPr>
-          <p:nvPr>
-            <p:ph type="body" idx="1"/>
-          </p:nvPr>
-        </p:nvSpPr>
-        <p:spPr/>
-        <p:txBody>
-          <a:bodyPr/>
-          <a:lstStyle/>
-          <a:p>
-            <a:endParaRPr lang="pt-BR"/>
-          </a:p>
-        </p:txBody>
-      </p:sp>
-      <p:pic>
-        <p:nvPicPr>
-          <p:cNvPr id="7" name="Imagem 6" descr="Interface gráfica do usuário, Texto, Aplicativo, Email&#10;&#10;Descrição gerada automaticamente">
-            <a:extLst>
-              <a:ext uri="{FF2B5EF4-FFF2-40B4-BE49-F238E27FC236}">
-                <a16:creationId xmlns:a16="http://schemas.microsoft.com/office/drawing/2014/main" id="{563E98EE-36C3-4AD8-8CDA-40582E7657F7}"/>
-              </a:ext>
-            </a:extLst>
-          </p:cNvPr>
-          <p:cNvPicPr>
-            <a:picLocks noChangeAspect="1"/>
-          </p:cNvPicPr>
-          <p:nvPr/>
-        </p:nvPicPr>
-        <p:blipFill>
-          <a:blip r:embed="rId2"/>
-          <a:stretch>
-            <a:fillRect/>
-          </a:stretch>
-        </p:blipFill>
-        <p:spPr>
-          <a:xfrm>
-            <a:off x="743803" y="1418120"/>
-            <a:ext cx="7779224" cy="3725380"/>
-          </a:xfrm>
-          <a:prstGeom prst="rect">
-            <a:avLst/>
-          </a:prstGeom>
-        </p:spPr>
-      </p:pic>
-    </p:spTree>
-    <p:extLst>
-      <p:ext uri="{BB962C8B-B14F-4D97-AF65-F5344CB8AC3E}">
-        <p14:creationId xmlns:p14="http://schemas.microsoft.com/office/powerpoint/2010/main" val="1777527954"/>
-      </p:ext>
-    </p:extLst>
-  </p:cSld>
-  <p:clrMapOvr>
-    <a:masterClrMapping/>
-  </p:clrMapOvr>
-</p:sld>
-</file>
-
-<file path=ppt/slides/slide18.xml><?xml version="1.0" encoding="utf-8"?>
-<p:sld xmlns:a="http://schemas.openxmlformats.org/drawingml/2006/main" xmlns:r="http://schemas.openxmlformats.org/officeDocument/2006/relationships" xmlns:p="http://schemas.openxmlformats.org/presentationml/2006/main">
-  <p:cSld>
-    <p:spTree>
-      <p:nvGrpSpPr>
-        <p:cNvPr id="1" name=""/>
-        <p:cNvGrpSpPr/>
-        <p:nvPr/>
-      </p:nvGrpSpPr>
-      <p:grpSpPr>
-        <a:xfrm>
-          <a:off x="0" y="0"/>
-          <a:ext cx="0" cy="0"/>
-          <a:chOff x="0" y="0"/>
-          <a:chExt cx="0" cy="0"/>
-        </a:xfrm>
-      </p:grpSpPr>
-      <p:sp>
-        <p:nvSpPr>
-          <p:cNvPr id="2" name="Título 1">
-            <a:extLst>
-              <a:ext uri="{FF2B5EF4-FFF2-40B4-BE49-F238E27FC236}">
-                <a16:creationId xmlns:a16="http://schemas.microsoft.com/office/drawing/2014/main" id="{10B88F02-4667-49E3-8502-C40E778EF98C}"/>
-              </a:ext>
-            </a:extLst>
-          </p:cNvPr>
-          <p:cNvSpPr>
-            <a:spLocks noGrp="1"/>
-          </p:cNvSpPr>
-          <p:nvPr>
-            <p:ph type="title"/>
-          </p:nvPr>
-        </p:nvSpPr>
-        <p:spPr/>
-        <p:txBody>
-          <a:bodyPr/>
-          <a:lstStyle/>
-          <a:p>
-            <a:r>
-              <a:rPr lang="pt-BR" dirty="0"/>
-              <a:t>Resultados CADIMA</a:t>
-            </a:r>
-          </a:p>
-        </p:txBody>
-      </p:sp>
-      <p:sp>
-        <p:nvSpPr>
-          <p:cNvPr id="3" name="Espaço Reservado para Texto 2">
-            <a:extLst>
-              <a:ext uri="{FF2B5EF4-FFF2-40B4-BE49-F238E27FC236}">
-                <a16:creationId xmlns:a16="http://schemas.microsoft.com/office/drawing/2014/main" id="{EE4DDF1D-D49F-4238-BDFC-99A59521136E}"/>
-              </a:ext>
-            </a:extLst>
-          </p:cNvPr>
-          <p:cNvSpPr>
-            <a:spLocks noGrp="1"/>
-          </p:cNvSpPr>
-          <p:nvPr>
-            <p:ph type="body" idx="1"/>
-          </p:nvPr>
-        </p:nvSpPr>
-        <p:spPr/>
-        <p:txBody>
-          <a:bodyPr>
-            <a:normAutofit/>
-          </a:bodyPr>
-          <a:lstStyle/>
-          <a:p>
-            <a:r>
-              <a:rPr lang="pt-BR" dirty="0"/>
-              <a:t>CADIMA garante uma documentação completa de todo o processo de revisão</a:t>
-            </a:r>
-          </a:p>
-          <a:p>
-            <a:endParaRPr lang="pt-BR" dirty="0"/>
-          </a:p>
-          <a:p>
-            <a:pPr lvl="1"/>
-            <a:r>
-              <a:rPr lang="pt-BR" dirty="0"/>
-              <a:t>Protocolo da Revisão</a:t>
-            </a:r>
-          </a:p>
-          <a:p>
-            <a:pPr lvl="1"/>
-            <a:r>
-              <a:rPr lang="pt-BR" dirty="0"/>
-              <a:t>Artigo de Revisão Sistemática </a:t>
-            </a:r>
-          </a:p>
-          <a:p>
-            <a:endParaRPr lang="pt-BR" dirty="0"/>
-          </a:p>
-          <a:p>
-            <a:endParaRPr lang="pt-BR" dirty="0"/>
-          </a:p>
-          <a:p>
-            <a:endParaRPr lang="pt-BR" dirty="0"/>
-          </a:p>
-          <a:p>
-            <a:endParaRPr lang="pt-BR" dirty="0"/>
-          </a:p>
-        </p:txBody>
-      </p:sp>
-    </p:spTree>
-    <p:extLst>
-      <p:ext uri="{BB962C8B-B14F-4D97-AF65-F5344CB8AC3E}">
-        <p14:creationId xmlns:p14="http://schemas.microsoft.com/office/powerpoint/2010/main" val="1717494546"/>
-      </p:ext>
-    </p:extLst>
-  </p:cSld>
-  <p:clrMapOvr>
-    <a:masterClrMapping/>
-  </p:clrMapOvr>
-</p:sld>
-</file>
-
-<file path=ppt/slides/slide19.xml><?xml version="1.0" encoding="utf-8"?>
-<p:sld xmlns:a="http://schemas.openxmlformats.org/drawingml/2006/main" xmlns:r="http://schemas.openxmlformats.org/officeDocument/2006/relationships" xmlns:p="http://schemas.openxmlformats.org/presentationml/2006/main">
-  <p:cSld>
-    <p:spTree>
-      <p:nvGrpSpPr>
-        <p:cNvPr id="1" name=""/>
-        <p:cNvGrpSpPr/>
-        <p:nvPr/>
-      </p:nvGrpSpPr>
-      <p:grpSpPr>
-        <a:xfrm>
-          <a:off x="0" y="0"/>
-          <a:ext cx="0" cy="0"/>
-          <a:chOff x="0" y="0"/>
-          <a:chExt cx="0" cy="0"/>
-        </a:xfrm>
-      </p:grpSpPr>
-      <p:sp>
-        <p:nvSpPr>
-          <p:cNvPr id="2" name="Título 1">
-            <a:extLst>
-              <a:ext uri="{FF2B5EF4-FFF2-40B4-BE49-F238E27FC236}">
-                <a16:creationId xmlns:a16="http://schemas.microsoft.com/office/drawing/2014/main" id="{CE1335B8-A5CA-4310-901C-CC99D529A40D}"/>
-              </a:ext>
-            </a:extLst>
-          </p:cNvPr>
-          <p:cNvSpPr>
-            <a:spLocks noGrp="1"/>
-          </p:cNvSpPr>
-          <p:nvPr>
-            <p:ph type="title"/>
-          </p:nvPr>
-        </p:nvSpPr>
-        <p:spPr/>
-        <p:txBody>
-          <a:bodyPr/>
-          <a:lstStyle/>
-          <a:p>
-            <a:r>
-              <a:rPr lang="pt-BR" dirty="0"/>
-              <a:t>CADIMA - Diagrama de fluxo</a:t>
-            </a:r>
-          </a:p>
-        </p:txBody>
-      </p:sp>
-      <p:sp>
-        <p:nvSpPr>
-          <p:cNvPr id="3" name="Espaço Reservado para Texto 2">
-            <a:extLst>
-              <a:ext uri="{FF2B5EF4-FFF2-40B4-BE49-F238E27FC236}">
-                <a16:creationId xmlns:a16="http://schemas.microsoft.com/office/drawing/2014/main" id="{8C977624-7D71-4812-A4C5-8427577A51EA}"/>
-              </a:ext>
-            </a:extLst>
-          </p:cNvPr>
-          <p:cNvSpPr>
-            <a:spLocks noGrp="1"/>
-          </p:cNvSpPr>
-          <p:nvPr>
-            <p:ph type="body" idx="1"/>
-          </p:nvPr>
-        </p:nvSpPr>
-        <p:spPr/>
-        <p:txBody>
-          <a:bodyPr/>
-          <a:lstStyle/>
-          <a:p>
-            <a:endParaRPr lang="pt-BR" dirty="0"/>
-          </a:p>
-        </p:txBody>
-      </p:sp>
-      <p:pic>
-        <p:nvPicPr>
-          <p:cNvPr id="7" name="Imagem 6" descr="Interface gráfica do usuário&#10;&#10;Descrição gerada automaticamente">
-            <a:extLst>
-              <a:ext uri="{FF2B5EF4-FFF2-40B4-BE49-F238E27FC236}">
-                <a16:creationId xmlns:a16="http://schemas.microsoft.com/office/drawing/2014/main" id="{B93F3AD0-5ECB-4105-9F46-3779C15AFEFE}"/>
-              </a:ext>
-            </a:extLst>
-          </p:cNvPr>
-          <p:cNvPicPr>
-            <a:picLocks noChangeAspect="1"/>
-          </p:cNvPicPr>
-          <p:nvPr/>
-        </p:nvPicPr>
-        <p:blipFill>
-          <a:blip r:embed="rId2"/>
-          <a:stretch>
-            <a:fillRect/>
-          </a:stretch>
-        </p:blipFill>
-        <p:spPr>
-          <a:xfrm>
-            <a:off x="1251187" y="1178826"/>
-            <a:ext cx="6749024" cy="3713896"/>
-          </a:xfrm>
-          <a:prstGeom prst="rect">
-            <a:avLst/>
-          </a:prstGeom>
-        </p:spPr>
-      </p:pic>
-    </p:spTree>
-    <p:extLst>
-      <p:ext uri="{BB962C8B-B14F-4D97-AF65-F5344CB8AC3E}">
-        <p14:creationId xmlns:p14="http://schemas.microsoft.com/office/powerpoint/2010/main" val="3425323785"/>
       </p:ext>
     </p:extLst>
   </p:cSld>
@@ -27342,6 +27956,357 @@
           <p:cNvPr id="2" name="Título 1">
             <a:extLst>
               <a:ext uri="{FF2B5EF4-FFF2-40B4-BE49-F238E27FC236}">
+                <a16:creationId xmlns:a16="http://schemas.microsoft.com/office/drawing/2014/main" id="{D779F1AA-F847-4CEB-AC4D-733F82223805}"/>
+              </a:ext>
+            </a:extLst>
+          </p:cNvPr>
+          <p:cNvSpPr>
+            <a:spLocks noGrp="1"/>
+          </p:cNvSpPr>
+          <p:nvPr>
+            <p:ph type="title"/>
+          </p:nvPr>
+        </p:nvSpPr>
+        <p:spPr/>
+        <p:txBody>
+          <a:bodyPr>
+            <a:normAutofit fontScale="90000"/>
+          </a:bodyPr>
+          <a:lstStyle/>
+          <a:p>
+            <a:r>
+              <a:rPr lang="pt-BR" dirty="0"/>
+              <a:t>CADIMA na prática – </a:t>
+            </a:r>
+            <a:br>
+              <a:rPr lang="pt-BR" dirty="0"/>
+            </a:br>
+            <a:r>
+              <a:rPr lang="pt-BR" dirty="0"/>
+              <a:t>Aplicando critérios no título</a:t>
+            </a:r>
+          </a:p>
+        </p:txBody>
+      </p:sp>
+      <p:sp>
+        <p:nvSpPr>
+          <p:cNvPr id="3" name="Espaço Reservado para Texto 2">
+            <a:extLst>
+              <a:ext uri="{FF2B5EF4-FFF2-40B4-BE49-F238E27FC236}">
+                <a16:creationId xmlns:a16="http://schemas.microsoft.com/office/drawing/2014/main" id="{B87EF6E7-5E6D-4429-A2BF-E4FD37721D7D}"/>
+              </a:ext>
+            </a:extLst>
+          </p:cNvPr>
+          <p:cNvSpPr>
+            <a:spLocks noGrp="1"/>
+          </p:cNvSpPr>
+          <p:nvPr>
+            <p:ph type="body" idx="1"/>
+          </p:nvPr>
+        </p:nvSpPr>
+        <p:spPr/>
+        <p:txBody>
+          <a:bodyPr/>
+          <a:lstStyle/>
+          <a:p>
+            <a:endParaRPr lang="pt-BR"/>
+          </a:p>
+        </p:txBody>
+      </p:sp>
+      <p:pic>
+        <p:nvPicPr>
+          <p:cNvPr id="7" name="Imagem 6" descr="Interface gráfica do usuário, Texto, Aplicativo, Email&#10;&#10;Descrição gerada automaticamente">
+            <a:extLst>
+              <a:ext uri="{FF2B5EF4-FFF2-40B4-BE49-F238E27FC236}">
+                <a16:creationId xmlns:a16="http://schemas.microsoft.com/office/drawing/2014/main" id="{563E98EE-36C3-4AD8-8CDA-40582E7657F7}"/>
+              </a:ext>
+            </a:extLst>
+          </p:cNvPr>
+          <p:cNvPicPr>
+            <a:picLocks noChangeAspect="1"/>
+          </p:cNvPicPr>
+          <p:nvPr/>
+        </p:nvPicPr>
+        <p:blipFill rotWithShape="1">
+          <a:blip r:embed="rId2"/>
+          <a:srcRect l="19688" t="22043" b="1534"/>
+          <a:stretch/>
+        </p:blipFill>
+        <p:spPr>
+          <a:xfrm>
+            <a:off x="516038" y="1446896"/>
+            <a:ext cx="8111924" cy="3696604"/>
+          </a:xfrm>
+          <a:prstGeom prst="rect">
+            <a:avLst/>
+          </a:prstGeom>
+        </p:spPr>
+      </p:pic>
+    </p:spTree>
+    <p:extLst>
+      <p:ext uri="{BB962C8B-B14F-4D97-AF65-F5344CB8AC3E}">
+        <p14:creationId xmlns:p14="http://schemas.microsoft.com/office/powerpoint/2010/main" val="1777527954"/>
+      </p:ext>
+    </p:extLst>
+  </p:cSld>
+  <p:clrMapOvr>
+    <a:masterClrMapping/>
+  </p:clrMapOvr>
+</p:sld>
+</file>
+
+<file path=ppt/slides/slide21.xml><?xml version="1.0" encoding="utf-8"?>
+<p:sld xmlns:a="http://schemas.openxmlformats.org/drawingml/2006/main" xmlns:r="http://schemas.openxmlformats.org/officeDocument/2006/relationships" xmlns:p="http://schemas.openxmlformats.org/presentationml/2006/main">
+  <p:cSld>
+    <p:spTree>
+      <p:nvGrpSpPr>
+        <p:cNvPr id="1" name=""/>
+        <p:cNvGrpSpPr/>
+        <p:nvPr/>
+      </p:nvGrpSpPr>
+      <p:grpSpPr>
+        <a:xfrm>
+          <a:off x="0" y="0"/>
+          <a:ext cx="0" cy="0"/>
+          <a:chOff x="0" y="0"/>
+          <a:chExt cx="0" cy="0"/>
+        </a:xfrm>
+      </p:grpSpPr>
+      <p:sp>
+        <p:nvSpPr>
+          <p:cNvPr id="2" name="Título 1">
+            <a:extLst>
+              <a:ext uri="{FF2B5EF4-FFF2-40B4-BE49-F238E27FC236}">
+                <a16:creationId xmlns:a16="http://schemas.microsoft.com/office/drawing/2014/main" id="{10B88F02-4667-49E3-8502-C40E778EF98C}"/>
+              </a:ext>
+            </a:extLst>
+          </p:cNvPr>
+          <p:cNvSpPr>
+            <a:spLocks noGrp="1"/>
+          </p:cNvSpPr>
+          <p:nvPr>
+            <p:ph type="title"/>
+          </p:nvPr>
+        </p:nvSpPr>
+        <p:spPr/>
+        <p:txBody>
+          <a:bodyPr/>
+          <a:lstStyle/>
+          <a:p>
+            <a:r>
+              <a:rPr lang="pt-BR" dirty="0"/>
+              <a:t>Resultados CADIMA</a:t>
+            </a:r>
+          </a:p>
+        </p:txBody>
+      </p:sp>
+      <p:sp>
+        <p:nvSpPr>
+          <p:cNvPr id="3" name="Espaço Reservado para Texto 2">
+            <a:extLst>
+              <a:ext uri="{FF2B5EF4-FFF2-40B4-BE49-F238E27FC236}">
+                <a16:creationId xmlns:a16="http://schemas.microsoft.com/office/drawing/2014/main" id="{EE4DDF1D-D49F-4238-BDFC-99A59521136E}"/>
+              </a:ext>
+            </a:extLst>
+          </p:cNvPr>
+          <p:cNvSpPr>
+            <a:spLocks noGrp="1"/>
+          </p:cNvSpPr>
+          <p:nvPr>
+            <p:ph type="body" idx="1"/>
+          </p:nvPr>
+        </p:nvSpPr>
+        <p:spPr/>
+        <p:txBody>
+          <a:bodyPr>
+            <a:normAutofit/>
+          </a:bodyPr>
+          <a:lstStyle/>
+          <a:p>
+            <a:r>
+              <a:rPr lang="pt-BR" dirty="0"/>
+              <a:t>Garante uma documentação completa de todo o processo de revisão</a:t>
+            </a:r>
+          </a:p>
+          <a:p>
+            <a:endParaRPr lang="pt-BR" dirty="0"/>
+          </a:p>
+          <a:p>
+            <a:pPr lvl="1"/>
+            <a:r>
+              <a:rPr lang="pt-BR" dirty="0"/>
+              <a:t>Protocolo da Revisão</a:t>
+            </a:r>
+          </a:p>
+          <a:p>
+            <a:pPr lvl="1"/>
+            <a:r>
+              <a:rPr lang="pt-BR" dirty="0"/>
+              <a:t>Artigo de Revisão Sistemática </a:t>
+            </a:r>
+          </a:p>
+          <a:p>
+            <a:endParaRPr lang="pt-BR" dirty="0"/>
+          </a:p>
+          <a:p>
+            <a:endParaRPr lang="pt-BR" dirty="0"/>
+          </a:p>
+          <a:p>
+            <a:endParaRPr lang="pt-BR" dirty="0"/>
+          </a:p>
+          <a:p>
+            <a:endParaRPr lang="pt-BR" dirty="0"/>
+          </a:p>
+        </p:txBody>
+      </p:sp>
+    </p:spTree>
+    <p:extLst>
+      <p:ext uri="{BB962C8B-B14F-4D97-AF65-F5344CB8AC3E}">
+        <p14:creationId xmlns:p14="http://schemas.microsoft.com/office/powerpoint/2010/main" val="1717494546"/>
+      </p:ext>
+    </p:extLst>
+  </p:cSld>
+  <p:clrMapOvr>
+    <a:masterClrMapping/>
+  </p:clrMapOvr>
+</p:sld>
+</file>
+
+<file path=ppt/slides/slide22.xml><?xml version="1.0" encoding="utf-8"?>
+<p:sld xmlns:a="http://schemas.openxmlformats.org/drawingml/2006/main" xmlns:r="http://schemas.openxmlformats.org/officeDocument/2006/relationships" xmlns:p="http://schemas.openxmlformats.org/presentationml/2006/main">
+  <p:cSld>
+    <p:spTree>
+      <p:nvGrpSpPr>
+        <p:cNvPr id="1" name=""/>
+        <p:cNvGrpSpPr/>
+        <p:nvPr/>
+      </p:nvGrpSpPr>
+      <p:grpSpPr>
+        <a:xfrm>
+          <a:off x="0" y="0"/>
+          <a:ext cx="0" cy="0"/>
+          <a:chOff x="0" y="0"/>
+          <a:chExt cx="0" cy="0"/>
+        </a:xfrm>
+      </p:grpSpPr>
+      <p:sp>
+        <p:nvSpPr>
+          <p:cNvPr id="2" name="Título 1">
+            <a:extLst>
+              <a:ext uri="{FF2B5EF4-FFF2-40B4-BE49-F238E27FC236}">
+                <a16:creationId xmlns:a16="http://schemas.microsoft.com/office/drawing/2014/main" id="{CE1335B8-A5CA-4310-901C-CC99D529A40D}"/>
+              </a:ext>
+            </a:extLst>
+          </p:cNvPr>
+          <p:cNvSpPr>
+            <a:spLocks noGrp="1"/>
+          </p:cNvSpPr>
+          <p:nvPr>
+            <p:ph type="title"/>
+          </p:nvPr>
+        </p:nvSpPr>
+        <p:spPr/>
+        <p:txBody>
+          <a:bodyPr/>
+          <a:lstStyle/>
+          <a:p>
+            <a:r>
+              <a:rPr lang="pt-BR" dirty="0"/>
+              <a:t>CADIMA - Diagrama de fluxo</a:t>
+            </a:r>
+          </a:p>
+        </p:txBody>
+      </p:sp>
+      <p:sp>
+        <p:nvSpPr>
+          <p:cNvPr id="3" name="Espaço Reservado para Texto 2">
+            <a:extLst>
+              <a:ext uri="{FF2B5EF4-FFF2-40B4-BE49-F238E27FC236}">
+                <a16:creationId xmlns:a16="http://schemas.microsoft.com/office/drawing/2014/main" id="{8C977624-7D71-4812-A4C5-8427577A51EA}"/>
+              </a:ext>
+            </a:extLst>
+          </p:cNvPr>
+          <p:cNvSpPr>
+            <a:spLocks noGrp="1"/>
+          </p:cNvSpPr>
+          <p:nvPr>
+            <p:ph type="body" idx="1"/>
+          </p:nvPr>
+        </p:nvSpPr>
+        <p:spPr/>
+        <p:txBody>
+          <a:bodyPr/>
+          <a:lstStyle/>
+          <a:p>
+            <a:endParaRPr lang="pt-BR" dirty="0"/>
+          </a:p>
+        </p:txBody>
+      </p:sp>
+      <p:pic>
+        <p:nvPicPr>
+          <p:cNvPr id="7" name="Imagem 6" descr="Interface gráfica do usuário&#10;&#10;Descrição gerada automaticamente">
+            <a:extLst>
+              <a:ext uri="{FF2B5EF4-FFF2-40B4-BE49-F238E27FC236}">
+                <a16:creationId xmlns:a16="http://schemas.microsoft.com/office/drawing/2014/main" id="{B93F3AD0-5ECB-4105-9F46-3779C15AFEFE}"/>
+              </a:ext>
+            </a:extLst>
+          </p:cNvPr>
+          <p:cNvPicPr>
+            <a:picLocks noChangeAspect="1"/>
+          </p:cNvPicPr>
+          <p:nvPr/>
+        </p:nvPicPr>
+        <p:blipFill>
+          <a:blip r:embed="rId3"/>
+          <a:stretch>
+            <a:fillRect/>
+          </a:stretch>
+        </p:blipFill>
+        <p:spPr>
+          <a:xfrm>
+            <a:off x="1251187" y="1178826"/>
+            <a:ext cx="6749024" cy="3713896"/>
+          </a:xfrm>
+          <a:prstGeom prst="rect">
+            <a:avLst/>
+          </a:prstGeom>
+        </p:spPr>
+      </p:pic>
+    </p:spTree>
+    <p:extLst>
+      <p:ext uri="{BB962C8B-B14F-4D97-AF65-F5344CB8AC3E}">
+        <p14:creationId xmlns:p14="http://schemas.microsoft.com/office/powerpoint/2010/main" val="3425323785"/>
+      </p:ext>
+    </p:extLst>
+  </p:cSld>
+  <p:clrMapOvr>
+    <a:masterClrMapping/>
+  </p:clrMapOvr>
+</p:sld>
+</file>
+
+<file path=ppt/slides/slide23.xml><?xml version="1.0" encoding="utf-8"?>
+<p:sld xmlns:a="http://schemas.openxmlformats.org/drawingml/2006/main" xmlns:r="http://schemas.openxmlformats.org/officeDocument/2006/relationships" xmlns:p="http://schemas.openxmlformats.org/presentationml/2006/main">
+  <p:cSld>
+    <p:spTree>
+      <p:nvGrpSpPr>
+        <p:cNvPr id="1" name=""/>
+        <p:cNvGrpSpPr/>
+        <p:nvPr/>
+      </p:nvGrpSpPr>
+      <p:grpSpPr>
+        <a:xfrm>
+          <a:off x="0" y="0"/>
+          <a:ext cx="0" cy="0"/>
+          <a:chOff x="0" y="0"/>
+          <a:chExt cx="0" cy="0"/>
+        </a:xfrm>
+      </p:grpSpPr>
+      <p:sp>
+        <p:nvSpPr>
+          <p:cNvPr id="2" name="Título 1">
+            <a:extLst>
+              <a:ext uri="{FF2B5EF4-FFF2-40B4-BE49-F238E27FC236}">
                 <a16:creationId xmlns:a16="http://schemas.microsoft.com/office/drawing/2014/main" id="{102C0FA0-50C3-4FD4-A5CA-C178788DD0B3}"/>
               </a:ext>
             </a:extLst>
@@ -27412,8 +28377,8 @@
         </p:blipFill>
         <p:spPr>
           <a:xfrm>
-            <a:off x="232011" y="1597875"/>
-            <a:ext cx="8584442" cy="3332308"/>
+            <a:off x="0" y="1317821"/>
+            <a:ext cx="9144000" cy="3549516"/>
           </a:xfrm>
           <a:prstGeom prst="rect">
             <a:avLst/>
@@ -27433,7 +28398,7 @@
 </p:sld>
 </file>
 
-<file path=ppt/slides/slide21.xml><?xml version="1.0" encoding="utf-8"?>
+<file path=ppt/slides/slide24.xml><?xml version="1.0" encoding="utf-8"?>
 <p:sld xmlns:a="http://schemas.openxmlformats.org/drawingml/2006/main" xmlns:r="http://schemas.openxmlformats.org/officeDocument/2006/relationships" xmlns:p="http://schemas.openxmlformats.org/presentationml/2006/main">
   <p:cSld>
     <p:spTree>
@@ -28541,7 +29506,7 @@
                     <a:srgbClr val="424242"/>
                   </a:solidFill>
                 </a:rPr>
-                <a:t>Análises quantitativa e qualitative dos resultados</a:t>
+                <a:t>Análises quantitativa e qualitativa dos resultados</a:t>
               </a:r>
             </a:p>
             <a:p>
@@ -28786,9 +29751,9 @@
         <p:grpSpPr>
           <a:xfrm>
             <a:off x="6778882" y="2358210"/>
-            <a:ext cx="1953639" cy="1477328"/>
+            <a:ext cx="1953639" cy="1358905"/>
             <a:chOff x="332936" y="1858324"/>
-            <a:chExt cx="2975111" cy="2788000"/>
+            <a:chExt cx="2975111" cy="2564513"/>
           </a:xfrm>
         </p:grpSpPr>
         <p:sp>
@@ -28845,8 +29810,8 @@
           </p:nvSpPr>
           <p:spPr>
             <a:xfrm>
-              <a:off x="332936" y="3086922"/>
-              <a:ext cx="2975111" cy="1559402"/>
+              <a:off x="332936" y="3086921"/>
+              <a:ext cx="2975111" cy="1335916"/>
             </a:xfrm>
             <a:prstGeom prst="rect">
               <a:avLst/>
@@ -28866,7 +29831,7 @@
                     <a:srgbClr val="424242"/>
                   </a:solidFill>
                 </a:rPr>
-                <a:t>Compilação dos dados extraidos </a:t>
+                <a:t>Compilação dos dados extraídos </a:t>
               </a:r>
             </a:p>
             <a:p>

</xml_diff>

<commit_message>
ajustes finais da apresentação
</commit_message>
<xml_diff>
--- a/apresentacao-revisao-sistematica.pptx
+++ b/apresentacao-revisao-sistematica.pptx
@@ -26723,6 +26723,79 @@
           </a:p>
         </p:txBody>
       </p:sp>
+      <p:sp>
+        <p:nvSpPr>
+          <p:cNvPr id="4" name="CaixaDeTexto 3">
+            <a:extLst>
+              <a:ext uri="{FF2B5EF4-FFF2-40B4-BE49-F238E27FC236}">
+                <a16:creationId xmlns:a16="http://schemas.microsoft.com/office/drawing/2014/main" id="{2815CBE2-F0C6-4981-A468-55AC92CBC489}"/>
+              </a:ext>
+            </a:extLst>
+          </p:cNvPr>
+          <p:cNvSpPr txBox="1"/>
+          <p:nvPr/>
+        </p:nvSpPr>
+        <p:spPr>
+          <a:xfrm>
+            <a:off x="7225259" y="4544925"/>
+            <a:ext cx="1641423" cy="276999"/>
+          </a:xfrm>
+          <a:prstGeom prst="rect">
+            <a:avLst/>
+          </a:prstGeom>
+          <a:noFill/>
+        </p:spPr>
+        <p:txBody>
+          <a:bodyPr wrap="square">
+            <a:spAutoFit/>
+          </a:bodyPr>
+          <a:lstStyle/>
+          <a:p>
+            <a:r>
+              <a:rPr lang="pt-BR" sz="1200" b="0" i="0" u="none" strike="noStrike" baseline="0" dirty="0">
+                <a:solidFill>
+                  <a:srgbClr val="424242"/>
+                </a:solidFill>
+                <a:latin typeface="Nunito" panose="00000500000000000000" pitchFamily="2" charset="0"/>
+              </a:rPr>
+              <a:t>(Kohl </a:t>
+            </a:r>
+            <a:r>
+              <a:rPr lang="pt-BR" sz="1200" b="0" i="1" u="none" strike="noStrike" baseline="0" dirty="0">
+                <a:solidFill>
+                  <a:srgbClr val="424242"/>
+                </a:solidFill>
+                <a:latin typeface="Nunito" panose="00000500000000000000" pitchFamily="2" charset="0"/>
+              </a:rPr>
+              <a:t>et al.</a:t>
+            </a:r>
+            <a:r>
+              <a:rPr lang="pt-BR" sz="1200" i="1" dirty="0">
+                <a:solidFill>
+                  <a:srgbClr val="424242"/>
+                </a:solidFill>
+                <a:latin typeface="Nunito" panose="00000500000000000000" pitchFamily="2" charset="0"/>
+              </a:rPr>
+              <a:t>, </a:t>
+            </a:r>
+            <a:r>
+              <a:rPr lang="pt-BR" sz="1200" b="0" i="1" u="none" strike="noStrike" baseline="0" dirty="0">
+                <a:solidFill>
+                  <a:srgbClr val="424242"/>
+                </a:solidFill>
+                <a:latin typeface="Nunito" panose="00000500000000000000" pitchFamily="2" charset="0"/>
+              </a:rPr>
+              <a:t>2018)</a:t>
+            </a:r>
+            <a:endParaRPr lang="pt-BR" sz="1200" dirty="0">
+              <a:solidFill>
+                <a:srgbClr val="424242"/>
+              </a:solidFill>
+              <a:latin typeface="Nunito" panose="00000500000000000000" pitchFamily="2" charset="0"/>
+            </a:endParaRPr>
+          </a:p>
+        </p:txBody>
+      </p:sp>
     </p:spTree>
     <p:extLst>
       <p:ext uri="{BB962C8B-B14F-4D97-AF65-F5344CB8AC3E}">
@@ -27482,7 +27555,7 @@
         </p:blipFill>
         <p:spPr>
           <a:xfrm>
-            <a:off x="82007" y="1393519"/>
+            <a:off x="82007" y="1441286"/>
             <a:ext cx="8979986" cy="3540640"/>
           </a:xfrm>
           <a:prstGeom prst="rect">
@@ -27765,7 +27838,7 @@
         </p:blipFill>
         <p:spPr>
           <a:xfrm>
-            <a:off x="-2107" y="1643050"/>
+            <a:off x="-2107" y="1861414"/>
             <a:ext cx="9148214" cy="2586910"/>
           </a:xfrm>
           <a:prstGeom prst="rect">

</xml_diff>